<commit_message>
Issue #1 - Adding galary and about page design documentation
</commit_message>
<xml_diff>
--- a/documentation/flow_diagrams/Diagrams.pptx
+++ b/documentation/flow_diagrams/Diagrams.pptx
@@ -9,6 +9,8 @@
     <p:sldId id="257" r:id="rId3"/>
     <p:sldId id="259" r:id="rId4"/>
     <p:sldId id="260" r:id="rId5"/>
+    <p:sldId id="261" r:id="rId6"/>
+    <p:sldId id="262" r:id="rId7"/>
   </p:sldIdLst>
   <p:sldSz cx="12192000" cy="6858000"/>
   <p:notesSz cx="6858000" cy="9144000"/>
@@ -107,6 +109,11 @@
       </a:defRPr>
     </a:lvl9pPr>
   </p:defaultTextStyle>
+  <p:extLst>
+    <p:ext uri="{EFAFB233-063F-42B5-8137-9DF3F51BA10A}">
+      <p15:sldGuideLst xmlns:p15="http://schemas.microsoft.com/office/powerpoint/2012/main"/>
+    </p:ext>
+  </p:extLst>
 </p:presentation>
 </file>
 
@@ -3446,7 +3453,7 @@
               <a:pPr algn="ctr"/>
               <a:r>
                 <a:rPr lang="en-US" sz="1600" dirty="0"/>
-                <a:t>About</a:t>
+                <a:t>About Us</a:t>
               </a:r>
             </a:p>
           </p:txBody>
@@ -4803,847 +4810,805 @@
           </a:p>
         </p:txBody>
       </p:sp>
-      <p:grpSp>
-        <p:nvGrpSpPr>
-          <p:cNvPr id="41" name="Group 40">
-            <a:extLst>
-              <a:ext uri="{FF2B5EF4-FFF2-40B4-BE49-F238E27FC236}">
-                <a16:creationId xmlns:a16="http://schemas.microsoft.com/office/drawing/2014/main" id="{E9CD1290-1E7A-4347-AE18-20E459F15A82}"/>
-              </a:ext>
-            </a:extLst>
-          </p:cNvPr>
-          <p:cNvGrpSpPr/>
+      <p:sp>
+        <p:nvSpPr>
+          <p:cNvPr id="14" name="Rectangle 13">
+            <a:extLst>
+              <a:ext uri="{FF2B5EF4-FFF2-40B4-BE49-F238E27FC236}">
+                <a16:creationId xmlns:a16="http://schemas.microsoft.com/office/drawing/2014/main" id="{6DF2B164-7CCC-45AD-9F27-839B30D6C127}"/>
+              </a:ext>
+            </a:extLst>
+          </p:cNvPr>
+          <p:cNvSpPr/>
           <p:nvPr/>
-        </p:nvGrpSpPr>
-        <p:grpSpPr>
+        </p:nvSpPr>
+        <p:spPr>
           <a:xfrm>
             <a:off x="1397000" y="1261300"/>
-            <a:ext cx="9398000" cy="5579130"/>
-            <a:chOff x="1397000" y="1261300"/>
-            <a:chExt cx="9398000" cy="5579130"/>
+            <a:ext cx="9398000" cy="5145850"/>
           </a:xfrm>
-        </p:grpSpPr>
-        <p:grpSp>
-          <p:nvGrpSpPr>
-            <p:cNvPr id="10" name="Group 9">
-              <a:extLst>
-                <a:ext uri="{FF2B5EF4-FFF2-40B4-BE49-F238E27FC236}">
-                  <a16:creationId xmlns:a16="http://schemas.microsoft.com/office/drawing/2014/main" id="{056549CB-0A55-4BBC-BEEE-A0FD816F4EC2}"/>
-                </a:ext>
-              </a:extLst>
-            </p:cNvPr>
-            <p:cNvGrpSpPr/>
-            <p:nvPr/>
-          </p:nvGrpSpPr>
-          <p:grpSpPr>
-            <a:xfrm>
-              <a:off x="1397000" y="1261300"/>
-              <a:ext cx="9398000" cy="5145850"/>
-              <a:chOff x="1397000" y="1261300"/>
-              <a:chExt cx="9398000" cy="5145850"/>
-            </a:xfrm>
-          </p:grpSpPr>
-          <p:sp>
-            <p:nvSpPr>
-              <p:cNvPr id="14" name="Rectangle 13">
-                <a:extLst>
-                  <a:ext uri="{FF2B5EF4-FFF2-40B4-BE49-F238E27FC236}">
-                    <a16:creationId xmlns:a16="http://schemas.microsoft.com/office/drawing/2014/main" id="{6DF2B164-7CCC-45AD-9F27-839B30D6C127}"/>
-                  </a:ext>
-                </a:extLst>
-              </p:cNvPr>
-              <p:cNvSpPr/>
-              <p:nvPr/>
-            </p:nvSpPr>
-            <p:spPr>
-              <a:xfrm>
-                <a:off x="1397000" y="1261300"/>
-                <a:ext cx="9398000" cy="5145850"/>
-              </a:xfrm>
-              <a:prstGeom prst="rect">
-                <a:avLst/>
-              </a:prstGeom>
-            </p:spPr>
-            <p:style>
-              <a:lnRef idx="2">
-                <a:schemeClr val="dk1"/>
-              </a:lnRef>
-              <a:fillRef idx="1">
-                <a:schemeClr val="lt1"/>
-              </a:fillRef>
-              <a:effectRef idx="0">
-                <a:schemeClr val="dk1"/>
-              </a:effectRef>
-              <a:fontRef idx="minor">
-                <a:schemeClr val="dk1"/>
-              </a:fontRef>
-            </p:style>
-            <p:txBody>
-              <a:bodyPr rtlCol="0" anchor="ctr"/>
-              <a:lstStyle/>
-              <a:p>
-                <a:pPr algn="ctr"/>
-                <a:endParaRPr lang="en-US" dirty="0"/>
-              </a:p>
-            </p:txBody>
-          </p:sp>
-          <p:sp>
-            <p:nvSpPr>
-              <p:cNvPr id="2" name="Rectangle 1">
-                <a:extLst>
-                  <a:ext uri="{FF2B5EF4-FFF2-40B4-BE49-F238E27FC236}">
-                    <a16:creationId xmlns:a16="http://schemas.microsoft.com/office/drawing/2014/main" id="{B2A926F5-B978-4698-BBA9-81143CB388A4}"/>
-                  </a:ext>
-                </a:extLst>
-              </p:cNvPr>
-              <p:cNvSpPr/>
-              <p:nvPr/>
-            </p:nvSpPr>
-            <p:spPr>
-              <a:xfrm>
-                <a:off x="1492250" y="2590800"/>
-                <a:ext cx="9201150" cy="2781301"/>
-              </a:xfrm>
-              <a:prstGeom prst="rect">
-                <a:avLst/>
-              </a:prstGeom>
-            </p:spPr>
-            <p:style>
-              <a:lnRef idx="2">
-                <a:schemeClr val="dk1"/>
-              </a:lnRef>
-              <a:fillRef idx="1">
-                <a:schemeClr val="lt1"/>
-              </a:fillRef>
-              <a:effectRef idx="0">
-                <a:schemeClr val="dk1"/>
-              </a:effectRef>
-              <a:fontRef idx="minor">
-                <a:schemeClr val="dk1"/>
-              </a:fontRef>
-            </p:style>
-            <p:txBody>
-              <a:bodyPr rtlCol="0" anchor="ctr"/>
-              <a:lstStyle/>
-              <a:p>
-                <a:pPr algn="ctr"/>
-                <a:r>
-                  <a:rPr lang="en-US" dirty="0"/>
-                  <a:t>Image Slider</a:t>
-                </a:r>
-              </a:p>
-            </p:txBody>
-          </p:sp>
-          <p:sp>
-            <p:nvSpPr>
-              <p:cNvPr id="3" name="Rectangle 2">
-                <a:extLst>
-                  <a:ext uri="{FF2B5EF4-FFF2-40B4-BE49-F238E27FC236}">
-                    <a16:creationId xmlns:a16="http://schemas.microsoft.com/office/drawing/2014/main" id="{97D8D097-E0D1-45DC-B495-4DAF92DDC517}"/>
-                  </a:ext>
-                </a:extLst>
-              </p:cNvPr>
-              <p:cNvSpPr/>
-              <p:nvPr/>
-            </p:nvSpPr>
-            <p:spPr>
-              <a:xfrm>
-                <a:off x="5162550" y="5194300"/>
-                <a:ext cx="1860550" cy="177800"/>
-              </a:xfrm>
-              <a:prstGeom prst="rect">
-                <a:avLst/>
-              </a:prstGeom>
-            </p:spPr>
-            <p:style>
-              <a:lnRef idx="2">
-                <a:schemeClr val="dk1"/>
-              </a:lnRef>
-              <a:fillRef idx="1">
-                <a:schemeClr val="lt1"/>
-              </a:fillRef>
-              <a:effectRef idx="0">
-                <a:schemeClr val="dk1"/>
-              </a:effectRef>
-              <a:fontRef idx="minor">
-                <a:schemeClr val="dk1"/>
-              </a:fontRef>
-            </p:style>
-            <p:txBody>
-              <a:bodyPr rtlCol="0" anchor="ctr"/>
-              <a:lstStyle/>
-              <a:p>
-                <a:pPr algn="ctr"/>
-                <a:endParaRPr lang="en-US"/>
-              </a:p>
-            </p:txBody>
-          </p:sp>
-          <p:sp>
-            <p:nvSpPr>
-              <p:cNvPr id="7" name="Oval 6">
-                <a:extLst>
-                  <a:ext uri="{FF2B5EF4-FFF2-40B4-BE49-F238E27FC236}">
-                    <a16:creationId xmlns:a16="http://schemas.microsoft.com/office/drawing/2014/main" id="{8528876C-C39B-4D1C-80DB-1C26040DBE4B}"/>
-                  </a:ext>
-                </a:extLst>
-              </p:cNvPr>
-              <p:cNvSpPr/>
-              <p:nvPr/>
-            </p:nvSpPr>
-            <p:spPr>
-              <a:xfrm>
-                <a:off x="5274733" y="5209116"/>
-                <a:ext cx="148167" cy="148167"/>
-              </a:xfrm>
-              <a:prstGeom prst="ellipse">
-                <a:avLst/>
-              </a:prstGeom>
-            </p:spPr>
-            <p:style>
-              <a:lnRef idx="2">
-                <a:schemeClr val="dk1"/>
-              </a:lnRef>
-              <a:fillRef idx="1">
-                <a:schemeClr val="lt1"/>
-              </a:fillRef>
-              <a:effectRef idx="0">
-                <a:schemeClr val="dk1"/>
-              </a:effectRef>
-              <a:fontRef idx="minor">
-                <a:schemeClr val="dk1"/>
-              </a:fontRef>
-            </p:style>
-            <p:txBody>
-              <a:bodyPr rtlCol="0" anchor="ctr"/>
-              <a:lstStyle/>
-              <a:p>
-                <a:pPr algn="ctr"/>
-                <a:endParaRPr lang="en-US"/>
-              </a:p>
-            </p:txBody>
-          </p:sp>
-          <p:sp>
-            <p:nvSpPr>
-              <p:cNvPr id="22" name="Oval 21">
-                <a:extLst>
-                  <a:ext uri="{FF2B5EF4-FFF2-40B4-BE49-F238E27FC236}">
-                    <a16:creationId xmlns:a16="http://schemas.microsoft.com/office/drawing/2014/main" id="{F24D3581-C4C5-453E-8FF7-EE6BC6CAB3FD}"/>
-                  </a:ext>
-                </a:extLst>
-              </p:cNvPr>
-              <p:cNvSpPr/>
-              <p:nvPr/>
-            </p:nvSpPr>
-            <p:spPr>
-              <a:xfrm>
-                <a:off x="5644620" y="5211233"/>
-                <a:ext cx="148167" cy="148167"/>
-              </a:xfrm>
-              <a:prstGeom prst="ellipse">
-                <a:avLst/>
-              </a:prstGeom>
-            </p:spPr>
-            <p:style>
-              <a:lnRef idx="2">
-                <a:schemeClr val="dk1"/>
-              </a:lnRef>
-              <a:fillRef idx="1">
-                <a:schemeClr val="lt1"/>
-              </a:fillRef>
-              <a:effectRef idx="0">
-                <a:schemeClr val="dk1"/>
-              </a:effectRef>
-              <a:fontRef idx="minor">
-                <a:schemeClr val="dk1"/>
-              </a:fontRef>
-            </p:style>
-            <p:txBody>
-              <a:bodyPr rtlCol="0" anchor="ctr"/>
-              <a:lstStyle/>
-              <a:p>
-                <a:pPr algn="ctr"/>
-                <a:endParaRPr lang="en-US"/>
-              </a:p>
-            </p:txBody>
-          </p:sp>
-          <p:sp>
-            <p:nvSpPr>
-              <p:cNvPr id="23" name="Oval 22">
-                <a:extLst>
-                  <a:ext uri="{FF2B5EF4-FFF2-40B4-BE49-F238E27FC236}">
-                    <a16:creationId xmlns:a16="http://schemas.microsoft.com/office/drawing/2014/main" id="{DDD5A35E-0ECF-4739-B529-571DB5FED10E}"/>
-                  </a:ext>
-                </a:extLst>
-              </p:cNvPr>
-              <p:cNvSpPr/>
-              <p:nvPr/>
-            </p:nvSpPr>
-            <p:spPr>
-              <a:xfrm>
-                <a:off x="6039908" y="5209116"/>
-                <a:ext cx="148167" cy="148167"/>
-              </a:xfrm>
-              <a:prstGeom prst="ellipse">
-                <a:avLst/>
-              </a:prstGeom>
-            </p:spPr>
-            <p:style>
-              <a:lnRef idx="2">
-                <a:schemeClr val="dk1"/>
-              </a:lnRef>
-              <a:fillRef idx="1">
-                <a:schemeClr val="lt1"/>
-              </a:fillRef>
-              <a:effectRef idx="0">
-                <a:schemeClr val="dk1"/>
-              </a:effectRef>
-              <a:fontRef idx="minor">
-                <a:schemeClr val="dk1"/>
-              </a:fontRef>
-            </p:style>
-            <p:txBody>
-              <a:bodyPr rtlCol="0" anchor="ctr"/>
-              <a:lstStyle/>
-              <a:p>
-                <a:pPr algn="ctr"/>
-                <a:endParaRPr lang="en-US"/>
-              </a:p>
-            </p:txBody>
-          </p:sp>
-          <p:sp>
-            <p:nvSpPr>
-              <p:cNvPr id="24" name="Oval 23">
-                <a:extLst>
-                  <a:ext uri="{FF2B5EF4-FFF2-40B4-BE49-F238E27FC236}">
-                    <a16:creationId xmlns:a16="http://schemas.microsoft.com/office/drawing/2014/main" id="{1322B983-6E3A-416C-B087-9028587862E7}"/>
-                  </a:ext>
-                </a:extLst>
-              </p:cNvPr>
-              <p:cNvSpPr/>
-              <p:nvPr/>
-            </p:nvSpPr>
-            <p:spPr>
-              <a:xfrm>
-                <a:off x="6409795" y="5209115"/>
-                <a:ext cx="148167" cy="148167"/>
-              </a:xfrm>
-              <a:prstGeom prst="ellipse">
-                <a:avLst/>
-              </a:prstGeom>
-            </p:spPr>
-            <p:style>
-              <a:lnRef idx="2">
-                <a:schemeClr val="dk1"/>
-              </a:lnRef>
-              <a:fillRef idx="1">
-                <a:schemeClr val="lt1"/>
-              </a:fillRef>
-              <a:effectRef idx="0">
-                <a:schemeClr val="dk1"/>
-              </a:effectRef>
-              <a:fontRef idx="minor">
-                <a:schemeClr val="dk1"/>
-              </a:fontRef>
-            </p:style>
-            <p:txBody>
-              <a:bodyPr rtlCol="0" anchor="ctr"/>
-              <a:lstStyle/>
-              <a:p>
-                <a:pPr algn="ctr"/>
-                <a:endParaRPr lang="en-US"/>
-              </a:p>
-            </p:txBody>
-          </p:sp>
-          <p:sp>
-            <p:nvSpPr>
-              <p:cNvPr id="25" name="Oval 24">
-                <a:extLst>
-                  <a:ext uri="{FF2B5EF4-FFF2-40B4-BE49-F238E27FC236}">
-                    <a16:creationId xmlns:a16="http://schemas.microsoft.com/office/drawing/2014/main" id="{E0374383-057C-49C0-8296-0029D7BFAB39}"/>
-                  </a:ext>
-                </a:extLst>
-              </p:cNvPr>
-              <p:cNvSpPr/>
-              <p:nvPr/>
-            </p:nvSpPr>
-            <p:spPr>
-              <a:xfrm>
-                <a:off x="6768834" y="5209115"/>
-                <a:ext cx="148167" cy="148167"/>
-              </a:xfrm>
-              <a:prstGeom prst="ellipse">
-                <a:avLst/>
-              </a:prstGeom>
-            </p:spPr>
-            <p:style>
-              <a:lnRef idx="2">
-                <a:schemeClr val="dk1"/>
-              </a:lnRef>
-              <a:fillRef idx="1">
-                <a:schemeClr val="lt1"/>
-              </a:fillRef>
-              <a:effectRef idx="0">
-                <a:schemeClr val="dk1"/>
-              </a:effectRef>
-              <a:fontRef idx="minor">
-                <a:schemeClr val="dk1"/>
-              </a:fontRef>
-            </p:style>
-            <p:txBody>
-              <a:bodyPr rtlCol="0" anchor="ctr"/>
-              <a:lstStyle/>
-              <a:p>
-                <a:pPr algn="ctr"/>
-                <a:endParaRPr lang="en-US"/>
-              </a:p>
-            </p:txBody>
-          </p:sp>
-          <p:sp>
-            <p:nvSpPr>
-              <p:cNvPr id="26" name="TextBox 25">
-                <a:extLst>
-                  <a:ext uri="{FF2B5EF4-FFF2-40B4-BE49-F238E27FC236}">
-                    <a16:creationId xmlns:a16="http://schemas.microsoft.com/office/drawing/2014/main" id="{07FFC8BE-BDF5-42C4-A471-E7EF7271F9DC}"/>
-                  </a:ext>
-                </a:extLst>
-              </p:cNvPr>
-              <p:cNvSpPr txBox="1"/>
-              <p:nvPr/>
-            </p:nvSpPr>
-            <p:spPr>
-              <a:xfrm>
-                <a:off x="1397000" y="1283553"/>
-                <a:ext cx="9398000" cy="830997"/>
-              </a:xfrm>
-              <a:prstGeom prst="rect">
-                <a:avLst/>
-              </a:prstGeom>
-              <a:noFill/>
-            </p:spPr>
-            <p:txBody>
-              <a:bodyPr wrap="square" rtlCol="0">
-                <a:spAutoFit/>
-              </a:bodyPr>
-              <a:lstStyle/>
-              <a:p>
-                <a:pPr algn="ctr"/>
-                <a:r>
-                  <a:rPr lang="en-US" sz="4800" dirty="0"/>
-                  <a:t>Carob Cottage</a:t>
-                </a:r>
-                <a:endParaRPr lang="en-US" dirty="0"/>
-              </a:p>
-            </p:txBody>
-          </p:sp>
-          <p:sp>
-            <p:nvSpPr>
-              <p:cNvPr id="9" name="TextBox 8">
-                <a:extLst>
-                  <a:ext uri="{FF2B5EF4-FFF2-40B4-BE49-F238E27FC236}">
-                    <a16:creationId xmlns:a16="http://schemas.microsoft.com/office/drawing/2014/main" id="{B4A1CAD3-2DB5-4B0C-AB30-770DA7751867}"/>
-                  </a:ext>
-                </a:extLst>
-              </p:cNvPr>
-              <p:cNvSpPr txBox="1"/>
-              <p:nvPr/>
-            </p:nvSpPr>
-            <p:spPr>
-              <a:xfrm>
-                <a:off x="1492250" y="2097161"/>
-                <a:ext cx="9144000" cy="369332"/>
-              </a:xfrm>
-              <a:prstGeom prst="rect">
-                <a:avLst/>
-              </a:prstGeom>
-              <a:noFill/>
-            </p:spPr>
-            <p:txBody>
-              <a:bodyPr wrap="square" rtlCol="0">
-                <a:spAutoFit/>
-              </a:bodyPr>
-              <a:lstStyle/>
-              <a:p>
-                <a:pPr algn="ctr"/>
-                <a:r>
-                  <a:rPr lang="en-US" dirty="0"/>
-                  <a:t>Your home away from home, right in the heart of Australia's Top wine region </a:t>
-                </a:r>
-              </a:p>
-            </p:txBody>
-          </p:sp>
-        </p:grpSp>
-        <p:sp>
-          <p:nvSpPr>
-            <p:cNvPr id="27" name="Rectangle 26">
-              <a:extLst>
-                <a:ext uri="{FF2B5EF4-FFF2-40B4-BE49-F238E27FC236}">
-                  <a16:creationId xmlns:a16="http://schemas.microsoft.com/office/drawing/2014/main" id="{34A7880F-1E73-453E-BE07-B862C0F1B58B}"/>
-                </a:ext>
-              </a:extLst>
-            </p:cNvPr>
-            <p:cNvSpPr/>
-            <p:nvPr/>
-          </p:nvSpPr>
-          <p:spPr>
-            <a:xfrm>
-              <a:off x="1492250" y="5372100"/>
-              <a:ext cx="2330450" cy="965200"/>
-            </a:xfrm>
-            <a:prstGeom prst="rect">
-              <a:avLst/>
-            </a:prstGeom>
-          </p:spPr>
-          <p:style>
-            <a:lnRef idx="2">
-              <a:schemeClr val="dk1"/>
-            </a:lnRef>
-            <a:fillRef idx="1">
-              <a:schemeClr val="lt1"/>
-            </a:fillRef>
-            <a:effectRef idx="0">
-              <a:schemeClr val="dk1"/>
-            </a:effectRef>
-            <a:fontRef idx="minor">
-              <a:schemeClr val="dk1"/>
-            </a:fontRef>
-          </p:style>
-          <p:txBody>
-            <a:bodyPr rtlCol="0" anchor="ctr"/>
-            <a:lstStyle/>
-            <a:p>
-              <a:pPr algn="ctr"/>
-              <a:r>
-                <a:rPr lang="en-US" dirty="0"/>
-                <a:t>Things to do nearby</a:t>
-              </a:r>
-            </a:p>
-          </p:txBody>
-        </p:sp>
-        <p:sp>
-          <p:nvSpPr>
-            <p:cNvPr id="28" name="Rectangle 27">
-              <a:extLst>
-                <a:ext uri="{FF2B5EF4-FFF2-40B4-BE49-F238E27FC236}">
-                  <a16:creationId xmlns:a16="http://schemas.microsoft.com/office/drawing/2014/main" id="{B2E7471B-7444-412D-BEB7-A1B76B631BBB}"/>
-                </a:ext>
-              </a:extLst>
-            </p:cNvPr>
-            <p:cNvSpPr/>
-            <p:nvPr/>
-          </p:nvSpPr>
-          <p:spPr>
-            <a:xfrm>
-              <a:off x="3819525" y="5374216"/>
-              <a:ext cx="2330450" cy="965200"/>
-            </a:xfrm>
-            <a:prstGeom prst="rect">
-              <a:avLst/>
-            </a:prstGeom>
-          </p:spPr>
-          <p:style>
-            <a:lnRef idx="2">
-              <a:schemeClr val="dk1"/>
-            </a:lnRef>
-            <a:fillRef idx="1">
-              <a:schemeClr val="lt1"/>
-            </a:fillRef>
-            <a:effectRef idx="0">
-              <a:schemeClr val="dk1"/>
-            </a:effectRef>
-            <a:fontRef idx="minor">
-              <a:schemeClr val="dk1"/>
-            </a:fontRef>
-          </p:style>
-          <p:txBody>
-            <a:bodyPr rtlCol="0" anchor="ctr"/>
-            <a:lstStyle/>
-            <a:p>
-              <a:pPr algn="ctr"/>
-              <a:r>
-                <a:rPr lang="en-US" dirty="0"/>
-                <a:t>Facilities and Amenities</a:t>
-              </a:r>
-            </a:p>
-          </p:txBody>
-        </p:sp>
-        <p:sp>
-          <p:nvSpPr>
-            <p:cNvPr id="29" name="Rectangle 28">
-              <a:extLst>
-                <a:ext uri="{FF2B5EF4-FFF2-40B4-BE49-F238E27FC236}">
-                  <a16:creationId xmlns:a16="http://schemas.microsoft.com/office/drawing/2014/main" id="{50A3DD0D-2BA5-468E-9325-DD1AE55D17E0}"/>
-                </a:ext>
-              </a:extLst>
-            </p:cNvPr>
-            <p:cNvSpPr/>
-            <p:nvPr/>
-          </p:nvSpPr>
-          <p:spPr>
-            <a:xfrm>
-              <a:off x="6143625" y="5378451"/>
-              <a:ext cx="2330450" cy="965200"/>
-            </a:xfrm>
-            <a:prstGeom prst="rect">
-              <a:avLst/>
-            </a:prstGeom>
-          </p:spPr>
-          <p:style>
-            <a:lnRef idx="2">
-              <a:schemeClr val="dk1"/>
-            </a:lnRef>
-            <a:fillRef idx="1">
-              <a:schemeClr val="lt1"/>
-            </a:fillRef>
-            <a:effectRef idx="0">
-              <a:schemeClr val="dk1"/>
-            </a:effectRef>
-            <a:fontRef idx="minor">
-              <a:schemeClr val="dk1"/>
-            </a:fontRef>
-          </p:style>
-          <p:txBody>
-            <a:bodyPr rtlCol="0" anchor="ctr"/>
-            <a:lstStyle/>
-            <a:p>
-              <a:pPr algn="ctr"/>
-              <a:r>
-                <a:rPr lang="en-US" dirty="0"/>
-                <a:t>Make a reservation</a:t>
-              </a:r>
-            </a:p>
-          </p:txBody>
-        </p:sp>
-        <p:sp>
-          <p:nvSpPr>
-            <p:cNvPr id="30" name="Rectangle 29">
-              <a:extLst>
-                <a:ext uri="{FF2B5EF4-FFF2-40B4-BE49-F238E27FC236}">
-                  <a16:creationId xmlns:a16="http://schemas.microsoft.com/office/drawing/2014/main" id="{38716F4C-899B-408A-8438-1ED24A3FFCBF}"/>
-                </a:ext>
-              </a:extLst>
-            </p:cNvPr>
-            <p:cNvSpPr/>
-            <p:nvPr/>
-          </p:nvSpPr>
-          <p:spPr>
-            <a:xfrm>
-              <a:off x="8477250" y="5378451"/>
-              <a:ext cx="2222500" cy="965200"/>
-            </a:xfrm>
-            <a:prstGeom prst="rect">
-              <a:avLst/>
-            </a:prstGeom>
-          </p:spPr>
-          <p:style>
-            <a:lnRef idx="2">
-              <a:schemeClr val="dk1"/>
-            </a:lnRef>
-            <a:fillRef idx="1">
-              <a:schemeClr val="lt1"/>
-            </a:fillRef>
-            <a:effectRef idx="0">
-              <a:schemeClr val="dk1"/>
-            </a:effectRef>
-            <a:fontRef idx="minor">
-              <a:schemeClr val="dk1"/>
-            </a:fontRef>
-          </p:style>
-          <p:txBody>
-            <a:bodyPr rtlCol="0" anchor="ctr"/>
-            <a:lstStyle/>
-            <a:p>
-              <a:pPr algn="ctr"/>
-              <a:r>
-                <a:rPr lang="en-US" dirty="0"/>
-                <a:t>Learn about us</a:t>
-              </a:r>
-            </a:p>
-          </p:txBody>
-        </p:sp>
-        <p:sp>
-          <p:nvSpPr>
-            <p:cNvPr id="31" name="TextBox 30">
-              <a:extLst>
-                <a:ext uri="{FF2B5EF4-FFF2-40B4-BE49-F238E27FC236}">
-                  <a16:creationId xmlns:a16="http://schemas.microsoft.com/office/drawing/2014/main" id="{E7ABC6EE-BAE7-4528-B50F-EFF5E2716427}"/>
-                </a:ext>
-              </a:extLst>
-            </p:cNvPr>
-            <p:cNvSpPr txBox="1"/>
-            <p:nvPr/>
-          </p:nvSpPr>
-          <p:spPr>
-            <a:xfrm>
-              <a:off x="4775200" y="6471098"/>
-              <a:ext cx="3013075" cy="369332"/>
-            </a:xfrm>
-            <a:prstGeom prst="rect">
-              <a:avLst/>
-            </a:prstGeom>
-            <a:noFill/>
-          </p:spPr>
-          <p:txBody>
-            <a:bodyPr wrap="square" rtlCol="0">
-              <a:spAutoFit/>
-            </a:bodyPr>
-            <a:lstStyle/>
-            <a:p>
-              <a:r>
-                <a:rPr lang="en-US" dirty="0"/>
-                <a:t>Optional – subject to change</a:t>
-              </a:r>
-            </a:p>
-          </p:txBody>
-        </p:sp>
-        <p:cxnSp>
-          <p:nvCxnSpPr>
-            <p:cNvPr id="33" name="Straight Connector 32">
-              <a:extLst>
-                <a:ext uri="{FF2B5EF4-FFF2-40B4-BE49-F238E27FC236}">
-                  <a16:creationId xmlns:a16="http://schemas.microsoft.com/office/drawing/2014/main" id="{06BA83CB-F779-4E18-ABBB-B867025C02E4}"/>
-                </a:ext>
-              </a:extLst>
-            </p:cNvPr>
-            <p:cNvCxnSpPr>
-              <a:stCxn id="31" idx="1"/>
-            </p:cNvCxnSpPr>
-            <p:nvPr/>
-          </p:nvCxnSpPr>
-          <p:spPr>
-            <a:xfrm flipH="1" flipV="1">
-              <a:off x="2705100" y="6076950"/>
-              <a:ext cx="2070100" cy="578814"/>
-            </a:xfrm>
-            <a:prstGeom prst="line">
-              <a:avLst/>
-            </a:prstGeom>
-          </p:spPr>
-          <p:style>
-            <a:lnRef idx="1">
-              <a:schemeClr val="dk1"/>
-            </a:lnRef>
-            <a:fillRef idx="0">
-              <a:schemeClr val="dk1"/>
-            </a:fillRef>
-            <a:effectRef idx="0">
-              <a:schemeClr val="dk1"/>
-            </a:effectRef>
-            <a:fontRef idx="minor">
-              <a:schemeClr val="tx1"/>
-            </a:fontRef>
-          </p:style>
-        </p:cxnSp>
-        <p:cxnSp>
-          <p:nvCxnSpPr>
-            <p:cNvPr id="35" name="Straight Connector 34">
-              <a:extLst>
-                <a:ext uri="{FF2B5EF4-FFF2-40B4-BE49-F238E27FC236}">
-                  <a16:creationId xmlns:a16="http://schemas.microsoft.com/office/drawing/2014/main" id="{D63F4F2E-73F5-491F-BA88-2F195C4CF447}"/>
-                </a:ext>
-              </a:extLst>
-            </p:cNvPr>
-            <p:cNvCxnSpPr/>
-            <p:nvPr/>
-          </p:nvCxnSpPr>
-          <p:spPr>
-            <a:xfrm flipH="1" flipV="1">
-              <a:off x="5059362" y="6179897"/>
-              <a:ext cx="492126" cy="351560"/>
-            </a:xfrm>
-            <a:prstGeom prst="line">
-              <a:avLst/>
-            </a:prstGeom>
-          </p:spPr>
-          <p:style>
-            <a:lnRef idx="1">
-              <a:schemeClr val="dk1"/>
-            </a:lnRef>
-            <a:fillRef idx="0">
-              <a:schemeClr val="dk1"/>
-            </a:fillRef>
-            <a:effectRef idx="0">
-              <a:schemeClr val="dk1"/>
-            </a:effectRef>
-            <a:fontRef idx="minor">
-              <a:schemeClr val="tx1"/>
-            </a:fontRef>
-          </p:style>
-        </p:cxnSp>
-        <p:cxnSp>
-          <p:nvCxnSpPr>
-            <p:cNvPr id="37" name="Straight Connector 36">
-              <a:extLst>
-                <a:ext uri="{FF2B5EF4-FFF2-40B4-BE49-F238E27FC236}">
-                  <a16:creationId xmlns:a16="http://schemas.microsoft.com/office/drawing/2014/main" id="{0C62E9A2-D561-4578-965C-E744E7D32D2A}"/>
-                </a:ext>
-              </a:extLst>
-            </p:cNvPr>
-            <p:cNvCxnSpPr/>
-            <p:nvPr/>
-          </p:nvCxnSpPr>
-          <p:spPr>
-            <a:xfrm flipV="1">
-              <a:off x="6842917" y="6076950"/>
-              <a:ext cx="319883" cy="392545"/>
-            </a:xfrm>
-            <a:prstGeom prst="line">
-              <a:avLst/>
-            </a:prstGeom>
-          </p:spPr>
-          <p:style>
-            <a:lnRef idx="1">
-              <a:schemeClr val="dk1"/>
-            </a:lnRef>
-            <a:fillRef idx="0">
-              <a:schemeClr val="dk1"/>
-            </a:fillRef>
-            <a:effectRef idx="0">
-              <a:schemeClr val="dk1"/>
-            </a:effectRef>
-            <a:fontRef idx="minor">
-              <a:schemeClr val="tx1"/>
-            </a:fontRef>
-          </p:style>
-        </p:cxnSp>
-        <p:cxnSp>
-          <p:nvCxnSpPr>
-            <p:cNvPr id="38" name="Straight Connector 37">
-              <a:extLst>
-                <a:ext uri="{FF2B5EF4-FFF2-40B4-BE49-F238E27FC236}">
-                  <a16:creationId xmlns:a16="http://schemas.microsoft.com/office/drawing/2014/main" id="{F498945F-7702-4011-B07F-DB095271A82D}"/>
-                </a:ext>
-              </a:extLst>
-            </p:cNvPr>
-            <p:cNvCxnSpPr>
-              <a:cxnSpLocks/>
-            </p:cNvCxnSpPr>
-            <p:nvPr/>
-          </p:nvCxnSpPr>
-          <p:spPr>
-            <a:xfrm flipH="1">
-              <a:off x="7645400" y="6076950"/>
-              <a:ext cx="1574800" cy="476250"/>
-            </a:xfrm>
-            <a:prstGeom prst="line">
-              <a:avLst/>
-            </a:prstGeom>
-          </p:spPr>
-          <p:style>
-            <a:lnRef idx="1">
-              <a:schemeClr val="dk1"/>
-            </a:lnRef>
-            <a:fillRef idx="0">
-              <a:schemeClr val="dk1"/>
-            </a:fillRef>
-            <a:effectRef idx="0">
-              <a:schemeClr val="dk1"/>
-            </a:effectRef>
-            <a:fontRef idx="minor">
-              <a:schemeClr val="tx1"/>
-            </a:fontRef>
-          </p:style>
-        </p:cxnSp>
-      </p:grpSp>
+          <a:prstGeom prst="rect">
+            <a:avLst/>
+          </a:prstGeom>
+        </p:spPr>
+        <p:style>
+          <a:lnRef idx="2">
+            <a:schemeClr val="dk1"/>
+          </a:lnRef>
+          <a:fillRef idx="1">
+            <a:schemeClr val="lt1"/>
+          </a:fillRef>
+          <a:effectRef idx="0">
+            <a:schemeClr val="dk1"/>
+          </a:effectRef>
+          <a:fontRef idx="minor">
+            <a:schemeClr val="dk1"/>
+          </a:fontRef>
+        </p:style>
+        <p:txBody>
+          <a:bodyPr rtlCol="0" anchor="ctr"/>
+          <a:lstStyle/>
+          <a:p>
+            <a:pPr algn="ctr"/>
+            <a:endParaRPr lang="en-US" dirty="0"/>
+          </a:p>
+        </p:txBody>
+      </p:sp>
+      <p:sp>
+        <p:nvSpPr>
+          <p:cNvPr id="2" name="Rectangle 1">
+            <a:extLst>
+              <a:ext uri="{FF2B5EF4-FFF2-40B4-BE49-F238E27FC236}">
+                <a16:creationId xmlns:a16="http://schemas.microsoft.com/office/drawing/2014/main" id="{B2A926F5-B978-4698-BBA9-81143CB388A4}"/>
+              </a:ext>
+            </a:extLst>
+          </p:cNvPr>
+          <p:cNvSpPr/>
+          <p:nvPr/>
+        </p:nvSpPr>
+        <p:spPr>
+          <a:xfrm>
+            <a:off x="1492250" y="2590800"/>
+            <a:ext cx="9201150" cy="2781301"/>
+          </a:xfrm>
+          <a:prstGeom prst="rect">
+            <a:avLst/>
+          </a:prstGeom>
+        </p:spPr>
+        <p:style>
+          <a:lnRef idx="2">
+            <a:schemeClr val="dk1"/>
+          </a:lnRef>
+          <a:fillRef idx="1">
+            <a:schemeClr val="lt1"/>
+          </a:fillRef>
+          <a:effectRef idx="0">
+            <a:schemeClr val="dk1"/>
+          </a:effectRef>
+          <a:fontRef idx="minor">
+            <a:schemeClr val="dk1"/>
+          </a:fontRef>
+        </p:style>
+        <p:txBody>
+          <a:bodyPr rtlCol="0" anchor="ctr"/>
+          <a:lstStyle/>
+          <a:p>
+            <a:pPr algn="ctr"/>
+            <a:r>
+              <a:rPr lang="en-US" dirty="0"/>
+              <a:t>Image Slider</a:t>
+            </a:r>
+          </a:p>
+        </p:txBody>
+      </p:sp>
+      <p:sp>
+        <p:nvSpPr>
+          <p:cNvPr id="3" name="Rectangle 2">
+            <a:extLst>
+              <a:ext uri="{FF2B5EF4-FFF2-40B4-BE49-F238E27FC236}">
+                <a16:creationId xmlns:a16="http://schemas.microsoft.com/office/drawing/2014/main" id="{97D8D097-E0D1-45DC-B495-4DAF92DDC517}"/>
+              </a:ext>
+            </a:extLst>
+          </p:cNvPr>
+          <p:cNvSpPr/>
+          <p:nvPr/>
+        </p:nvSpPr>
+        <p:spPr>
+          <a:xfrm>
+            <a:off x="5162550" y="5194300"/>
+            <a:ext cx="1860550" cy="177800"/>
+          </a:xfrm>
+          <a:prstGeom prst="rect">
+            <a:avLst/>
+          </a:prstGeom>
+        </p:spPr>
+        <p:style>
+          <a:lnRef idx="2">
+            <a:schemeClr val="dk1"/>
+          </a:lnRef>
+          <a:fillRef idx="1">
+            <a:schemeClr val="lt1"/>
+          </a:fillRef>
+          <a:effectRef idx="0">
+            <a:schemeClr val="dk1"/>
+          </a:effectRef>
+          <a:fontRef idx="minor">
+            <a:schemeClr val="dk1"/>
+          </a:fontRef>
+        </p:style>
+        <p:txBody>
+          <a:bodyPr rtlCol="0" anchor="ctr"/>
+          <a:lstStyle/>
+          <a:p>
+            <a:pPr algn="ctr"/>
+            <a:endParaRPr lang="en-US"/>
+          </a:p>
+        </p:txBody>
+      </p:sp>
+      <p:sp>
+        <p:nvSpPr>
+          <p:cNvPr id="7" name="Oval 6">
+            <a:extLst>
+              <a:ext uri="{FF2B5EF4-FFF2-40B4-BE49-F238E27FC236}">
+                <a16:creationId xmlns:a16="http://schemas.microsoft.com/office/drawing/2014/main" id="{8528876C-C39B-4D1C-80DB-1C26040DBE4B}"/>
+              </a:ext>
+            </a:extLst>
+          </p:cNvPr>
+          <p:cNvSpPr/>
+          <p:nvPr/>
+        </p:nvSpPr>
+        <p:spPr>
+          <a:xfrm>
+            <a:off x="5274733" y="5209116"/>
+            <a:ext cx="148167" cy="148167"/>
+          </a:xfrm>
+          <a:prstGeom prst="ellipse">
+            <a:avLst/>
+          </a:prstGeom>
+        </p:spPr>
+        <p:style>
+          <a:lnRef idx="2">
+            <a:schemeClr val="dk1"/>
+          </a:lnRef>
+          <a:fillRef idx="1">
+            <a:schemeClr val="lt1"/>
+          </a:fillRef>
+          <a:effectRef idx="0">
+            <a:schemeClr val="dk1"/>
+          </a:effectRef>
+          <a:fontRef idx="minor">
+            <a:schemeClr val="dk1"/>
+          </a:fontRef>
+        </p:style>
+        <p:txBody>
+          <a:bodyPr rtlCol="0" anchor="ctr"/>
+          <a:lstStyle/>
+          <a:p>
+            <a:pPr algn="ctr"/>
+            <a:endParaRPr lang="en-US"/>
+          </a:p>
+        </p:txBody>
+      </p:sp>
+      <p:sp>
+        <p:nvSpPr>
+          <p:cNvPr id="22" name="Oval 21">
+            <a:extLst>
+              <a:ext uri="{FF2B5EF4-FFF2-40B4-BE49-F238E27FC236}">
+                <a16:creationId xmlns:a16="http://schemas.microsoft.com/office/drawing/2014/main" id="{F24D3581-C4C5-453E-8FF7-EE6BC6CAB3FD}"/>
+              </a:ext>
+            </a:extLst>
+          </p:cNvPr>
+          <p:cNvSpPr/>
+          <p:nvPr/>
+        </p:nvSpPr>
+        <p:spPr>
+          <a:xfrm>
+            <a:off x="5644620" y="5211233"/>
+            <a:ext cx="148167" cy="148167"/>
+          </a:xfrm>
+          <a:prstGeom prst="ellipse">
+            <a:avLst/>
+          </a:prstGeom>
+        </p:spPr>
+        <p:style>
+          <a:lnRef idx="2">
+            <a:schemeClr val="dk1"/>
+          </a:lnRef>
+          <a:fillRef idx="1">
+            <a:schemeClr val="lt1"/>
+          </a:fillRef>
+          <a:effectRef idx="0">
+            <a:schemeClr val="dk1"/>
+          </a:effectRef>
+          <a:fontRef idx="minor">
+            <a:schemeClr val="dk1"/>
+          </a:fontRef>
+        </p:style>
+        <p:txBody>
+          <a:bodyPr rtlCol="0" anchor="ctr"/>
+          <a:lstStyle/>
+          <a:p>
+            <a:pPr algn="ctr"/>
+            <a:endParaRPr lang="en-US"/>
+          </a:p>
+        </p:txBody>
+      </p:sp>
+      <p:sp>
+        <p:nvSpPr>
+          <p:cNvPr id="23" name="Oval 22">
+            <a:extLst>
+              <a:ext uri="{FF2B5EF4-FFF2-40B4-BE49-F238E27FC236}">
+                <a16:creationId xmlns:a16="http://schemas.microsoft.com/office/drawing/2014/main" id="{DDD5A35E-0ECF-4739-B529-571DB5FED10E}"/>
+              </a:ext>
+            </a:extLst>
+          </p:cNvPr>
+          <p:cNvSpPr/>
+          <p:nvPr/>
+        </p:nvSpPr>
+        <p:spPr>
+          <a:xfrm>
+            <a:off x="6039908" y="5209116"/>
+            <a:ext cx="148167" cy="148167"/>
+          </a:xfrm>
+          <a:prstGeom prst="ellipse">
+            <a:avLst/>
+          </a:prstGeom>
+        </p:spPr>
+        <p:style>
+          <a:lnRef idx="2">
+            <a:schemeClr val="dk1"/>
+          </a:lnRef>
+          <a:fillRef idx="1">
+            <a:schemeClr val="lt1"/>
+          </a:fillRef>
+          <a:effectRef idx="0">
+            <a:schemeClr val="dk1"/>
+          </a:effectRef>
+          <a:fontRef idx="minor">
+            <a:schemeClr val="dk1"/>
+          </a:fontRef>
+        </p:style>
+        <p:txBody>
+          <a:bodyPr rtlCol="0" anchor="ctr"/>
+          <a:lstStyle/>
+          <a:p>
+            <a:pPr algn="ctr"/>
+            <a:endParaRPr lang="en-US"/>
+          </a:p>
+        </p:txBody>
+      </p:sp>
+      <p:sp>
+        <p:nvSpPr>
+          <p:cNvPr id="24" name="Oval 23">
+            <a:extLst>
+              <a:ext uri="{FF2B5EF4-FFF2-40B4-BE49-F238E27FC236}">
+                <a16:creationId xmlns:a16="http://schemas.microsoft.com/office/drawing/2014/main" id="{1322B983-6E3A-416C-B087-9028587862E7}"/>
+              </a:ext>
+            </a:extLst>
+          </p:cNvPr>
+          <p:cNvSpPr/>
+          <p:nvPr/>
+        </p:nvSpPr>
+        <p:spPr>
+          <a:xfrm>
+            <a:off x="6409795" y="5209115"/>
+            <a:ext cx="148167" cy="148167"/>
+          </a:xfrm>
+          <a:prstGeom prst="ellipse">
+            <a:avLst/>
+          </a:prstGeom>
+        </p:spPr>
+        <p:style>
+          <a:lnRef idx="2">
+            <a:schemeClr val="dk1"/>
+          </a:lnRef>
+          <a:fillRef idx="1">
+            <a:schemeClr val="lt1"/>
+          </a:fillRef>
+          <a:effectRef idx="0">
+            <a:schemeClr val="dk1"/>
+          </a:effectRef>
+          <a:fontRef idx="minor">
+            <a:schemeClr val="dk1"/>
+          </a:fontRef>
+        </p:style>
+        <p:txBody>
+          <a:bodyPr rtlCol="0" anchor="ctr"/>
+          <a:lstStyle/>
+          <a:p>
+            <a:pPr algn="ctr"/>
+            <a:endParaRPr lang="en-US"/>
+          </a:p>
+        </p:txBody>
+      </p:sp>
+      <p:sp>
+        <p:nvSpPr>
+          <p:cNvPr id="25" name="Oval 24">
+            <a:extLst>
+              <a:ext uri="{FF2B5EF4-FFF2-40B4-BE49-F238E27FC236}">
+                <a16:creationId xmlns:a16="http://schemas.microsoft.com/office/drawing/2014/main" id="{E0374383-057C-49C0-8296-0029D7BFAB39}"/>
+              </a:ext>
+            </a:extLst>
+          </p:cNvPr>
+          <p:cNvSpPr/>
+          <p:nvPr/>
+        </p:nvSpPr>
+        <p:spPr>
+          <a:xfrm>
+            <a:off x="6768834" y="5209115"/>
+            <a:ext cx="148167" cy="148167"/>
+          </a:xfrm>
+          <a:prstGeom prst="ellipse">
+            <a:avLst/>
+          </a:prstGeom>
+        </p:spPr>
+        <p:style>
+          <a:lnRef idx="2">
+            <a:schemeClr val="dk1"/>
+          </a:lnRef>
+          <a:fillRef idx="1">
+            <a:schemeClr val="lt1"/>
+          </a:fillRef>
+          <a:effectRef idx="0">
+            <a:schemeClr val="dk1"/>
+          </a:effectRef>
+          <a:fontRef idx="minor">
+            <a:schemeClr val="dk1"/>
+          </a:fontRef>
+        </p:style>
+        <p:txBody>
+          <a:bodyPr rtlCol="0" anchor="ctr"/>
+          <a:lstStyle/>
+          <a:p>
+            <a:pPr algn="ctr"/>
+            <a:endParaRPr lang="en-US"/>
+          </a:p>
+        </p:txBody>
+      </p:sp>
+      <p:sp>
+        <p:nvSpPr>
+          <p:cNvPr id="26" name="TextBox 25">
+            <a:extLst>
+              <a:ext uri="{FF2B5EF4-FFF2-40B4-BE49-F238E27FC236}">
+                <a16:creationId xmlns:a16="http://schemas.microsoft.com/office/drawing/2014/main" id="{07FFC8BE-BDF5-42C4-A471-E7EF7271F9DC}"/>
+              </a:ext>
+            </a:extLst>
+          </p:cNvPr>
+          <p:cNvSpPr txBox="1"/>
+          <p:nvPr/>
+        </p:nvSpPr>
+        <p:spPr>
+          <a:xfrm>
+            <a:off x="1397000" y="1283553"/>
+            <a:ext cx="9398000" cy="830997"/>
+          </a:xfrm>
+          <a:prstGeom prst="rect">
+            <a:avLst/>
+          </a:prstGeom>
+          <a:noFill/>
+        </p:spPr>
+        <p:txBody>
+          <a:bodyPr wrap="square" rtlCol="0">
+            <a:spAutoFit/>
+          </a:bodyPr>
+          <a:lstStyle/>
+          <a:p>
+            <a:pPr algn="ctr"/>
+            <a:r>
+              <a:rPr lang="en-US" sz="4800" dirty="0"/>
+              <a:t>Carob Cottage</a:t>
+            </a:r>
+            <a:endParaRPr lang="en-US" dirty="0"/>
+          </a:p>
+        </p:txBody>
+      </p:sp>
+      <p:sp>
+        <p:nvSpPr>
+          <p:cNvPr id="9" name="TextBox 8">
+            <a:extLst>
+              <a:ext uri="{FF2B5EF4-FFF2-40B4-BE49-F238E27FC236}">
+                <a16:creationId xmlns:a16="http://schemas.microsoft.com/office/drawing/2014/main" id="{B4A1CAD3-2DB5-4B0C-AB30-770DA7751867}"/>
+              </a:ext>
+            </a:extLst>
+          </p:cNvPr>
+          <p:cNvSpPr txBox="1"/>
+          <p:nvPr/>
+        </p:nvSpPr>
+        <p:spPr>
+          <a:xfrm>
+            <a:off x="1492250" y="2097161"/>
+            <a:ext cx="9144000" cy="369332"/>
+          </a:xfrm>
+          <a:prstGeom prst="rect">
+            <a:avLst/>
+          </a:prstGeom>
+          <a:noFill/>
+        </p:spPr>
+        <p:txBody>
+          <a:bodyPr wrap="square" rtlCol="0">
+            <a:spAutoFit/>
+          </a:bodyPr>
+          <a:lstStyle/>
+          <a:p>
+            <a:pPr algn="ctr"/>
+            <a:r>
+              <a:rPr lang="en-US" dirty="0"/>
+              <a:t>Your home away from home, right in the heart of Australia’s top wine region </a:t>
+            </a:r>
+          </a:p>
+        </p:txBody>
+      </p:sp>
+      <p:sp>
+        <p:nvSpPr>
+          <p:cNvPr id="27" name="Rectangle 26">
+            <a:extLst>
+              <a:ext uri="{FF2B5EF4-FFF2-40B4-BE49-F238E27FC236}">
+                <a16:creationId xmlns:a16="http://schemas.microsoft.com/office/drawing/2014/main" id="{34A7880F-1E73-453E-BE07-B862C0F1B58B}"/>
+              </a:ext>
+            </a:extLst>
+          </p:cNvPr>
+          <p:cNvSpPr/>
+          <p:nvPr/>
+        </p:nvSpPr>
+        <p:spPr>
+          <a:xfrm>
+            <a:off x="1492250" y="5372100"/>
+            <a:ext cx="2330450" cy="965200"/>
+          </a:xfrm>
+          <a:prstGeom prst="rect">
+            <a:avLst/>
+          </a:prstGeom>
+        </p:spPr>
+        <p:style>
+          <a:lnRef idx="2">
+            <a:schemeClr val="dk1"/>
+          </a:lnRef>
+          <a:fillRef idx="1">
+            <a:schemeClr val="lt1"/>
+          </a:fillRef>
+          <a:effectRef idx="0">
+            <a:schemeClr val="dk1"/>
+          </a:effectRef>
+          <a:fontRef idx="minor">
+            <a:schemeClr val="dk1"/>
+          </a:fontRef>
+        </p:style>
+        <p:txBody>
+          <a:bodyPr rtlCol="0" anchor="ctr"/>
+          <a:lstStyle/>
+          <a:p>
+            <a:pPr algn="ctr"/>
+            <a:r>
+              <a:rPr lang="en-US" dirty="0"/>
+              <a:t>Things to do nearby</a:t>
+            </a:r>
+          </a:p>
+        </p:txBody>
+      </p:sp>
+      <p:sp>
+        <p:nvSpPr>
+          <p:cNvPr id="28" name="Rectangle 27">
+            <a:extLst>
+              <a:ext uri="{FF2B5EF4-FFF2-40B4-BE49-F238E27FC236}">
+                <a16:creationId xmlns:a16="http://schemas.microsoft.com/office/drawing/2014/main" id="{B2E7471B-7444-412D-BEB7-A1B76B631BBB}"/>
+              </a:ext>
+            </a:extLst>
+          </p:cNvPr>
+          <p:cNvSpPr/>
+          <p:nvPr/>
+        </p:nvSpPr>
+        <p:spPr>
+          <a:xfrm>
+            <a:off x="3819525" y="5374216"/>
+            <a:ext cx="2330450" cy="965200"/>
+          </a:xfrm>
+          <a:prstGeom prst="rect">
+            <a:avLst/>
+          </a:prstGeom>
+        </p:spPr>
+        <p:style>
+          <a:lnRef idx="2">
+            <a:schemeClr val="dk1"/>
+          </a:lnRef>
+          <a:fillRef idx="1">
+            <a:schemeClr val="lt1"/>
+          </a:fillRef>
+          <a:effectRef idx="0">
+            <a:schemeClr val="dk1"/>
+          </a:effectRef>
+          <a:fontRef idx="minor">
+            <a:schemeClr val="dk1"/>
+          </a:fontRef>
+        </p:style>
+        <p:txBody>
+          <a:bodyPr rtlCol="0" anchor="ctr"/>
+          <a:lstStyle/>
+          <a:p>
+            <a:pPr algn="ctr"/>
+            <a:r>
+              <a:rPr lang="en-US" dirty="0"/>
+              <a:t>Facilities and Amenities</a:t>
+            </a:r>
+          </a:p>
+        </p:txBody>
+      </p:sp>
+      <p:sp>
+        <p:nvSpPr>
+          <p:cNvPr id="29" name="Rectangle 28">
+            <a:extLst>
+              <a:ext uri="{FF2B5EF4-FFF2-40B4-BE49-F238E27FC236}">
+                <a16:creationId xmlns:a16="http://schemas.microsoft.com/office/drawing/2014/main" id="{50A3DD0D-2BA5-468E-9325-DD1AE55D17E0}"/>
+              </a:ext>
+            </a:extLst>
+          </p:cNvPr>
+          <p:cNvSpPr/>
+          <p:nvPr/>
+        </p:nvSpPr>
+        <p:spPr>
+          <a:xfrm>
+            <a:off x="6143625" y="5378451"/>
+            <a:ext cx="2330450" cy="965200"/>
+          </a:xfrm>
+          <a:prstGeom prst="rect">
+            <a:avLst/>
+          </a:prstGeom>
+        </p:spPr>
+        <p:style>
+          <a:lnRef idx="2">
+            <a:schemeClr val="dk1"/>
+          </a:lnRef>
+          <a:fillRef idx="1">
+            <a:schemeClr val="lt1"/>
+          </a:fillRef>
+          <a:effectRef idx="0">
+            <a:schemeClr val="dk1"/>
+          </a:effectRef>
+          <a:fontRef idx="minor">
+            <a:schemeClr val="dk1"/>
+          </a:fontRef>
+        </p:style>
+        <p:txBody>
+          <a:bodyPr rtlCol="0" anchor="ctr"/>
+          <a:lstStyle/>
+          <a:p>
+            <a:pPr algn="ctr"/>
+            <a:r>
+              <a:rPr lang="en-US" dirty="0"/>
+              <a:t>Make a reservation</a:t>
+            </a:r>
+          </a:p>
+        </p:txBody>
+      </p:sp>
+      <p:sp>
+        <p:nvSpPr>
+          <p:cNvPr id="30" name="Rectangle 29">
+            <a:extLst>
+              <a:ext uri="{FF2B5EF4-FFF2-40B4-BE49-F238E27FC236}">
+                <a16:creationId xmlns:a16="http://schemas.microsoft.com/office/drawing/2014/main" id="{38716F4C-899B-408A-8438-1ED24A3FFCBF}"/>
+              </a:ext>
+            </a:extLst>
+          </p:cNvPr>
+          <p:cNvSpPr/>
+          <p:nvPr/>
+        </p:nvSpPr>
+        <p:spPr>
+          <a:xfrm>
+            <a:off x="8477250" y="5378451"/>
+            <a:ext cx="2222500" cy="965200"/>
+          </a:xfrm>
+          <a:prstGeom prst="rect">
+            <a:avLst/>
+          </a:prstGeom>
+        </p:spPr>
+        <p:style>
+          <a:lnRef idx="2">
+            <a:schemeClr val="dk1"/>
+          </a:lnRef>
+          <a:fillRef idx="1">
+            <a:schemeClr val="lt1"/>
+          </a:fillRef>
+          <a:effectRef idx="0">
+            <a:schemeClr val="dk1"/>
+          </a:effectRef>
+          <a:fontRef idx="minor">
+            <a:schemeClr val="dk1"/>
+          </a:fontRef>
+        </p:style>
+        <p:txBody>
+          <a:bodyPr rtlCol="0" anchor="ctr"/>
+          <a:lstStyle/>
+          <a:p>
+            <a:pPr algn="ctr"/>
+            <a:r>
+              <a:rPr lang="en-US" dirty="0"/>
+              <a:t>Learn about us</a:t>
+            </a:r>
+          </a:p>
+        </p:txBody>
+      </p:sp>
+      <p:sp>
+        <p:nvSpPr>
+          <p:cNvPr id="31" name="TextBox 30">
+            <a:extLst>
+              <a:ext uri="{FF2B5EF4-FFF2-40B4-BE49-F238E27FC236}">
+                <a16:creationId xmlns:a16="http://schemas.microsoft.com/office/drawing/2014/main" id="{E7ABC6EE-BAE7-4528-B50F-EFF5E2716427}"/>
+              </a:ext>
+            </a:extLst>
+          </p:cNvPr>
+          <p:cNvSpPr txBox="1"/>
+          <p:nvPr/>
+        </p:nvSpPr>
+        <p:spPr>
+          <a:xfrm>
+            <a:off x="4775200" y="6471098"/>
+            <a:ext cx="3013075" cy="369332"/>
+          </a:xfrm>
+          <a:prstGeom prst="rect">
+            <a:avLst/>
+          </a:prstGeom>
+          <a:noFill/>
+        </p:spPr>
+        <p:txBody>
+          <a:bodyPr wrap="square" rtlCol="0">
+            <a:spAutoFit/>
+          </a:bodyPr>
+          <a:lstStyle/>
+          <a:p>
+            <a:r>
+              <a:rPr lang="en-US" dirty="0"/>
+              <a:t>Optional – subject to change</a:t>
+            </a:r>
+          </a:p>
+        </p:txBody>
+      </p:sp>
+      <p:cxnSp>
+        <p:nvCxnSpPr>
+          <p:cNvPr id="33" name="Straight Connector 32">
+            <a:extLst>
+              <a:ext uri="{FF2B5EF4-FFF2-40B4-BE49-F238E27FC236}">
+                <a16:creationId xmlns:a16="http://schemas.microsoft.com/office/drawing/2014/main" id="{06BA83CB-F779-4E18-ABBB-B867025C02E4}"/>
+              </a:ext>
+            </a:extLst>
+          </p:cNvPr>
+          <p:cNvCxnSpPr>
+            <a:stCxn id="31" idx="1"/>
+          </p:cNvCxnSpPr>
+          <p:nvPr/>
+        </p:nvCxnSpPr>
+        <p:spPr>
+          <a:xfrm flipH="1" flipV="1">
+            <a:off x="2705100" y="6076950"/>
+            <a:ext cx="2070100" cy="578814"/>
+          </a:xfrm>
+          <a:prstGeom prst="line">
+            <a:avLst/>
+          </a:prstGeom>
+        </p:spPr>
+        <p:style>
+          <a:lnRef idx="1">
+            <a:schemeClr val="dk1"/>
+          </a:lnRef>
+          <a:fillRef idx="0">
+            <a:schemeClr val="dk1"/>
+          </a:fillRef>
+          <a:effectRef idx="0">
+            <a:schemeClr val="dk1"/>
+          </a:effectRef>
+          <a:fontRef idx="minor">
+            <a:schemeClr val="tx1"/>
+          </a:fontRef>
+        </p:style>
+      </p:cxnSp>
+      <p:cxnSp>
+        <p:nvCxnSpPr>
+          <p:cNvPr id="35" name="Straight Connector 34">
+            <a:extLst>
+              <a:ext uri="{FF2B5EF4-FFF2-40B4-BE49-F238E27FC236}">
+                <a16:creationId xmlns:a16="http://schemas.microsoft.com/office/drawing/2014/main" id="{D63F4F2E-73F5-491F-BA88-2F195C4CF447}"/>
+              </a:ext>
+            </a:extLst>
+          </p:cNvPr>
+          <p:cNvCxnSpPr/>
+          <p:nvPr/>
+        </p:nvCxnSpPr>
+        <p:spPr>
+          <a:xfrm flipH="1" flipV="1">
+            <a:off x="5059362" y="6179897"/>
+            <a:ext cx="492126" cy="351560"/>
+          </a:xfrm>
+          <a:prstGeom prst="line">
+            <a:avLst/>
+          </a:prstGeom>
+        </p:spPr>
+        <p:style>
+          <a:lnRef idx="1">
+            <a:schemeClr val="dk1"/>
+          </a:lnRef>
+          <a:fillRef idx="0">
+            <a:schemeClr val="dk1"/>
+          </a:fillRef>
+          <a:effectRef idx="0">
+            <a:schemeClr val="dk1"/>
+          </a:effectRef>
+          <a:fontRef idx="minor">
+            <a:schemeClr val="tx1"/>
+          </a:fontRef>
+        </p:style>
+      </p:cxnSp>
+      <p:cxnSp>
+        <p:nvCxnSpPr>
+          <p:cNvPr id="37" name="Straight Connector 36">
+            <a:extLst>
+              <a:ext uri="{FF2B5EF4-FFF2-40B4-BE49-F238E27FC236}">
+                <a16:creationId xmlns:a16="http://schemas.microsoft.com/office/drawing/2014/main" id="{0C62E9A2-D561-4578-965C-E744E7D32D2A}"/>
+              </a:ext>
+            </a:extLst>
+          </p:cNvPr>
+          <p:cNvCxnSpPr/>
+          <p:nvPr/>
+        </p:nvCxnSpPr>
+        <p:spPr>
+          <a:xfrm flipV="1">
+            <a:off x="6842917" y="6076950"/>
+            <a:ext cx="319883" cy="392545"/>
+          </a:xfrm>
+          <a:prstGeom prst="line">
+            <a:avLst/>
+          </a:prstGeom>
+        </p:spPr>
+        <p:style>
+          <a:lnRef idx="1">
+            <a:schemeClr val="dk1"/>
+          </a:lnRef>
+          <a:fillRef idx="0">
+            <a:schemeClr val="dk1"/>
+          </a:fillRef>
+          <a:effectRef idx="0">
+            <a:schemeClr val="dk1"/>
+          </a:effectRef>
+          <a:fontRef idx="minor">
+            <a:schemeClr val="tx1"/>
+          </a:fontRef>
+        </p:style>
+      </p:cxnSp>
+      <p:cxnSp>
+        <p:nvCxnSpPr>
+          <p:cNvPr id="38" name="Straight Connector 37">
+            <a:extLst>
+              <a:ext uri="{FF2B5EF4-FFF2-40B4-BE49-F238E27FC236}">
+                <a16:creationId xmlns:a16="http://schemas.microsoft.com/office/drawing/2014/main" id="{F498945F-7702-4011-B07F-DB095271A82D}"/>
+              </a:ext>
+            </a:extLst>
+          </p:cNvPr>
+          <p:cNvCxnSpPr>
+            <a:cxnSpLocks/>
+          </p:cNvCxnSpPr>
+          <p:nvPr/>
+        </p:nvCxnSpPr>
+        <p:spPr>
+          <a:xfrm flipH="1">
+            <a:off x="7645400" y="6076950"/>
+            <a:ext cx="1574800" cy="476250"/>
+          </a:xfrm>
+          <a:prstGeom prst="line">
+            <a:avLst/>
+          </a:prstGeom>
+        </p:spPr>
+        <p:style>
+          <a:lnRef idx="1">
+            <a:schemeClr val="dk1"/>
+          </a:lnRef>
+          <a:fillRef idx="0">
+            <a:schemeClr val="dk1"/>
+          </a:fillRef>
+          <a:effectRef idx="0">
+            <a:schemeClr val="dk1"/>
+          </a:effectRef>
+          <a:fontRef idx="minor">
+            <a:schemeClr val="tx1"/>
+          </a:fontRef>
+        </p:style>
+      </p:cxnSp>
     </p:spTree>
     <p:extLst>
       <p:ext uri="{BB962C8B-B14F-4D97-AF65-F5344CB8AC3E}">
@@ -6540,6 +6505,1806 @@
     <p:extLst>
       <p:ext uri="{BB962C8B-B14F-4D97-AF65-F5344CB8AC3E}">
         <p14:creationId xmlns:p14="http://schemas.microsoft.com/office/powerpoint/2010/main" val="4256739966"/>
+      </p:ext>
+    </p:extLst>
+  </p:cSld>
+  <p:clrMapOvr>
+    <a:masterClrMapping/>
+  </p:clrMapOvr>
+</p:sld>
+</file>
+
+<file path=ppt/slides/slide5.xml><?xml version="1.0" encoding="utf-8"?>
+<p:sld xmlns:a="http://schemas.openxmlformats.org/drawingml/2006/main" xmlns:r="http://schemas.openxmlformats.org/officeDocument/2006/relationships" xmlns:p="http://schemas.openxmlformats.org/presentationml/2006/main">
+  <p:cSld>
+    <p:spTree>
+      <p:nvGrpSpPr>
+        <p:cNvPr id="1" name=""/>
+        <p:cNvGrpSpPr/>
+        <p:nvPr/>
+      </p:nvGrpSpPr>
+      <p:grpSpPr>
+        <a:xfrm>
+          <a:off x="0" y="0"/>
+          <a:ext cx="0" cy="0"/>
+          <a:chOff x="0" y="0"/>
+          <a:chExt cx="0" cy="0"/>
+        </a:xfrm>
+      </p:grpSpPr>
+      <p:sp>
+        <p:nvSpPr>
+          <p:cNvPr id="8" name="TextBox 7">
+            <a:extLst>
+              <a:ext uri="{FF2B5EF4-FFF2-40B4-BE49-F238E27FC236}">
+                <a16:creationId xmlns:a16="http://schemas.microsoft.com/office/drawing/2014/main" id="{6B8468B5-7310-4B26-889D-AF6B42A4512C}"/>
+              </a:ext>
+            </a:extLst>
+          </p:cNvPr>
+          <p:cNvSpPr txBox="1"/>
+          <p:nvPr/>
+        </p:nvSpPr>
+        <p:spPr>
+          <a:xfrm>
+            <a:off x="0" y="-1"/>
+            <a:ext cx="12192000" cy="707886"/>
+          </a:xfrm>
+          <a:prstGeom prst="rect">
+            <a:avLst/>
+          </a:prstGeom>
+          <a:noFill/>
+        </p:spPr>
+        <p:txBody>
+          <a:bodyPr wrap="square" rtlCol="0">
+            <a:spAutoFit/>
+          </a:bodyPr>
+          <a:lstStyle/>
+          <a:p>
+            <a:pPr algn="ctr"/>
+            <a:r>
+              <a:rPr lang="en-US" sz="4000" b="1" i="1" dirty="0"/>
+              <a:t>About us</a:t>
+            </a:r>
+            <a:endParaRPr lang="en-US" b="1" i="1" dirty="0"/>
+          </a:p>
+        </p:txBody>
+      </p:sp>
+      <p:grpSp>
+        <p:nvGrpSpPr>
+          <p:cNvPr id="13" name="Group 12">
+            <a:extLst>
+              <a:ext uri="{FF2B5EF4-FFF2-40B4-BE49-F238E27FC236}">
+                <a16:creationId xmlns:a16="http://schemas.microsoft.com/office/drawing/2014/main" id="{819964A8-7F7E-4105-A131-CE709D6201E9}"/>
+              </a:ext>
+            </a:extLst>
+          </p:cNvPr>
+          <p:cNvGrpSpPr/>
+          <p:nvPr/>
+        </p:nvGrpSpPr>
+        <p:grpSpPr>
+          <a:xfrm>
+            <a:off x="1396996" y="767687"/>
+            <a:ext cx="9398004" cy="8862088"/>
+            <a:chOff x="1396996" y="767687"/>
+            <a:chExt cx="9398004" cy="8862088"/>
+          </a:xfrm>
+        </p:grpSpPr>
+        <p:sp>
+          <p:nvSpPr>
+            <p:cNvPr id="7" name="Rectangle 6">
+              <a:extLst>
+                <a:ext uri="{FF2B5EF4-FFF2-40B4-BE49-F238E27FC236}">
+                  <a16:creationId xmlns:a16="http://schemas.microsoft.com/office/drawing/2014/main" id="{F5FA0461-E5E1-4ACB-BE2C-D563B08A55BF}"/>
+                </a:ext>
+              </a:extLst>
+            </p:cNvPr>
+            <p:cNvSpPr/>
+            <p:nvPr/>
+          </p:nvSpPr>
+          <p:spPr>
+            <a:xfrm>
+              <a:off x="1397000" y="767688"/>
+              <a:ext cx="9398000" cy="8862087"/>
+            </a:xfrm>
+            <a:prstGeom prst="rect">
+              <a:avLst/>
+            </a:prstGeom>
+          </p:spPr>
+          <p:style>
+            <a:lnRef idx="2">
+              <a:schemeClr val="dk1"/>
+            </a:lnRef>
+            <a:fillRef idx="1">
+              <a:schemeClr val="lt1"/>
+            </a:fillRef>
+            <a:effectRef idx="0">
+              <a:schemeClr val="dk1"/>
+            </a:effectRef>
+            <a:fontRef idx="minor">
+              <a:schemeClr val="dk1"/>
+            </a:fontRef>
+          </p:style>
+          <p:txBody>
+            <a:bodyPr rtlCol="0" anchor="ctr"/>
+            <a:lstStyle/>
+            <a:p>
+              <a:pPr algn="ctr"/>
+              <a:endParaRPr lang="en-US" dirty="0"/>
+            </a:p>
+          </p:txBody>
+        </p:sp>
+        <p:sp>
+          <p:nvSpPr>
+            <p:cNvPr id="3" name="Rectangle 2">
+              <a:extLst>
+                <a:ext uri="{FF2B5EF4-FFF2-40B4-BE49-F238E27FC236}">
+                  <a16:creationId xmlns:a16="http://schemas.microsoft.com/office/drawing/2014/main" id="{67716F84-F1EA-465F-9450-0D6EA715C916}"/>
+                </a:ext>
+              </a:extLst>
+            </p:cNvPr>
+            <p:cNvSpPr/>
+            <p:nvPr/>
+          </p:nvSpPr>
+          <p:spPr>
+            <a:xfrm>
+              <a:off x="1397000" y="767688"/>
+              <a:ext cx="4699000" cy="1157469"/>
+            </a:xfrm>
+            <a:prstGeom prst="rect">
+              <a:avLst/>
+            </a:prstGeom>
+          </p:spPr>
+          <p:style>
+            <a:lnRef idx="2">
+              <a:schemeClr val="dk1"/>
+            </a:lnRef>
+            <a:fillRef idx="1">
+              <a:schemeClr val="lt1"/>
+            </a:fillRef>
+            <a:effectRef idx="0">
+              <a:schemeClr val="dk1"/>
+            </a:effectRef>
+            <a:fontRef idx="minor">
+              <a:schemeClr val="dk1"/>
+            </a:fontRef>
+          </p:style>
+          <p:txBody>
+            <a:bodyPr rtlCol="0" anchor="ctr"/>
+            <a:lstStyle/>
+            <a:p>
+              <a:pPr algn="ctr"/>
+              <a:r>
+                <a:rPr lang="en-US" dirty="0"/>
+                <a:t>Original Photo 1</a:t>
+              </a:r>
+            </a:p>
+          </p:txBody>
+        </p:sp>
+        <p:sp>
+          <p:nvSpPr>
+            <p:cNvPr id="33" name="Rectangle 32">
+              <a:extLst>
+                <a:ext uri="{FF2B5EF4-FFF2-40B4-BE49-F238E27FC236}">
+                  <a16:creationId xmlns:a16="http://schemas.microsoft.com/office/drawing/2014/main" id="{47D7B8EE-8DFC-4CCA-9E7F-4EB1743F88F5}"/>
+                </a:ext>
+              </a:extLst>
+            </p:cNvPr>
+            <p:cNvSpPr/>
+            <p:nvPr/>
+          </p:nvSpPr>
+          <p:spPr>
+            <a:xfrm>
+              <a:off x="1397000" y="5181500"/>
+              <a:ext cx="4760732" cy="1157469"/>
+            </a:xfrm>
+            <a:prstGeom prst="rect">
+              <a:avLst/>
+            </a:prstGeom>
+          </p:spPr>
+          <p:style>
+            <a:lnRef idx="2">
+              <a:schemeClr val="dk1"/>
+            </a:lnRef>
+            <a:fillRef idx="1">
+              <a:schemeClr val="lt1"/>
+            </a:fillRef>
+            <a:effectRef idx="0">
+              <a:schemeClr val="dk1"/>
+            </a:effectRef>
+            <a:fontRef idx="minor">
+              <a:schemeClr val="dk1"/>
+            </a:fontRef>
+          </p:style>
+          <p:txBody>
+            <a:bodyPr rtlCol="0" anchor="ctr"/>
+            <a:lstStyle/>
+            <a:p>
+              <a:pPr algn="ctr"/>
+              <a:r>
+                <a:rPr lang="en-US" dirty="0"/>
+                <a:t>Landscape</a:t>
+              </a:r>
+            </a:p>
+          </p:txBody>
+        </p:sp>
+        <p:sp>
+          <p:nvSpPr>
+            <p:cNvPr id="4" name="TextBox 3">
+              <a:extLst>
+                <a:ext uri="{FF2B5EF4-FFF2-40B4-BE49-F238E27FC236}">
+                  <a16:creationId xmlns:a16="http://schemas.microsoft.com/office/drawing/2014/main" id="{9A98C491-A318-42A6-B2A4-FC46DF3FE7BC}"/>
+                </a:ext>
+              </a:extLst>
+            </p:cNvPr>
+            <p:cNvSpPr txBox="1"/>
+            <p:nvPr/>
+          </p:nvSpPr>
+          <p:spPr>
+            <a:xfrm>
+              <a:off x="1396999" y="1979271"/>
+              <a:ext cx="9398001" cy="923330"/>
+            </a:xfrm>
+            <a:prstGeom prst="rect">
+              <a:avLst/>
+            </a:prstGeom>
+            <a:noFill/>
+          </p:spPr>
+          <p:txBody>
+            <a:bodyPr wrap="square" rtlCol="0">
+              <a:spAutoFit/>
+            </a:bodyPr>
+            <a:lstStyle/>
+            <a:p>
+              <a:r>
+                <a:rPr lang="en-US" dirty="0"/>
+                <a:t>Lorem ipsum dolor sit </a:t>
+              </a:r>
+              <a:r>
+                <a:rPr lang="en-US" dirty="0" err="1"/>
+                <a:t>amet</a:t>
+              </a:r>
+              <a:r>
+                <a:rPr lang="en-US" dirty="0"/>
+                <a:t>, </a:t>
+              </a:r>
+              <a:r>
+                <a:rPr lang="en-US" dirty="0" err="1"/>
+                <a:t>consectetur</a:t>
+              </a:r>
+              <a:r>
+                <a:rPr lang="en-US" dirty="0"/>
+                <a:t> </a:t>
+              </a:r>
+              <a:r>
+                <a:rPr lang="en-US" dirty="0" err="1"/>
+                <a:t>adipiscing</a:t>
+              </a:r>
+              <a:r>
+                <a:rPr lang="en-US" dirty="0"/>
+                <a:t> </a:t>
+              </a:r>
+              <a:r>
+                <a:rPr lang="en-US" dirty="0" err="1"/>
+                <a:t>elit</a:t>
+              </a:r>
+              <a:r>
+                <a:rPr lang="en-US" dirty="0"/>
+                <a:t>. In ac </a:t>
+              </a:r>
+              <a:r>
+                <a:rPr lang="en-US" dirty="0" err="1"/>
+                <a:t>rhoncus</a:t>
+              </a:r>
+              <a:r>
+                <a:rPr lang="en-US" dirty="0"/>
+                <a:t> ante, at </a:t>
+              </a:r>
+              <a:r>
+                <a:rPr lang="en-US" dirty="0" err="1"/>
+                <a:t>dapibus</a:t>
+              </a:r>
+              <a:r>
+                <a:rPr lang="en-US" dirty="0"/>
+                <a:t> </a:t>
+              </a:r>
+              <a:r>
+                <a:rPr lang="en-US" dirty="0" err="1"/>
+                <a:t>orci</a:t>
+              </a:r>
+              <a:r>
+                <a:rPr lang="en-US" dirty="0"/>
+                <a:t>. </a:t>
+              </a:r>
+              <a:r>
+                <a:rPr lang="en-US" dirty="0" err="1"/>
+                <a:t>Proin</a:t>
+              </a:r>
+              <a:r>
+                <a:rPr lang="en-US" dirty="0"/>
+                <a:t> at </a:t>
+              </a:r>
+              <a:r>
+                <a:rPr lang="en-US" dirty="0" err="1"/>
+                <a:t>pretium</a:t>
+              </a:r>
+              <a:r>
+                <a:rPr lang="en-US" dirty="0"/>
+                <a:t> </a:t>
+              </a:r>
+              <a:r>
+                <a:rPr lang="en-US" dirty="0" err="1"/>
+                <a:t>arcu</a:t>
+              </a:r>
+              <a:r>
+                <a:rPr lang="en-US" dirty="0"/>
+                <a:t>, in semper </a:t>
+              </a:r>
+              <a:r>
+                <a:rPr lang="en-US" dirty="0" err="1"/>
+                <a:t>urna</a:t>
+              </a:r>
+              <a:r>
+                <a:rPr lang="en-US" dirty="0"/>
+                <a:t>. Nunc vestibulum </a:t>
+              </a:r>
+              <a:r>
+                <a:rPr lang="en-US" dirty="0" err="1"/>
+                <a:t>odio</a:t>
+              </a:r>
+              <a:r>
+                <a:rPr lang="en-US" dirty="0"/>
+                <a:t> dui, vitae pharetra ipsum porta a. </a:t>
+              </a:r>
+              <a:r>
+                <a:rPr lang="en-US" dirty="0" err="1"/>
+                <a:t>Aenean</a:t>
+              </a:r>
+              <a:r>
+                <a:rPr lang="en-US" dirty="0"/>
+                <a:t> </a:t>
+              </a:r>
+              <a:r>
+                <a:rPr lang="en-US" dirty="0" err="1"/>
+                <a:t>rhoncus</a:t>
+              </a:r>
+              <a:r>
+                <a:rPr lang="en-US" dirty="0"/>
+                <a:t> </a:t>
+              </a:r>
+              <a:r>
+                <a:rPr lang="en-US" dirty="0" err="1"/>
+                <a:t>velit</a:t>
+              </a:r>
+              <a:r>
+                <a:rPr lang="en-US" dirty="0"/>
+                <a:t> vel </a:t>
+              </a:r>
+              <a:r>
+                <a:rPr lang="en-US" dirty="0" err="1"/>
+                <a:t>ultrices</a:t>
+              </a:r>
+              <a:r>
+                <a:rPr lang="en-US" dirty="0"/>
+                <a:t> tempus. </a:t>
+              </a:r>
+            </a:p>
+          </p:txBody>
+        </p:sp>
+        <p:grpSp>
+          <p:nvGrpSpPr>
+            <p:cNvPr id="5" name="Group 4">
+              <a:extLst>
+                <a:ext uri="{FF2B5EF4-FFF2-40B4-BE49-F238E27FC236}">
+                  <a16:creationId xmlns:a16="http://schemas.microsoft.com/office/drawing/2014/main" id="{4582F6B9-BD69-45C3-9A32-C91FC8F612BC}"/>
+                </a:ext>
+              </a:extLst>
+            </p:cNvPr>
+            <p:cNvGrpSpPr/>
+            <p:nvPr/>
+          </p:nvGrpSpPr>
+          <p:grpSpPr>
+            <a:xfrm>
+              <a:off x="1397001" y="2974594"/>
+              <a:ext cx="9397999" cy="1157469"/>
+              <a:chOff x="1397001" y="2974594"/>
+              <a:chExt cx="9993774" cy="1157469"/>
+            </a:xfrm>
+          </p:grpSpPr>
+          <p:sp>
+            <p:nvSpPr>
+              <p:cNvPr id="32" name="Rectangle 31">
+                <a:extLst>
+                  <a:ext uri="{FF2B5EF4-FFF2-40B4-BE49-F238E27FC236}">
+                    <a16:creationId xmlns:a16="http://schemas.microsoft.com/office/drawing/2014/main" id="{10CE6EDC-925B-423D-B47A-9D4375616D49}"/>
+                  </a:ext>
+                </a:extLst>
+              </p:cNvPr>
+              <p:cNvSpPr/>
+              <p:nvPr/>
+            </p:nvSpPr>
+            <p:spPr>
+              <a:xfrm>
+                <a:off x="1397001" y="2974594"/>
+                <a:ext cx="3331258" cy="1157469"/>
+              </a:xfrm>
+              <a:prstGeom prst="rect">
+                <a:avLst/>
+              </a:prstGeom>
+            </p:spPr>
+            <p:style>
+              <a:lnRef idx="2">
+                <a:schemeClr val="dk1"/>
+              </a:lnRef>
+              <a:fillRef idx="1">
+                <a:schemeClr val="lt1"/>
+              </a:fillRef>
+              <a:effectRef idx="0">
+                <a:schemeClr val="dk1"/>
+              </a:effectRef>
+              <a:fontRef idx="minor">
+                <a:schemeClr val="dk1"/>
+              </a:fontRef>
+            </p:style>
+            <p:txBody>
+              <a:bodyPr rtlCol="0" anchor="ctr"/>
+              <a:lstStyle/>
+              <a:p>
+                <a:pPr algn="ctr"/>
+                <a:r>
+                  <a:rPr lang="en-US" dirty="0"/>
+                  <a:t>Stove</a:t>
+                </a:r>
+              </a:p>
+            </p:txBody>
+          </p:sp>
+          <p:sp>
+            <p:nvSpPr>
+              <p:cNvPr id="34" name="Rectangle 33">
+                <a:extLst>
+                  <a:ext uri="{FF2B5EF4-FFF2-40B4-BE49-F238E27FC236}">
+                    <a16:creationId xmlns:a16="http://schemas.microsoft.com/office/drawing/2014/main" id="{FC170EDB-F987-41EA-8E5F-049F99345597}"/>
+                  </a:ext>
+                </a:extLst>
+              </p:cNvPr>
+              <p:cNvSpPr/>
+              <p:nvPr/>
+            </p:nvSpPr>
+            <p:spPr>
+              <a:xfrm>
+                <a:off x="4728259" y="2974594"/>
+                <a:ext cx="3331258" cy="1157469"/>
+              </a:xfrm>
+              <a:prstGeom prst="rect">
+                <a:avLst/>
+              </a:prstGeom>
+            </p:spPr>
+            <p:style>
+              <a:lnRef idx="2">
+                <a:schemeClr val="dk1"/>
+              </a:lnRef>
+              <a:fillRef idx="1">
+                <a:schemeClr val="lt1"/>
+              </a:fillRef>
+              <a:effectRef idx="0">
+                <a:schemeClr val="dk1"/>
+              </a:effectRef>
+              <a:fontRef idx="minor">
+                <a:schemeClr val="dk1"/>
+              </a:fontRef>
+            </p:style>
+            <p:txBody>
+              <a:bodyPr rtlCol="0" anchor="ctr"/>
+              <a:lstStyle/>
+              <a:p>
+                <a:pPr algn="ctr"/>
+                <a:r>
+                  <a:rPr lang="en-US" dirty="0"/>
+                  <a:t>Pump</a:t>
+                </a:r>
+              </a:p>
+            </p:txBody>
+          </p:sp>
+          <p:sp>
+            <p:nvSpPr>
+              <p:cNvPr id="35" name="Rectangle 34">
+                <a:extLst>
+                  <a:ext uri="{FF2B5EF4-FFF2-40B4-BE49-F238E27FC236}">
+                    <a16:creationId xmlns:a16="http://schemas.microsoft.com/office/drawing/2014/main" id="{33BB6D53-6E86-4B35-8295-7F5631185CC7}"/>
+                  </a:ext>
+                </a:extLst>
+              </p:cNvPr>
+              <p:cNvSpPr/>
+              <p:nvPr/>
+            </p:nvSpPr>
+            <p:spPr>
+              <a:xfrm>
+                <a:off x="8059517" y="2974594"/>
+                <a:ext cx="3331258" cy="1157469"/>
+              </a:xfrm>
+              <a:prstGeom prst="rect">
+                <a:avLst/>
+              </a:prstGeom>
+            </p:spPr>
+            <p:style>
+              <a:lnRef idx="2">
+                <a:schemeClr val="dk1"/>
+              </a:lnRef>
+              <a:fillRef idx="1">
+                <a:schemeClr val="lt1"/>
+              </a:fillRef>
+              <a:effectRef idx="0">
+                <a:schemeClr val="dk1"/>
+              </a:effectRef>
+              <a:fontRef idx="minor">
+                <a:schemeClr val="dk1"/>
+              </a:fontRef>
+            </p:style>
+            <p:txBody>
+              <a:bodyPr rtlCol="0" anchor="ctr"/>
+              <a:lstStyle/>
+              <a:p>
+                <a:pPr algn="ctr"/>
+                <a:r>
+                  <a:rPr lang="en-US" dirty="0"/>
+                  <a:t>Fire Place</a:t>
+                </a:r>
+              </a:p>
+            </p:txBody>
+          </p:sp>
+        </p:grpSp>
+        <p:sp>
+          <p:nvSpPr>
+            <p:cNvPr id="36" name="TextBox 35">
+              <a:extLst>
+                <a:ext uri="{FF2B5EF4-FFF2-40B4-BE49-F238E27FC236}">
+                  <a16:creationId xmlns:a16="http://schemas.microsoft.com/office/drawing/2014/main" id="{F7B120A7-94D1-425D-8B33-DAE9FFB6AC34}"/>
+                </a:ext>
+              </a:extLst>
+            </p:cNvPr>
+            <p:cNvSpPr txBox="1"/>
+            <p:nvPr/>
+          </p:nvSpPr>
+          <p:spPr>
+            <a:xfrm>
+              <a:off x="1396998" y="4154497"/>
+              <a:ext cx="9398001" cy="923330"/>
+            </a:xfrm>
+            <a:prstGeom prst="rect">
+              <a:avLst/>
+            </a:prstGeom>
+            <a:noFill/>
+          </p:spPr>
+          <p:txBody>
+            <a:bodyPr wrap="square" rtlCol="0">
+              <a:spAutoFit/>
+            </a:bodyPr>
+            <a:lstStyle/>
+            <a:p>
+              <a:r>
+                <a:rPr lang="en-US" dirty="0"/>
+                <a:t>Lorem ipsum dolor sit </a:t>
+              </a:r>
+              <a:r>
+                <a:rPr lang="en-US" dirty="0" err="1"/>
+                <a:t>amet</a:t>
+              </a:r>
+              <a:r>
+                <a:rPr lang="en-US" dirty="0"/>
+                <a:t>, </a:t>
+              </a:r>
+              <a:r>
+                <a:rPr lang="en-US" dirty="0" err="1"/>
+                <a:t>consectetur</a:t>
+              </a:r>
+              <a:r>
+                <a:rPr lang="en-US" dirty="0"/>
+                <a:t> </a:t>
+              </a:r>
+              <a:r>
+                <a:rPr lang="en-US" dirty="0" err="1"/>
+                <a:t>adipiscing</a:t>
+              </a:r>
+              <a:r>
+                <a:rPr lang="en-US" dirty="0"/>
+                <a:t> </a:t>
+              </a:r>
+              <a:r>
+                <a:rPr lang="en-US" dirty="0" err="1"/>
+                <a:t>elit</a:t>
+              </a:r>
+              <a:r>
+                <a:rPr lang="en-US" dirty="0"/>
+                <a:t>. In ac </a:t>
+              </a:r>
+              <a:r>
+                <a:rPr lang="en-US" dirty="0" err="1"/>
+                <a:t>rhoncus</a:t>
+              </a:r>
+              <a:r>
+                <a:rPr lang="en-US" dirty="0"/>
+                <a:t> ante, at </a:t>
+              </a:r>
+              <a:r>
+                <a:rPr lang="en-US" dirty="0" err="1"/>
+                <a:t>dapibus</a:t>
+              </a:r>
+              <a:r>
+                <a:rPr lang="en-US" dirty="0"/>
+                <a:t> </a:t>
+              </a:r>
+              <a:r>
+                <a:rPr lang="en-US" dirty="0" err="1"/>
+                <a:t>orci</a:t>
+              </a:r>
+              <a:r>
+                <a:rPr lang="en-US" dirty="0"/>
+                <a:t>. </a:t>
+              </a:r>
+              <a:r>
+                <a:rPr lang="en-US" dirty="0" err="1"/>
+                <a:t>Proin</a:t>
+              </a:r>
+              <a:r>
+                <a:rPr lang="en-US" dirty="0"/>
+                <a:t> at </a:t>
+              </a:r>
+              <a:r>
+                <a:rPr lang="en-US" dirty="0" err="1"/>
+                <a:t>pretium</a:t>
+              </a:r>
+              <a:r>
+                <a:rPr lang="en-US" dirty="0"/>
+                <a:t> </a:t>
+              </a:r>
+              <a:r>
+                <a:rPr lang="en-US" dirty="0" err="1"/>
+                <a:t>arcu</a:t>
+              </a:r>
+              <a:r>
+                <a:rPr lang="en-US" dirty="0"/>
+                <a:t>, in semper </a:t>
+              </a:r>
+              <a:r>
+                <a:rPr lang="en-US" dirty="0" err="1"/>
+                <a:t>urna</a:t>
+              </a:r>
+              <a:r>
+                <a:rPr lang="en-US" dirty="0"/>
+                <a:t>. Nunc vestibulum </a:t>
+              </a:r>
+              <a:r>
+                <a:rPr lang="en-US" dirty="0" err="1"/>
+                <a:t>odio</a:t>
+              </a:r>
+              <a:r>
+                <a:rPr lang="en-US" dirty="0"/>
+                <a:t> dui, vitae pharetra ipsum porta a. </a:t>
+              </a:r>
+              <a:r>
+                <a:rPr lang="en-US" dirty="0" err="1"/>
+                <a:t>Aenean</a:t>
+              </a:r>
+              <a:r>
+                <a:rPr lang="en-US" dirty="0"/>
+                <a:t> </a:t>
+              </a:r>
+              <a:r>
+                <a:rPr lang="en-US" dirty="0" err="1"/>
+                <a:t>rhoncus</a:t>
+              </a:r>
+              <a:r>
+                <a:rPr lang="en-US" dirty="0"/>
+                <a:t> </a:t>
+              </a:r>
+              <a:r>
+                <a:rPr lang="en-US" dirty="0" err="1"/>
+                <a:t>velit</a:t>
+              </a:r>
+              <a:r>
+                <a:rPr lang="en-US" dirty="0"/>
+                <a:t> vel </a:t>
+              </a:r>
+              <a:r>
+                <a:rPr lang="en-US" dirty="0" err="1"/>
+                <a:t>ultrices</a:t>
+              </a:r>
+              <a:r>
+                <a:rPr lang="en-US" dirty="0"/>
+                <a:t> tempus. </a:t>
+              </a:r>
+            </a:p>
+          </p:txBody>
+        </p:sp>
+        <p:sp>
+          <p:nvSpPr>
+            <p:cNvPr id="37" name="Rectangle 36">
+              <a:extLst>
+                <a:ext uri="{FF2B5EF4-FFF2-40B4-BE49-F238E27FC236}">
+                  <a16:creationId xmlns:a16="http://schemas.microsoft.com/office/drawing/2014/main" id="{516DAA35-0D3B-44A3-ADEB-212B2639C689}"/>
+                </a:ext>
+              </a:extLst>
+            </p:cNvPr>
+            <p:cNvSpPr/>
+            <p:nvPr/>
+          </p:nvSpPr>
+          <p:spPr>
+            <a:xfrm>
+              <a:off x="6157732" y="5181500"/>
+              <a:ext cx="4637267" cy="1157469"/>
+            </a:xfrm>
+            <a:prstGeom prst="rect">
+              <a:avLst/>
+            </a:prstGeom>
+          </p:spPr>
+          <p:style>
+            <a:lnRef idx="2">
+              <a:schemeClr val="dk1"/>
+            </a:lnRef>
+            <a:fillRef idx="1">
+              <a:schemeClr val="lt1"/>
+            </a:fillRef>
+            <a:effectRef idx="0">
+              <a:schemeClr val="dk1"/>
+            </a:effectRef>
+            <a:fontRef idx="minor">
+              <a:schemeClr val="dk1"/>
+            </a:fontRef>
+          </p:style>
+          <p:txBody>
+            <a:bodyPr rtlCol="0" anchor="ctr"/>
+            <a:lstStyle/>
+            <a:p>
+              <a:pPr algn="ctr"/>
+              <a:r>
+                <a:rPr lang="en-US" dirty="0"/>
+                <a:t>Cottage Now</a:t>
+              </a:r>
+            </a:p>
+          </p:txBody>
+        </p:sp>
+        <p:sp>
+          <p:nvSpPr>
+            <p:cNvPr id="38" name="Rectangle 37">
+              <a:extLst>
+                <a:ext uri="{FF2B5EF4-FFF2-40B4-BE49-F238E27FC236}">
+                  <a16:creationId xmlns:a16="http://schemas.microsoft.com/office/drawing/2014/main" id="{DCE4C334-1947-4272-BD98-7D05282EEA97}"/>
+                </a:ext>
+              </a:extLst>
+            </p:cNvPr>
+            <p:cNvSpPr/>
+            <p:nvPr/>
+          </p:nvSpPr>
+          <p:spPr>
+            <a:xfrm>
+              <a:off x="6096001" y="767687"/>
+              <a:ext cx="4698998" cy="1157469"/>
+            </a:xfrm>
+            <a:prstGeom prst="rect">
+              <a:avLst/>
+            </a:prstGeom>
+          </p:spPr>
+          <p:style>
+            <a:lnRef idx="2">
+              <a:schemeClr val="dk1"/>
+            </a:lnRef>
+            <a:fillRef idx="1">
+              <a:schemeClr val="lt1"/>
+            </a:fillRef>
+            <a:effectRef idx="0">
+              <a:schemeClr val="dk1"/>
+            </a:effectRef>
+            <a:fontRef idx="minor">
+              <a:schemeClr val="dk1"/>
+            </a:fontRef>
+          </p:style>
+          <p:txBody>
+            <a:bodyPr rtlCol="0" anchor="ctr"/>
+            <a:lstStyle/>
+            <a:p>
+              <a:pPr algn="ctr"/>
+              <a:r>
+                <a:rPr lang="en-US" dirty="0"/>
+                <a:t>Original Photo 2</a:t>
+              </a:r>
+            </a:p>
+          </p:txBody>
+        </p:sp>
+        <p:sp>
+          <p:nvSpPr>
+            <p:cNvPr id="39" name="TextBox 38">
+              <a:extLst>
+                <a:ext uri="{FF2B5EF4-FFF2-40B4-BE49-F238E27FC236}">
+                  <a16:creationId xmlns:a16="http://schemas.microsoft.com/office/drawing/2014/main" id="{F91FE9FA-9EEE-4F1E-806F-701961F1BFFA}"/>
+                </a:ext>
+              </a:extLst>
+            </p:cNvPr>
+            <p:cNvSpPr txBox="1"/>
+            <p:nvPr/>
+          </p:nvSpPr>
+          <p:spPr>
+            <a:xfrm>
+              <a:off x="1396997" y="6418824"/>
+              <a:ext cx="9398001" cy="923330"/>
+            </a:xfrm>
+            <a:prstGeom prst="rect">
+              <a:avLst/>
+            </a:prstGeom>
+            <a:noFill/>
+          </p:spPr>
+          <p:txBody>
+            <a:bodyPr wrap="square" rtlCol="0">
+              <a:spAutoFit/>
+            </a:bodyPr>
+            <a:lstStyle/>
+            <a:p>
+              <a:r>
+                <a:rPr lang="en-US" dirty="0"/>
+                <a:t>Lorem ipsum dolor sit </a:t>
+              </a:r>
+              <a:r>
+                <a:rPr lang="en-US" dirty="0" err="1"/>
+                <a:t>amet</a:t>
+              </a:r>
+              <a:r>
+                <a:rPr lang="en-US" dirty="0"/>
+                <a:t>, </a:t>
+              </a:r>
+              <a:r>
+                <a:rPr lang="en-US" dirty="0" err="1"/>
+                <a:t>consectetur</a:t>
+              </a:r>
+              <a:r>
+                <a:rPr lang="en-US" dirty="0"/>
+                <a:t> </a:t>
+              </a:r>
+              <a:r>
+                <a:rPr lang="en-US" dirty="0" err="1"/>
+                <a:t>adipiscing</a:t>
+              </a:r>
+              <a:r>
+                <a:rPr lang="en-US" dirty="0"/>
+                <a:t> </a:t>
+              </a:r>
+              <a:r>
+                <a:rPr lang="en-US" dirty="0" err="1"/>
+                <a:t>elit</a:t>
+              </a:r>
+              <a:r>
+                <a:rPr lang="en-US" dirty="0"/>
+                <a:t>. In ac </a:t>
+              </a:r>
+              <a:r>
+                <a:rPr lang="en-US" dirty="0" err="1"/>
+                <a:t>rhoncus</a:t>
+              </a:r>
+              <a:r>
+                <a:rPr lang="en-US" dirty="0"/>
+                <a:t> ante, at </a:t>
+              </a:r>
+              <a:r>
+                <a:rPr lang="en-US" dirty="0" err="1"/>
+                <a:t>dapibus</a:t>
+              </a:r>
+              <a:r>
+                <a:rPr lang="en-US" dirty="0"/>
+                <a:t> </a:t>
+              </a:r>
+              <a:r>
+                <a:rPr lang="en-US" dirty="0" err="1"/>
+                <a:t>orci</a:t>
+              </a:r>
+              <a:r>
+                <a:rPr lang="en-US" dirty="0"/>
+                <a:t>. </a:t>
+              </a:r>
+              <a:r>
+                <a:rPr lang="en-US" dirty="0" err="1"/>
+                <a:t>Proin</a:t>
+              </a:r>
+              <a:r>
+                <a:rPr lang="en-US" dirty="0"/>
+                <a:t> at </a:t>
+              </a:r>
+              <a:r>
+                <a:rPr lang="en-US" dirty="0" err="1"/>
+                <a:t>pretium</a:t>
+              </a:r>
+              <a:r>
+                <a:rPr lang="en-US" dirty="0"/>
+                <a:t> </a:t>
+              </a:r>
+              <a:r>
+                <a:rPr lang="en-US" dirty="0" err="1"/>
+                <a:t>arcu</a:t>
+              </a:r>
+              <a:r>
+                <a:rPr lang="en-US" dirty="0"/>
+                <a:t>, in semper </a:t>
+              </a:r>
+              <a:r>
+                <a:rPr lang="en-US" dirty="0" err="1"/>
+                <a:t>urna</a:t>
+              </a:r>
+              <a:r>
+                <a:rPr lang="en-US" dirty="0"/>
+                <a:t>. Nunc vestibulum </a:t>
+              </a:r>
+              <a:r>
+                <a:rPr lang="en-US" dirty="0" err="1"/>
+                <a:t>odio</a:t>
+              </a:r>
+              <a:r>
+                <a:rPr lang="en-US" dirty="0"/>
+                <a:t> dui, vitae pharetra ipsum porta a. </a:t>
+              </a:r>
+              <a:r>
+                <a:rPr lang="en-US" dirty="0" err="1"/>
+                <a:t>Aenean</a:t>
+              </a:r>
+              <a:r>
+                <a:rPr lang="en-US" dirty="0"/>
+                <a:t> </a:t>
+              </a:r>
+              <a:r>
+                <a:rPr lang="en-US" dirty="0" err="1"/>
+                <a:t>rhoncus</a:t>
+              </a:r>
+              <a:r>
+                <a:rPr lang="en-US" dirty="0"/>
+                <a:t> </a:t>
+              </a:r>
+              <a:r>
+                <a:rPr lang="en-US" dirty="0" err="1"/>
+                <a:t>velit</a:t>
+              </a:r>
+              <a:r>
+                <a:rPr lang="en-US" dirty="0"/>
+                <a:t> vel </a:t>
+              </a:r>
+              <a:r>
+                <a:rPr lang="en-US" dirty="0" err="1"/>
+                <a:t>ultrices</a:t>
+              </a:r>
+              <a:r>
+                <a:rPr lang="en-US" dirty="0"/>
+                <a:t> tempus. </a:t>
+              </a:r>
+            </a:p>
+          </p:txBody>
+        </p:sp>
+        <p:grpSp>
+          <p:nvGrpSpPr>
+            <p:cNvPr id="12" name="Group 11">
+              <a:extLst>
+                <a:ext uri="{FF2B5EF4-FFF2-40B4-BE49-F238E27FC236}">
+                  <a16:creationId xmlns:a16="http://schemas.microsoft.com/office/drawing/2014/main" id="{AB70A5EF-5F1D-4C38-BF0D-C4C29338A623}"/>
+                </a:ext>
+              </a:extLst>
+            </p:cNvPr>
+            <p:cNvGrpSpPr/>
+            <p:nvPr/>
+          </p:nvGrpSpPr>
+          <p:grpSpPr>
+            <a:xfrm>
+              <a:off x="1397000" y="7366968"/>
+              <a:ext cx="9397998" cy="1157471"/>
+              <a:chOff x="1397000" y="7518870"/>
+              <a:chExt cx="9696450" cy="1157471"/>
+            </a:xfrm>
+          </p:grpSpPr>
+          <p:grpSp>
+            <p:nvGrpSpPr>
+              <p:cNvPr id="6" name="Group 5">
+                <a:extLst>
+                  <a:ext uri="{FF2B5EF4-FFF2-40B4-BE49-F238E27FC236}">
+                    <a16:creationId xmlns:a16="http://schemas.microsoft.com/office/drawing/2014/main" id="{19717F67-BC13-44F2-B589-674EDD20A7FE}"/>
+                  </a:ext>
+                </a:extLst>
+              </p:cNvPr>
+              <p:cNvGrpSpPr/>
+              <p:nvPr/>
+            </p:nvGrpSpPr>
+            <p:grpSpPr>
+              <a:xfrm>
+                <a:off x="1397000" y="7518871"/>
+                <a:ext cx="6464300" cy="1157470"/>
+                <a:chOff x="1397000" y="7518871"/>
+                <a:chExt cx="6464300" cy="1157470"/>
+              </a:xfrm>
+            </p:grpSpPr>
+            <p:sp>
+              <p:nvSpPr>
+                <p:cNvPr id="40" name="Rectangle 39">
+                  <a:extLst>
+                    <a:ext uri="{FF2B5EF4-FFF2-40B4-BE49-F238E27FC236}">
+                      <a16:creationId xmlns:a16="http://schemas.microsoft.com/office/drawing/2014/main" id="{64D46F13-7723-4F27-ABE1-7CE758BE1F84}"/>
+                    </a:ext>
+                  </a:extLst>
+                </p:cNvPr>
+                <p:cNvSpPr/>
+                <p:nvPr/>
+              </p:nvSpPr>
+              <p:spPr>
+                <a:xfrm>
+                  <a:off x="1397000" y="7518872"/>
+                  <a:ext cx="3232150" cy="1157469"/>
+                </a:xfrm>
+                <a:prstGeom prst="rect">
+                  <a:avLst/>
+                </a:prstGeom>
+              </p:spPr>
+              <p:style>
+                <a:lnRef idx="2">
+                  <a:schemeClr val="dk1"/>
+                </a:lnRef>
+                <a:fillRef idx="1">
+                  <a:schemeClr val="lt1"/>
+                </a:fillRef>
+                <a:effectRef idx="0">
+                  <a:schemeClr val="dk1"/>
+                </a:effectRef>
+                <a:fontRef idx="minor">
+                  <a:schemeClr val="dk1"/>
+                </a:fontRef>
+              </p:style>
+              <p:txBody>
+                <a:bodyPr rtlCol="0" anchor="ctr"/>
+                <a:lstStyle/>
+                <a:p>
+                  <a:pPr algn="ctr"/>
+                  <a:r>
+                    <a:rPr lang="en-US" dirty="0"/>
+                    <a:t>Photo of Mother</a:t>
+                  </a:r>
+                </a:p>
+              </p:txBody>
+            </p:sp>
+            <p:sp>
+              <p:nvSpPr>
+                <p:cNvPr id="41" name="Rectangle 40">
+                  <a:extLst>
+                    <a:ext uri="{FF2B5EF4-FFF2-40B4-BE49-F238E27FC236}">
+                      <a16:creationId xmlns:a16="http://schemas.microsoft.com/office/drawing/2014/main" id="{C603BE43-5B07-4D92-ADCD-04A57C70D4FE}"/>
+                    </a:ext>
+                  </a:extLst>
+                </p:cNvPr>
+                <p:cNvSpPr/>
+                <p:nvPr/>
+              </p:nvSpPr>
+              <p:spPr>
+                <a:xfrm>
+                  <a:off x="4629150" y="7518871"/>
+                  <a:ext cx="3232150" cy="1157469"/>
+                </a:xfrm>
+                <a:prstGeom prst="rect">
+                  <a:avLst/>
+                </a:prstGeom>
+              </p:spPr>
+              <p:style>
+                <a:lnRef idx="2">
+                  <a:schemeClr val="dk1"/>
+                </a:lnRef>
+                <a:fillRef idx="1">
+                  <a:schemeClr val="lt1"/>
+                </a:fillRef>
+                <a:effectRef idx="0">
+                  <a:schemeClr val="dk1"/>
+                </a:effectRef>
+                <a:fontRef idx="minor">
+                  <a:schemeClr val="dk1"/>
+                </a:fontRef>
+              </p:style>
+              <p:txBody>
+                <a:bodyPr rtlCol="0" anchor="ctr"/>
+                <a:lstStyle/>
+                <a:p>
+                  <a:pPr algn="ctr"/>
+                  <a:r>
+                    <a:rPr lang="en-US" dirty="0"/>
+                    <a:t>Photo of Father</a:t>
+                  </a:r>
+                </a:p>
+              </p:txBody>
+            </p:sp>
+          </p:grpSp>
+          <p:sp>
+            <p:nvSpPr>
+              <p:cNvPr id="42" name="Rectangle 41">
+                <a:extLst>
+                  <a:ext uri="{FF2B5EF4-FFF2-40B4-BE49-F238E27FC236}">
+                    <a16:creationId xmlns:a16="http://schemas.microsoft.com/office/drawing/2014/main" id="{6148AC22-58B7-4C82-ABEF-380DFEB8950F}"/>
+                  </a:ext>
+                </a:extLst>
+              </p:cNvPr>
+              <p:cNvSpPr/>
+              <p:nvPr/>
+            </p:nvSpPr>
+            <p:spPr>
+              <a:xfrm>
+                <a:off x="7861300" y="7518870"/>
+                <a:ext cx="3232150" cy="1157469"/>
+              </a:xfrm>
+              <a:prstGeom prst="rect">
+                <a:avLst/>
+              </a:prstGeom>
+            </p:spPr>
+            <p:style>
+              <a:lnRef idx="2">
+                <a:schemeClr val="dk1"/>
+              </a:lnRef>
+              <a:fillRef idx="1">
+                <a:schemeClr val="lt1"/>
+              </a:fillRef>
+              <a:effectRef idx="0">
+                <a:schemeClr val="dk1"/>
+              </a:effectRef>
+              <a:fontRef idx="minor">
+                <a:schemeClr val="dk1"/>
+              </a:fontRef>
+            </p:style>
+            <p:txBody>
+              <a:bodyPr rtlCol="0" anchor="ctr"/>
+              <a:lstStyle/>
+              <a:p>
+                <a:pPr algn="ctr"/>
+                <a:r>
+                  <a:rPr lang="en-US" dirty="0"/>
+                  <a:t>Photo of Mother and Father</a:t>
+                </a:r>
+              </a:p>
+            </p:txBody>
+          </p:sp>
+        </p:grpSp>
+        <p:sp>
+          <p:nvSpPr>
+            <p:cNvPr id="43" name="TextBox 42">
+              <a:extLst>
+                <a:ext uri="{FF2B5EF4-FFF2-40B4-BE49-F238E27FC236}">
+                  <a16:creationId xmlns:a16="http://schemas.microsoft.com/office/drawing/2014/main" id="{F314B07A-DC9E-4EDC-888E-D357655255E5}"/>
+                </a:ext>
+              </a:extLst>
+            </p:cNvPr>
+            <p:cNvSpPr txBox="1"/>
+            <p:nvPr/>
+          </p:nvSpPr>
+          <p:spPr>
+            <a:xfrm>
+              <a:off x="1396996" y="8524437"/>
+              <a:ext cx="9398001" cy="923330"/>
+            </a:xfrm>
+            <a:prstGeom prst="rect">
+              <a:avLst/>
+            </a:prstGeom>
+            <a:noFill/>
+          </p:spPr>
+          <p:txBody>
+            <a:bodyPr wrap="square" rtlCol="0">
+              <a:spAutoFit/>
+            </a:bodyPr>
+            <a:lstStyle/>
+            <a:p>
+              <a:r>
+                <a:rPr lang="en-US" dirty="0"/>
+                <a:t>Lorem ipsum dolor sit </a:t>
+              </a:r>
+              <a:r>
+                <a:rPr lang="en-US" dirty="0" err="1"/>
+                <a:t>amet</a:t>
+              </a:r>
+              <a:r>
+                <a:rPr lang="en-US" dirty="0"/>
+                <a:t>, </a:t>
+              </a:r>
+              <a:r>
+                <a:rPr lang="en-US" dirty="0" err="1"/>
+                <a:t>consectetur</a:t>
+              </a:r>
+              <a:r>
+                <a:rPr lang="en-US" dirty="0"/>
+                <a:t> </a:t>
+              </a:r>
+              <a:r>
+                <a:rPr lang="en-US" dirty="0" err="1"/>
+                <a:t>adipiscing</a:t>
+              </a:r>
+              <a:r>
+                <a:rPr lang="en-US" dirty="0"/>
+                <a:t> </a:t>
+              </a:r>
+              <a:r>
+                <a:rPr lang="en-US" dirty="0" err="1"/>
+                <a:t>elit</a:t>
+              </a:r>
+              <a:r>
+                <a:rPr lang="en-US" dirty="0"/>
+                <a:t>. In ac </a:t>
+              </a:r>
+              <a:r>
+                <a:rPr lang="en-US" dirty="0" err="1"/>
+                <a:t>rhoncus</a:t>
+              </a:r>
+              <a:r>
+                <a:rPr lang="en-US" dirty="0"/>
+                <a:t> ante, at </a:t>
+              </a:r>
+              <a:r>
+                <a:rPr lang="en-US" dirty="0" err="1"/>
+                <a:t>dapibus</a:t>
+              </a:r>
+              <a:r>
+                <a:rPr lang="en-US" dirty="0"/>
+                <a:t> </a:t>
+              </a:r>
+              <a:r>
+                <a:rPr lang="en-US" dirty="0" err="1"/>
+                <a:t>orci</a:t>
+              </a:r>
+              <a:r>
+                <a:rPr lang="en-US" dirty="0"/>
+                <a:t>. </a:t>
+              </a:r>
+              <a:r>
+                <a:rPr lang="en-US" dirty="0" err="1"/>
+                <a:t>Proin</a:t>
+              </a:r>
+              <a:r>
+                <a:rPr lang="en-US" dirty="0"/>
+                <a:t> at </a:t>
+              </a:r>
+              <a:r>
+                <a:rPr lang="en-US" dirty="0" err="1"/>
+                <a:t>pretium</a:t>
+              </a:r>
+              <a:r>
+                <a:rPr lang="en-US" dirty="0"/>
+                <a:t> </a:t>
+              </a:r>
+              <a:r>
+                <a:rPr lang="en-US" dirty="0" err="1"/>
+                <a:t>arcu</a:t>
+              </a:r>
+              <a:r>
+                <a:rPr lang="en-US" dirty="0"/>
+                <a:t>, in semper </a:t>
+              </a:r>
+              <a:r>
+                <a:rPr lang="en-US" dirty="0" err="1"/>
+                <a:t>urna</a:t>
+              </a:r>
+              <a:r>
+                <a:rPr lang="en-US" dirty="0"/>
+                <a:t>. Nunc vestibulum </a:t>
+              </a:r>
+              <a:r>
+                <a:rPr lang="en-US" dirty="0" err="1"/>
+                <a:t>odio</a:t>
+              </a:r>
+              <a:r>
+                <a:rPr lang="en-US" dirty="0"/>
+                <a:t> dui, vitae pharetra ipsum porta a. </a:t>
+              </a:r>
+              <a:r>
+                <a:rPr lang="en-US" dirty="0" err="1"/>
+                <a:t>Aenean</a:t>
+              </a:r>
+              <a:r>
+                <a:rPr lang="en-US" dirty="0"/>
+                <a:t> </a:t>
+              </a:r>
+              <a:r>
+                <a:rPr lang="en-US" dirty="0" err="1"/>
+                <a:t>rhoncus</a:t>
+              </a:r>
+              <a:r>
+                <a:rPr lang="en-US" dirty="0"/>
+                <a:t> </a:t>
+              </a:r>
+              <a:r>
+                <a:rPr lang="en-US" dirty="0" err="1"/>
+                <a:t>velit</a:t>
+              </a:r>
+              <a:r>
+                <a:rPr lang="en-US" dirty="0"/>
+                <a:t> vel </a:t>
+              </a:r>
+              <a:r>
+                <a:rPr lang="en-US" dirty="0" err="1"/>
+                <a:t>ultrices</a:t>
+              </a:r>
+              <a:r>
+                <a:rPr lang="en-US" dirty="0"/>
+                <a:t> tempus. </a:t>
+              </a:r>
+            </a:p>
+          </p:txBody>
+        </p:sp>
+      </p:grpSp>
+    </p:spTree>
+    <p:extLst>
+      <p:ext uri="{BB962C8B-B14F-4D97-AF65-F5344CB8AC3E}">
+        <p14:creationId xmlns:p14="http://schemas.microsoft.com/office/powerpoint/2010/main" val="838305673"/>
+      </p:ext>
+    </p:extLst>
+  </p:cSld>
+  <p:clrMapOvr>
+    <a:masterClrMapping/>
+  </p:clrMapOvr>
+</p:sld>
+</file>
+
+<file path=ppt/slides/slide6.xml><?xml version="1.0" encoding="utf-8"?>
+<p:sld xmlns:a="http://schemas.openxmlformats.org/drawingml/2006/main" xmlns:r="http://schemas.openxmlformats.org/officeDocument/2006/relationships" xmlns:p="http://schemas.openxmlformats.org/presentationml/2006/main">
+  <p:cSld>
+    <p:spTree>
+      <p:nvGrpSpPr>
+        <p:cNvPr id="1" name=""/>
+        <p:cNvGrpSpPr/>
+        <p:nvPr/>
+      </p:nvGrpSpPr>
+      <p:grpSpPr>
+        <a:xfrm>
+          <a:off x="0" y="0"/>
+          <a:ext cx="0" cy="0"/>
+          <a:chOff x="0" y="0"/>
+          <a:chExt cx="0" cy="0"/>
+        </a:xfrm>
+      </p:grpSpPr>
+      <p:sp>
+        <p:nvSpPr>
+          <p:cNvPr id="8" name="TextBox 7">
+            <a:extLst>
+              <a:ext uri="{FF2B5EF4-FFF2-40B4-BE49-F238E27FC236}">
+                <a16:creationId xmlns:a16="http://schemas.microsoft.com/office/drawing/2014/main" id="{6B8468B5-7310-4B26-889D-AF6B42A4512C}"/>
+              </a:ext>
+            </a:extLst>
+          </p:cNvPr>
+          <p:cNvSpPr txBox="1"/>
+          <p:nvPr/>
+        </p:nvSpPr>
+        <p:spPr>
+          <a:xfrm>
+            <a:off x="0" y="304800"/>
+            <a:ext cx="12192000" cy="707886"/>
+          </a:xfrm>
+          <a:prstGeom prst="rect">
+            <a:avLst/>
+          </a:prstGeom>
+          <a:noFill/>
+        </p:spPr>
+        <p:txBody>
+          <a:bodyPr wrap="square" rtlCol="0">
+            <a:spAutoFit/>
+          </a:bodyPr>
+          <a:lstStyle/>
+          <a:p>
+            <a:pPr algn="ctr"/>
+            <a:r>
+              <a:rPr lang="en-US" sz="4000" b="1" i="1" dirty="0"/>
+              <a:t>Gallery</a:t>
+            </a:r>
+            <a:endParaRPr lang="en-US" b="1" i="1" dirty="0"/>
+          </a:p>
+        </p:txBody>
+      </p:sp>
+      <p:sp>
+        <p:nvSpPr>
+          <p:cNvPr id="7" name="Rectangle 6">
+            <a:extLst>
+              <a:ext uri="{FF2B5EF4-FFF2-40B4-BE49-F238E27FC236}">
+                <a16:creationId xmlns:a16="http://schemas.microsoft.com/office/drawing/2014/main" id="{F5FA0461-E5E1-4ACB-BE2C-D563B08A55BF}"/>
+              </a:ext>
+            </a:extLst>
+          </p:cNvPr>
+          <p:cNvSpPr/>
+          <p:nvPr/>
+        </p:nvSpPr>
+        <p:spPr>
+          <a:xfrm>
+            <a:off x="1397000" y="4652432"/>
+            <a:ext cx="9398000" cy="425753"/>
+          </a:xfrm>
+          <a:prstGeom prst="rect">
+            <a:avLst/>
+          </a:prstGeom>
+        </p:spPr>
+        <p:style>
+          <a:lnRef idx="2">
+            <a:schemeClr val="dk1"/>
+          </a:lnRef>
+          <a:fillRef idx="1">
+            <a:schemeClr val="lt1"/>
+          </a:fillRef>
+          <a:effectRef idx="0">
+            <a:schemeClr val="dk1"/>
+          </a:effectRef>
+          <a:fontRef idx="minor">
+            <a:schemeClr val="dk1"/>
+          </a:fontRef>
+        </p:style>
+        <p:txBody>
+          <a:bodyPr rtlCol="0" anchor="ctr"/>
+          <a:lstStyle/>
+          <a:p>
+            <a:pPr algn="ctr"/>
+            <a:r>
+              <a:rPr lang="en-US" i="1" dirty="0"/>
+              <a:t>Description: </a:t>
+            </a:r>
+            <a:r>
+              <a:rPr lang="en-US" dirty="0"/>
+              <a:t>Lorem ipsum dolor sit </a:t>
+            </a:r>
+            <a:r>
+              <a:rPr lang="en-US" dirty="0" err="1"/>
+              <a:t>amet</a:t>
+            </a:r>
+            <a:r>
+              <a:rPr lang="en-US" dirty="0"/>
+              <a:t>, </a:t>
+            </a:r>
+            <a:r>
+              <a:rPr lang="en-US" dirty="0" err="1"/>
+              <a:t>consectetur</a:t>
+            </a:r>
+            <a:r>
+              <a:rPr lang="en-US" dirty="0"/>
+              <a:t> </a:t>
+            </a:r>
+            <a:r>
+              <a:rPr lang="en-US" dirty="0" err="1"/>
+              <a:t>adipiscing</a:t>
+            </a:r>
+            <a:r>
+              <a:rPr lang="en-US" dirty="0"/>
+              <a:t> </a:t>
+            </a:r>
+            <a:r>
+              <a:rPr lang="en-US" dirty="0" err="1"/>
+              <a:t>elit</a:t>
+            </a:r>
+            <a:r>
+              <a:rPr lang="en-US"/>
+              <a:t>. </a:t>
+            </a:r>
+            <a:endParaRPr lang="en-US" i="1" dirty="0"/>
+          </a:p>
+        </p:txBody>
+      </p:sp>
+      <p:sp>
+        <p:nvSpPr>
+          <p:cNvPr id="2" name="Rectangle 1">
+            <a:extLst>
+              <a:ext uri="{FF2B5EF4-FFF2-40B4-BE49-F238E27FC236}">
+                <a16:creationId xmlns:a16="http://schemas.microsoft.com/office/drawing/2014/main" id="{287A8ECD-4A3C-42EE-AA65-5BA7F91B72D4}"/>
+              </a:ext>
+            </a:extLst>
+          </p:cNvPr>
+          <p:cNvSpPr/>
+          <p:nvPr/>
+        </p:nvSpPr>
+        <p:spPr>
+          <a:xfrm>
+            <a:off x="1397000" y="1242250"/>
+            <a:ext cx="9398000" cy="3425000"/>
+          </a:xfrm>
+          <a:prstGeom prst="rect">
+            <a:avLst/>
+          </a:prstGeom>
+        </p:spPr>
+        <p:style>
+          <a:lnRef idx="2">
+            <a:schemeClr val="dk1"/>
+          </a:lnRef>
+          <a:fillRef idx="1">
+            <a:schemeClr val="lt1"/>
+          </a:fillRef>
+          <a:effectRef idx="0">
+            <a:schemeClr val="dk1"/>
+          </a:effectRef>
+          <a:fontRef idx="minor">
+            <a:schemeClr val="dk1"/>
+          </a:fontRef>
+        </p:style>
+        <p:txBody>
+          <a:bodyPr rtlCol="0" anchor="ctr"/>
+          <a:lstStyle/>
+          <a:p>
+            <a:pPr algn="ctr"/>
+            <a:r>
+              <a:rPr lang="en-US" dirty="0"/>
+              <a:t>Image Slider</a:t>
+            </a:r>
+          </a:p>
+        </p:txBody>
+      </p:sp>
+      <p:grpSp>
+        <p:nvGrpSpPr>
+          <p:cNvPr id="3" name="Group 2">
+            <a:extLst>
+              <a:ext uri="{FF2B5EF4-FFF2-40B4-BE49-F238E27FC236}">
+                <a16:creationId xmlns:a16="http://schemas.microsoft.com/office/drawing/2014/main" id="{AC07BE6C-B4AE-4B96-BCD8-E929C54158C8}"/>
+              </a:ext>
+            </a:extLst>
+          </p:cNvPr>
+          <p:cNvGrpSpPr/>
+          <p:nvPr/>
+        </p:nvGrpSpPr>
+        <p:grpSpPr>
+          <a:xfrm>
+            <a:off x="5162550" y="4489450"/>
+            <a:ext cx="1860550" cy="177800"/>
+            <a:chOff x="5162550" y="5194300"/>
+            <a:chExt cx="1860550" cy="177800"/>
+          </a:xfrm>
+        </p:grpSpPr>
+        <p:sp>
+          <p:nvSpPr>
+            <p:cNvPr id="30" name="Rectangle 29">
+              <a:extLst>
+                <a:ext uri="{FF2B5EF4-FFF2-40B4-BE49-F238E27FC236}">
+                  <a16:creationId xmlns:a16="http://schemas.microsoft.com/office/drawing/2014/main" id="{12951C0C-6D81-491A-80CB-4BAD3F6EBEE3}"/>
+                </a:ext>
+              </a:extLst>
+            </p:cNvPr>
+            <p:cNvSpPr/>
+            <p:nvPr/>
+          </p:nvSpPr>
+          <p:spPr>
+            <a:xfrm>
+              <a:off x="5162550" y="5194300"/>
+              <a:ext cx="1860550" cy="177800"/>
+            </a:xfrm>
+            <a:prstGeom prst="rect">
+              <a:avLst/>
+            </a:prstGeom>
+          </p:spPr>
+          <p:style>
+            <a:lnRef idx="2">
+              <a:schemeClr val="dk1"/>
+            </a:lnRef>
+            <a:fillRef idx="1">
+              <a:schemeClr val="lt1"/>
+            </a:fillRef>
+            <a:effectRef idx="0">
+              <a:schemeClr val="dk1"/>
+            </a:effectRef>
+            <a:fontRef idx="minor">
+              <a:schemeClr val="dk1"/>
+            </a:fontRef>
+          </p:style>
+          <p:txBody>
+            <a:bodyPr rtlCol="0" anchor="ctr"/>
+            <a:lstStyle/>
+            <a:p>
+              <a:pPr algn="ctr"/>
+              <a:endParaRPr lang="en-US"/>
+            </a:p>
+          </p:txBody>
+        </p:sp>
+        <p:sp>
+          <p:nvSpPr>
+            <p:cNvPr id="31" name="Oval 30">
+              <a:extLst>
+                <a:ext uri="{FF2B5EF4-FFF2-40B4-BE49-F238E27FC236}">
+                  <a16:creationId xmlns:a16="http://schemas.microsoft.com/office/drawing/2014/main" id="{790B3EF6-2165-4B2F-A84F-B47C4BC7EC35}"/>
+                </a:ext>
+              </a:extLst>
+            </p:cNvPr>
+            <p:cNvSpPr/>
+            <p:nvPr/>
+          </p:nvSpPr>
+          <p:spPr>
+            <a:xfrm>
+              <a:off x="5274733" y="5209116"/>
+              <a:ext cx="148167" cy="148167"/>
+            </a:xfrm>
+            <a:prstGeom prst="ellipse">
+              <a:avLst/>
+            </a:prstGeom>
+          </p:spPr>
+          <p:style>
+            <a:lnRef idx="2">
+              <a:schemeClr val="dk1"/>
+            </a:lnRef>
+            <a:fillRef idx="1">
+              <a:schemeClr val="lt1"/>
+            </a:fillRef>
+            <a:effectRef idx="0">
+              <a:schemeClr val="dk1"/>
+            </a:effectRef>
+            <a:fontRef idx="minor">
+              <a:schemeClr val="dk1"/>
+            </a:fontRef>
+          </p:style>
+          <p:txBody>
+            <a:bodyPr rtlCol="0" anchor="ctr"/>
+            <a:lstStyle/>
+            <a:p>
+              <a:pPr algn="ctr"/>
+              <a:endParaRPr lang="en-US"/>
+            </a:p>
+          </p:txBody>
+        </p:sp>
+        <p:sp>
+          <p:nvSpPr>
+            <p:cNvPr id="32" name="Oval 31">
+              <a:extLst>
+                <a:ext uri="{FF2B5EF4-FFF2-40B4-BE49-F238E27FC236}">
+                  <a16:creationId xmlns:a16="http://schemas.microsoft.com/office/drawing/2014/main" id="{C7DCDDE9-8B2B-411B-8620-54436FEBE5EC}"/>
+                </a:ext>
+              </a:extLst>
+            </p:cNvPr>
+            <p:cNvSpPr/>
+            <p:nvPr/>
+          </p:nvSpPr>
+          <p:spPr>
+            <a:xfrm>
+              <a:off x="5644620" y="5211233"/>
+              <a:ext cx="148167" cy="148167"/>
+            </a:xfrm>
+            <a:prstGeom prst="ellipse">
+              <a:avLst/>
+            </a:prstGeom>
+          </p:spPr>
+          <p:style>
+            <a:lnRef idx="2">
+              <a:schemeClr val="dk1"/>
+            </a:lnRef>
+            <a:fillRef idx="1">
+              <a:schemeClr val="lt1"/>
+            </a:fillRef>
+            <a:effectRef idx="0">
+              <a:schemeClr val="dk1"/>
+            </a:effectRef>
+            <a:fontRef idx="minor">
+              <a:schemeClr val="dk1"/>
+            </a:fontRef>
+          </p:style>
+          <p:txBody>
+            <a:bodyPr rtlCol="0" anchor="ctr"/>
+            <a:lstStyle/>
+            <a:p>
+              <a:pPr algn="ctr"/>
+              <a:endParaRPr lang="en-US"/>
+            </a:p>
+          </p:txBody>
+        </p:sp>
+        <p:sp>
+          <p:nvSpPr>
+            <p:cNvPr id="33" name="Oval 32">
+              <a:extLst>
+                <a:ext uri="{FF2B5EF4-FFF2-40B4-BE49-F238E27FC236}">
+                  <a16:creationId xmlns:a16="http://schemas.microsoft.com/office/drawing/2014/main" id="{0BF7BD5C-5087-47DF-85B3-130B4113EC2C}"/>
+                </a:ext>
+              </a:extLst>
+            </p:cNvPr>
+            <p:cNvSpPr/>
+            <p:nvPr/>
+          </p:nvSpPr>
+          <p:spPr>
+            <a:xfrm>
+              <a:off x="6039908" y="5209116"/>
+              <a:ext cx="148167" cy="148167"/>
+            </a:xfrm>
+            <a:prstGeom prst="ellipse">
+              <a:avLst/>
+            </a:prstGeom>
+          </p:spPr>
+          <p:style>
+            <a:lnRef idx="2">
+              <a:schemeClr val="dk1"/>
+            </a:lnRef>
+            <a:fillRef idx="1">
+              <a:schemeClr val="lt1"/>
+            </a:fillRef>
+            <a:effectRef idx="0">
+              <a:schemeClr val="dk1"/>
+            </a:effectRef>
+            <a:fontRef idx="minor">
+              <a:schemeClr val="dk1"/>
+            </a:fontRef>
+          </p:style>
+          <p:txBody>
+            <a:bodyPr rtlCol="0" anchor="ctr"/>
+            <a:lstStyle/>
+            <a:p>
+              <a:pPr algn="ctr"/>
+              <a:endParaRPr lang="en-US"/>
+            </a:p>
+          </p:txBody>
+        </p:sp>
+        <p:sp>
+          <p:nvSpPr>
+            <p:cNvPr id="34" name="Oval 33">
+              <a:extLst>
+                <a:ext uri="{FF2B5EF4-FFF2-40B4-BE49-F238E27FC236}">
+                  <a16:creationId xmlns:a16="http://schemas.microsoft.com/office/drawing/2014/main" id="{F9897F23-C135-49EF-9C11-504105E07E1F}"/>
+                </a:ext>
+              </a:extLst>
+            </p:cNvPr>
+            <p:cNvSpPr/>
+            <p:nvPr/>
+          </p:nvSpPr>
+          <p:spPr>
+            <a:xfrm>
+              <a:off x="6409795" y="5209115"/>
+              <a:ext cx="148167" cy="148167"/>
+            </a:xfrm>
+            <a:prstGeom prst="ellipse">
+              <a:avLst/>
+            </a:prstGeom>
+          </p:spPr>
+          <p:style>
+            <a:lnRef idx="2">
+              <a:schemeClr val="dk1"/>
+            </a:lnRef>
+            <a:fillRef idx="1">
+              <a:schemeClr val="lt1"/>
+            </a:fillRef>
+            <a:effectRef idx="0">
+              <a:schemeClr val="dk1"/>
+            </a:effectRef>
+            <a:fontRef idx="minor">
+              <a:schemeClr val="dk1"/>
+            </a:fontRef>
+          </p:style>
+          <p:txBody>
+            <a:bodyPr rtlCol="0" anchor="ctr"/>
+            <a:lstStyle/>
+            <a:p>
+              <a:pPr algn="ctr"/>
+              <a:endParaRPr lang="en-US"/>
+            </a:p>
+          </p:txBody>
+        </p:sp>
+        <p:sp>
+          <p:nvSpPr>
+            <p:cNvPr id="35" name="Oval 34">
+              <a:extLst>
+                <a:ext uri="{FF2B5EF4-FFF2-40B4-BE49-F238E27FC236}">
+                  <a16:creationId xmlns:a16="http://schemas.microsoft.com/office/drawing/2014/main" id="{994DF231-3DA9-43E1-8441-726CD973E013}"/>
+                </a:ext>
+              </a:extLst>
+            </p:cNvPr>
+            <p:cNvSpPr/>
+            <p:nvPr/>
+          </p:nvSpPr>
+          <p:spPr>
+            <a:xfrm>
+              <a:off x="6768834" y="5209115"/>
+              <a:ext cx="148167" cy="148167"/>
+            </a:xfrm>
+            <a:prstGeom prst="ellipse">
+              <a:avLst/>
+            </a:prstGeom>
+          </p:spPr>
+          <p:style>
+            <a:lnRef idx="2">
+              <a:schemeClr val="dk1"/>
+            </a:lnRef>
+            <a:fillRef idx="1">
+              <a:schemeClr val="lt1"/>
+            </a:fillRef>
+            <a:effectRef idx="0">
+              <a:schemeClr val="dk1"/>
+            </a:effectRef>
+            <a:fontRef idx="minor">
+              <a:schemeClr val="dk1"/>
+            </a:fontRef>
+          </p:style>
+          <p:txBody>
+            <a:bodyPr rtlCol="0" anchor="ctr"/>
+            <a:lstStyle/>
+            <a:p>
+              <a:pPr algn="ctr"/>
+              <a:endParaRPr lang="en-US"/>
+            </a:p>
+          </p:txBody>
+        </p:sp>
+      </p:grpSp>
+    </p:spTree>
+    <p:extLst>
+      <p:ext uri="{BB962C8B-B14F-4D97-AF65-F5344CB8AC3E}">
+        <p14:creationId xmlns:p14="http://schemas.microsoft.com/office/powerpoint/2010/main" val="1562976362"/>
       </p:ext>
     </p:extLst>
   </p:cSld>

</xml_diff>

<commit_message>
Issue #1 - adding terms and conditions page
</commit_message>
<xml_diff>
--- a/documentation/flow_diagrams/Diagrams.pptx
+++ b/documentation/flow_diagrams/Diagrams.pptx
@@ -11,6 +11,7 @@
     <p:sldId id="260" r:id="rId5"/>
     <p:sldId id="261" r:id="rId6"/>
     <p:sldId id="262" r:id="rId7"/>
+    <p:sldId id="263" r:id="rId8"/>
   </p:sldIdLst>
   <p:sldSz cx="12192000" cy="6858000"/>
   <p:notesSz cx="6858000" cy="9144000"/>
@@ -3625,61 +3626,6 @@
         </p:sp>
         <p:sp>
           <p:nvSpPr>
-            <p:cNvPr id="9" name="Rectangle 8">
-              <a:extLst>
-                <a:ext uri="{FF2B5EF4-FFF2-40B4-BE49-F238E27FC236}">
-                  <a16:creationId xmlns:a16="http://schemas.microsoft.com/office/drawing/2014/main" id="{204301F9-2987-4398-B9A4-C75DE5002DEB}"/>
-                </a:ext>
-              </a:extLst>
-            </p:cNvPr>
-            <p:cNvSpPr/>
-            <p:nvPr/>
-          </p:nvSpPr>
-          <p:spPr>
-            <a:xfrm>
-              <a:off x="6990651" y="1568658"/>
-              <a:ext cx="1369395" cy="542081"/>
-            </a:xfrm>
-            <a:prstGeom prst="rect">
-              <a:avLst/>
-            </a:prstGeom>
-            <a:solidFill>
-              <a:schemeClr val="bg1"/>
-            </a:solidFill>
-            <a:ln>
-              <a:solidFill>
-                <a:schemeClr val="dk1"/>
-              </a:solidFill>
-            </a:ln>
-          </p:spPr>
-          <p:style>
-            <a:lnRef idx="2">
-              <a:schemeClr val="dk1"/>
-            </a:lnRef>
-            <a:fillRef idx="1">
-              <a:schemeClr val="lt1"/>
-            </a:fillRef>
-            <a:effectRef idx="0">
-              <a:schemeClr val="dk1"/>
-            </a:effectRef>
-            <a:fontRef idx="minor">
-              <a:schemeClr val="dk1"/>
-            </a:fontRef>
-          </p:style>
-          <p:txBody>
-            <a:bodyPr rtlCol="0" anchor="ctr"/>
-            <a:lstStyle/>
-            <a:p>
-              <a:pPr algn="ctr"/>
-              <a:r>
-                <a:rPr lang="en-US" sz="1600" dirty="0"/>
-                <a:t>Rates</a:t>
-              </a:r>
-            </a:p>
-          </p:txBody>
-        </p:sp>
-        <p:sp>
-          <p:nvSpPr>
             <p:cNvPr id="10" name="Rectangle 9">
               <a:extLst>
                 <a:ext uri="{FF2B5EF4-FFF2-40B4-BE49-F238E27FC236}">
@@ -7962,7 +7908,7 @@
               <a:t>elit</a:t>
             </a:r>
             <a:r>
-              <a:rPr lang="en-US"/>
+              <a:rPr lang="en-US" dirty="0"/>
               <a:t>. </a:t>
             </a:r>
             <a:endParaRPr lang="en-US" i="1" dirty="0"/>
@@ -8305,6 +8251,850 @@
     <p:extLst>
       <p:ext uri="{BB962C8B-B14F-4D97-AF65-F5344CB8AC3E}">
         <p14:creationId xmlns:p14="http://schemas.microsoft.com/office/powerpoint/2010/main" val="1562976362"/>
+      </p:ext>
+    </p:extLst>
+  </p:cSld>
+  <p:clrMapOvr>
+    <a:masterClrMapping/>
+  </p:clrMapOvr>
+</p:sld>
+</file>
+
+<file path=ppt/slides/slide7.xml><?xml version="1.0" encoding="utf-8"?>
+<p:sld xmlns:a="http://schemas.openxmlformats.org/drawingml/2006/main" xmlns:r="http://schemas.openxmlformats.org/officeDocument/2006/relationships" xmlns:p="http://schemas.openxmlformats.org/presentationml/2006/main">
+  <p:cSld>
+    <p:spTree>
+      <p:nvGrpSpPr>
+        <p:cNvPr id="1" name=""/>
+        <p:cNvGrpSpPr/>
+        <p:nvPr/>
+      </p:nvGrpSpPr>
+      <p:grpSpPr>
+        <a:xfrm>
+          <a:off x="0" y="0"/>
+          <a:ext cx="0" cy="0"/>
+          <a:chOff x="0" y="0"/>
+          <a:chExt cx="0" cy="0"/>
+        </a:xfrm>
+      </p:grpSpPr>
+      <p:sp>
+        <p:nvSpPr>
+          <p:cNvPr id="8" name="TextBox 7">
+            <a:extLst>
+              <a:ext uri="{FF2B5EF4-FFF2-40B4-BE49-F238E27FC236}">
+                <a16:creationId xmlns:a16="http://schemas.microsoft.com/office/drawing/2014/main" id="{6B8468B5-7310-4B26-889D-AF6B42A4512C}"/>
+              </a:ext>
+            </a:extLst>
+          </p:cNvPr>
+          <p:cNvSpPr txBox="1"/>
+          <p:nvPr/>
+        </p:nvSpPr>
+        <p:spPr>
+          <a:xfrm>
+            <a:off x="0" y="304800"/>
+            <a:ext cx="12192000" cy="707886"/>
+          </a:xfrm>
+          <a:prstGeom prst="rect">
+            <a:avLst/>
+          </a:prstGeom>
+          <a:noFill/>
+        </p:spPr>
+        <p:txBody>
+          <a:bodyPr wrap="square" rtlCol="0">
+            <a:spAutoFit/>
+          </a:bodyPr>
+          <a:lstStyle/>
+          <a:p>
+            <a:pPr algn="ctr"/>
+            <a:r>
+              <a:rPr lang="en-US" sz="4000" b="1" i="1" dirty="0"/>
+              <a:t>Terms and Conditions</a:t>
+            </a:r>
+            <a:endParaRPr lang="en-US" b="1" i="1" dirty="0"/>
+          </a:p>
+        </p:txBody>
+      </p:sp>
+      <p:sp>
+        <p:nvSpPr>
+          <p:cNvPr id="2" name="Rectangle 1">
+            <a:extLst>
+              <a:ext uri="{FF2B5EF4-FFF2-40B4-BE49-F238E27FC236}">
+                <a16:creationId xmlns:a16="http://schemas.microsoft.com/office/drawing/2014/main" id="{287A8ECD-4A3C-42EE-AA65-5BA7F91B72D4}"/>
+              </a:ext>
+            </a:extLst>
+          </p:cNvPr>
+          <p:cNvSpPr/>
+          <p:nvPr/>
+        </p:nvSpPr>
+        <p:spPr>
+          <a:xfrm>
+            <a:off x="1397000" y="1242250"/>
+            <a:ext cx="9398000" cy="3912136"/>
+          </a:xfrm>
+          <a:prstGeom prst="rect">
+            <a:avLst/>
+          </a:prstGeom>
+        </p:spPr>
+        <p:style>
+          <a:lnRef idx="2">
+            <a:schemeClr val="dk1"/>
+          </a:lnRef>
+          <a:fillRef idx="1">
+            <a:schemeClr val="lt1"/>
+          </a:fillRef>
+          <a:effectRef idx="0">
+            <a:schemeClr val="dk1"/>
+          </a:effectRef>
+          <a:fontRef idx="minor">
+            <a:schemeClr val="dk1"/>
+          </a:fontRef>
+        </p:style>
+        <p:txBody>
+          <a:bodyPr rtlCol="0" anchor="ctr"/>
+          <a:lstStyle/>
+          <a:p>
+            <a:pPr algn="ctr"/>
+            <a:endParaRPr lang="en-US" dirty="0"/>
+          </a:p>
+        </p:txBody>
+      </p:sp>
+      <p:sp>
+        <p:nvSpPr>
+          <p:cNvPr id="12" name="TextBox 11">
+            <a:extLst>
+              <a:ext uri="{FF2B5EF4-FFF2-40B4-BE49-F238E27FC236}">
+                <a16:creationId xmlns:a16="http://schemas.microsoft.com/office/drawing/2014/main" id="{A9470AE9-B037-46CB-82BF-14CD09B13762}"/>
+              </a:ext>
+            </a:extLst>
+          </p:cNvPr>
+          <p:cNvSpPr txBox="1"/>
+          <p:nvPr/>
+        </p:nvSpPr>
+        <p:spPr>
+          <a:xfrm>
+            <a:off x="1396999" y="1242250"/>
+            <a:ext cx="9398001" cy="3970318"/>
+          </a:xfrm>
+          <a:prstGeom prst="rect">
+            <a:avLst/>
+          </a:prstGeom>
+          <a:noFill/>
+        </p:spPr>
+        <p:txBody>
+          <a:bodyPr wrap="square" rtlCol="0">
+            <a:spAutoFit/>
+          </a:bodyPr>
+          <a:lstStyle/>
+          <a:p>
+            <a:r>
+              <a:rPr lang="en-US" dirty="0"/>
+              <a:t>Lorem ipsum dolor sit </a:t>
+            </a:r>
+            <a:r>
+              <a:rPr lang="en-US" dirty="0" err="1"/>
+              <a:t>amet</a:t>
+            </a:r>
+            <a:r>
+              <a:rPr lang="en-US" dirty="0"/>
+              <a:t>, </a:t>
+            </a:r>
+            <a:r>
+              <a:rPr lang="en-US" dirty="0" err="1"/>
+              <a:t>consectetur</a:t>
+            </a:r>
+            <a:r>
+              <a:rPr lang="en-US" dirty="0"/>
+              <a:t> </a:t>
+            </a:r>
+            <a:r>
+              <a:rPr lang="en-US" dirty="0" err="1"/>
+              <a:t>adipiscing</a:t>
+            </a:r>
+            <a:r>
+              <a:rPr lang="en-US" dirty="0"/>
+              <a:t> </a:t>
+            </a:r>
+            <a:r>
+              <a:rPr lang="en-US" dirty="0" err="1"/>
+              <a:t>elit</a:t>
+            </a:r>
+            <a:r>
+              <a:rPr lang="en-US" dirty="0"/>
+              <a:t>.</a:t>
+            </a:r>
+          </a:p>
+          <a:p>
+            <a:pPr marL="285750" indent="-285750">
+              <a:buFont typeface="Arial" panose="020B0604020202020204" pitchFamily="34" charset="0"/>
+              <a:buChar char="•"/>
+            </a:pPr>
+            <a:r>
+              <a:rPr lang="en-US" dirty="0" err="1"/>
+              <a:t>Nulla</a:t>
+            </a:r>
+            <a:r>
+              <a:rPr lang="en-US" dirty="0"/>
+              <a:t> </a:t>
+            </a:r>
+            <a:r>
+              <a:rPr lang="en-US" dirty="0" err="1"/>
+              <a:t>sodales</a:t>
+            </a:r>
+            <a:r>
+              <a:rPr lang="en-US" dirty="0"/>
+              <a:t> </a:t>
+            </a:r>
+            <a:r>
+              <a:rPr lang="en-US" dirty="0" err="1"/>
+              <a:t>nunc</a:t>
+            </a:r>
+            <a:r>
+              <a:rPr lang="en-US" dirty="0"/>
+              <a:t> </a:t>
+            </a:r>
+            <a:r>
+              <a:rPr lang="en-US" dirty="0" err="1"/>
+              <a:t>eget</a:t>
+            </a:r>
+            <a:r>
+              <a:rPr lang="en-US" dirty="0"/>
+              <a:t> </a:t>
+            </a:r>
+            <a:r>
+              <a:rPr lang="en-US" dirty="0" err="1"/>
+              <a:t>metus</a:t>
+            </a:r>
+            <a:r>
+              <a:rPr lang="en-US" dirty="0"/>
+              <a:t> </a:t>
+            </a:r>
+            <a:r>
+              <a:rPr lang="en-US" dirty="0" err="1"/>
+              <a:t>porttitor</a:t>
+            </a:r>
+            <a:r>
+              <a:rPr lang="en-US" dirty="0"/>
+              <a:t> </a:t>
+            </a:r>
+            <a:r>
+              <a:rPr lang="en-US" dirty="0" err="1"/>
+              <a:t>egestas</a:t>
+            </a:r>
+            <a:r>
+              <a:rPr lang="en-US" dirty="0"/>
+              <a:t> id </a:t>
+            </a:r>
+            <a:r>
+              <a:rPr lang="en-US" dirty="0" err="1"/>
+              <a:t>nec</a:t>
+            </a:r>
+            <a:r>
+              <a:rPr lang="en-US" dirty="0"/>
+              <a:t> </a:t>
+            </a:r>
+            <a:r>
+              <a:rPr lang="en-US" dirty="0" err="1"/>
+              <a:t>mauris</a:t>
+            </a:r>
+            <a:r>
+              <a:rPr lang="en-US" dirty="0"/>
+              <a:t>.</a:t>
+            </a:r>
+          </a:p>
+          <a:p>
+            <a:pPr marL="285750" indent="-285750">
+              <a:buFont typeface="Arial" panose="020B0604020202020204" pitchFamily="34" charset="0"/>
+              <a:buChar char="•"/>
+            </a:pPr>
+            <a:r>
+              <a:rPr lang="en-US" dirty="0"/>
+              <a:t>Vestibulum et diam </a:t>
+            </a:r>
+            <a:r>
+              <a:rPr lang="en-US" dirty="0" err="1"/>
+              <a:t>ut</a:t>
+            </a:r>
+            <a:r>
+              <a:rPr lang="en-US" dirty="0"/>
+              <a:t> </a:t>
+            </a:r>
+            <a:r>
+              <a:rPr lang="en-US" dirty="0" err="1"/>
+              <a:t>arcu</a:t>
+            </a:r>
+            <a:r>
+              <a:rPr lang="en-US" dirty="0"/>
+              <a:t> </a:t>
+            </a:r>
+            <a:r>
+              <a:rPr lang="en-US" dirty="0" err="1"/>
+              <a:t>tincidunt</a:t>
+            </a:r>
+            <a:r>
+              <a:rPr lang="en-US" dirty="0"/>
+              <a:t> </a:t>
+            </a:r>
+            <a:r>
+              <a:rPr lang="en-US" dirty="0" err="1"/>
+              <a:t>euismod</a:t>
+            </a:r>
+            <a:r>
+              <a:rPr lang="en-US" dirty="0"/>
+              <a:t>.</a:t>
+            </a:r>
+          </a:p>
+          <a:p>
+            <a:pPr marL="285750" indent="-285750">
+              <a:buFont typeface="Arial" panose="020B0604020202020204" pitchFamily="34" charset="0"/>
+              <a:buChar char="•"/>
+            </a:pPr>
+            <a:r>
+              <a:rPr lang="en-US" dirty="0" err="1"/>
+              <a:t>Praesent</a:t>
+            </a:r>
+            <a:r>
+              <a:rPr lang="en-US" dirty="0"/>
+              <a:t> </a:t>
+            </a:r>
+            <a:r>
+              <a:rPr lang="en-US" dirty="0" err="1"/>
+              <a:t>suscipit</a:t>
+            </a:r>
+            <a:r>
+              <a:rPr lang="en-US" dirty="0"/>
+              <a:t> magna </a:t>
+            </a:r>
+            <a:r>
+              <a:rPr lang="en-US" dirty="0" err="1"/>
+              <a:t>eget</a:t>
+            </a:r>
+            <a:r>
+              <a:rPr lang="en-US" dirty="0"/>
+              <a:t> </a:t>
+            </a:r>
+            <a:r>
+              <a:rPr lang="en-US" dirty="0" err="1"/>
+              <a:t>congue</a:t>
+            </a:r>
+            <a:r>
+              <a:rPr lang="en-US" dirty="0"/>
+              <a:t> </a:t>
+            </a:r>
+            <a:r>
+              <a:rPr lang="en-US" dirty="0" err="1"/>
+              <a:t>dignissim</a:t>
+            </a:r>
+            <a:r>
+              <a:rPr lang="en-US" dirty="0"/>
+              <a:t>.</a:t>
+            </a:r>
+          </a:p>
+          <a:p>
+            <a:pPr marL="285750" indent="-285750">
+              <a:buFont typeface="Arial" panose="020B0604020202020204" pitchFamily="34" charset="0"/>
+              <a:buChar char="•"/>
+            </a:pPr>
+            <a:r>
+              <a:rPr lang="en-US" dirty="0" err="1"/>
+              <a:t>Phasellus</a:t>
+            </a:r>
+            <a:r>
+              <a:rPr lang="en-US" dirty="0"/>
+              <a:t> </a:t>
+            </a:r>
+            <a:r>
+              <a:rPr lang="en-US" dirty="0" err="1"/>
+              <a:t>aliquet</a:t>
+            </a:r>
+            <a:r>
+              <a:rPr lang="en-US" dirty="0"/>
+              <a:t> nisi ac </a:t>
+            </a:r>
+            <a:r>
+              <a:rPr lang="en-US" dirty="0" err="1"/>
+              <a:t>tortor</a:t>
+            </a:r>
+            <a:r>
+              <a:rPr lang="en-US" dirty="0"/>
+              <a:t> </a:t>
+            </a:r>
+            <a:r>
+              <a:rPr lang="en-US" dirty="0" err="1"/>
+              <a:t>egestas</a:t>
+            </a:r>
+            <a:r>
+              <a:rPr lang="en-US" dirty="0"/>
+              <a:t>, id </a:t>
+            </a:r>
+            <a:r>
+              <a:rPr lang="en-US" dirty="0" err="1"/>
+              <a:t>fringilla</a:t>
+            </a:r>
+            <a:r>
+              <a:rPr lang="en-US" dirty="0"/>
+              <a:t> </a:t>
+            </a:r>
+            <a:r>
+              <a:rPr lang="en-US" dirty="0" err="1"/>
+              <a:t>tellus</a:t>
+            </a:r>
+            <a:r>
+              <a:rPr lang="en-US" dirty="0"/>
+              <a:t> </a:t>
+            </a:r>
+            <a:r>
+              <a:rPr lang="en-US" dirty="0" err="1"/>
+              <a:t>ultricies</a:t>
+            </a:r>
+            <a:r>
+              <a:rPr lang="en-US" dirty="0"/>
+              <a:t>.</a:t>
+            </a:r>
+          </a:p>
+          <a:p>
+            <a:pPr marL="285750" indent="-285750">
+              <a:buFont typeface="Arial" panose="020B0604020202020204" pitchFamily="34" charset="0"/>
+              <a:buChar char="•"/>
+            </a:pPr>
+            <a:r>
+              <a:rPr lang="en-US" dirty="0" err="1"/>
+              <a:t>Praesent</a:t>
+            </a:r>
+            <a:r>
+              <a:rPr lang="en-US" dirty="0"/>
+              <a:t> pulvinar ligula vel </a:t>
+            </a:r>
+            <a:r>
+              <a:rPr lang="en-US" dirty="0" err="1"/>
+              <a:t>lacus</a:t>
+            </a:r>
+            <a:r>
+              <a:rPr lang="en-US" dirty="0"/>
+              <a:t> </a:t>
+            </a:r>
+            <a:r>
+              <a:rPr lang="en-US" dirty="0" err="1"/>
+              <a:t>euismod</a:t>
+            </a:r>
+            <a:r>
+              <a:rPr lang="en-US" dirty="0"/>
+              <a:t>, at </a:t>
+            </a:r>
+            <a:r>
+              <a:rPr lang="en-US" dirty="0" err="1"/>
+              <a:t>tempor</a:t>
+            </a:r>
+            <a:r>
+              <a:rPr lang="en-US" dirty="0"/>
+              <a:t> </a:t>
+            </a:r>
+            <a:r>
+              <a:rPr lang="en-US" dirty="0" err="1"/>
+              <a:t>metus</a:t>
+            </a:r>
+            <a:r>
+              <a:rPr lang="en-US" dirty="0"/>
+              <a:t> </a:t>
+            </a:r>
+            <a:r>
+              <a:rPr lang="en-US" dirty="0" err="1"/>
+              <a:t>condimentum</a:t>
+            </a:r>
+            <a:r>
+              <a:rPr lang="en-US" dirty="0"/>
+              <a:t>.</a:t>
+            </a:r>
+          </a:p>
+          <a:p>
+            <a:pPr marL="285750" indent="-285750">
+              <a:buFont typeface="Arial" panose="020B0604020202020204" pitchFamily="34" charset="0"/>
+              <a:buChar char="•"/>
+            </a:pPr>
+            <a:r>
+              <a:rPr lang="en-US" dirty="0" err="1"/>
+              <a:t>Praesent</a:t>
+            </a:r>
+            <a:r>
+              <a:rPr lang="en-US" dirty="0"/>
+              <a:t> vel </a:t>
+            </a:r>
+            <a:r>
+              <a:rPr lang="en-US" dirty="0" err="1"/>
+              <a:t>sem</a:t>
+            </a:r>
+            <a:r>
+              <a:rPr lang="en-US" dirty="0"/>
+              <a:t> sed ante </a:t>
+            </a:r>
+            <a:r>
+              <a:rPr lang="en-US" dirty="0" err="1"/>
+              <a:t>finibus</a:t>
+            </a:r>
+            <a:r>
+              <a:rPr lang="en-US" dirty="0"/>
+              <a:t> </a:t>
+            </a:r>
+            <a:r>
+              <a:rPr lang="en-US" dirty="0" err="1"/>
+              <a:t>ullamcorper</a:t>
+            </a:r>
+            <a:r>
+              <a:rPr lang="en-US" dirty="0"/>
+              <a:t> non in </a:t>
+            </a:r>
+            <a:r>
+              <a:rPr lang="en-US" dirty="0" err="1"/>
+              <a:t>neque</a:t>
+            </a:r>
+            <a:r>
+              <a:rPr lang="en-US" dirty="0"/>
+              <a:t>.</a:t>
+            </a:r>
+          </a:p>
+          <a:p>
+            <a:pPr marL="285750" indent="-285750">
+              <a:buFont typeface="Arial" panose="020B0604020202020204" pitchFamily="34" charset="0"/>
+              <a:buChar char="•"/>
+            </a:pPr>
+            <a:r>
+              <a:rPr lang="en-US" dirty="0" err="1"/>
+              <a:t>Aliquam</a:t>
+            </a:r>
+            <a:r>
+              <a:rPr lang="en-US" dirty="0"/>
+              <a:t> </a:t>
+            </a:r>
+            <a:r>
+              <a:rPr lang="en-US" dirty="0" err="1"/>
+              <a:t>viverra</a:t>
+            </a:r>
+            <a:r>
+              <a:rPr lang="en-US" dirty="0"/>
+              <a:t> </a:t>
+            </a:r>
+            <a:r>
+              <a:rPr lang="en-US" dirty="0" err="1"/>
+              <a:t>purus</a:t>
+            </a:r>
+            <a:r>
+              <a:rPr lang="en-US" dirty="0"/>
+              <a:t> id </a:t>
+            </a:r>
+            <a:r>
+              <a:rPr lang="en-US" dirty="0" err="1"/>
+              <a:t>erat</a:t>
+            </a:r>
+            <a:r>
+              <a:rPr lang="en-US" dirty="0"/>
+              <a:t> </a:t>
+            </a:r>
+            <a:r>
+              <a:rPr lang="en-US" dirty="0" err="1"/>
+              <a:t>sagittis</a:t>
+            </a:r>
+            <a:r>
+              <a:rPr lang="en-US" dirty="0"/>
+              <a:t> </a:t>
+            </a:r>
+            <a:r>
+              <a:rPr lang="en-US" dirty="0" err="1"/>
+              <a:t>ornare</a:t>
+            </a:r>
+            <a:r>
+              <a:rPr lang="en-US" dirty="0"/>
+              <a:t>.</a:t>
+            </a:r>
+          </a:p>
+          <a:p>
+            <a:pPr marL="285750" indent="-285750">
+              <a:buFont typeface="Arial" panose="020B0604020202020204" pitchFamily="34" charset="0"/>
+              <a:buChar char="•"/>
+            </a:pPr>
+            <a:r>
+              <a:rPr lang="en-US" dirty="0" err="1"/>
+              <a:t>Suspendisse</a:t>
+            </a:r>
+            <a:r>
+              <a:rPr lang="en-US" dirty="0"/>
+              <a:t> </a:t>
+            </a:r>
+            <a:r>
+              <a:rPr lang="en-US" dirty="0" err="1"/>
+              <a:t>eget</a:t>
+            </a:r>
+            <a:r>
+              <a:rPr lang="en-US" dirty="0"/>
+              <a:t> </a:t>
+            </a:r>
+            <a:r>
+              <a:rPr lang="en-US" dirty="0" err="1"/>
+              <a:t>sapien</a:t>
+            </a:r>
+            <a:r>
+              <a:rPr lang="en-US" dirty="0"/>
+              <a:t> in </a:t>
+            </a:r>
+            <a:r>
+              <a:rPr lang="en-US" dirty="0" err="1"/>
+              <a:t>nibh</a:t>
+            </a:r>
+            <a:r>
+              <a:rPr lang="en-US" dirty="0"/>
+              <a:t> </a:t>
+            </a:r>
+            <a:r>
+              <a:rPr lang="en-US" dirty="0" err="1"/>
+              <a:t>euismod</a:t>
+            </a:r>
+            <a:r>
+              <a:rPr lang="en-US" dirty="0"/>
+              <a:t> </a:t>
+            </a:r>
+            <a:r>
+              <a:rPr lang="en-US" dirty="0" err="1"/>
+              <a:t>finibus</a:t>
+            </a:r>
+            <a:r>
+              <a:rPr lang="en-US" dirty="0"/>
+              <a:t>.</a:t>
+            </a:r>
+          </a:p>
+          <a:p>
+            <a:pPr marL="285750" indent="-285750">
+              <a:buFont typeface="Arial" panose="020B0604020202020204" pitchFamily="34" charset="0"/>
+              <a:buChar char="•"/>
+            </a:pPr>
+            <a:r>
+              <a:rPr lang="en-US" dirty="0"/>
+              <a:t>Nam </a:t>
+            </a:r>
+            <a:r>
+              <a:rPr lang="en-US" dirty="0" err="1"/>
+              <a:t>eget</a:t>
+            </a:r>
+            <a:r>
+              <a:rPr lang="en-US" dirty="0"/>
+              <a:t> </a:t>
+            </a:r>
+            <a:r>
+              <a:rPr lang="en-US" dirty="0" err="1"/>
+              <a:t>arcu</a:t>
+            </a:r>
+            <a:r>
+              <a:rPr lang="en-US" dirty="0"/>
+              <a:t> sed </a:t>
+            </a:r>
+            <a:r>
+              <a:rPr lang="en-US" dirty="0" err="1"/>
+              <a:t>felis</a:t>
+            </a:r>
+            <a:r>
+              <a:rPr lang="en-US" dirty="0"/>
+              <a:t> </a:t>
+            </a:r>
+            <a:r>
+              <a:rPr lang="en-US" dirty="0" err="1"/>
+              <a:t>hendrerit</a:t>
+            </a:r>
+            <a:r>
+              <a:rPr lang="en-US" dirty="0"/>
+              <a:t> </a:t>
+            </a:r>
+            <a:r>
+              <a:rPr lang="en-US" dirty="0" err="1"/>
+              <a:t>volutpat</a:t>
+            </a:r>
+            <a:r>
+              <a:rPr lang="en-US" dirty="0"/>
+              <a:t> </a:t>
+            </a:r>
+            <a:r>
+              <a:rPr lang="en-US" dirty="0" err="1"/>
+              <a:t>nec</a:t>
+            </a:r>
+            <a:r>
+              <a:rPr lang="en-US" dirty="0"/>
+              <a:t> at </a:t>
+            </a:r>
+            <a:r>
+              <a:rPr lang="en-US" dirty="0" err="1"/>
+              <a:t>elit</a:t>
+            </a:r>
+            <a:r>
+              <a:rPr lang="en-US" dirty="0"/>
+              <a:t>.</a:t>
+            </a:r>
+          </a:p>
+          <a:p>
+            <a:pPr marL="285750" indent="-285750">
+              <a:buFont typeface="Arial" panose="020B0604020202020204" pitchFamily="34" charset="0"/>
+              <a:buChar char="•"/>
+            </a:pPr>
+            <a:r>
+              <a:rPr lang="en-US" dirty="0" err="1"/>
+              <a:t>Aliquam</a:t>
+            </a:r>
+            <a:r>
+              <a:rPr lang="en-US" dirty="0"/>
+              <a:t> </a:t>
+            </a:r>
+            <a:r>
+              <a:rPr lang="en-US" dirty="0" err="1"/>
+              <a:t>dignissim</a:t>
+            </a:r>
+            <a:r>
+              <a:rPr lang="en-US" dirty="0"/>
+              <a:t> </a:t>
+            </a:r>
+            <a:r>
+              <a:rPr lang="en-US" dirty="0" err="1"/>
+              <a:t>nulla</a:t>
+            </a:r>
+            <a:r>
+              <a:rPr lang="en-US" dirty="0"/>
+              <a:t> </a:t>
+            </a:r>
+            <a:r>
+              <a:rPr lang="en-US" dirty="0" err="1"/>
+              <a:t>fringilla</a:t>
+            </a:r>
+            <a:r>
+              <a:rPr lang="en-US" dirty="0"/>
+              <a:t> </a:t>
+            </a:r>
+            <a:r>
+              <a:rPr lang="en-US" dirty="0" err="1"/>
+              <a:t>arcu</a:t>
+            </a:r>
+            <a:r>
+              <a:rPr lang="en-US" dirty="0"/>
+              <a:t> </a:t>
+            </a:r>
+            <a:r>
+              <a:rPr lang="en-US" dirty="0" err="1"/>
+              <a:t>porttitor</a:t>
+            </a:r>
+            <a:r>
+              <a:rPr lang="en-US" dirty="0"/>
+              <a:t>, vel </a:t>
+            </a:r>
+            <a:r>
+              <a:rPr lang="en-US" dirty="0" err="1"/>
+              <a:t>auctor</a:t>
+            </a:r>
+            <a:r>
+              <a:rPr lang="en-US" dirty="0"/>
+              <a:t> ipsum </a:t>
+            </a:r>
+            <a:r>
+              <a:rPr lang="en-US" dirty="0" err="1"/>
+              <a:t>consequat</a:t>
+            </a:r>
+            <a:r>
+              <a:rPr lang="en-US" dirty="0"/>
+              <a:t>.</a:t>
+            </a:r>
+          </a:p>
+          <a:p>
+            <a:pPr marL="285750" indent="-285750">
+              <a:buFont typeface="Arial" panose="020B0604020202020204" pitchFamily="34" charset="0"/>
+              <a:buChar char="•"/>
+            </a:pPr>
+            <a:r>
+              <a:rPr lang="en-US" dirty="0"/>
+              <a:t>Maecenas ac </a:t>
+            </a:r>
+            <a:r>
+              <a:rPr lang="en-US" dirty="0" err="1"/>
+              <a:t>neque</a:t>
+            </a:r>
+            <a:r>
+              <a:rPr lang="en-US" dirty="0"/>
+              <a:t> non </a:t>
+            </a:r>
+            <a:r>
+              <a:rPr lang="en-US" dirty="0" err="1"/>
+              <a:t>arcu</a:t>
+            </a:r>
+            <a:r>
+              <a:rPr lang="en-US" dirty="0"/>
+              <a:t> lacinia </a:t>
+            </a:r>
+            <a:r>
+              <a:rPr lang="en-US" dirty="0" err="1"/>
+              <a:t>efficitur</a:t>
+            </a:r>
+            <a:r>
+              <a:rPr lang="en-US" dirty="0"/>
+              <a:t> a </a:t>
+            </a:r>
+            <a:r>
+              <a:rPr lang="en-US" dirty="0" err="1"/>
+              <a:t>venenatis</a:t>
+            </a:r>
+            <a:r>
+              <a:rPr lang="en-US" dirty="0"/>
+              <a:t> </a:t>
+            </a:r>
+            <a:r>
+              <a:rPr lang="en-US" dirty="0" err="1"/>
+              <a:t>justo</a:t>
+            </a:r>
+            <a:r>
+              <a:rPr lang="en-US" dirty="0"/>
+              <a:t>.</a:t>
+            </a:r>
+          </a:p>
+          <a:p>
+            <a:pPr marL="285750" indent="-285750">
+              <a:buFont typeface="Arial" panose="020B0604020202020204" pitchFamily="34" charset="0"/>
+              <a:buChar char="•"/>
+            </a:pPr>
+            <a:r>
+              <a:rPr lang="en-US" dirty="0" err="1"/>
+              <a:t>Proin</a:t>
+            </a:r>
+            <a:r>
+              <a:rPr lang="en-US" dirty="0"/>
+              <a:t> in ante </a:t>
+            </a:r>
+            <a:r>
+              <a:rPr lang="en-US" dirty="0" err="1"/>
+              <a:t>tincidunt</a:t>
+            </a:r>
+            <a:r>
+              <a:rPr lang="en-US" dirty="0"/>
+              <a:t>, </a:t>
+            </a:r>
+            <a:r>
+              <a:rPr lang="en-US" dirty="0" err="1"/>
+              <a:t>pellentesque</a:t>
+            </a:r>
+            <a:r>
+              <a:rPr lang="en-US" dirty="0"/>
+              <a:t> libero non, convallis </a:t>
+            </a:r>
+            <a:r>
+              <a:rPr lang="en-US" dirty="0" err="1"/>
+              <a:t>felis</a:t>
+            </a:r>
+            <a:r>
+              <a:rPr lang="en-US" dirty="0"/>
+              <a:t>.</a:t>
+            </a:r>
+          </a:p>
+          <a:p>
+            <a:r>
+              <a:rPr lang="en-US" dirty="0"/>
+              <a:t>….</a:t>
+            </a:r>
+          </a:p>
+        </p:txBody>
+      </p:sp>
+    </p:spTree>
+    <p:extLst>
+      <p:ext uri="{BB962C8B-B14F-4D97-AF65-F5344CB8AC3E}">
+        <p14:creationId xmlns:p14="http://schemas.microsoft.com/office/powerpoint/2010/main" val="1884810284"/>
       </p:ext>
     </p:extLst>
   </p:cSld>

</xml_diff>

<commit_message>
Issue #1 - Adding designs for terms and conditions, contact us and about the area pages
</commit_message>
<xml_diff>
--- a/documentation/flow_diagrams/Diagrams.pptx
+++ b/documentation/flow_diagrams/Diagrams.pptx
@@ -12,6 +12,8 @@
     <p:sldId id="261" r:id="rId6"/>
     <p:sldId id="262" r:id="rId7"/>
     <p:sldId id="263" r:id="rId8"/>
+    <p:sldId id="264" r:id="rId9"/>
+    <p:sldId id="265" r:id="rId10"/>
   </p:sldIdLst>
   <p:sldSz cx="12192000" cy="6858000"/>
   <p:notesSz cx="6858000" cy="9144000"/>
@@ -9104,6 +9106,3925 @@
 </p:sld>
 </file>
 
+<file path=ppt/slides/slide8.xml><?xml version="1.0" encoding="utf-8"?>
+<p:sld xmlns:a="http://schemas.openxmlformats.org/drawingml/2006/main" xmlns:r="http://schemas.openxmlformats.org/officeDocument/2006/relationships" xmlns:p="http://schemas.openxmlformats.org/presentationml/2006/main">
+  <p:cSld>
+    <p:spTree>
+      <p:nvGrpSpPr>
+        <p:cNvPr id="1" name=""/>
+        <p:cNvGrpSpPr/>
+        <p:nvPr/>
+      </p:nvGrpSpPr>
+      <p:grpSpPr>
+        <a:xfrm>
+          <a:off x="0" y="0"/>
+          <a:ext cx="0" cy="0"/>
+          <a:chOff x="0" y="0"/>
+          <a:chExt cx="0" cy="0"/>
+        </a:xfrm>
+      </p:grpSpPr>
+      <p:sp>
+        <p:nvSpPr>
+          <p:cNvPr id="8" name="TextBox 7">
+            <a:extLst>
+              <a:ext uri="{FF2B5EF4-FFF2-40B4-BE49-F238E27FC236}">
+                <a16:creationId xmlns:a16="http://schemas.microsoft.com/office/drawing/2014/main" id="{6B8468B5-7310-4B26-889D-AF6B42A4512C}"/>
+              </a:ext>
+            </a:extLst>
+          </p:cNvPr>
+          <p:cNvSpPr txBox="1"/>
+          <p:nvPr/>
+        </p:nvSpPr>
+        <p:spPr>
+          <a:xfrm>
+            <a:off x="0" y="304800"/>
+            <a:ext cx="12192000" cy="707886"/>
+          </a:xfrm>
+          <a:prstGeom prst="rect">
+            <a:avLst/>
+          </a:prstGeom>
+          <a:noFill/>
+        </p:spPr>
+        <p:txBody>
+          <a:bodyPr wrap="square" rtlCol="0">
+            <a:spAutoFit/>
+          </a:bodyPr>
+          <a:lstStyle/>
+          <a:p>
+            <a:pPr algn="ctr"/>
+            <a:r>
+              <a:rPr lang="en-US" sz="4000" b="1" i="1" dirty="0"/>
+              <a:t>Contact Us</a:t>
+            </a:r>
+            <a:endParaRPr lang="en-US" b="1" i="1" dirty="0"/>
+          </a:p>
+        </p:txBody>
+      </p:sp>
+      <p:sp>
+        <p:nvSpPr>
+          <p:cNvPr id="2" name="Rectangle 1">
+            <a:extLst>
+              <a:ext uri="{FF2B5EF4-FFF2-40B4-BE49-F238E27FC236}">
+                <a16:creationId xmlns:a16="http://schemas.microsoft.com/office/drawing/2014/main" id="{287A8ECD-4A3C-42EE-AA65-5BA7F91B72D4}"/>
+              </a:ext>
+            </a:extLst>
+          </p:cNvPr>
+          <p:cNvSpPr/>
+          <p:nvPr/>
+        </p:nvSpPr>
+        <p:spPr>
+          <a:xfrm>
+            <a:off x="1397000" y="1242250"/>
+            <a:ext cx="9398000" cy="3912136"/>
+          </a:xfrm>
+          <a:prstGeom prst="rect">
+            <a:avLst/>
+          </a:prstGeom>
+        </p:spPr>
+        <p:style>
+          <a:lnRef idx="2">
+            <a:schemeClr val="dk1"/>
+          </a:lnRef>
+          <a:fillRef idx="1">
+            <a:schemeClr val="lt1"/>
+          </a:fillRef>
+          <a:effectRef idx="0">
+            <a:schemeClr val="dk1"/>
+          </a:effectRef>
+          <a:fontRef idx="minor">
+            <a:schemeClr val="dk1"/>
+          </a:fontRef>
+        </p:style>
+        <p:txBody>
+          <a:bodyPr rtlCol="0" anchor="ctr"/>
+          <a:lstStyle/>
+          <a:p>
+            <a:pPr algn="ctr"/>
+            <a:endParaRPr lang="en-US" dirty="0"/>
+          </a:p>
+        </p:txBody>
+      </p:sp>
+      <p:sp>
+        <p:nvSpPr>
+          <p:cNvPr id="5" name="Rectangle 4">
+            <a:extLst>
+              <a:ext uri="{FF2B5EF4-FFF2-40B4-BE49-F238E27FC236}">
+                <a16:creationId xmlns:a16="http://schemas.microsoft.com/office/drawing/2014/main" id="{DBE0E741-4CE7-4E79-AD17-CC63F3B462A2}"/>
+              </a:ext>
+            </a:extLst>
+          </p:cNvPr>
+          <p:cNvSpPr/>
+          <p:nvPr/>
+        </p:nvSpPr>
+        <p:spPr>
+          <a:xfrm>
+            <a:off x="2278744" y="1554008"/>
+            <a:ext cx="3132666" cy="1798792"/>
+          </a:xfrm>
+          <a:prstGeom prst="rect">
+            <a:avLst/>
+          </a:prstGeom>
+        </p:spPr>
+        <p:style>
+          <a:lnRef idx="2">
+            <a:schemeClr val="dk1"/>
+          </a:lnRef>
+          <a:fillRef idx="1">
+            <a:schemeClr val="lt1"/>
+          </a:fillRef>
+          <a:effectRef idx="0">
+            <a:schemeClr val="dk1"/>
+          </a:effectRef>
+          <a:fontRef idx="minor">
+            <a:schemeClr val="dk1"/>
+          </a:fontRef>
+        </p:style>
+        <p:txBody>
+          <a:bodyPr rtlCol="0" anchor="ctr"/>
+          <a:lstStyle/>
+          <a:p>
+            <a:pPr algn="ctr"/>
+            <a:r>
+              <a:rPr lang="en-US" dirty="0"/>
+              <a:t>Photo of Mother (and Father)</a:t>
+            </a:r>
+          </a:p>
+        </p:txBody>
+      </p:sp>
+      <p:sp>
+        <p:nvSpPr>
+          <p:cNvPr id="3" name="Rectangle 2">
+            <a:extLst>
+              <a:ext uri="{FF2B5EF4-FFF2-40B4-BE49-F238E27FC236}">
+                <a16:creationId xmlns:a16="http://schemas.microsoft.com/office/drawing/2014/main" id="{DE69E330-DA4F-426F-B293-F0811C74AD4E}"/>
+              </a:ext>
+            </a:extLst>
+          </p:cNvPr>
+          <p:cNvSpPr/>
+          <p:nvPr/>
+        </p:nvSpPr>
+        <p:spPr>
+          <a:xfrm>
+            <a:off x="5453743" y="1554008"/>
+            <a:ext cx="4229100" cy="2585323"/>
+          </a:xfrm>
+          <a:prstGeom prst="rect">
+            <a:avLst/>
+          </a:prstGeom>
+        </p:spPr>
+        <p:txBody>
+          <a:bodyPr wrap="square">
+            <a:spAutoFit/>
+          </a:bodyPr>
+          <a:lstStyle/>
+          <a:p>
+            <a:r>
+              <a:rPr lang="en-US" dirty="0"/>
+              <a:t>Contact Details: </a:t>
+            </a:r>
+          </a:p>
+          <a:p>
+            <a:r>
+              <a:rPr lang="en-US" dirty="0"/>
+              <a:t>Lorem ipsum dolor sit </a:t>
+            </a:r>
+            <a:r>
+              <a:rPr lang="en-US" dirty="0" err="1"/>
+              <a:t>amet</a:t>
+            </a:r>
+            <a:r>
+              <a:rPr lang="en-US" dirty="0"/>
+              <a:t>, </a:t>
+            </a:r>
+            <a:r>
+              <a:rPr lang="en-US" dirty="0" err="1"/>
+              <a:t>consectetur</a:t>
+            </a:r>
+            <a:r>
+              <a:rPr lang="en-US" dirty="0"/>
+              <a:t> </a:t>
+            </a:r>
+            <a:r>
+              <a:rPr lang="en-US" dirty="0" err="1"/>
+              <a:t>adipiscing</a:t>
+            </a:r>
+            <a:r>
+              <a:rPr lang="en-US" dirty="0"/>
+              <a:t> </a:t>
+            </a:r>
+            <a:r>
+              <a:rPr lang="en-US" dirty="0" err="1"/>
+              <a:t>elit</a:t>
+            </a:r>
+            <a:r>
+              <a:rPr lang="en-US" dirty="0"/>
+              <a:t>.</a:t>
+            </a:r>
+          </a:p>
+          <a:p>
+            <a:r>
+              <a:rPr lang="en-US" dirty="0" err="1"/>
+              <a:t>Nulla</a:t>
+            </a:r>
+            <a:r>
+              <a:rPr lang="en-US" dirty="0"/>
+              <a:t> </a:t>
+            </a:r>
+            <a:r>
+              <a:rPr lang="en-US" dirty="0" err="1"/>
+              <a:t>sodales</a:t>
+            </a:r>
+            <a:r>
+              <a:rPr lang="en-US" dirty="0"/>
+              <a:t> </a:t>
+            </a:r>
+            <a:r>
+              <a:rPr lang="en-US" dirty="0" err="1"/>
+              <a:t>nunc</a:t>
+            </a:r>
+            <a:r>
+              <a:rPr lang="en-US" dirty="0"/>
+              <a:t> </a:t>
+            </a:r>
+            <a:r>
+              <a:rPr lang="en-US" dirty="0" err="1"/>
+              <a:t>eget</a:t>
+            </a:r>
+            <a:r>
+              <a:rPr lang="en-US" dirty="0"/>
+              <a:t> </a:t>
+            </a:r>
+            <a:r>
+              <a:rPr lang="en-US" dirty="0" err="1"/>
+              <a:t>metus</a:t>
+            </a:r>
+            <a:r>
+              <a:rPr lang="en-US" dirty="0"/>
+              <a:t> </a:t>
+            </a:r>
+            <a:r>
+              <a:rPr lang="en-US" dirty="0" err="1"/>
+              <a:t>porttitor</a:t>
+            </a:r>
+            <a:r>
+              <a:rPr lang="en-US" dirty="0"/>
+              <a:t> </a:t>
+            </a:r>
+            <a:r>
+              <a:rPr lang="en-US" dirty="0" err="1"/>
+              <a:t>egestas</a:t>
+            </a:r>
+            <a:r>
+              <a:rPr lang="en-US" dirty="0"/>
+              <a:t> id </a:t>
+            </a:r>
+            <a:r>
+              <a:rPr lang="en-US" dirty="0" err="1"/>
+              <a:t>nec</a:t>
+            </a:r>
+            <a:r>
+              <a:rPr lang="en-US" dirty="0"/>
+              <a:t> </a:t>
+            </a:r>
+            <a:r>
+              <a:rPr lang="en-US" dirty="0" err="1"/>
+              <a:t>mauris</a:t>
+            </a:r>
+            <a:r>
+              <a:rPr lang="en-US" dirty="0"/>
+              <a:t>.</a:t>
+            </a:r>
+          </a:p>
+          <a:p>
+            <a:r>
+              <a:rPr lang="en-US" dirty="0"/>
+              <a:t>Vestibulum et diam </a:t>
+            </a:r>
+            <a:r>
+              <a:rPr lang="en-US" dirty="0" err="1"/>
+              <a:t>ut</a:t>
+            </a:r>
+            <a:r>
+              <a:rPr lang="en-US" dirty="0"/>
+              <a:t> </a:t>
+            </a:r>
+            <a:r>
+              <a:rPr lang="en-US" dirty="0" err="1"/>
+              <a:t>arcu</a:t>
+            </a:r>
+            <a:r>
+              <a:rPr lang="en-US" dirty="0"/>
+              <a:t> </a:t>
+            </a:r>
+            <a:r>
+              <a:rPr lang="en-US" dirty="0" err="1"/>
+              <a:t>tincidunt</a:t>
+            </a:r>
+            <a:r>
+              <a:rPr lang="en-US" dirty="0"/>
+              <a:t> </a:t>
+            </a:r>
+            <a:r>
+              <a:rPr lang="en-US" dirty="0" err="1"/>
+              <a:t>euismod</a:t>
+            </a:r>
+            <a:r>
+              <a:rPr lang="en-US" dirty="0"/>
+              <a:t>.</a:t>
+            </a:r>
+          </a:p>
+          <a:p>
+            <a:r>
+              <a:rPr lang="en-US" dirty="0" err="1"/>
+              <a:t>Praesent</a:t>
+            </a:r>
+            <a:r>
+              <a:rPr lang="en-US" dirty="0"/>
+              <a:t> </a:t>
+            </a:r>
+            <a:r>
+              <a:rPr lang="en-US" dirty="0" err="1"/>
+              <a:t>suscipit</a:t>
+            </a:r>
+            <a:r>
+              <a:rPr lang="en-US" dirty="0"/>
+              <a:t> magna </a:t>
+            </a:r>
+            <a:r>
+              <a:rPr lang="en-US" dirty="0" err="1"/>
+              <a:t>eget</a:t>
+            </a:r>
+            <a:r>
+              <a:rPr lang="en-US" dirty="0"/>
+              <a:t> </a:t>
+            </a:r>
+            <a:r>
+              <a:rPr lang="en-US" dirty="0" err="1"/>
+              <a:t>congue</a:t>
+            </a:r>
+            <a:r>
+              <a:rPr lang="en-US" dirty="0"/>
+              <a:t> </a:t>
+            </a:r>
+            <a:r>
+              <a:rPr lang="en-US" dirty="0" err="1"/>
+              <a:t>dignissim</a:t>
+            </a:r>
+            <a:r>
+              <a:rPr lang="en-US" dirty="0"/>
+              <a:t>.</a:t>
+            </a:r>
+          </a:p>
+        </p:txBody>
+      </p:sp>
+    </p:spTree>
+    <p:extLst>
+      <p:ext uri="{BB962C8B-B14F-4D97-AF65-F5344CB8AC3E}">
+        <p14:creationId xmlns:p14="http://schemas.microsoft.com/office/powerpoint/2010/main" val="2955255919"/>
+      </p:ext>
+    </p:extLst>
+  </p:cSld>
+  <p:clrMapOvr>
+    <a:masterClrMapping/>
+  </p:clrMapOvr>
+</p:sld>
+</file>
+
+<file path=ppt/slides/slide9.xml><?xml version="1.0" encoding="utf-8"?>
+<p:sld xmlns:a="http://schemas.openxmlformats.org/drawingml/2006/main" xmlns:r="http://schemas.openxmlformats.org/officeDocument/2006/relationships" xmlns:p="http://schemas.openxmlformats.org/presentationml/2006/main">
+  <p:cSld>
+    <p:spTree>
+      <p:nvGrpSpPr>
+        <p:cNvPr id="1" name=""/>
+        <p:cNvGrpSpPr/>
+        <p:nvPr/>
+      </p:nvGrpSpPr>
+      <p:grpSpPr>
+        <a:xfrm>
+          <a:off x="0" y="0"/>
+          <a:ext cx="0" cy="0"/>
+          <a:chOff x="0" y="0"/>
+          <a:chExt cx="0" cy="0"/>
+        </a:xfrm>
+      </p:grpSpPr>
+      <p:sp>
+        <p:nvSpPr>
+          <p:cNvPr id="8" name="TextBox 7">
+            <a:extLst>
+              <a:ext uri="{FF2B5EF4-FFF2-40B4-BE49-F238E27FC236}">
+                <a16:creationId xmlns:a16="http://schemas.microsoft.com/office/drawing/2014/main" id="{6B8468B5-7310-4B26-889D-AF6B42A4512C}"/>
+              </a:ext>
+            </a:extLst>
+          </p:cNvPr>
+          <p:cNvSpPr txBox="1"/>
+          <p:nvPr/>
+        </p:nvSpPr>
+        <p:spPr>
+          <a:xfrm>
+            <a:off x="0" y="304800"/>
+            <a:ext cx="12192000" cy="707886"/>
+          </a:xfrm>
+          <a:prstGeom prst="rect">
+            <a:avLst/>
+          </a:prstGeom>
+          <a:noFill/>
+        </p:spPr>
+        <p:txBody>
+          <a:bodyPr wrap="square" rtlCol="0">
+            <a:spAutoFit/>
+          </a:bodyPr>
+          <a:lstStyle/>
+          <a:p>
+            <a:pPr algn="ctr"/>
+            <a:r>
+              <a:rPr lang="en-US" sz="4000" b="1" i="1" dirty="0"/>
+              <a:t>About the Area</a:t>
+            </a:r>
+            <a:endParaRPr lang="en-US" b="1" i="1" dirty="0"/>
+          </a:p>
+        </p:txBody>
+      </p:sp>
+      <p:grpSp>
+        <p:nvGrpSpPr>
+          <p:cNvPr id="77" name="Group 76">
+            <a:extLst>
+              <a:ext uri="{FF2B5EF4-FFF2-40B4-BE49-F238E27FC236}">
+                <a16:creationId xmlns:a16="http://schemas.microsoft.com/office/drawing/2014/main" id="{116B64C2-423C-47A4-B593-A78FC6716892}"/>
+              </a:ext>
+            </a:extLst>
+          </p:cNvPr>
+          <p:cNvGrpSpPr/>
+          <p:nvPr/>
+        </p:nvGrpSpPr>
+        <p:grpSpPr>
+          <a:xfrm>
+            <a:off x="1393505" y="1242249"/>
+            <a:ext cx="9401495" cy="17198151"/>
+            <a:chOff x="1393505" y="1242249"/>
+            <a:chExt cx="9401495" cy="17198151"/>
+          </a:xfrm>
+        </p:grpSpPr>
+        <p:sp>
+          <p:nvSpPr>
+            <p:cNvPr id="2" name="Rectangle 1">
+              <a:extLst>
+                <a:ext uri="{FF2B5EF4-FFF2-40B4-BE49-F238E27FC236}">
+                  <a16:creationId xmlns:a16="http://schemas.microsoft.com/office/drawing/2014/main" id="{287A8ECD-4A3C-42EE-AA65-5BA7F91B72D4}"/>
+                </a:ext>
+              </a:extLst>
+            </p:cNvPr>
+            <p:cNvSpPr/>
+            <p:nvPr/>
+          </p:nvSpPr>
+          <p:spPr>
+            <a:xfrm>
+              <a:off x="1397000" y="1242249"/>
+              <a:ext cx="9398000" cy="17198151"/>
+            </a:xfrm>
+            <a:prstGeom prst="rect">
+              <a:avLst/>
+            </a:prstGeom>
+          </p:spPr>
+          <p:style>
+            <a:lnRef idx="2">
+              <a:schemeClr val="dk1"/>
+            </a:lnRef>
+            <a:fillRef idx="1">
+              <a:schemeClr val="lt1"/>
+            </a:fillRef>
+            <a:effectRef idx="0">
+              <a:schemeClr val="dk1"/>
+            </a:effectRef>
+            <a:fontRef idx="minor">
+              <a:schemeClr val="dk1"/>
+            </a:fontRef>
+          </p:style>
+          <p:txBody>
+            <a:bodyPr rtlCol="0" anchor="ctr"/>
+            <a:lstStyle/>
+            <a:p>
+              <a:pPr algn="ctr"/>
+              <a:endParaRPr lang="en-US" dirty="0"/>
+            </a:p>
+          </p:txBody>
+        </p:sp>
+        <p:sp>
+          <p:nvSpPr>
+            <p:cNvPr id="6" name="Rectangle 5">
+              <a:extLst>
+                <a:ext uri="{FF2B5EF4-FFF2-40B4-BE49-F238E27FC236}">
+                  <a16:creationId xmlns:a16="http://schemas.microsoft.com/office/drawing/2014/main" id="{3577D058-D252-4EAE-9DD5-27DDBBD0A99E}"/>
+                </a:ext>
+              </a:extLst>
+            </p:cNvPr>
+            <p:cNvSpPr/>
+            <p:nvPr/>
+          </p:nvSpPr>
+          <p:spPr>
+            <a:xfrm>
+              <a:off x="1396999" y="1351568"/>
+              <a:ext cx="9397999" cy="646331"/>
+            </a:xfrm>
+            <a:prstGeom prst="rect">
+              <a:avLst/>
+            </a:prstGeom>
+          </p:spPr>
+          <p:txBody>
+            <a:bodyPr wrap="square">
+              <a:spAutoFit/>
+            </a:bodyPr>
+            <a:lstStyle/>
+            <a:p>
+              <a:r>
+                <a:rPr lang="en-US" dirty="0"/>
+                <a:t>Lorem ipsum dolor sit </a:t>
+              </a:r>
+              <a:r>
+                <a:rPr lang="en-US" dirty="0" err="1"/>
+                <a:t>amet</a:t>
+              </a:r>
+              <a:r>
+                <a:rPr lang="en-US" dirty="0"/>
+                <a:t>, </a:t>
+              </a:r>
+              <a:r>
+                <a:rPr lang="en-US" dirty="0" err="1"/>
+                <a:t>consectetur</a:t>
+              </a:r>
+              <a:r>
+                <a:rPr lang="en-US" dirty="0"/>
+                <a:t> </a:t>
+              </a:r>
+              <a:r>
+                <a:rPr lang="en-US" dirty="0" err="1"/>
+                <a:t>adipiscing</a:t>
+              </a:r>
+              <a:r>
+                <a:rPr lang="en-US" dirty="0"/>
+                <a:t> </a:t>
+              </a:r>
+              <a:r>
+                <a:rPr lang="en-US" dirty="0" err="1"/>
+                <a:t>elit</a:t>
+              </a:r>
+              <a:r>
+                <a:rPr lang="en-US" dirty="0"/>
+                <a:t>. </a:t>
+              </a:r>
+              <a:r>
+                <a:rPr lang="en-US" dirty="0" err="1"/>
+                <a:t>Nulla</a:t>
+              </a:r>
+              <a:r>
+                <a:rPr lang="en-US" dirty="0"/>
+                <a:t> </a:t>
+              </a:r>
+              <a:r>
+                <a:rPr lang="en-US" dirty="0" err="1"/>
+                <a:t>sodales</a:t>
+              </a:r>
+              <a:r>
+                <a:rPr lang="en-US" dirty="0"/>
+                <a:t> </a:t>
+              </a:r>
+              <a:r>
+                <a:rPr lang="en-US" dirty="0" err="1"/>
+                <a:t>nunc</a:t>
+              </a:r>
+              <a:r>
+                <a:rPr lang="en-US" dirty="0"/>
+                <a:t> </a:t>
+              </a:r>
+              <a:r>
+                <a:rPr lang="en-US" dirty="0" err="1"/>
+                <a:t>eget</a:t>
+              </a:r>
+              <a:r>
+                <a:rPr lang="en-US" dirty="0"/>
+                <a:t> </a:t>
+              </a:r>
+              <a:r>
+                <a:rPr lang="en-US" dirty="0" err="1"/>
+                <a:t>metus</a:t>
+              </a:r>
+              <a:r>
+                <a:rPr lang="en-US" dirty="0"/>
+                <a:t> </a:t>
+              </a:r>
+              <a:r>
+                <a:rPr lang="en-US" dirty="0" err="1"/>
+                <a:t>porttitor</a:t>
+              </a:r>
+              <a:r>
+                <a:rPr lang="en-US" dirty="0"/>
+                <a:t> </a:t>
+              </a:r>
+              <a:r>
+                <a:rPr lang="en-US" dirty="0" err="1"/>
+                <a:t>egestas</a:t>
+              </a:r>
+              <a:r>
+                <a:rPr lang="en-US" dirty="0"/>
+                <a:t> id </a:t>
+              </a:r>
+              <a:r>
+                <a:rPr lang="en-US" dirty="0" err="1"/>
+                <a:t>nec</a:t>
+              </a:r>
+              <a:r>
+                <a:rPr lang="en-US" dirty="0"/>
+                <a:t> </a:t>
+              </a:r>
+              <a:r>
+                <a:rPr lang="en-US" dirty="0" err="1"/>
+                <a:t>mauris</a:t>
+              </a:r>
+              <a:r>
+                <a:rPr lang="en-US" dirty="0"/>
+                <a:t>.</a:t>
+              </a:r>
+            </a:p>
+          </p:txBody>
+        </p:sp>
+        <p:pic>
+          <p:nvPicPr>
+            <p:cNvPr id="9" name="Picture 8">
+              <a:extLst>
+                <a:ext uri="{FF2B5EF4-FFF2-40B4-BE49-F238E27FC236}">
+                  <a16:creationId xmlns:a16="http://schemas.microsoft.com/office/drawing/2014/main" id="{708DE38E-C218-410E-AD44-AC7D02E684EC}"/>
+                </a:ext>
+              </a:extLst>
+            </p:cNvPr>
+            <p:cNvPicPr>
+              <a:picLocks noChangeAspect="1"/>
+            </p:cNvPicPr>
+            <p:nvPr/>
+          </p:nvPicPr>
+          <p:blipFill rotWithShape="1">
+            <a:blip r:embed="rId2"/>
+            <a:srcRect t="14284"/>
+            <a:stretch/>
+          </p:blipFill>
+          <p:spPr>
+            <a:xfrm>
+              <a:off x="1396999" y="2107218"/>
+              <a:ext cx="9397999" cy="3186445"/>
+            </a:xfrm>
+            <a:prstGeom prst="rect">
+              <a:avLst/>
+            </a:prstGeom>
+          </p:spPr>
+        </p:pic>
+        <p:sp>
+          <p:nvSpPr>
+            <p:cNvPr id="10" name="Rectangle 9">
+              <a:extLst>
+                <a:ext uri="{FF2B5EF4-FFF2-40B4-BE49-F238E27FC236}">
+                  <a16:creationId xmlns:a16="http://schemas.microsoft.com/office/drawing/2014/main" id="{F9E3AEA5-C9EF-4C5D-9DA9-FF6DAF8B53C2}"/>
+                </a:ext>
+              </a:extLst>
+            </p:cNvPr>
+            <p:cNvSpPr/>
+            <p:nvPr/>
+          </p:nvSpPr>
+          <p:spPr>
+            <a:xfrm>
+              <a:off x="1396999" y="5339368"/>
+              <a:ext cx="9397999" cy="369332"/>
+            </a:xfrm>
+            <a:prstGeom prst="rect">
+              <a:avLst/>
+            </a:prstGeom>
+          </p:spPr>
+          <p:txBody>
+            <a:bodyPr wrap="square">
+              <a:spAutoFit/>
+            </a:bodyPr>
+            <a:lstStyle/>
+            <a:p>
+              <a:r>
+                <a:rPr lang="en-US" dirty="0"/>
+                <a:t>Activities within Walking Distance</a:t>
+              </a:r>
+            </a:p>
+          </p:txBody>
+        </p:sp>
+        <p:sp>
+          <p:nvSpPr>
+            <p:cNvPr id="18" name="Rectangle 17">
+              <a:extLst>
+                <a:ext uri="{FF2B5EF4-FFF2-40B4-BE49-F238E27FC236}">
+                  <a16:creationId xmlns:a16="http://schemas.microsoft.com/office/drawing/2014/main" id="{694C3FDC-4CCA-4432-9639-059FBC8F2B68}"/>
+                </a:ext>
+              </a:extLst>
+            </p:cNvPr>
+            <p:cNvSpPr/>
+            <p:nvPr/>
+          </p:nvSpPr>
+          <p:spPr>
+            <a:xfrm>
+              <a:off x="1396997" y="10364877"/>
+              <a:ext cx="9397999" cy="5632311"/>
+            </a:xfrm>
+            <a:prstGeom prst="rect">
+              <a:avLst/>
+            </a:prstGeom>
+          </p:spPr>
+          <p:txBody>
+            <a:bodyPr wrap="square">
+              <a:spAutoFit/>
+            </a:bodyPr>
+            <a:lstStyle/>
+            <a:p>
+              <a:r>
+                <a:rPr lang="en-US" dirty="0"/>
+                <a:t>Further afield</a:t>
+              </a:r>
+            </a:p>
+            <a:p>
+              <a:endParaRPr lang="en-US" dirty="0"/>
+            </a:p>
+            <a:p>
+              <a:endParaRPr lang="en-US" dirty="0"/>
+            </a:p>
+            <a:p>
+              <a:endParaRPr lang="en-US" dirty="0"/>
+            </a:p>
+            <a:p>
+              <a:endParaRPr lang="en-US" dirty="0"/>
+            </a:p>
+            <a:p>
+              <a:endParaRPr lang="en-US" dirty="0"/>
+            </a:p>
+            <a:p>
+              <a:endParaRPr lang="en-US" dirty="0"/>
+            </a:p>
+            <a:p>
+              <a:endParaRPr lang="en-US" dirty="0"/>
+            </a:p>
+            <a:p>
+              <a:endParaRPr lang="en-US" dirty="0"/>
+            </a:p>
+            <a:p>
+              <a:endParaRPr lang="en-US" dirty="0"/>
+            </a:p>
+            <a:p>
+              <a:endParaRPr lang="en-US" dirty="0"/>
+            </a:p>
+            <a:p>
+              <a:endParaRPr lang="en-US" dirty="0"/>
+            </a:p>
+            <a:p>
+              <a:endParaRPr lang="en-US" dirty="0"/>
+            </a:p>
+            <a:p>
+              <a:endParaRPr lang="en-US" dirty="0"/>
+            </a:p>
+            <a:p>
+              <a:endParaRPr lang="en-US" dirty="0"/>
+            </a:p>
+            <a:p>
+              <a:endParaRPr lang="en-US" dirty="0"/>
+            </a:p>
+            <a:p>
+              <a:endParaRPr lang="en-US" dirty="0"/>
+            </a:p>
+            <a:p>
+              <a:endParaRPr lang="en-US" dirty="0"/>
+            </a:p>
+            <a:p>
+              <a:endParaRPr lang="en-US" dirty="0"/>
+            </a:p>
+            <a:p>
+              <a:r>
+                <a:rPr lang="en-US" dirty="0"/>
+                <a:t>Nearby towns</a:t>
+              </a:r>
+            </a:p>
+          </p:txBody>
+        </p:sp>
+        <p:grpSp>
+          <p:nvGrpSpPr>
+            <p:cNvPr id="37" name="Group 36">
+              <a:extLst>
+                <a:ext uri="{FF2B5EF4-FFF2-40B4-BE49-F238E27FC236}">
+                  <a16:creationId xmlns:a16="http://schemas.microsoft.com/office/drawing/2014/main" id="{06719AFA-4635-4CB4-A058-8EB95F98294A}"/>
+                </a:ext>
+              </a:extLst>
+            </p:cNvPr>
+            <p:cNvGrpSpPr/>
+            <p:nvPr/>
+          </p:nvGrpSpPr>
+          <p:grpSpPr>
+            <a:xfrm>
+              <a:off x="1396901" y="5708700"/>
+              <a:ext cx="9398097" cy="4622700"/>
+              <a:chOff x="1396901" y="5708700"/>
+              <a:chExt cx="9398097" cy="4622700"/>
+            </a:xfrm>
+          </p:grpSpPr>
+          <p:sp>
+            <p:nvSpPr>
+              <p:cNvPr id="11" name="Rectangle 10">
+                <a:extLst>
+                  <a:ext uri="{FF2B5EF4-FFF2-40B4-BE49-F238E27FC236}">
+                    <a16:creationId xmlns:a16="http://schemas.microsoft.com/office/drawing/2014/main" id="{E36447B2-6D74-421E-89BC-B390FAF283E5}"/>
+                  </a:ext>
+                </a:extLst>
+              </p:cNvPr>
+              <p:cNvSpPr/>
+              <p:nvPr/>
+            </p:nvSpPr>
+            <p:spPr>
+              <a:xfrm>
+                <a:off x="1396999" y="5708700"/>
+                <a:ext cx="9397999" cy="2311350"/>
+              </a:xfrm>
+              <a:prstGeom prst="rect">
+                <a:avLst/>
+              </a:prstGeom>
+            </p:spPr>
+            <p:style>
+              <a:lnRef idx="2">
+                <a:schemeClr val="dk1"/>
+              </a:lnRef>
+              <a:fillRef idx="1">
+                <a:schemeClr val="lt1"/>
+              </a:fillRef>
+              <a:effectRef idx="0">
+                <a:schemeClr val="dk1"/>
+              </a:effectRef>
+              <a:fontRef idx="minor">
+                <a:schemeClr val="dk1"/>
+              </a:fontRef>
+            </p:style>
+            <p:txBody>
+              <a:bodyPr rtlCol="0" anchor="ctr"/>
+              <a:lstStyle/>
+              <a:p>
+                <a:pPr algn="ctr"/>
+                <a:endParaRPr lang="en-US"/>
+              </a:p>
+            </p:txBody>
+          </p:sp>
+          <p:sp>
+            <p:nvSpPr>
+              <p:cNvPr id="12" name="Rectangle 11">
+                <a:extLst>
+                  <a:ext uri="{FF2B5EF4-FFF2-40B4-BE49-F238E27FC236}">
+                    <a16:creationId xmlns:a16="http://schemas.microsoft.com/office/drawing/2014/main" id="{465220C2-6AC9-4752-B249-25F6063A71B7}"/>
+                  </a:ext>
+                </a:extLst>
+              </p:cNvPr>
+              <p:cNvSpPr/>
+              <p:nvPr/>
+            </p:nvSpPr>
+            <p:spPr>
+              <a:xfrm>
+                <a:off x="1396997" y="8020050"/>
+                <a:ext cx="9397999" cy="2311350"/>
+              </a:xfrm>
+              <a:prstGeom prst="rect">
+                <a:avLst/>
+              </a:prstGeom>
+            </p:spPr>
+            <p:style>
+              <a:lnRef idx="2">
+                <a:schemeClr val="dk1"/>
+              </a:lnRef>
+              <a:fillRef idx="1">
+                <a:schemeClr val="lt1"/>
+              </a:fillRef>
+              <a:effectRef idx="0">
+                <a:schemeClr val="dk1"/>
+              </a:effectRef>
+              <a:fontRef idx="minor">
+                <a:schemeClr val="dk1"/>
+              </a:fontRef>
+            </p:style>
+            <p:txBody>
+              <a:bodyPr rtlCol="0" anchor="ctr"/>
+              <a:lstStyle/>
+              <a:p>
+                <a:pPr algn="ctr"/>
+                <a:endParaRPr lang="en-US"/>
+              </a:p>
+            </p:txBody>
+          </p:sp>
+          <p:cxnSp>
+            <p:nvCxnSpPr>
+              <p:cNvPr id="14" name="Straight Connector 13">
+                <a:extLst>
+                  <a:ext uri="{FF2B5EF4-FFF2-40B4-BE49-F238E27FC236}">
+                    <a16:creationId xmlns:a16="http://schemas.microsoft.com/office/drawing/2014/main" id="{FBC546A9-4728-4D68-BC9E-7382728F9158}"/>
+                  </a:ext>
+                </a:extLst>
+              </p:cNvPr>
+              <p:cNvCxnSpPr>
+                <a:cxnSpLocks/>
+                <a:endCxn id="12" idx="2"/>
+              </p:cNvCxnSpPr>
+              <p:nvPr/>
+            </p:nvCxnSpPr>
+            <p:spPr>
+              <a:xfrm flipH="1">
+                <a:off x="6095997" y="5708700"/>
+                <a:ext cx="4" cy="4622700"/>
+              </a:xfrm>
+              <a:prstGeom prst="line">
+                <a:avLst/>
+              </a:prstGeom>
+            </p:spPr>
+            <p:style>
+              <a:lnRef idx="1">
+                <a:schemeClr val="dk1"/>
+              </a:lnRef>
+              <a:fillRef idx="0">
+                <a:schemeClr val="dk1"/>
+              </a:fillRef>
+              <a:effectRef idx="0">
+                <a:schemeClr val="dk1"/>
+              </a:effectRef>
+              <a:fontRef idx="minor">
+                <a:schemeClr val="tx1"/>
+              </a:fontRef>
+            </p:style>
+          </p:cxnSp>
+          <p:cxnSp>
+            <p:nvCxnSpPr>
+              <p:cNvPr id="16" name="Straight Connector 15">
+                <a:extLst>
+                  <a:ext uri="{FF2B5EF4-FFF2-40B4-BE49-F238E27FC236}">
+                    <a16:creationId xmlns:a16="http://schemas.microsoft.com/office/drawing/2014/main" id="{B80B3157-5259-4116-A49F-E59B5C2CEC7E}"/>
+                  </a:ext>
+                </a:extLst>
+              </p:cNvPr>
+              <p:cNvCxnSpPr>
+                <a:cxnSpLocks/>
+              </p:cNvCxnSpPr>
+              <p:nvPr/>
+            </p:nvCxnSpPr>
+            <p:spPr>
+              <a:xfrm flipH="1">
+                <a:off x="3746490" y="5708700"/>
+                <a:ext cx="4" cy="4622700"/>
+              </a:xfrm>
+              <a:prstGeom prst="line">
+                <a:avLst/>
+              </a:prstGeom>
+            </p:spPr>
+            <p:style>
+              <a:lnRef idx="1">
+                <a:schemeClr val="dk1"/>
+              </a:lnRef>
+              <a:fillRef idx="0">
+                <a:schemeClr val="dk1"/>
+              </a:fillRef>
+              <a:effectRef idx="0">
+                <a:schemeClr val="dk1"/>
+              </a:effectRef>
+              <a:fontRef idx="minor">
+                <a:schemeClr val="tx1"/>
+              </a:fontRef>
+            </p:style>
+          </p:cxnSp>
+          <p:cxnSp>
+            <p:nvCxnSpPr>
+              <p:cNvPr id="17" name="Straight Connector 16">
+                <a:extLst>
+                  <a:ext uri="{FF2B5EF4-FFF2-40B4-BE49-F238E27FC236}">
+                    <a16:creationId xmlns:a16="http://schemas.microsoft.com/office/drawing/2014/main" id="{A185E9B7-85EE-4EFF-9FE4-7AC287E8AE2C}"/>
+                  </a:ext>
+                </a:extLst>
+              </p:cNvPr>
+              <p:cNvCxnSpPr>
+                <a:cxnSpLocks/>
+              </p:cNvCxnSpPr>
+              <p:nvPr/>
+            </p:nvCxnSpPr>
+            <p:spPr>
+              <a:xfrm flipH="1">
+                <a:off x="8445492" y="5708700"/>
+                <a:ext cx="4" cy="4622700"/>
+              </a:xfrm>
+              <a:prstGeom prst="line">
+                <a:avLst/>
+              </a:prstGeom>
+            </p:spPr>
+            <p:style>
+              <a:lnRef idx="1">
+                <a:schemeClr val="dk1"/>
+              </a:lnRef>
+              <a:fillRef idx="0">
+                <a:schemeClr val="dk1"/>
+              </a:fillRef>
+              <a:effectRef idx="0">
+                <a:schemeClr val="dk1"/>
+              </a:effectRef>
+              <a:fontRef idx="minor">
+                <a:schemeClr val="tx1"/>
+              </a:fontRef>
+            </p:style>
+          </p:cxnSp>
+          <p:sp>
+            <p:nvSpPr>
+              <p:cNvPr id="20" name="Rectangle 19">
+                <a:extLst>
+                  <a:ext uri="{FF2B5EF4-FFF2-40B4-BE49-F238E27FC236}">
+                    <a16:creationId xmlns:a16="http://schemas.microsoft.com/office/drawing/2014/main" id="{E122AD27-49CF-49FA-92B9-B7225AC139E9}"/>
+                  </a:ext>
+                </a:extLst>
+              </p:cNvPr>
+              <p:cNvSpPr/>
+              <p:nvPr/>
+            </p:nvSpPr>
+            <p:spPr>
+              <a:xfrm>
+                <a:off x="1396997" y="5708700"/>
+                <a:ext cx="2349183" cy="844500"/>
+              </a:xfrm>
+              <a:prstGeom prst="rect">
+                <a:avLst/>
+              </a:prstGeom>
+            </p:spPr>
+            <p:style>
+              <a:lnRef idx="2">
+                <a:schemeClr val="dk1"/>
+              </a:lnRef>
+              <a:fillRef idx="1">
+                <a:schemeClr val="lt1"/>
+              </a:fillRef>
+              <a:effectRef idx="0">
+                <a:schemeClr val="dk1"/>
+              </a:effectRef>
+              <a:fontRef idx="minor">
+                <a:schemeClr val="dk1"/>
+              </a:fontRef>
+            </p:style>
+            <p:txBody>
+              <a:bodyPr rtlCol="0" anchor="ctr"/>
+              <a:lstStyle/>
+              <a:p>
+                <a:pPr algn="ctr"/>
+                <a:r>
+                  <a:rPr lang="en-US" dirty="0"/>
+                  <a:t>Picture</a:t>
+                </a:r>
+              </a:p>
+            </p:txBody>
+          </p:sp>
+          <p:sp>
+            <p:nvSpPr>
+              <p:cNvPr id="21" name="Rectangle 20">
+                <a:extLst>
+                  <a:ext uri="{FF2B5EF4-FFF2-40B4-BE49-F238E27FC236}">
+                    <a16:creationId xmlns:a16="http://schemas.microsoft.com/office/drawing/2014/main" id="{6DCF7882-4848-4E6D-8713-0E13A03BD2B8}"/>
+                  </a:ext>
+                </a:extLst>
+              </p:cNvPr>
+              <p:cNvSpPr/>
+              <p:nvPr/>
+            </p:nvSpPr>
+            <p:spPr>
+              <a:xfrm>
+                <a:off x="3746180" y="5711275"/>
+                <a:ext cx="2349183" cy="844500"/>
+              </a:xfrm>
+              <a:prstGeom prst="rect">
+                <a:avLst/>
+              </a:prstGeom>
+            </p:spPr>
+            <p:style>
+              <a:lnRef idx="2">
+                <a:schemeClr val="dk1"/>
+              </a:lnRef>
+              <a:fillRef idx="1">
+                <a:schemeClr val="lt1"/>
+              </a:fillRef>
+              <a:effectRef idx="0">
+                <a:schemeClr val="dk1"/>
+              </a:effectRef>
+              <a:fontRef idx="minor">
+                <a:schemeClr val="dk1"/>
+              </a:fontRef>
+            </p:style>
+            <p:txBody>
+              <a:bodyPr rtlCol="0" anchor="ctr"/>
+              <a:lstStyle/>
+              <a:p>
+                <a:pPr algn="ctr"/>
+                <a:r>
+                  <a:rPr lang="en-US" dirty="0"/>
+                  <a:t>Picture</a:t>
+                </a:r>
+              </a:p>
+            </p:txBody>
+          </p:sp>
+          <p:sp>
+            <p:nvSpPr>
+              <p:cNvPr id="22" name="Rectangle 21">
+                <a:extLst>
+                  <a:ext uri="{FF2B5EF4-FFF2-40B4-BE49-F238E27FC236}">
+                    <a16:creationId xmlns:a16="http://schemas.microsoft.com/office/drawing/2014/main" id="{838D70A9-9573-447A-B12D-22BF588C2FC0}"/>
+                  </a:ext>
+                </a:extLst>
+              </p:cNvPr>
+              <p:cNvSpPr/>
+              <p:nvPr/>
+            </p:nvSpPr>
+            <p:spPr>
+              <a:xfrm>
+                <a:off x="6096307" y="5708700"/>
+                <a:ext cx="2349183" cy="844500"/>
+              </a:xfrm>
+              <a:prstGeom prst="rect">
+                <a:avLst/>
+              </a:prstGeom>
+            </p:spPr>
+            <p:style>
+              <a:lnRef idx="2">
+                <a:schemeClr val="dk1"/>
+              </a:lnRef>
+              <a:fillRef idx="1">
+                <a:schemeClr val="lt1"/>
+              </a:fillRef>
+              <a:effectRef idx="0">
+                <a:schemeClr val="dk1"/>
+              </a:effectRef>
+              <a:fontRef idx="minor">
+                <a:schemeClr val="dk1"/>
+              </a:fontRef>
+            </p:style>
+            <p:txBody>
+              <a:bodyPr rtlCol="0" anchor="ctr"/>
+              <a:lstStyle/>
+              <a:p>
+                <a:pPr algn="ctr"/>
+                <a:r>
+                  <a:rPr lang="en-US" dirty="0"/>
+                  <a:t>Picture</a:t>
+                </a:r>
+              </a:p>
+            </p:txBody>
+          </p:sp>
+          <p:sp>
+            <p:nvSpPr>
+              <p:cNvPr id="23" name="Rectangle 22">
+                <a:extLst>
+                  <a:ext uri="{FF2B5EF4-FFF2-40B4-BE49-F238E27FC236}">
+                    <a16:creationId xmlns:a16="http://schemas.microsoft.com/office/drawing/2014/main" id="{416E1324-577E-430E-BDBD-8C30857B85AE}"/>
+                  </a:ext>
+                </a:extLst>
+              </p:cNvPr>
+              <p:cNvSpPr/>
+              <p:nvPr/>
+            </p:nvSpPr>
+            <p:spPr>
+              <a:xfrm>
+                <a:off x="8445815" y="5708700"/>
+                <a:ext cx="2349183" cy="844500"/>
+              </a:xfrm>
+              <a:prstGeom prst="rect">
+                <a:avLst/>
+              </a:prstGeom>
+            </p:spPr>
+            <p:style>
+              <a:lnRef idx="2">
+                <a:schemeClr val="dk1"/>
+              </a:lnRef>
+              <a:fillRef idx="1">
+                <a:schemeClr val="lt1"/>
+              </a:fillRef>
+              <a:effectRef idx="0">
+                <a:schemeClr val="dk1"/>
+              </a:effectRef>
+              <a:fontRef idx="minor">
+                <a:schemeClr val="dk1"/>
+              </a:fontRef>
+            </p:style>
+            <p:txBody>
+              <a:bodyPr rtlCol="0" anchor="ctr"/>
+              <a:lstStyle/>
+              <a:p>
+                <a:pPr algn="ctr"/>
+                <a:r>
+                  <a:rPr lang="en-US" dirty="0"/>
+                  <a:t>Picture</a:t>
+                </a:r>
+              </a:p>
+            </p:txBody>
+          </p:sp>
+          <p:sp>
+            <p:nvSpPr>
+              <p:cNvPr id="24" name="Rectangle 23">
+                <a:extLst>
+                  <a:ext uri="{FF2B5EF4-FFF2-40B4-BE49-F238E27FC236}">
+                    <a16:creationId xmlns:a16="http://schemas.microsoft.com/office/drawing/2014/main" id="{EB3564D9-7CD0-4767-9E25-1FD2186C2F04}"/>
+                  </a:ext>
+                </a:extLst>
+              </p:cNvPr>
+              <p:cNvSpPr/>
+              <p:nvPr/>
+            </p:nvSpPr>
+            <p:spPr>
+              <a:xfrm>
+                <a:off x="1396990" y="8023275"/>
+                <a:ext cx="2349183" cy="844500"/>
+              </a:xfrm>
+              <a:prstGeom prst="rect">
+                <a:avLst/>
+              </a:prstGeom>
+            </p:spPr>
+            <p:style>
+              <a:lnRef idx="2">
+                <a:schemeClr val="dk1"/>
+              </a:lnRef>
+              <a:fillRef idx="1">
+                <a:schemeClr val="lt1"/>
+              </a:fillRef>
+              <a:effectRef idx="0">
+                <a:schemeClr val="dk1"/>
+              </a:effectRef>
+              <a:fontRef idx="minor">
+                <a:schemeClr val="dk1"/>
+              </a:fontRef>
+            </p:style>
+            <p:txBody>
+              <a:bodyPr rtlCol="0" anchor="ctr"/>
+              <a:lstStyle/>
+              <a:p>
+                <a:pPr algn="ctr"/>
+                <a:r>
+                  <a:rPr lang="en-US" dirty="0"/>
+                  <a:t>Picture</a:t>
+                </a:r>
+              </a:p>
+            </p:txBody>
+          </p:sp>
+          <p:sp>
+            <p:nvSpPr>
+              <p:cNvPr id="25" name="Rectangle 24">
+                <a:extLst>
+                  <a:ext uri="{FF2B5EF4-FFF2-40B4-BE49-F238E27FC236}">
+                    <a16:creationId xmlns:a16="http://schemas.microsoft.com/office/drawing/2014/main" id="{5D306C63-94E6-45FE-9B57-F614F612AA1A}"/>
+                  </a:ext>
+                </a:extLst>
+              </p:cNvPr>
+              <p:cNvSpPr/>
+              <p:nvPr/>
+            </p:nvSpPr>
+            <p:spPr>
+              <a:xfrm>
+                <a:off x="3746180" y="8023275"/>
+                <a:ext cx="2349183" cy="844500"/>
+              </a:xfrm>
+              <a:prstGeom prst="rect">
+                <a:avLst/>
+              </a:prstGeom>
+            </p:spPr>
+            <p:style>
+              <a:lnRef idx="2">
+                <a:schemeClr val="dk1"/>
+              </a:lnRef>
+              <a:fillRef idx="1">
+                <a:schemeClr val="lt1"/>
+              </a:fillRef>
+              <a:effectRef idx="0">
+                <a:schemeClr val="dk1"/>
+              </a:effectRef>
+              <a:fontRef idx="minor">
+                <a:schemeClr val="dk1"/>
+              </a:fontRef>
+            </p:style>
+            <p:txBody>
+              <a:bodyPr rtlCol="0" anchor="ctr"/>
+              <a:lstStyle/>
+              <a:p>
+                <a:pPr algn="ctr"/>
+                <a:r>
+                  <a:rPr lang="en-US" dirty="0"/>
+                  <a:t>Picture</a:t>
+                </a:r>
+              </a:p>
+            </p:txBody>
+          </p:sp>
+          <p:sp>
+            <p:nvSpPr>
+              <p:cNvPr id="26" name="Rectangle 25">
+                <a:extLst>
+                  <a:ext uri="{FF2B5EF4-FFF2-40B4-BE49-F238E27FC236}">
+                    <a16:creationId xmlns:a16="http://schemas.microsoft.com/office/drawing/2014/main" id="{EC742D62-4649-4BCC-A3E8-CA96DF597FFF}"/>
+                  </a:ext>
+                </a:extLst>
+              </p:cNvPr>
+              <p:cNvSpPr/>
+              <p:nvPr/>
+            </p:nvSpPr>
+            <p:spPr>
+              <a:xfrm>
+                <a:off x="6095206" y="8024114"/>
+                <a:ext cx="2349183" cy="844500"/>
+              </a:xfrm>
+              <a:prstGeom prst="rect">
+                <a:avLst/>
+              </a:prstGeom>
+            </p:spPr>
+            <p:style>
+              <a:lnRef idx="2">
+                <a:schemeClr val="dk1"/>
+              </a:lnRef>
+              <a:fillRef idx="1">
+                <a:schemeClr val="lt1"/>
+              </a:fillRef>
+              <a:effectRef idx="0">
+                <a:schemeClr val="dk1"/>
+              </a:effectRef>
+              <a:fontRef idx="minor">
+                <a:schemeClr val="dk1"/>
+              </a:fontRef>
+            </p:style>
+            <p:txBody>
+              <a:bodyPr rtlCol="0" anchor="ctr"/>
+              <a:lstStyle/>
+              <a:p>
+                <a:pPr algn="ctr"/>
+                <a:r>
+                  <a:rPr lang="en-US" dirty="0"/>
+                  <a:t>Picture</a:t>
+                </a:r>
+              </a:p>
+            </p:txBody>
+          </p:sp>
+          <p:sp>
+            <p:nvSpPr>
+              <p:cNvPr id="27" name="Rectangle 26">
+                <a:extLst>
+                  <a:ext uri="{FF2B5EF4-FFF2-40B4-BE49-F238E27FC236}">
+                    <a16:creationId xmlns:a16="http://schemas.microsoft.com/office/drawing/2014/main" id="{8DA26E69-8788-407F-B9CA-9D11F3CF4457}"/>
+                  </a:ext>
+                </a:extLst>
+              </p:cNvPr>
+              <p:cNvSpPr/>
+              <p:nvPr/>
+            </p:nvSpPr>
+            <p:spPr>
+              <a:xfrm>
+                <a:off x="8443918" y="8024114"/>
+                <a:ext cx="2349183" cy="844500"/>
+              </a:xfrm>
+              <a:prstGeom prst="rect">
+                <a:avLst/>
+              </a:prstGeom>
+            </p:spPr>
+            <p:style>
+              <a:lnRef idx="2">
+                <a:schemeClr val="dk1"/>
+              </a:lnRef>
+              <a:fillRef idx="1">
+                <a:schemeClr val="lt1"/>
+              </a:fillRef>
+              <a:effectRef idx="0">
+                <a:schemeClr val="dk1"/>
+              </a:effectRef>
+              <a:fontRef idx="minor">
+                <a:schemeClr val="dk1"/>
+              </a:fontRef>
+            </p:style>
+            <p:txBody>
+              <a:bodyPr rtlCol="0" anchor="ctr"/>
+              <a:lstStyle/>
+              <a:p>
+                <a:pPr algn="ctr"/>
+                <a:r>
+                  <a:rPr lang="en-US" dirty="0"/>
+                  <a:t>Picture</a:t>
+                </a:r>
+              </a:p>
+            </p:txBody>
+          </p:sp>
+          <p:sp>
+            <p:nvSpPr>
+              <p:cNvPr id="28" name="TextBox 27">
+                <a:extLst>
+                  <a:ext uri="{FF2B5EF4-FFF2-40B4-BE49-F238E27FC236}">
+                    <a16:creationId xmlns:a16="http://schemas.microsoft.com/office/drawing/2014/main" id="{80F2E754-5F6E-4E96-B42E-0548FA25DB33}"/>
+                  </a:ext>
+                </a:extLst>
+              </p:cNvPr>
+              <p:cNvSpPr txBox="1"/>
+              <p:nvPr/>
+            </p:nvSpPr>
+            <p:spPr>
+              <a:xfrm>
+                <a:off x="1396990" y="6553200"/>
+                <a:ext cx="2348492" cy="1415772"/>
+              </a:xfrm>
+              <a:prstGeom prst="rect">
+                <a:avLst/>
+              </a:prstGeom>
+              <a:noFill/>
+            </p:spPr>
+            <p:txBody>
+              <a:bodyPr wrap="square" rtlCol="0">
+                <a:spAutoFit/>
+              </a:bodyPr>
+              <a:lstStyle/>
+              <a:p>
+                <a:r>
+                  <a:rPr lang="en-US" i="1" dirty="0"/>
+                  <a:t>Description</a:t>
+                </a:r>
+                <a:r>
+                  <a:rPr lang="en-US" dirty="0"/>
+                  <a:t> </a:t>
+                </a:r>
+              </a:p>
+              <a:p>
+                <a:r>
+                  <a:rPr lang="en-US" dirty="0"/>
+                  <a:t>Lorem ipsum dolor sit </a:t>
+                </a:r>
+                <a:r>
+                  <a:rPr lang="en-US" dirty="0" err="1"/>
+                  <a:t>amet</a:t>
+                </a:r>
+                <a:r>
+                  <a:rPr lang="en-US" dirty="0"/>
+                  <a:t>, </a:t>
+                </a:r>
+                <a:r>
+                  <a:rPr lang="en-US" dirty="0" err="1"/>
+                  <a:t>consectetur</a:t>
+                </a:r>
+                <a:r>
+                  <a:rPr lang="en-US" dirty="0"/>
+                  <a:t> </a:t>
+                </a:r>
+                <a:r>
+                  <a:rPr lang="en-US" dirty="0" err="1"/>
+                  <a:t>adipiscing</a:t>
+                </a:r>
+                <a:r>
+                  <a:rPr lang="en-US" dirty="0"/>
+                  <a:t> </a:t>
+                </a:r>
+                <a:r>
+                  <a:rPr lang="en-US" dirty="0" err="1"/>
+                  <a:t>elit</a:t>
+                </a:r>
+                <a:r>
+                  <a:rPr lang="en-US" dirty="0"/>
+                  <a:t>.</a:t>
+                </a:r>
+                <a:br>
+                  <a:rPr lang="en-US" dirty="0"/>
+                </a:br>
+                <a:r>
+                  <a:rPr lang="en-US" sz="1200" i="1" dirty="0"/>
+                  <a:t>Distance</a:t>
+                </a:r>
+                <a:endParaRPr lang="en-US" i="1" dirty="0"/>
+              </a:p>
+            </p:txBody>
+          </p:sp>
+          <p:sp>
+            <p:nvSpPr>
+              <p:cNvPr id="30" name="TextBox 29">
+                <a:extLst>
+                  <a:ext uri="{FF2B5EF4-FFF2-40B4-BE49-F238E27FC236}">
+                    <a16:creationId xmlns:a16="http://schemas.microsoft.com/office/drawing/2014/main" id="{0FDA1002-45D3-461F-9962-BE08773FFF15}"/>
+                  </a:ext>
+                </a:extLst>
+              </p:cNvPr>
+              <p:cNvSpPr txBox="1"/>
+              <p:nvPr/>
+            </p:nvSpPr>
+            <p:spPr>
+              <a:xfrm>
+                <a:off x="3746525" y="6576707"/>
+                <a:ext cx="2348492" cy="1415772"/>
+              </a:xfrm>
+              <a:prstGeom prst="rect">
+                <a:avLst/>
+              </a:prstGeom>
+              <a:noFill/>
+            </p:spPr>
+            <p:txBody>
+              <a:bodyPr wrap="square" rtlCol="0">
+                <a:spAutoFit/>
+              </a:bodyPr>
+              <a:lstStyle/>
+              <a:p>
+                <a:r>
+                  <a:rPr lang="en-US" i="1" dirty="0"/>
+                  <a:t>Description</a:t>
+                </a:r>
+                <a:r>
+                  <a:rPr lang="en-US" dirty="0"/>
+                  <a:t> </a:t>
+                </a:r>
+              </a:p>
+              <a:p>
+                <a:r>
+                  <a:rPr lang="en-US" dirty="0"/>
+                  <a:t>Lorem ipsum dolor sit </a:t>
+                </a:r>
+                <a:r>
+                  <a:rPr lang="en-US" dirty="0" err="1"/>
+                  <a:t>amet</a:t>
+                </a:r>
+                <a:r>
+                  <a:rPr lang="en-US" dirty="0"/>
+                  <a:t>, </a:t>
+                </a:r>
+                <a:r>
+                  <a:rPr lang="en-US" dirty="0" err="1"/>
+                  <a:t>consectetur</a:t>
+                </a:r>
+                <a:r>
+                  <a:rPr lang="en-US" dirty="0"/>
+                  <a:t> </a:t>
+                </a:r>
+                <a:r>
+                  <a:rPr lang="en-US" dirty="0" err="1"/>
+                  <a:t>adipiscing</a:t>
+                </a:r>
+                <a:r>
+                  <a:rPr lang="en-US" dirty="0"/>
+                  <a:t> </a:t>
+                </a:r>
+                <a:r>
+                  <a:rPr lang="en-US" dirty="0" err="1"/>
+                  <a:t>elit</a:t>
+                </a:r>
+                <a:r>
+                  <a:rPr lang="en-US" dirty="0"/>
+                  <a:t>.</a:t>
+                </a:r>
+                <a:br>
+                  <a:rPr lang="en-US" dirty="0"/>
+                </a:br>
+                <a:r>
+                  <a:rPr lang="en-US" sz="1200" i="1" dirty="0"/>
+                  <a:t>Distance</a:t>
+                </a:r>
+                <a:endParaRPr lang="en-US" i="1" dirty="0"/>
+              </a:p>
+            </p:txBody>
+          </p:sp>
+          <p:sp>
+            <p:nvSpPr>
+              <p:cNvPr id="31" name="TextBox 30">
+                <a:extLst>
+                  <a:ext uri="{FF2B5EF4-FFF2-40B4-BE49-F238E27FC236}">
+                    <a16:creationId xmlns:a16="http://schemas.microsoft.com/office/drawing/2014/main" id="{BB92226D-B85A-4543-8811-39602D917BF0}"/>
+                  </a:ext>
+                </a:extLst>
+              </p:cNvPr>
+              <p:cNvSpPr txBox="1"/>
+              <p:nvPr/>
+            </p:nvSpPr>
+            <p:spPr>
+              <a:xfrm>
+                <a:off x="6095551" y="6553200"/>
+                <a:ext cx="2348492" cy="1415772"/>
+              </a:xfrm>
+              <a:prstGeom prst="rect">
+                <a:avLst/>
+              </a:prstGeom>
+              <a:noFill/>
+            </p:spPr>
+            <p:txBody>
+              <a:bodyPr wrap="square" rtlCol="0">
+                <a:spAutoFit/>
+              </a:bodyPr>
+              <a:lstStyle/>
+              <a:p>
+                <a:r>
+                  <a:rPr lang="en-US" i="1" dirty="0"/>
+                  <a:t>Description</a:t>
+                </a:r>
+                <a:r>
+                  <a:rPr lang="en-US" dirty="0"/>
+                  <a:t> </a:t>
+                </a:r>
+              </a:p>
+              <a:p>
+                <a:r>
+                  <a:rPr lang="en-US" dirty="0"/>
+                  <a:t>Lorem ipsum dolor sit </a:t>
+                </a:r>
+                <a:r>
+                  <a:rPr lang="en-US" dirty="0" err="1"/>
+                  <a:t>amet</a:t>
+                </a:r>
+                <a:r>
+                  <a:rPr lang="en-US" dirty="0"/>
+                  <a:t>, </a:t>
+                </a:r>
+                <a:r>
+                  <a:rPr lang="en-US" dirty="0" err="1"/>
+                  <a:t>consectetur</a:t>
+                </a:r>
+                <a:r>
+                  <a:rPr lang="en-US" dirty="0"/>
+                  <a:t> </a:t>
+                </a:r>
+                <a:r>
+                  <a:rPr lang="en-US" dirty="0" err="1"/>
+                  <a:t>adipiscing</a:t>
+                </a:r>
+                <a:r>
+                  <a:rPr lang="en-US" dirty="0"/>
+                  <a:t> </a:t>
+                </a:r>
+                <a:r>
+                  <a:rPr lang="en-US" dirty="0" err="1"/>
+                  <a:t>elit</a:t>
+                </a:r>
+                <a:r>
+                  <a:rPr lang="en-US" dirty="0"/>
+                  <a:t>.</a:t>
+                </a:r>
+                <a:br>
+                  <a:rPr lang="en-US" dirty="0"/>
+                </a:br>
+                <a:r>
+                  <a:rPr lang="en-US" sz="1200" i="1" dirty="0"/>
+                  <a:t>Distance</a:t>
+                </a:r>
+                <a:endParaRPr lang="en-US" i="1" dirty="0"/>
+              </a:p>
+            </p:txBody>
+          </p:sp>
+          <p:sp>
+            <p:nvSpPr>
+              <p:cNvPr id="32" name="TextBox 31">
+                <a:extLst>
+                  <a:ext uri="{FF2B5EF4-FFF2-40B4-BE49-F238E27FC236}">
+                    <a16:creationId xmlns:a16="http://schemas.microsoft.com/office/drawing/2014/main" id="{C6DB5F4D-3C27-47A9-A829-783B695C7920}"/>
+                  </a:ext>
+                </a:extLst>
+              </p:cNvPr>
+              <p:cNvSpPr txBox="1"/>
+              <p:nvPr/>
+            </p:nvSpPr>
+            <p:spPr>
+              <a:xfrm>
+                <a:off x="8443756" y="6529693"/>
+                <a:ext cx="2348492" cy="1415772"/>
+              </a:xfrm>
+              <a:prstGeom prst="rect">
+                <a:avLst/>
+              </a:prstGeom>
+              <a:noFill/>
+            </p:spPr>
+            <p:txBody>
+              <a:bodyPr wrap="square" rtlCol="0">
+                <a:spAutoFit/>
+              </a:bodyPr>
+              <a:lstStyle/>
+              <a:p>
+                <a:r>
+                  <a:rPr lang="en-US" i="1" dirty="0"/>
+                  <a:t>Description</a:t>
+                </a:r>
+                <a:r>
+                  <a:rPr lang="en-US" dirty="0"/>
+                  <a:t> </a:t>
+                </a:r>
+              </a:p>
+              <a:p>
+                <a:r>
+                  <a:rPr lang="en-US" dirty="0"/>
+                  <a:t>Lorem ipsum dolor sit </a:t>
+                </a:r>
+                <a:r>
+                  <a:rPr lang="en-US" dirty="0" err="1"/>
+                  <a:t>amet</a:t>
+                </a:r>
+                <a:r>
+                  <a:rPr lang="en-US" dirty="0"/>
+                  <a:t>, </a:t>
+                </a:r>
+                <a:r>
+                  <a:rPr lang="en-US" dirty="0" err="1"/>
+                  <a:t>consectetur</a:t>
+                </a:r>
+                <a:r>
+                  <a:rPr lang="en-US" dirty="0"/>
+                  <a:t> </a:t>
+                </a:r>
+                <a:r>
+                  <a:rPr lang="en-US" dirty="0" err="1"/>
+                  <a:t>adipiscing</a:t>
+                </a:r>
+                <a:r>
+                  <a:rPr lang="en-US" dirty="0"/>
+                  <a:t> </a:t>
+                </a:r>
+                <a:r>
+                  <a:rPr lang="en-US" dirty="0" err="1"/>
+                  <a:t>elit</a:t>
+                </a:r>
+                <a:r>
+                  <a:rPr lang="en-US" dirty="0"/>
+                  <a:t>.</a:t>
+                </a:r>
+                <a:br>
+                  <a:rPr lang="en-US" dirty="0"/>
+                </a:br>
+                <a:r>
+                  <a:rPr lang="en-US" sz="1200" i="1" dirty="0"/>
+                  <a:t>Distance</a:t>
+                </a:r>
+                <a:endParaRPr lang="en-US" i="1" dirty="0"/>
+              </a:p>
+            </p:txBody>
+          </p:sp>
+          <p:sp>
+            <p:nvSpPr>
+              <p:cNvPr id="33" name="TextBox 32">
+                <a:extLst>
+                  <a:ext uri="{FF2B5EF4-FFF2-40B4-BE49-F238E27FC236}">
+                    <a16:creationId xmlns:a16="http://schemas.microsoft.com/office/drawing/2014/main" id="{5B7251A8-7779-408A-90DA-B7C0445CEC94}"/>
+                  </a:ext>
+                </a:extLst>
+              </p:cNvPr>
+              <p:cNvSpPr txBox="1"/>
+              <p:nvPr/>
+            </p:nvSpPr>
+            <p:spPr>
+              <a:xfrm>
+                <a:off x="1396901" y="8886329"/>
+                <a:ext cx="2348492" cy="1415772"/>
+              </a:xfrm>
+              <a:prstGeom prst="rect">
+                <a:avLst/>
+              </a:prstGeom>
+              <a:noFill/>
+            </p:spPr>
+            <p:txBody>
+              <a:bodyPr wrap="square" rtlCol="0">
+                <a:spAutoFit/>
+              </a:bodyPr>
+              <a:lstStyle/>
+              <a:p>
+                <a:r>
+                  <a:rPr lang="en-US" i="1" dirty="0"/>
+                  <a:t>Description</a:t>
+                </a:r>
+                <a:r>
+                  <a:rPr lang="en-US" dirty="0"/>
+                  <a:t> </a:t>
+                </a:r>
+              </a:p>
+              <a:p>
+                <a:r>
+                  <a:rPr lang="en-US" dirty="0"/>
+                  <a:t>Lorem ipsum dolor sit </a:t>
+                </a:r>
+                <a:r>
+                  <a:rPr lang="en-US" dirty="0" err="1"/>
+                  <a:t>amet</a:t>
+                </a:r>
+                <a:r>
+                  <a:rPr lang="en-US" dirty="0"/>
+                  <a:t>, </a:t>
+                </a:r>
+                <a:r>
+                  <a:rPr lang="en-US" dirty="0" err="1"/>
+                  <a:t>consectetur</a:t>
+                </a:r>
+                <a:r>
+                  <a:rPr lang="en-US" dirty="0"/>
+                  <a:t> </a:t>
+                </a:r>
+                <a:r>
+                  <a:rPr lang="en-US" dirty="0" err="1"/>
+                  <a:t>adipiscing</a:t>
+                </a:r>
+                <a:r>
+                  <a:rPr lang="en-US" dirty="0"/>
+                  <a:t> </a:t>
+                </a:r>
+                <a:r>
+                  <a:rPr lang="en-US" dirty="0" err="1"/>
+                  <a:t>elit</a:t>
+                </a:r>
+                <a:r>
+                  <a:rPr lang="en-US" dirty="0"/>
+                  <a:t>.</a:t>
+                </a:r>
+                <a:br>
+                  <a:rPr lang="en-US" dirty="0"/>
+                </a:br>
+                <a:r>
+                  <a:rPr lang="en-US" sz="1200" i="1" dirty="0"/>
+                  <a:t>Distance</a:t>
+                </a:r>
+                <a:endParaRPr lang="en-US" i="1" dirty="0"/>
+              </a:p>
+            </p:txBody>
+          </p:sp>
+          <p:sp>
+            <p:nvSpPr>
+              <p:cNvPr id="34" name="TextBox 33">
+                <a:extLst>
+                  <a:ext uri="{FF2B5EF4-FFF2-40B4-BE49-F238E27FC236}">
+                    <a16:creationId xmlns:a16="http://schemas.microsoft.com/office/drawing/2014/main" id="{811AF7CB-EDE3-4945-BA56-9A11D295BD25}"/>
+                  </a:ext>
+                </a:extLst>
+              </p:cNvPr>
+              <p:cNvSpPr txBox="1"/>
+              <p:nvPr/>
+            </p:nvSpPr>
+            <p:spPr>
+              <a:xfrm>
+                <a:off x="3744523" y="8881207"/>
+                <a:ext cx="2348492" cy="1415772"/>
+              </a:xfrm>
+              <a:prstGeom prst="rect">
+                <a:avLst/>
+              </a:prstGeom>
+              <a:noFill/>
+            </p:spPr>
+            <p:txBody>
+              <a:bodyPr wrap="square" rtlCol="0">
+                <a:spAutoFit/>
+              </a:bodyPr>
+              <a:lstStyle/>
+              <a:p>
+                <a:r>
+                  <a:rPr lang="en-US" i="1" dirty="0"/>
+                  <a:t>Description</a:t>
+                </a:r>
+                <a:r>
+                  <a:rPr lang="en-US" dirty="0"/>
+                  <a:t> </a:t>
+                </a:r>
+              </a:p>
+              <a:p>
+                <a:r>
+                  <a:rPr lang="en-US" dirty="0"/>
+                  <a:t>Lorem ipsum dolor sit </a:t>
+                </a:r>
+                <a:r>
+                  <a:rPr lang="en-US" dirty="0" err="1"/>
+                  <a:t>amet</a:t>
+                </a:r>
+                <a:r>
+                  <a:rPr lang="en-US" dirty="0"/>
+                  <a:t>, </a:t>
+                </a:r>
+                <a:r>
+                  <a:rPr lang="en-US" dirty="0" err="1"/>
+                  <a:t>consectetur</a:t>
+                </a:r>
+                <a:r>
+                  <a:rPr lang="en-US" dirty="0"/>
+                  <a:t> </a:t>
+                </a:r>
+                <a:r>
+                  <a:rPr lang="en-US" dirty="0" err="1"/>
+                  <a:t>adipiscing</a:t>
+                </a:r>
+                <a:r>
+                  <a:rPr lang="en-US" dirty="0"/>
+                  <a:t> </a:t>
+                </a:r>
+                <a:r>
+                  <a:rPr lang="en-US" dirty="0" err="1"/>
+                  <a:t>elit</a:t>
+                </a:r>
+                <a:r>
+                  <a:rPr lang="en-US" dirty="0"/>
+                  <a:t>.</a:t>
+                </a:r>
+                <a:br>
+                  <a:rPr lang="en-US" dirty="0"/>
+                </a:br>
+                <a:r>
+                  <a:rPr lang="en-US" sz="1200" i="1" dirty="0"/>
+                  <a:t>Distance</a:t>
+                </a:r>
+                <a:endParaRPr lang="en-US" i="1" dirty="0"/>
+              </a:p>
+            </p:txBody>
+          </p:sp>
+          <p:sp>
+            <p:nvSpPr>
+              <p:cNvPr id="35" name="TextBox 34">
+                <a:extLst>
+                  <a:ext uri="{FF2B5EF4-FFF2-40B4-BE49-F238E27FC236}">
+                    <a16:creationId xmlns:a16="http://schemas.microsoft.com/office/drawing/2014/main" id="{08455020-43FF-40E1-A7F2-27C742C8ED26}"/>
+                  </a:ext>
+                </a:extLst>
+              </p:cNvPr>
+              <p:cNvSpPr txBox="1"/>
+              <p:nvPr/>
+            </p:nvSpPr>
+            <p:spPr>
+              <a:xfrm>
+                <a:off x="6092030" y="8868614"/>
+                <a:ext cx="2348492" cy="1415772"/>
+              </a:xfrm>
+              <a:prstGeom prst="rect">
+                <a:avLst/>
+              </a:prstGeom>
+              <a:noFill/>
+            </p:spPr>
+            <p:txBody>
+              <a:bodyPr wrap="square" rtlCol="0">
+                <a:spAutoFit/>
+              </a:bodyPr>
+              <a:lstStyle/>
+              <a:p>
+                <a:r>
+                  <a:rPr lang="en-US" i="1" dirty="0"/>
+                  <a:t>Description</a:t>
+                </a:r>
+                <a:r>
+                  <a:rPr lang="en-US" dirty="0"/>
+                  <a:t> </a:t>
+                </a:r>
+              </a:p>
+              <a:p>
+                <a:r>
+                  <a:rPr lang="en-US" dirty="0"/>
+                  <a:t>Lorem ipsum dolor sit </a:t>
+                </a:r>
+                <a:r>
+                  <a:rPr lang="en-US" dirty="0" err="1"/>
+                  <a:t>amet</a:t>
+                </a:r>
+                <a:r>
+                  <a:rPr lang="en-US" dirty="0"/>
+                  <a:t>, </a:t>
+                </a:r>
+                <a:r>
+                  <a:rPr lang="en-US" dirty="0" err="1"/>
+                  <a:t>consectetur</a:t>
+                </a:r>
+                <a:r>
+                  <a:rPr lang="en-US" dirty="0"/>
+                  <a:t> </a:t>
+                </a:r>
+                <a:r>
+                  <a:rPr lang="en-US" dirty="0" err="1"/>
+                  <a:t>adipiscing</a:t>
+                </a:r>
+                <a:r>
+                  <a:rPr lang="en-US" dirty="0"/>
+                  <a:t> </a:t>
+                </a:r>
+                <a:r>
+                  <a:rPr lang="en-US" dirty="0" err="1"/>
+                  <a:t>elit</a:t>
+                </a:r>
+                <a:r>
+                  <a:rPr lang="en-US" dirty="0"/>
+                  <a:t>.</a:t>
+                </a:r>
+                <a:br>
+                  <a:rPr lang="en-US" dirty="0"/>
+                </a:br>
+                <a:r>
+                  <a:rPr lang="en-US" sz="1200" i="1" dirty="0"/>
+                  <a:t>Distance</a:t>
+                </a:r>
+                <a:endParaRPr lang="en-US" i="1" dirty="0"/>
+              </a:p>
+            </p:txBody>
+          </p:sp>
+          <p:sp>
+            <p:nvSpPr>
+              <p:cNvPr id="36" name="TextBox 35">
+                <a:extLst>
+                  <a:ext uri="{FF2B5EF4-FFF2-40B4-BE49-F238E27FC236}">
+                    <a16:creationId xmlns:a16="http://schemas.microsoft.com/office/drawing/2014/main" id="{0AE59655-09D1-481E-8F00-CE3EC7E32B02}"/>
+                  </a:ext>
+                </a:extLst>
+              </p:cNvPr>
+              <p:cNvSpPr txBox="1"/>
+              <p:nvPr/>
+            </p:nvSpPr>
+            <p:spPr>
+              <a:xfrm>
+                <a:off x="8444888" y="8868614"/>
+                <a:ext cx="2348492" cy="1415772"/>
+              </a:xfrm>
+              <a:prstGeom prst="rect">
+                <a:avLst/>
+              </a:prstGeom>
+              <a:noFill/>
+            </p:spPr>
+            <p:txBody>
+              <a:bodyPr wrap="square" rtlCol="0">
+                <a:spAutoFit/>
+              </a:bodyPr>
+              <a:lstStyle/>
+              <a:p>
+                <a:r>
+                  <a:rPr lang="en-US" i="1" dirty="0"/>
+                  <a:t>Description</a:t>
+                </a:r>
+                <a:r>
+                  <a:rPr lang="en-US" dirty="0"/>
+                  <a:t> </a:t>
+                </a:r>
+              </a:p>
+              <a:p>
+                <a:r>
+                  <a:rPr lang="en-US" dirty="0"/>
+                  <a:t>Lorem ipsum dolor sit </a:t>
+                </a:r>
+                <a:r>
+                  <a:rPr lang="en-US" dirty="0" err="1"/>
+                  <a:t>amet</a:t>
+                </a:r>
+                <a:r>
+                  <a:rPr lang="en-US" dirty="0"/>
+                  <a:t>, </a:t>
+                </a:r>
+                <a:r>
+                  <a:rPr lang="en-US" dirty="0" err="1"/>
+                  <a:t>consectetur</a:t>
+                </a:r>
+                <a:r>
+                  <a:rPr lang="en-US" dirty="0"/>
+                  <a:t> </a:t>
+                </a:r>
+                <a:r>
+                  <a:rPr lang="en-US" dirty="0" err="1"/>
+                  <a:t>adipiscing</a:t>
+                </a:r>
+                <a:r>
+                  <a:rPr lang="en-US" dirty="0"/>
+                  <a:t> </a:t>
+                </a:r>
+                <a:r>
+                  <a:rPr lang="en-US" dirty="0" err="1"/>
+                  <a:t>elit</a:t>
+                </a:r>
+                <a:r>
+                  <a:rPr lang="en-US" dirty="0"/>
+                  <a:t>.</a:t>
+                </a:r>
+                <a:br>
+                  <a:rPr lang="en-US" dirty="0"/>
+                </a:br>
+                <a:r>
+                  <a:rPr lang="en-US" sz="1200" i="1" dirty="0"/>
+                  <a:t>Distance</a:t>
+                </a:r>
+                <a:endParaRPr lang="en-US" i="1" dirty="0"/>
+              </a:p>
+            </p:txBody>
+          </p:sp>
+        </p:grpSp>
+        <p:grpSp>
+          <p:nvGrpSpPr>
+            <p:cNvPr id="38" name="Group 37">
+              <a:extLst>
+                <a:ext uri="{FF2B5EF4-FFF2-40B4-BE49-F238E27FC236}">
+                  <a16:creationId xmlns:a16="http://schemas.microsoft.com/office/drawing/2014/main" id="{756E63BA-221F-439F-BF8E-2F55661483FC}"/>
+                </a:ext>
+              </a:extLst>
+            </p:cNvPr>
+            <p:cNvGrpSpPr/>
+            <p:nvPr/>
+          </p:nvGrpSpPr>
+          <p:grpSpPr>
+            <a:xfrm>
+              <a:off x="1396901" y="10746437"/>
+              <a:ext cx="9398097" cy="4622700"/>
+              <a:chOff x="1396901" y="5708700"/>
+              <a:chExt cx="9398097" cy="4622700"/>
+            </a:xfrm>
+          </p:grpSpPr>
+          <p:sp>
+            <p:nvSpPr>
+              <p:cNvPr id="39" name="Rectangle 38">
+                <a:extLst>
+                  <a:ext uri="{FF2B5EF4-FFF2-40B4-BE49-F238E27FC236}">
+                    <a16:creationId xmlns:a16="http://schemas.microsoft.com/office/drawing/2014/main" id="{B8DB5B2D-BBFB-40D3-A306-32C43D99B90A}"/>
+                  </a:ext>
+                </a:extLst>
+              </p:cNvPr>
+              <p:cNvSpPr/>
+              <p:nvPr/>
+            </p:nvSpPr>
+            <p:spPr>
+              <a:xfrm>
+                <a:off x="1396999" y="5708700"/>
+                <a:ext cx="9397999" cy="2311350"/>
+              </a:xfrm>
+              <a:prstGeom prst="rect">
+                <a:avLst/>
+              </a:prstGeom>
+            </p:spPr>
+            <p:style>
+              <a:lnRef idx="2">
+                <a:schemeClr val="dk1"/>
+              </a:lnRef>
+              <a:fillRef idx="1">
+                <a:schemeClr val="lt1"/>
+              </a:fillRef>
+              <a:effectRef idx="0">
+                <a:schemeClr val="dk1"/>
+              </a:effectRef>
+              <a:fontRef idx="minor">
+                <a:schemeClr val="dk1"/>
+              </a:fontRef>
+            </p:style>
+            <p:txBody>
+              <a:bodyPr rtlCol="0" anchor="ctr"/>
+              <a:lstStyle/>
+              <a:p>
+                <a:pPr algn="ctr"/>
+                <a:endParaRPr lang="en-US"/>
+              </a:p>
+            </p:txBody>
+          </p:sp>
+          <p:sp>
+            <p:nvSpPr>
+              <p:cNvPr id="40" name="Rectangle 39">
+                <a:extLst>
+                  <a:ext uri="{FF2B5EF4-FFF2-40B4-BE49-F238E27FC236}">
+                    <a16:creationId xmlns:a16="http://schemas.microsoft.com/office/drawing/2014/main" id="{E89145D6-789C-48DD-BB32-E0271D9B5F19}"/>
+                  </a:ext>
+                </a:extLst>
+              </p:cNvPr>
+              <p:cNvSpPr/>
+              <p:nvPr/>
+            </p:nvSpPr>
+            <p:spPr>
+              <a:xfrm>
+                <a:off x="1396997" y="8020050"/>
+                <a:ext cx="9397999" cy="2311350"/>
+              </a:xfrm>
+              <a:prstGeom prst="rect">
+                <a:avLst/>
+              </a:prstGeom>
+            </p:spPr>
+            <p:style>
+              <a:lnRef idx="2">
+                <a:schemeClr val="dk1"/>
+              </a:lnRef>
+              <a:fillRef idx="1">
+                <a:schemeClr val="lt1"/>
+              </a:fillRef>
+              <a:effectRef idx="0">
+                <a:schemeClr val="dk1"/>
+              </a:effectRef>
+              <a:fontRef idx="minor">
+                <a:schemeClr val="dk1"/>
+              </a:fontRef>
+            </p:style>
+            <p:txBody>
+              <a:bodyPr rtlCol="0" anchor="ctr"/>
+              <a:lstStyle/>
+              <a:p>
+                <a:pPr algn="ctr"/>
+                <a:endParaRPr lang="en-US"/>
+              </a:p>
+            </p:txBody>
+          </p:sp>
+          <p:cxnSp>
+            <p:nvCxnSpPr>
+              <p:cNvPr id="41" name="Straight Connector 40">
+                <a:extLst>
+                  <a:ext uri="{FF2B5EF4-FFF2-40B4-BE49-F238E27FC236}">
+                    <a16:creationId xmlns:a16="http://schemas.microsoft.com/office/drawing/2014/main" id="{94ADFC34-973B-4CB2-B6F6-230FFFEEA074}"/>
+                  </a:ext>
+                </a:extLst>
+              </p:cNvPr>
+              <p:cNvCxnSpPr>
+                <a:cxnSpLocks/>
+                <a:endCxn id="40" idx="2"/>
+              </p:cNvCxnSpPr>
+              <p:nvPr/>
+            </p:nvCxnSpPr>
+            <p:spPr>
+              <a:xfrm flipH="1">
+                <a:off x="6095997" y="5708700"/>
+                <a:ext cx="4" cy="4622700"/>
+              </a:xfrm>
+              <a:prstGeom prst="line">
+                <a:avLst/>
+              </a:prstGeom>
+            </p:spPr>
+            <p:style>
+              <a:lnRef idx="1">
+                <a:schemeClr val="dk1"/>
+              </a:lnRef>
+              <a:fillRef idx="0">
+                <a:schemeClr val="dk1"/>
+              </a:fillRef>
+              <a:effectRef idx="0">
+                <a:schemeClr val="dk1"/>
+              </a:effectRef>
+              <a:fontRef idx="minor">
+                <a:schemeClr val="tx1"/>
+              </a:fontRef>
+            </p:style>
+          </p:cxnSp>
+          <p:cxnSp>
+            <p:nvCxnSpPr>
+              <p:cNvPr id="42" name="Straight Connector 41">
+                <a:extLst>
+                  <a:ext uri="{FF2B5EF4-FFF2-40B4-BE49-F238E27FC236}">
+                    <a16:creationId xmlns:a16="http://schemas.microsoft.com/office/drawing/2014/main" id="{30957FED-BD0A-47BC-8D4B-2008D852E39E}"/>
+                  </a:ext>
+                </a:extLst>
+              </p:cNvPr>
+              <p:cNvCxnSpPr>
+                <a:cxnSpLocks/>
+              </p:cNvCxnSpPr>
+              <p:nvPr/>
+            </p:nvCxnSpPr>
+            <p:spPr>
+              <a:xfrm flipH="1">
+                <a:off x="3746490" y="5708700"/>
+                <a:ext cx="4" cy="4622700"/>
+              </a:xfrm>
+              <a:prstGeom prst="line">
+                <a:avLst/>
+              </a:prstGeom>
+            </p:spPr>
+            <p:style>
+              <a:lnRef idx="1">
+                <a:schemeClr val="dk1"/>
+              </a:lnRef>
+              <a:fillRef idx="0">
+                <a:schemeClr val="dk1"/>
+              </a:fillRef>
+              <a:effectRef idx="0">
+                <a:schemeClr val="dk1"/>
+              </a:effectRef>
+              <a:fontRef idx="minor">
+                <a:schemeClr val="tx1"/>
+              </a:fontRef>
+            </p:style>
+          </p:cxnSp>
+          <p:cxnSp>
+            <p:nvCxnSpPr>
+              <p:cNvPr id="43" name="Straight Connector 42">
+                <a:extLst>
+                  <a:ext uri="{FF2B5EF4-FFF2-40B4-BE49-F238E27FC236}">
+                    <a16:creationId xmlns:a16="http://schemas.microsoft.com/office/drawing/2014/main" id="{F4F5F79D-1B2F-4B4E-A5C4-255887FDCDF9}"/>
+                  </a:ext>
+                </a:extLst>
+              </p:cNvPr>
+              <p:cNvCxnSpPr>
+                <a:cxnSpLocks/>
+              </p:cNvCxnSpPr>
+              <p:nvPr/>
+            </p:nvCxnSpPr>
+            <p:spPr>
+              <a:xfrm flipH="1">
+                <a:off x="8445492" y="5708700"/>
+                <a:ext cx="4" cy="4622700"/>
+              </a:xfrm>
+              <a:prstGeom prst="line">
+                <a:avLst/>
+              </a:prstGeom>
+            </p:spPr>
+            <p:style>
+              <a:lnRef idx="1">
+                <a:schemeClr val="dk1"/>
+              </a:lnRef>
+              <a:fillRef idx="0">
+                <a:schemeClr val="dk1"/>
+              </a:fillRef>
+              <a:effectRef idx="0">
+                <a:schemeClr val="dk1"/>
+              </a:effectRef>
+              <a:fontRef idx="minor">
+                <a:schemeClr val="tx1"/>
+              </a:fontRef>
+            </p:style>
+          </p:cxnSp>
+          <p:sp>
+            <p:nvSpPr>
+              <p:cNvPr id="44" name="Rectangle 43">
+                <a:extLst>
+                  <a:ext uri="{FF2B5EF4-FFF2-40B4-BE49-F238E27FC236}">
+                    <a16:creationId xmlns:a16="http://schemas.microsoft.com/office/drawing/2014/main" id="{E9B9DFDF-11BB-4285-A844-02AD1F55BC41}"/>
+                  </a:ext>
+                </a:extLst>
+              </p:cNvPr>
+              <p:cNvSpPr/>
+              <p:nvPr/>
+            </p:nvSpPr>
+            <p:spPr>
+              <a:xfrm>
+                <a:off x="1396997" y="5708700"/>
+                <a:ext cx="2349183" cy="844500"/>
+              </a:xfrm>
+              <a:prstGeom prst="rect">
+                <a:avLst/>
+              </a:prstGeom>
+            </p:spPr>
+            <p:style>
+              <a:lnRef idx="2">
+                <a:schemeClr val="dk1"/>
+              </a:lnRef>
+              <a:fillRef idx="1">
+                <a:schemeClr val="lt1"/>
+              </a:fillRef>
+              <a:effectRef idx="0">
+                <a:schemeClr val="dk1"/>
+              </a:effectRef>
+              <a:fontRef idx="minor">
+                <a:schemeClr val="dk1"/>
+              </a:fontRef>
+            </p:style>
+            <p:txBody>
+              <a:bodyPr rtlCol="0" anchor="ctr"/>
+              <a:lstStyle/>
+              <a:p>
+                <a:pPr algn="ctr"/>
+                <a:r>
+                  <a:rPr lang="en-US" dirty="0"/>
+                  <a:t>Picture</a:t>
+                </a:r>
+              </a:p>
+            </p:txBody>
+          </p:sp>
+          <p:sp>
+            <p:nvSpPr>
+              <p:cNvPr id="45" name="Rectangle 44">
+                <a:extLst>
+                  <a:ext uri="{FF2B5EF4-FFF2-40B4-BE49-F238E27FC236}">
+                    <a16:creationId xmlns:a16="http://schemas.microsoft.com/office/drawing/2014/main" id="{E87FA2A3-BAA2-4978-8561-B0F474166019}"/>
+                  </a:ext>
+                </a:extLst>
+              </p:cNvPr>
+              <p:cNvSpPr/>
+              <p:nvPr/>
+            </p:nvSpPr>
+            <p:spPr>
+              <a:xfrm>
+                <a:off x="3746180" y="5711275"/>
+                <a:ext cx="2349183" cy="844500"/>
+              </a:xfrm>
+              <a:prstGeom prst="rect">
+                <a:avLst/>
+              </a:prstGeom>
+            </p:spPr>
+            <p:style>
+              <a:lnRef idx="2">
+                <a:schemeClr val="dk1"/>
+              </a:lnRef>
+              <a:fillRef idx="1">
+                <a:schemeClr val="lt1"/>
+              </a:fillRef>
+              <a:effectRef idx="0">
+                <a:schemeClr val="dk1"/>
+              </a:effectRef>
+              <a:fontRef idx="minor">
+                <a:schemeClr val="dk1"/>
+              </a:fontRef>
+            </p:style>
+            <p:txBody>
+              <a:bodyPr rtlCol="0" anchor="ctr"/>
+              <a:lstStyle/>
+              <a:p>
+                <a:pPr algn="ctr"/>
+                <a:r>
+                  <a:rPr lang="en-US" dirty="0"/>
+                  <a:t>Picture</a:t>
+                </a:r>
+              </a:p>
+            </p:txBody>
+          </p:sp>
+          <p:sp>
+            <p:nvSpPr>
+              <p:cNvPr id="46" name="Rectangle 45">
+                <a:extLst>
+                  <a:ext uri="{FF2B5EF4-FFF2-40B4-BE49-F238E27FC236}">
+                    <a16:creationId xmlns:a16="http://schemas.microsoft.com/office/drawing/2014/main" id="{E79A8545-38AD-4ADA-BE19-FD3DAE13EA94}"/>
+                  </a:ext>
+                </a:extLst>
+              </p:cNvPr>
+              <p:cNvSpPr/>
+              <p:nvPr/>
+            </p:nvSpPr>
+            <p:spPr>
+              <a:xfrm>
+                <a:off x="6096307" y="5708700"/>
+                <a:ext cx="2349183" cy="844500"/>
+              </a:xfrm>
+              <a:prstGeom prst="rect">
+                <a:avLst/>
+              </a:prstGeom>
+            </p:spPr>
+            <p:style>
+              <a:lnRef idx="2">
+                <a:schemeClr val="dk1"/>
+              </a:lnRef>
+              <a:fillRef idx="1">
+                <a:schemeClr val="lt1"/>
+              </a:fillRef>
+              <a:effectRef idx="0">
+                <a:schemeClr val="dk1"/>
+              </a:effectRef>
+              <a:fontRef idx="minor">
+                <a:schemeClr val="dk1"/>
+              </a:fontRef>
+            </p:style>
+            <p:txBody>
+              <a:bodyPr rtlCol="0" anchor="ctr"/>
+              <a:lstStyle/>
+              <a:p>
+                <a:pPr algn="ctr"/>
+                <a:r>
+                  <a:rPr lang="en-US" dirty="0"/>
+                  <a:t>Picture</a:t>
+                </a:r>
+              </a:p>
+            </p:txBody>
+          </p:sp>
+          <p:sp>
+            <p:nvSpPr>
+              <p:cNvPr id="47" name="Rectangle 46">
+                <a:extLst>
+                  <a:ext uri="{FF2B5EF4-FFF2-40B4-BE49-F238E27FC236}">
+                    <a16:creationId xmlns:a16="http://schemas.microsoft.com/office/drawing/2014/main" id="{94784401-2A9D-4226-BC00-BBCB1974D311}"/>
+                  </a:ext>
+                </a:extLst>
+              </p:cNvPr>
+              <p:cNvSpPr/>
+              <p:nvPr/>
+            </p:nvSpPr>
+            <p:spPr>
+              <a:xfrm>
+                <a:off x="8445815" y="5708700"/>
+                <a:ext cx="2349183" cy="844500"/>
+              </a:xfrm>
+              <a:prstGeom prst="rect">
+                <a:avLst/>
+              </a:prstGeom>
+            </p:spPr>
+            <p:style>
+              <a:lnRef idx="2">
+                <a:schemeClr val="dk1"/>
+              </a:lnRef>
+              <a:fillRef idx="1">
+                <a:schemeClr val="lt1"/>
+              </a:fillRef>
+              <a:effectRef idx="0">
+                <a:schemeClr val="dk1"/>
+              </a:effectRef>
+              <a:fontRef idx="minor">
+                <a:schemeClr val="dk1"/>
+              </a:fontRef>
+            </p:style>
+            <p:txBody>
+              <a:bodyPr rtlCol="0" anchor="ctr"/>
+              <a:lstStyle/>
+              <a:p>
+                <a:pPr algn="ctr"/>
+                <a:r>
+                  <a:rPr lang="en-US" dirty="0"/>
+                  <a:t>Picture</a:t>
+                </a:r>
+              </a:p>
+            </p:txBody>
+          </p:sp>
+          <p:sp>
+            <p:nvSpPr>
+              <p:cNvPr id="48" name="Rectangle 47">
+                <a:extLst>
+                  <a:ext uri="{FF2B5EF4-FFF2-40B4-BE49-F238E27FC236}">
+                    <a16:creationId xmlns:a16="http://schemas.microsoft.com/office/drawing/2014/main" id="{A716ECB3-570D-4819-BAAA-31FC022FA15F}"/>
+                  </a:ext>
+                </a:extLst>
+              </p:cNvPr>
+              <p:cNvSpPr/>
+              <p:nvPr/>
+            </p:nvSpPr>
+            <p:spPr>
+              <a:xfrm>
+                <a:off x="1396990" y="8023275"/>
+                <a:ext cx="2349183" cy="844500"/>
+              </a:xfrm>
+              <a:prstGeom prst="rect">
+                <a:avLst/>
+              </a:prstGeom>
+            </p:spPr>
+            <p:style>
+              <a:lnRef idx="2">
+                <a:schemeClr val="dk1"/>
+              </a:lnRef>
+              <a:fillRef idx="1">
+                <a:schemeClr val="lt1"/>
+              </a:fillRef>
+              <a:effectRef idx="0">
+                <a:schemeClr val="dk1"/>
+              </a:effectRef>
+              <a:fontRef idx="minor">
+                <a:schemeClr val="dk1"/>
+              </a:fontRef>
+            </p:style>
+            <p:txBody>
+              <a:bodyPr rtlCol="0" anchor="ctr"/>
+              <a:lstStyle/>
+              <a:p>
+                <a:pPr algn="ctr"/>
+                <a:r>
+                  <a:rPr lang="en-US" dirty="0"/>
+                  <a:t>Picture</a:t>
+                </a:r>
+              </a:p>
+            </p:txBody>
+          </p:sp>
+          <p:sp>
+            <p:nvSpPr>
+              <p:cNvPr id="49" name="Rectangle 48">
+                <a:extLst>
+                  <a:ext uri="{FF2B5EF4-FFF2-40B4-BE49-F238E27FC236}">
+                    <a16:creationId xmlns:a16="http://schemas.microsoft.com/office/drawing/2014/main" id="{46F57E8B-346F-4428-87B2-3CF51BB7EDB5}"/>
+                  </a:ext>
+                </a:extLst>
+              </p:cNvPr>
+              <p:cNvSpPr/>
+              <p:nvPr/>
+            </p:nvSpPr>
+            <p:spPr>
+              <a:xfrm>
+                <a:off x="3746180" y="8023275"/>
+                <a:ext cx="2349183" cy="844500"/>
+              </a:xfrm>
+              <a:prstGeom prst="rect">
+                <a:avLst/>
+              </a:prstGeom>
+            </p:spPr>
+            <p:style>
+              <a:lnRef idx="2">
+                <a:schemeClr val="dk1"/>
+              </a:lnRef>
+              <a:fillRef idx="1">
+                <a:schemeClr val="lt1"/>
+              </a:fillRef>
+              <a:effectRef idx="0">
+                <a:schemeClr val="dk1"/>
+              </a:effectRef>
+              <a:fontRef idx="minor">
+                <a:schemeClr val="dk1"/>
+              </a:fontRef>
+            </p:style>
+            <p:txBody>
+              <a:bodyPr rtlCol="0" anchor="ctr"/>
+              <a:lstStyle/>
+              <a:p>
+                <a:pPr algn="ctr"/>
+                <a:r>
+                  <a:rPr lang="en-US" dirty="0"/>
+                  <a:t>Picture</a:t>
+                </a:r>
+              </a:p>
+            </p:txBody>
+          </p:sp>
+          <p:sp>
+            <p:nvSpPr>
+              <p:cNvPr id="50" name="Rectangle 49">
+                <a:extLst>
+                  <a:ext uri="{FF2B5EF4-FFF2-40B4-BE49-F238E27FC236}">
+                    <a16:creationId xmlns:a16="http://schemas.microsoft.com/office/drawing/2014/main" id="{79195A49-2A7E-406D-B75F-C52AC44585EA}"/>
+                  </a:ext>
+                </a:extLst>
+              </p:cNvPr>
+              <p:cNvSpPr/>
+              <p:nvPr/>
+            </p:nvSpPr>
+            <p:spPr>
+              <a:xfrm>
+                <a:off x="6095206" y="8024114"/>
+                <a:ext cx="2349183" cy="844500"/>
+              </a:xfrm>
+              <a:prstGeom prst="rect">
+                <a:avLst/>
+              </a:prstGeom>
+            </p:spPr>
+            <p:style>
+              <a:lnRef idx="2">
+                <a:schemeClr val="dk1"/>
+              </a:lnRef>
+              <a:fillRef idx="1">
+                <a:schemeClr val="lt1"/>
+              </a:fillRef>
+              <a:effectRef idx="0">
+                <a:schemeClr val="dk1"/>
+              </a:effectRef>
+              <a:fontRef idx="minor">
+                <a:schemeClr val="dk1"/>
+              </a:fontRef>
+            </p:style>
+            <p:txBody>
+              <a:bodyPr rtlCol="0" anchor="ctr"/>
+              <a:lstStyle/>
+              <a:p>
+                <a:pPr algn="ctr"/>
+                <a:r>
+                  <a:rPr lang="en-US" dirty="0"/>
+                  <a:t>Picture</a:t>
+                </a:r>
+              </a:p>
+            </p:txBody>
+          </p:sp>
+          <p:sp>
+            <p:nvSpPr>
+              <p:cNvPr id="51" name="Rectangle 50">
+                <a:extLst>
+                  <a:ext uri="{FF2B5EF4-FFF2-40B4-BE49-F238E27FC236}">
+                    <a16:creationId xmlns:a16="http://schemas.microsoft.com/office/drawing/2014/main" id="{2B4C3642-4D5B-4AD1-9BA2-05899CFA0400}"/>
+                  </a:ext>
+                </a:extLst>
+              </p:cNvPr>
+              <p:cNvSpPr/>
+              <p:nvPr/>
+            </p:nvSpPr>
+            <p:spPr>
+              <a:xfrm>
+                <a:off x="8443918" y="8024114"/>
+                <a:ext cx="2349183" cy="844500"/>
+              </a:xfrm>
+              <a:prstGeom prst="rect">
+                <a:avLst/>
+              </a:prstGeom>
+            </p:spPr>
+            <p:style>
+              <a:lnRef idx="2">
+                <a:schemeClr val="dk1"/>
+              </a:lnRef>
+              <a:fillRef idx="1">
+                <a:schemeClr val="lt1"/>
+              </a:fillRef>
+              <a:effectRef idx="0">
+                <a:schemeClr val="dk1"/>
+              </a:effectRef>
+              <a:fontRef idx="minor">
+                <a:schemeClr val="dk1"/>
+              </a:fontRef>
+            </p:style>
+            <p:txBody>
+              <a:bodyPr rtlCol="0" anchor="ctr"/>
+              <a:lstStyle/>
+              <a:p>
+                <a:pPr algn="ctr"/>
+                <a:r>
+                  <a:rPr lang="en-US" dirty="0"/>
+                  <a:t>Picture</a:t>
+                </a:r>
+              </a:p>
+            </p:txBody>
+          </p:sp>
+          <p:sp>
+            <p:nvSpPr>
+              <p:cNvPr id="52" name="TextBox 51">
+                <a:extLst>
+                  <a:ext uri="{FF2B5EF4-FFF2-40B4-BE49-F238E27FC236}">
+                    <a16:creationId xmlns:a16="http://schemas.microsoft.com/office/drawing/2014/main" id="{AB0F49CD-D62D-448A-BD46-FD152FBE55A0}"/>
+                  </a:ext>
+                </a:extLst>
+              </p:cNvPr>
+              <p:cNvSpPr txBox="1"/>
+              <p:nvPr/>
+            </p:nvSpPr>
+            <p:spPr>
+              <a:xfrm>
+                <a:off x="1396990" y="6553200"/>
+                <a:ext cx="2348492" cy="1415772"/>
+              </a:xfrm>
+              <a:prstGeom prst="rect">
+                <a:avLst/>
+              </a:prstGeom>
+              <a:noFill/>
+            </p:spPr>
+            <p:txBody>
+              <a:bodyPr wrap="square" rtlCol="0">
+                <a:spAutoFit/>
+              </a:bodyPr>
+              <a:lstStyle/>
+              <a:p>
+                <a:r>
+                  <a:rPr lang="en-US" i="1" dirty="0"/>
+                  <a:t>Description</a:t>
+                </a:r>
+                <a:r>
+                  <a:rPr lang="en-US" dirty="0"/>
+                  <a:t> </a:t>
+                </a:r>
+              </a:p>
+              <a:p>
+                <a:r>
+                  <a:rPr lang="en-US" dirty="0"/>
+                  <a:t>Lorem ipsum dolor sit </a:t>
+                </a:r>
+                <a:r>
+                  <a:rPr lang="en-US" dirty="0" err="1"/>
+                  <a:t>amet</a:t>
+                </a:r>
+                <a:r>
+                  <a:rPr lang="en-US" dirty="0"/>
+                  <a:t>, </a:t>
+                </a:r>
+                <a:r>
+                  <a:rPr lang="en-US" dirty="0" err="1"/>
+                  <a:t>consectetur</a:t>
+                </a:r>
+                <a:r>
+                  <a:rPr lang="en-US" dirty="0"/>
+                  <a:t> </a:t>
+                </a:r>
+                <a:r>
+                  <a:rPr lang="en-US" dirty="0" err="1"/>
+                  <a:t>adipiscing</a:t>
+                </a:r>
+                <a:r>
+                  <a:rPr lang="en-US" dirty="0"/>
+                  <a:t> </a:t>
+                </a:r>
+                <a:r>
+                  <a:rPr lang="en-US" dirty="0" err="1"/>
+                  <a:t>elit</a:t>
+                </a:r>
+                <a:r>
+                  <a:rPr lang="en-US" dirty="0"/>
+                  <a:t>.</a:t>
+                </a:r>
+                <a:br>
+                  <a:rPr lang="en-US" dirty="0"/>
+                </a:br>
+                <a:r>
+                  <a:rPr lang="en-US" sz="1200" i="1" dirty="0"/>
+                  <a:t>Distance</a:t>
+                </a:r>
+                <a:endParaRPr lang="en-US" i="1" dirty="0"/>
+              </a:p>
+            </p:txBody>
+          </p:sp>
+          <p:sp>
+            <p:nvSpPr>
+              <p:cNvPr id="53" name="TextBox 52">
+                <a:extLst>
+                  <a:ext uri="{FF2B5EF4-FFF2-40B4-BE49-F238E27FC236}">
+                    <a16:creationId xmlns:a16="http://schemas.microsoft.com/office/drawing/2014/main" id="{3CF74A9E-E799-45E8-9DD7-6D9BA66DAE39}"/>
+                  </a:ext>
+                </a:extLst>
+              </p:cNvPr>
+              <p:cNvSpPr txBox="1"/>
+              <p:nvPr/>
+            </p:nvSpPr>
+            <p:spPr>
+              <a:xfrm>
+                <a:off x="3746525" y="6576707"/>
+                <a:ext cx="2348492" cy="1415772"/>
+              </a:xfrm>
+              <a:prstGeom prst="rect">
+                <a:avLst/>
+              </a:prstGeom>
+              <a:noFill/>
+            </p:spPr>
+            <p:txBody>
+              <a:bodyPr wrap="square" rtlCol="0">
+                <a:spAutoFit/>
+              </a:bodyPr>
+              <a:lstStyle/>
+              <a:p>
+                <a:r>
+                  <a:rPr lang="en-US" i="1" dirty="0"/>
+                  <a:t>Description</a:t>
+                </a:r>
+                <a:r>
+                  <a:rPr lang="en-US" dirty="0"/>
+                  <a:t> </a:t>
+                </a:r>
+              </a:p>
+              <a:p>
+                <a:r>
+                  <a:rPr lang="en-US" dirty="0"/>
+                  <a:t>Lorem ipsum dolor sit </a:t>
+                </a:r>
+                <a:r>
+                  <a:rPr lang="en-US" dirty="0" err="1"/>
+                  <a:t>amet</a:t>
+                </a:r>
+                <a:r>
+                  <a:rPr lang="en-US" dirty="0"/>
+                  <a:t>, </a:t>
+                </a:r>
+                <a:r>
+                  <a:rPr lang="en-US" dirty="0" err="1"/>
+                  <a:t>consectetur</a:t>
+                </a:r>
+                <a:r>
+                  <a:rPr lang="en-US" dirty="0"/>
+                  <a:t> </a:t>
+                </a:r>
+                <a:r>
+                  <a:rPr lang="en-US" dirty="0" err="1"/>
+                  <a:t>adipiscing</a:t>
+                </a:r>
+                <a:r>
+                  <a:rPr lang="en-US" dirty="0"/>
+                  <a:t> </a:t>
+                </a:r>
+                <a:r>
+                  <a:rPr lang="en-US" dirty="0" err="1"/>
+                  <a:t>elit</a:t>
+                </a:r>
+                <a:r>
+                  <a:rPr lang="en-US" dirty="0"/>
+                  <a:t>.</a:t>
+                </a:r>
+                <a:br>
+                  <a:rPr lang="en-US" dirty="0"/>
+                </a:br>
+                <a:r>
+                  <a:rPr lang="en-US" sz="1200" i="1" dirty="0"/>
+                  <a:t>Distance</a:t>
+                </a:r>
+                <a:endParaRPr lang="en-US" i="1" dirty="0"/>
+              </a:p>
+            </p:txBody>
+          </p:sp>
+          <p:sp>
+            <p:nvSpPr>
+              <p:cNvPr id="54" name="TextBox 53">
+                <a:extLst>
+                  <a:ext uri="{FF2B5EF4-FFF2-40B4-BE49-F238E27FC236}">
+                    <a16:creationId xmlns:a16="http://schemas.microsoft.com/office/drawing/2014/main" id="{64DC8CA5-B9E0-4ED6-BADE-A4F655E3ADEC}"/>
+                  </a:ext>
+                </a:extLst>
+              </p:cNvPr>
+              <p:cNvSpPr txBox="1"/>
+              <p:nvPr/>
+            </p:nvSpPr>
+            <p:spPr>
+              <a:xfrm>
+                <a:off x="6095551" y="6553200"/>
+                <a:ext cx="2348492" cy="1415772"/>
+              </a:xfrm>
+              <a:prstGeom prst="rect">
+                <a:avLst/>
+              </a:prstGeom>
+              <a:noFill/>
+            </p:spPr>
+            <p:txBody>
+              <a:bodyPr wrap="square" rtlCol="0">
+                <a:spAutoFit/>
+              </a:bodyPr>
+              <a:lstStyle/>
+              <a:p>
+                <a:r>
+                  <a:rPr lang="en-US" i="1" dirty="0"/>
+                  <a:t>Description</a:t>
+                </a:r>
+                <a:r>
+                  <a:rPr lang="en-US" dirty="0"/>
+                  <a:t> </a:t>
+                </a:r>
+              </a:p>
+              <a:p>
+                <a:r>
+                  <a:rPr lang="en-US" dirty="0"/>
+                  <a:t>Lorem ipsum dolor sit </a:t>
+                </a:r>
+                <a:r>
+                  <a:rPr lang="en-US" dirty="0" err="1"/>
+                  <a:t>amet</a:t>
+                </a:r>
+                <a:r>
+                  <a:rPr lang="en-US" dirty="0"/>
+                  <a:t>, </a:t>
+                </a:r>
+                <a:r>
+                  <a:rPr lang="en-US" dirty="0" err="1"/>
+                  <a:t>consectetur</a:t>
+                </a:r>
+                <a:r>
+                  <a:rPr lang="en-US" dirty="0"/>
+                  <a:t> </a:t>
+                </a:r>
+                <a:r>
+                  <a:rPr lang="en-US" dirty="0" err="1"/>
+                  <a:t>adipiscing</a:t>
+                </a:r>
+                <a:r>
+                  <a:rPr lang="en-US" dirty="0"/>
+                  <a:t> </a:t>
+                </a:r>
+                <a:r>
+                  <a:rPr lang="en-US" dirty="0" err="1"/>
+                  <a:t>elit</a:t>
+                </a:r>
+                <a:r>
+                  <a:rPr lang="en-US" dirty="0"/>
+                  <a:t>.</a:t>
+                </a:r>
+                <a:br>
+                  <a:rPr lang="en-US" dirty="0"/>
+                </a:br>
+                <a:r>
+                  <a:rPr lang="en-US" sz="1200" i="1" dirty="0"/>
+                  <a:t>Distance</a:t>
+                </a:r>
+                <a:endParaRPr lang="en-US" i="1" dirty="0"/>
+              </a:p>
+            </p:txBody>
+          </p:sp>
+          <p:sp>
+            <p:nvSpPr>
+              <p:cNvPr id="55" name="TextBox 54">
+                <a:extLst>
+                  <a:ext uri="{FF2B5EF4-FFF2-40B4-BE49-F238E27FC236}">
+                    <a16:creationId xmlns:a16="http://schemas.microsoft.com/office/drawing/2014/main" id="{816F558C-11F8-4B90-8824-5B5A576AC0E7}"/>
+                  </a:ext>
+                </a:extLst>
+              </p:cNvPr>
+              <p:cNvSpPr txBox="1"/>
+              <p:nvPr/>
+            </p:nvSpPr>
+            <p:spPr>
+              <a:xfrm>
+                <a:off x="8443756" y="6529693"/>
+                <a:ext cx="2348492" cy="1415772"/>
+              </a:xfrm>
+              <a:prstGeom prst="rect">
+                <a:avLst/>
+              </a:prstGeom>
+              <a:noFill/>
+            </p:spPr>
+            <p:txBody>
+              <a:bodyPr wrap="square" rtlCol="0">
+                <a:spAutoFit/>
+              </a:bodyPr>
+              <a:lstStyle/>
+              <a:p>
+                <a:r>
+                  <a:rPr lang="en-US" i="1" dirty="0"/>
+                  <a:t>Description</a:t>
+                </a:r>
+                <a:r>
+                  <a:rPr lang="en-US" dirty="0"/>
+                  <a:t> </a:t>
+                </a:r>
+              </a:p>
+              <a:p>
+                <a:r>
+                  <a:rPr lang="en-US" dirty="0"/>
+                  <a:t>Lorem ipsum dolor sit </a:t>
+                </a:r>
+                <a:r>
+                  <a:rPr lang="en-US" dirty="0" err="1"/>
+                  <a:t>amet</a:t>
+                </a:r>
+                <a:r>
+                  <a:rPr lang="en-US" dirty="0"/>
+                  <a:t>, </a:t>
+                </a:r>
+                <a:r>
+                  <a:rPr lang="en-US" dirty="0" err="1"/>
+                  <a:t>consectetur</a:t>
+                </a:r>
+                <a:r>
+                  <a:rPr lang="en-US" dirty="0"/>
+                  <a:t> </a:t>
+                </a:r>
+                <a:r>
+                  <a:rPr lang="en-US" dirty="0" err="1"/>
+                  <a:t>adipiscing</a:t>
+                </a:r>
+                <a:r>
+                  <a:rPr lang="en-US" dirty="0"/>
+                  <a:t> </a:t>
+                </a:r>
+                <a:r>
+                  <a:rPr lang="en-US" dirty="0" err="1"/>
+                  <a:t>elit</a:t>
+                </a:r>
+                <a:r>
+                  <a:rPr lang="en-US" dirty="0"/>
+                  <a:t>.</a:t>
+                </a:r>
+                <a:br>
+                  <a:rPr lang="en-US" dirty="0"/>
+                </a:br>
+                <a:r>
+                  <a:rPr lang="en-US" sz="1200" i="1" dirty="0"/>
+                  <a:t>Distance</a:t>
+                </a:r>
+                <a:endParaRPr lang="en-US" i="1" dirty="0"/>
+              </a:p>
+            </p:txBody>
+          </p:sp>
+          <p:sp>
+            <p:nvSpPr>
+              <p:cNvPr id="56" name="TextBox 55">
+                <a:extLst>
+                  <a:ext uri="{FF2B5EF4-FFF2-40B4-BE49-F238E27FC236}">
+                    <a16:creationId xmlns:a16="http://schemas.microsoft.com/office/drawing/2014/main" id="{2DE55261-ACFA-474C-8B67-6D1544A6B533}"/>
+                  </a:ext>
+                </a:extLst>
+              </p:cNvPr>
+              <p:cNvSpPr txBox="1"/>
+              <p:nvPr/>
+            </p:nvSpPr>
+            <p:spPr>
+              <a:xfrm>
+                <a:off x="1396901" y="8886329"/>
+                <a:ext cx="2348492" cy="1415772"/>
+              </a:xfrm>
+              <a:prstGeom prst="rect">
+                <a:avLst/>
+              </a:prstGeom>
+              <a:noFill/>
+            </p:spPr>
+            <p:txBody>
+              <a:bodyPr wrap="square" rtlCol="0">
+                <a:spAutoFit/>
+              </a:bodyPr>
+              <a:lstStyle/>
+              <a:p>
+                <a:r>
+                  <a:rPr lang="en-US" i="1" dirty="0"/>
+                  <a:t>Description</a:t>
+                </a:r>
+                <a:r>
+                  <a:rPr lang="en-US" dirty="0"/>
+                  <a:t> </a:t>
+                </a:r>
+              </a:p>
+              <a:p>
+                <a:r>
+                  <a:rPr lang="en-US" dirty="0"/>
+                  <a:t>Lorem ipsum dolor sit </a:t>
+                </a:r>
+                <a:r>
+                  <a:rPr lang="en-US" dirty="0" err="1"/>
+                  <a:t>amet</a:t>
+                </a:r>
+                <a:r>
+                  <a:rPr lang="en-US" dirty="0"/>
+                  <a:t>, </a:t>
+                </a:r>
+                <a:r>
+                  <a:rPr lang="en-US" dirty="0" err="1"/>
+                  <a:t>consectetur</a:t>
+                </a:r>
+                <a:r>
+                  <a:rPr lang="en-US" dirty="0"/>
+                  <a:t> </a:t>
+                </a:r>
+                <a:r>
+                  <a:rPr lang="en-US" dirty="0" err="1"/>
+                  <a:t>adipiscing</a:t>
+                </a:r>
+                <a:r>
+                  <a:rPr lang="en-US" dirty="0"/>
+                  <a:t> </a:t>
+                </a:r>
+                <a:r>
+                  <a:rPr lang="en-US" dirty="0" err="1"/>
+                  <a:t>elit</a:t>
+                </a:r>
+                <a:r>
+                  <a:rPr lang="en-US" dirty="0"/>
+                  <a:t>.</a:t>
+                </a:r>
+                <a:br>
+                  <a:rPr lang="en-US" dirty="0"/>
+                </a:br>
+                <a:r>
+                  <a:rPr lang="en-US" sz="1200" i="1" dirty="0"/>
+                  <a:t>Distance</a:t>
+                </a:r>
+                <a:endParaRPr lang="en-US" i="1" dirty="0"/>
+              </a:p>
+            </p:txBody>
+          </p:sp>
+          <p:sp>
+            <p:nvSpPr>
+              <p:cNvPr id="57" name="TextBox 56">
+                <a:extLst>
+                  <a:ext uri="{FF2B5EF4-FFF2-40B4-BE49-F238E27FC236}">
+                    <a16:creationId xmlns:a16="http://schemas.microsoft.com/office/drawing/2014/main" id="{CDBC6175-541E-4A33-871E-382B52F7A7B7}"/>
+                  </a:ext>
+                </a:extLst>
+              </p:cNvPr>
+              <p:cNvSpPr txBox="1"/>
+              <p:nvPr/>
+            </p:nvSpPr>
+            <p:spPr>
+              <a:xfrm>
+                <a:off x="3744523" y="8881207"/>
+                <a:ext cx="2348492" cy="1415772"/>
+              </a:xfrm>
+              <a:prstGeom prst="rect">
+                <a:avLst/>
+              </a:prstGeom>
+              <a:noFill/>
+            </p:spPr>
+            <p:txBody>
+              <a:bodyPr wrap="square" rtlCol="0">
+                <a:spAutoFit/>
+              </a:bodyPr>
+              <a:lstStyle/>
+              <a:p>
+                <a:r>
+                  <a:rPr lang="en-US" i="1" dirty="0"/>
+                  <a:t>Description</a:t>
+                </a:r>
+                <a:r>
+                  <a:rPr lang="en-US" dirty="0"/>
+                  <a:t> </a:t>
+                </a:r>
+              </a:p>
+              <a:p>
+                <a:r>
+                  <a:rPr lang="en-US" dirty="0"/>
+                  <a:t>Lorem ipsum dolor sit </a:t>
+                </a:r>
+                <a:r>
+                  <a:rPr lang="en-US" dirty="0" err="1"/>
+                  <a:t>amet</a:t>
+                </a:r>
+                <a:r>
+                  <a:rPr lang="en-US" dirty="0"/>
+                  <a:t>, </a:t>
+                </a:r>
+                <a:r>
+                  <a:rPr lang="en-US" dirty="0" err="1"/>
+                  <a:t>consectetur</a:t>
+                </a:r>
+                <a:r>
+                  <a:rPr lang="en-US" dirty="0"/>
+                  <a:t> </a:t>
+                </a:r>
+                <a:r>
+                  <a:rPr lang="en-US" dirty="0" err="1"/>
+                  <a:t>adipiscing</a:t>
+                </a:r>
+                <a:r>
+                  <a:rPr lang="en-US" dirty="0"/>
+                  <a:t> </a:t>
+                </a:r>
+                <a:r>
+                  <a:rPr lang="en-US" dirty="0" err="1"/>
+                  <a:t>elit</a:t>
+                </a:r>
+                <a:r>
+                  <a:rPr lang="en-US" dirty="0"/>
+                  <a:t>.</a:t>
+                </a:r>
+                <a:br>
+                  <a:rPr lang="en-US" dirty="0"/>
+                </a:br>
+                <a:r>
+                  <a:rPr lang="en-US" sz="1200" i="1" dirty="0"/>
+                  <a:t>Distance</a:t>
+                </a:r>
+                <a:endParaRPr lang="en-US" i="1" dirty="0"/>
+              </a:p>
+            </p:txBody>
+          </p:sp>
+          <p:sp>
+            <p:nvSpPr>
+              <p:cNvPr id="58" name="TextBox 57">
+                <a:extLst>
+                  <a:ext uri="{FF2B5EF4-FFF2-40B4-BE49-F238E27FC236}">
+                    <a16:creationId xmlns:a16="http://schemas.microsoft.com/office/drawing/2014/main" id="{26F40003-19C1-4B5C-B436-4608A9DD55BA}"/>
+                  </a:ext>
+                </a:extLst>
+              </p:cNvPr>
+              <p:cNvSpPr txBox="1"/>
+              <p:nvPr/>
+            </p:nvSpPr>
+            <p:spPr>
+              <a:xfrm>
+                <a:off x="6092030" y="8868614"/>
+                <a:ext cx="2348492" cy="1415772"/>
+              </a:xfrm>
+              <a:prstGeom prst="rect">
+                <a:avLst/>
+              </a:prstGeom>
+              <a:noFill/>
+            </p:spPr>
+            <p:txBody>
+              <a:bodyPr wrap="square" rtlCol="0">
+                <a:spAutoFit/>
+              </a:bodyPr>
+              <a:lstStyle/>
+              <a:p>
+                <a:r>
+                  <a:rPr lang="en-US" i="1" dirty="0"/>
+                  <a:t>Description</a:t>
+                </a:r>
+                <a:r>
+                  <a:rPr lang="en-US" dirty="0"/>
+                  <a:t> </a:t>
+                </a:r>
+              </a:p>
+              <a:p>
+                <a:r>
+                  <a:rPr lang="en-US" dirty="0"/>
+                  <a:t>Lorem ipsum dolor sit </a:t>
+                </a:r>
+                <a:r>
+                  <a:rPr lang="en-US" dirty="0" err="1"/>
+                  <a:t>amet</a:t>
+                </a:r>
+                <a:r>
+                  <a:rPr lang="en-US" dirty="0"/>
+                  <a:t>, </a:t>
+                </a:r>
+                <a:r>
+                  <a:rPr lang="en-US" dirty="0" err="1"/>
+                  <a:t>consectetur</a:t>
+                </a:r>
+                <a:r>
+                  <a:rPr lang="en-US" dirty="0"/>
+                  <a:t> </a:t>
+                </a:r>
+                <a:r>
+                  <a:rPr lang="en-US" dirty="0" err="1"/>
+                  <a:t>adipiscing</a:t>
+                </a:r>
+                <a:r>
+                  <a:rPr lang="en-US" dirty="0"/>
+                  <a:t> </a:t>
+                </a:r>
+                <a:r>
+                  <a:rPr lang="en-US" dirty="0" err="1"/>
+                  <a:t>elit</a:t>
+                </a:r>
+                <a:r>
+                  <a:rPr lang="en-US" dirty="0"/>
+                  <a:t>.</a:t>
+                </a:r>
+                <a:br>
+                  <a:rPr lang="en-US" dirty="0"/>
+                </a:br>
+                <a:r>
+                  <a:rPr lang="en-US" sz="1200" i="1" dirty="0"/>
+                  <a:t>Distance</a:t>
+                </a:r>
+                <a:endParaRPr lang="en-US" i="1" dirty="0"/>
+              </a:p>
+            </p:txBody>
+          </p:sp>
+          <p:sp>
+            <p:nvSpPr>
+              <p:cNvPr id="59" name="TextBox 58">
+                <a:extLst>
+                  <a:ext uri="{FF2B5EF4-FFF2-40B4-BE49-F238E27FC236}">
+                    <a16:creationId xmlns:a16="http://schemas.microsoft.com/office/drawing/2014/main" id="{C46FD5B6-3C4A-45BA-9D6D-FBCB509FEE1C}"/>
+                  </a:ext>
+                </a:extLst>
+              </p:cNvPr>
+              <p:cNvSpPr txBox="1"/>
+              <p:nvPr/>
+            </p:nvSpPr>
+            <p:spPr>
+              <a:xfrm>
+                <a:off x="8444888" y="8868614"/>
+                <a:ext cx="2348492" cy="1415772"/>
+              </a:xfrm>
+              <a:prstGeom prst="rect">
+                <a:avLst/>
+              </a:prstGeom>
+              <a:noFill/>
+            </p:spPr>
+            <p:txBody>
+              <a:bodyPr wrap="square" rtlCol="0">
+                <a:spAutoFit/>
+              </a:bodyPr>
+              <a:lstStyle/>
+              <a:p>
+                <a:r>
+                  <a:rPr lang="en-US" i="1" dirty="0"/>
+                  <a:t>Description</a:t>
+                </a:r>
+                <a:r>
+                  <a:rPr lang="en-US" dirty="0"/>
+                  <a:t> </a:t>
+                </a:r>
+              </a:p>
+              <a:p>
+                <a:r>
+                  <a:rPr lang="en-US" dirty="0"/>
+                  <a:t>Lorem ipsum dolor sit </a:t>
+                </a:r>
+                <a:r>
+                  <a:rPr lang="en-US" dirty="0" err="1"/>
+                  <a:t>amet</a:t>
+                </a:r>
+                <a:r>
+                  <a:rPr lang="en-US" dirty="0"/>
+                  <a:t>, </a:t>
+                </a:r>
+                <a:r>
+                  <a:rPr lang="en-US" dirty="0" err="1"/>
+                  <a:t>consectetur</a:t>
+                </a:r>
+                <a:r>
+                  <a:rPr lang="en-US" dirty="0"/>
+                  <a:t> </a:t>
+                </a:r>
+                <a:r>
+                  <a:rPr lang="en-US" dirty="0" err="1"/>
+                  <a:t>adipiscing</a:t>
+                </a:r>
+                <a:r>
+                  <a:rPr lang="en-US" dirty="0"/>
+                  <a:t> </a:t>
+                </a:r>
+                <a:r>
+                  <a:rPr lang="en-US" dirty="0" err="1"/>
+                  <a:t>elit</a:t>
+                </a:r>
+                <a:r>
+                  <a:rPr lang="en-US" dirty="0"/>
+                  <a:t>.</a:t>
+                </a:r>
+                <a:br>
+                  <a:rPr lang="en-US" dirty="0"/>
+                </a:br>
+                <a:r>
+                  <a:rPr lang="en-US" sz="1200" i="1" dirty="0"/>
+                  <a:t>Distance</a:t>
+                </a:r>
+                <a:endParaRPr lang="en-US" i="1" dirty="0"/>
+              </a:p>
+            </p:txBody>
+          </p:sp>
+        </p:grpSp>
+        <p:sp>
+          <p:nvSpPr>
+            <p:cNvPr id="69" name="Rectangle 68">
+              <a:extLst>
+                <a:ext uri="{FF2B5EF4-FFF2-40B4-BE49-F238E27FC236}">
+                  <a16:creationId xmlns:a16="http://schemas.microsoft.com/office/drawing/2014/main" id="{FE74CCF2-AAE5-48D8-ACD5-105E99F8FE10}"/>
+                </a:ext>
+              </a:extLst>
+            </p:cNvPr>
+            <p:cNvSpPr/>
+            <p:nvPr/>
+          </p:nvSpPr>
+          <p:spPr>
+            <a:xfrm>
+              <a:off x="1393594" y="15996349"/>
+              <a:ext cx="2349183" cy="844500"/>
+            </a:xfrm>
+            <a:prstGeom prst="rect">
+              <a:avLst/>
+            </a:prstGeom>
+          </p:spPr>
+          <p:style>
+            <a:lnRef idx="2">
+              <a:schemeClr val="dk1"/>
+            </a:lnRef>
+            <a:fillRef idx="1">
+              <a:schemeClr val="lt1"/>
+            </a:fillRef>
+            <a:effectRef idx="0">
+              <a:schemeClr val="dk1"/>
+            </a:effectRef>
+            <a:fontRef idx="minor">
+              <a:schemeClr val="dk1"/>
+            </a:fontRef>
+          </p:style>
+          <p:txBody>
+            <a:bodyPr rtlCol="0" anchor="ctr"/>
+            <a:lstStyle/>
+            <a:p>
+              <a:pPr algn="ctr"/>
+              <a:r>
+                <a:rPr lang="en-US" dirty="0"/>
+                <a:t>Picture</a:t>
+              </a:r>
+            </a:p>
+          </p:txBody>
+        </p:sp>
+        <p:sp>
+          <p:nvSpPr>
+            <p:cNvPr id="70" name="Rectangle 69">
+              <a:extLst>
+                <a:ext uri="{FF2B5EF4-FFF2-40B4-BE49-F238E27FC236}">
+                  <a16:creationId xmlns:a16="http://schemas.microsoft.com/office/drawing/2014/main" id="{FBBDFDAD-2154-41D0-99FE-8BB9E36694F8}"/>
+                </a:ext>
+              </a:extLst>
+            </p:cNvPr>
+            <p:cNvSpPr/>
+            <p:nvPr/>
+          </p:nvSpPr>
+          <p:spPr>
+            <a:xfrm>
+              <a:off x="3742784" y="15996349"/>
+              <a:ext cx="2349183" cy="844500"/>
+            </a:xfrm>
+            <a:prstGeom prst="rect">
+              <a:avLst/>
+            </a:prstGeom>
+          </p:spPr>
+          <p:style>
+            <a:lnRef idx="2">
+              <a:schemeClr val="dk1"/>
+            </a:lnRef>
+            <a:fillRef idx="1">
+              <a:schemeClr val="lt1"/>
+            </a:fillRef>
+            <a:effectRef idx="0">
+              <a:schemeClr val="dk1"/>
+            </a:effectRef>
+            <a:fontRef idx="minor">
+              <a:schemeClr val="dk1"/>
+            </a:fontRef>
+          </p:style>
+          <p:txBody>
+            <a:bodyPr rtlCol="0" anchor="ctr"/>
+            <a:lstStyle/>
+            <a:p>
+              <a:pPr algn="ctr"/>
+              <a:r>
+                <a:rPr lang="en-US" dirty="0"/>
+                <a:t>Picture</a:t>
+              </a:r>
+            </a:p>
+          </p:txBody>
+        </p:sp>
+        <p:sp>
+          <p:nvSpPr>
+            <p:cNvPr id="71" name="Rectangle 70">
+              <a:extLst>
+                <a:ext uri="{FF2B5EF4-FFF2-40B4-BE49-F238E27FC236}">
+                  <a16:creationId xmlns:a16="http://schemas.microsoft.com/office/drawing/2014/main" id="{DFE7A392-6E37-477B-9F68-8C4522B2A9B1}"/>
+                </a:ext>
+              </a:extLst>
+            </p:cNvPr>
+            <p:cNvSpPr/>
+            <p:nvPr/>
+          </p:nvSpPr>
+          <p:spPr>
+            <a:xfrm>
+              <a:off x="6091810" y="15997188"/>
+              <a:ext cx="2349183" cy="844500"/>
+            </a:xfrm>
+            <a:prstGeom prst="rect">
+              <a:avLst/>
+            </a:prstGeom>
+          </p:spPr>
+          <p:style>
+            <a:lnRef idx="2">
+              <a:schemeClr val="dk1"/>
+            </a:lnRef>
+            <a:fillRef idx="1">
+              <a:schemeClr val="lt1"/>
+            </a:fillRef>
+            <a:effectRef idx="0">
+              <a:schemeClr val="dk1"/>
+            </a:effectRef>
+            <a:fontRef idx="minor">
+              <a:schemeClr val="dk1"/>
+            </a:fontRef>
+          </p:style>
+          <p:txBody>
+            <a:bodyPr rtlCol="0" anchor="ctr"/>
+            <a:lstStyle/>
+            <a:p>
+              <a:pPr algn="ctr"/>
+              <a:r>
+                <a:rPr lang="en-US" dirty="0"/>
+                <a:t>Picture</a:t>
+              </a:r>
+            </a:p>
+          </p:txBody>
+        </p:sp>
+        <p:sp>
+          <p:nvSpPr>
+            <p:cNvPr id="72" name="Rectangle 71">
+              <a:extLst>
+                <a:ext uri="{FF2B5EF4-FFF2-40B4-BE49-F238E27FC236}">
+                  <a16:creationId xmlns:a16="http://schemas.microsoft.com/office/drawing/2014/main" id="{50A39FEA-067A-4E01-8DAD-1A8039C4D6A0}"/>
+                </a:ext>
+              </a:extLst>
+            </p:cNvPr>
+            <p:cNvSpPr/>
+            <p:nvPr/>
+          </p:nvSpPr>
+          <p:spPr>
+            <a:xfrm>
+              <a:off x="8440522" y="15997188"/>
+              <a:ext cx="2349183" cy="844500"/>
+            </a:xfrm>
+            <a:prstGeom prst="rect">
+              <a:avLst/>
+            </a:prstGeom>
+          </p:spPr>
+          <p:style>
+            <a:lnRef idx="2">
+              <a:schemeClr val="dk1"/>
+            </a:lnRef>
+            <a:fillRef idx="1">
+              <a:schemeClr val="lt1"/>
+            </a:fillRef>
+            <a:effectRef idx="0">
+              <a:schemeClr val="dk1"/>
+            </a:effectRef>
+            <a:fontRef idx="minor">
+              <a:schemeClr val="dk1"/>
+            </a:fontRef>
+          </p:style>
+          <p:txBody>
+            <a:bodyPr rtlCol="0" anchor="ctr"/>
+            <a:lstStyle/>
+            <a:p>
+              <a:pPr algn="ctr"/>
+              <a:r>
+                <a:rPr lang="en-US" dirty="0"/>
+                <a:t>Picture</a:t>
+              </a:r>
+            </a:p>
+          </p:txBody>
+        </p:sp>
+        <p:sp>
+          <p:nvSpPr>
+            <p:cNvPr id="73" name="TextBox 72">
+              <a:extLst>
+                <a:ext uri="{FF2B5EF4-FFF2-40B4-BE49-F238E27FC236}">
+                  <a16:creationId xmlns:a16="http://schemas.microsoft.com/office/drawing/2014/main" id="{30E8EDB1-EBF8-4001-AFDE-D09592154347}"/>
+                </a:ext>
+              </a:extLst>
+            </p:cNvPr>
+            <p:cNvSpPr txBox="1"/>
+            <p:nvPr/>
+          </p:nvSpPr>
+          <p:spPr>
+            <a:xfrm>
+              <a:off x="1393505" y="16859403"/>
+              <a:ext cx="2348492" cy="1415772"/>
+            </a:xfrm>
+            <a:prstGeom prst="rect">
+              <a:avLst/>
+            </a:prstGeom>
+            <a:noFill/>
+            <a:ln>
+              <a:solidFill>
+                <a:schemeClr val="tx1"/>
+              </a:solidFill>
+            </a:ln>
+          </p:spPr>
+          <p:txBody>
+            <a:bodyPr wrap="square" rtlCol="0">
+              <a:spAutoFit/>
+            </a:bodyPr>
+            <a:lstStyle/>
+            <a:p>
+              <a:r>
+                <a:rPr lang="en-US" i="1" dirty="0"/>
+                <a:t>Description</a:t>
+              </a:r>
+              <a:r>
+                <a:rPr lang="en-US" dirty="0"/>
+                <a:t> </a:t>
+              </a:r>
+            </a:p>
+            <a:p>
+              <a:r>
+                <a:rPr lang="en-US" dirty="0"/>
+                <a:t>Lorem ipsum dolor sit </a:t>
+              </a:r>
+              <a:r>
+                <a:rPr lang="en-US" dirty="0" err="1"/>
+                <a:t>amet</a:t>
+              </a:r>
+              <a:r>
+                <a:rPr lang="en-US" dirty="0"/>
+                <a:t>, </a:t>
+              </a:r>
+              <a:r>
+                <a:rPr lang="en-US" dirty="0" err="1"/>
+                <a:t>consectetur</a:t>
+              </a:r>
+              <a:r>
+                <a:rPr lang="en-US" dirty="0"/>
+                <a:t> </a:t>
+              </a:r>
+              <a:r>
+                <a:rPr lang="en-US" dirty="0" err="1"/>
+                <a:t>adipiscing</a:t>
+              </a:r>
+              <a:r>
+                <a:rPr lang="en-US" dirty="0"/>
+                <a:t> </a:t>
+              </a:r>
+              <a:r>
+                <a:rPr lang="en-US" dirty="0" err="1"/>
+                <a:t>elit</a:t>
+              </a:r>
+              <a:r>
+                <a:rPr lang="en-US" dirty="0"/>
+                <a:t>.</a:t>
+              </a:r>
+              <a:br>
+                <a:rPr lang="en-US" dirty="0"/>
+              </a:br>
+              <a:r>
+                <a:rPr lang="en-US" sz="1200" i="1" dirty="0"/>
+                <a:t>Distance</a:t>
+              </a:r>
+              <a:endParaRPr lang="en-US" i="1" dirty="0"/>
+            </a:p>
+          </p:txBody>
+        </p:sp>
+        <p:sp>
+          <p:nvSpPr>
+            <p:cNvPr id="74" name="TextBox 73">
+              <a:extLst>
+                <a:ext uri="{FF2B5EF4-FFF2-40B4-BE49-F238E27FC236}">
+                  <a16:creationId xmlns:a16="http://schemas.microsoft.com/office/drawing/2014/main" id="{48F3EBF6-176A-45F4-A63B-A69C8F27C887}"/>
+                </a:ext>
+              </a:extLst>
+            </p:cNvPr>
+            <p:cNvSpPr txBox="1"/>
+            <p:nvPr/>
+          </p:nvSpPr>
+          <p:spPr>
+            <a:xfrm>
+              <a:off x="3741127" y="16854281"/>
+              <a:ext cx="2348492" cy="1415772"/>
+            </a:xfrm>
+            <a:prstGeom prst="rect">
+              <a:avLst/>
+            </a:prstGeom>
+            <a:noFill/>
+            <a:ln>
+              <a:solidFill>
+                <a:schemeClr val="tx1"/>
+              </a:solidFill>
+            </a:ln>
+          </p:spPr>
+          <p:txBody>
+            <a:bodyPr wrap="square" rtlCol="0">
+              <a:spAutoFit/>
+            </a:bodyPr>
+            <a:lstStyle/>
+            <a:p>
+              <a:r>
+                <a:rPr lang="en-US" i="1" dirty="0"/>
+                <a:t>Description</a:t>
+              </a:r>
+              <a:r>
+                <a:rPr lang="en-US" dirty="0"/>
+                <a:t> </a:t>
+              </a:r>
+            </a:p>
+            <a:p>
+              <a:r>
+                <a:rPr lang="en-US" dirty="0"/>
+                <a:t>Lorem ipsum dolor sit </a:t>
+              </a:r>
+              <a:r>
+                <a:rPr lang="en-US" dirty="0" err="1"/>
+                <a:t>amet</a:t>
+              </a:r>
+              <a:r>
+                <a:rPr lang="en-US" dirty="0"/>
+                <a:t>, </a:t>
+              </a:r>
+              <a:r>
+                <a:rPr lang="en-US" dirty="0" err="1"/>
+                <a:t>consectetur</a:t>
+              </a:r>
+              <a:r>
+                <a:rPr lang="en-US" dirty="0"/>
+                <a:t> </a:t>
+              </a:r>
+              <a:r>
+                <a:rPr lang="en-US" dirty="0" err="1"/>
+                <a:t>adipiscing</a:t>
+              </a:r>
+              <a:r>
+                <a:rPr lang="en-US" dirty="0"/>
+                <a:t> </a:t>
+              </a:r>
+              <a:r>
+                <a:rPr lang="en-US" dirty="0" err="1"/>
+                <a:t>elit</a:t>
+              </a:r>
+              <a:r>
+                <a:rPr lang="en-US" dirty="0"/>
+                <a:t>.</a:t>
+              </a:r>
+              <a:br>
+                <a:rPr lang="en-US" dirty="0"/>
+              </a:br>
+              <a:r>
+                <a:rPr lang="en-US" sz="1200" i="1" dirty="0"/>
+                <a:t>Distance</a:t>
+              </a:r>
+              <a:endParaRPr lang="en-US" i="1" dirty="0"/>
+            </a:p>
+          </p:txBody>
+        </p:sp>
+        <p:sp>
+          <p:nvSpPr>
+            <p:cNvPr id="75" name="TextBox 74">
+              <a:extLst>
+                <a:ext uri="{FF2B5EF4-FFF2-40B4-BE49-F238E27FC236}">
+                  <a16:creationId xmlns:a16="http://schemas.microsoft.com/office/drawing/2014/main" id="{637E105F-15DF-484E-90F1-A66B4D471392}"/>
+                </a:ext>
+              </a:extLst>
+            </p:cNvPr>
+            <p:cNvSpPr txBox="1"/>
+            <p:nvPr/>
+          </p:nvSpPr>
+          <p:spPr>
+            <a:xfrm>
+              <a:off x="6088634" y="16841688"/>
+              <a:ext cx="2348492" cy="1415772"/>
+            </a:xfrm>
+            <a:prstGeom prst="rect">
+              <a:avLst/>
+            </a:prstGeom>
+            <a:noFill/>
+            <a:ln>
+              <a:solidFill>
+                <a:schemeClr val="tx1"/>
+              </a:solidFill>
+            </a:ln>
+          </p:spPr>
+          <p:txBody>
+            <a:bodyPr wrap="square" rtlCol="0">
+              <a:spAutoFit/>
+            </a:bodyPr>
+            <a:lstStyle/>
+            <a:p>
+              <a:r>
+                <a:rPr lang="en-US" i="1" dirty="0"/>
+                <a:t>Description</a:t>
+              </a:r>
+              <a:r>
+                <a:rPr lang="en-US" dirty="0"/>
+                <a:t> </a:t>
+              </a:r>
+            </a:p>
+            <a:p>
+              <a:r>
+                <a:rPr lang="en-US" dirty="0"/>
+                <a:t>Lorem ipsum dolor sit </a:t>
+              </a:r>
+              <a:r>
+                <a:rPr lang="en-US" dirty="0" err="1"/>
+                <a:t>amet</a:t>
+              </a:r>
+              <a:r>
+                <a:rPr lang="en-US" dirty="0"/>
+                <a:t>, </a:t>
+              </a:r>
+              <a:r>
+                <a:rPr lang="en-US" dirty="0" err="1"/>
+                <a:t>consectetur</a:t>
+              </a:r>
+              <a:r>
+                <a:rPr lang="en-US" dirty="0"/>
+                <a:t> </a:t>
+              </a:r>
+              <a:r>
+                <a:rPr lang="en-US" dirty="0" err="1"/>
+                <a:t>adipiscing</a:t>
+              </a:r>
+              <a:r>
+                <a:rPr lang="en-US" dirty="0"/>
+                <a:t> </a:t>
+              </a:r>
+              <a:r>
+                <a:rPr lang="en-US" dirty="0" err="1"/>
+                <a:t>elit</a:t>
+              </a:r>
+              <a:r>
+                <a:rPr lang="en-US" dirty="0"/>
+                <a:t>.</a:t>
+              </a:r>
+              <a:br>
+                <a:rPr lang="en-US" dirty="0"/>
+              </a:br>
+              <a:r>
+                <a:rPr lang="en-US" sz="1200" i="1" dirty="0"/>
+                <a:t>Distance</a:t>
+              </a:r>
+              <a:endParaRPr lang="en-US" i="1" dirty="0"/>
+            </a:p>
+          </p:txBody>
+        </p:sp>
+        <p:sp>
+          <p:nvSpPr>
+            <p:cNvPr id="76" name="TextBox 75">
+              <a:extLst>
+                <a:ext uri="{FF2B5EF4-FFF2-40B4-BE49-F238E27FC236}">
+                  <a16:creationId xmlns:a16="http://schemas.microsoft.com/office/drawing/2014/main" id="{2970ECDD-A269-4DD9-ADD6-9E276AFAF4FE}"/>
+                </a:ext>
+              </a:extLst>
+            </p:cNvPr>
+            <p:cNvSpPr txBox="1"/>
+            <p:nvPr/>
+          </p:nvSpPr>
+          <p:spPr>
+            <a:xfrm>
+              <a:off x="8441492" y="16841688"/>
+              <a:ext cx="2348492" cy="1415772"/>
+            </a:xfrm>
+            <a:prstGeom prst="rect">
+              <a:avLst/>
+            </a:prstGeom>
+            <a:noFill/>
+            <a:ln>
+              <a:solidFill>
+                <a:schemeClr val="tx1"/>
+              </a:solidFill>
+            </a:ln>
+          </p:spPr>
+          <p:txBody>
+            <a:bodyPr wrap="square" rtlCol="0">
+              <a:spAutoFit/>
+            </a:bodyPr>
+            <a:lstStyle/>
+            <a:p>
+              <a:r>
+                <a:rPr lang="en-US" i="1" dirty="0"/>
+                <a:t>Description</a:t>
+              </a:r>
+              <a:r>
+                <a:rPr lang="en-US" dirty="0"/>
+                <a:t> </a:t>
+              </a:r>
+            </a:p>
+            <a:p>
+              <a:r>
+                <a:rPr lang="en-US" dirty="0"/>
+                <a:t>Lorem ipsum dolor sit </a:t>
+              </a:r>
+              <a:r>
+                <a:rPr lang="en-US" dirty="0" err="1"/>
+                <a:t>amet</a:t>
+              </a:r>
+              <a:r>
+                <a:rPr lang="en-US" dirty="0"/>
+                <a:t>, </a:t>
+              </a:r>
+              <a:r>
+                <a:rPr lang="en-US" dirty="0" err="1"/>
+                <a:t>consectetur</a:t>
+              </a:r>
+              <a:r>
+                <a:rPr lang="en-US" dirty="0"/>
+                <a:t> </a:t>
+              </a:r>
+              <a:r>
+                <a:rPr lang="en-US" dirty="0" err="1"/>
+                <a:t>adipiscing</a:t>
+              </a:r>
+              <a:r>
+                <a:rPr lang="en-US" dirty="0"/>
+                <a:t> </a:t>
+              </a:r>
+              <a:r>
+                <a:rPr lang="en-US" dirty="0" err="1"/>
+                <a:t>elit</a:t>
+              </a:r>
+              <a:r>
+                <a:rPr lang="en-US" dirty="0"/>
+                <a:t>.</a:t>
+              </a:r>
+              <a:br>
+                <a:rPr lang="en-US" dirty="0"/>
+              </a:br>
+              <a:r>
+                <a:rPr lang="en-US" sz="1200" i="1" dirty="0"/>
+                <a:t>Distance</a:t>
+              </a:r>
+              <a:endParaRPr lang="en-US" i="1" dirty="0"/>
+            </a:p>
+          </p:txBody>
+        </p:sp>
+      </p:grpSp>
+    </p:spTree>
+    <p:extLst>
+      <p:ext uri="{BB962C8B-B14F-4D97-AF65-F5344CB8AC3E}">
+        <p14:creationId xmlns:p14="http://schemas.microsoft.com/office/powerpoint/2010/main" val="2154886787"/>
+      </p:ext>
+    </p:extLst>
+  </p:cSld>
+  <p:clrMapOvr>
+    <a:masterClrMapping/>
+  </p:clrMapOvr>
+</p:sld>
+</file>
+
 <file path=ppt/theme/theme1.xml><?xml version="1.0" encoding="utf-8"?>
 <a:theme xmlns:a="http://schemas.openxmlformats.org/drawingml/2006/main" name="Office Theme">
   <a:themeElements>

</xml_diff>

<commit_message>
Issue #1 - adding design for About the Area and Rersevation
</commit_message>
<xml_diff>
--- a/documentation/flow_diagrams/Diagrams.pptx
+++ b/documentation/flow_diagrams/Diagrams.pptx
@@ -14,6 +14,7 @@
     <p:sldId id="263" r:id="rId8"/>
     <p:sldId id="264" r:id="rId9"/>
     <p:sldId id="265" r:id="rId10"/>
+    <p:sldId id="266" r:id="rId11"/>
   </p:sldIdLst>
   <p:sldSz cx="12192000" cy="6858000"/>
   <p:notesSz cx="6858000" cy="9144000"/>
@@ -4360,6 +4361,1372 @@
 </p:sld>
 </file>
 
+<file path=ppt/slides/slide10.xml><?xml version="1.0" encoding="utf-8"?>
+<p:sld xmlns:a="http://schemas.openxmlformats.org/drawingml/2006/main" xmlns:r="http://schemas.openxmlformats.org/officeDocument/2006/relationships" xmlns:p="http://schemas.openxmlformats.org/presentationml/2006/main">
+  <p:cSld>
+    <p:spTree>
+      <p:nvGrpSpPr>
+        <p:cNvPr id="1" name=""/>
+        <p:cNvGrpSpPr/>
+        <p:nvPr/>
+      </p:nvGrpSpPr>
+      <p:grpSpPr>
+        <a:xfrm>
+          <a:off x="0" y="0"/>
+          <a:ext cx="0" cy="0"/>
+          <a:chOff x="0" y="0"/>
+          <a:chExt cx="0" cy="0"/>
+        </a:xfrm>
+      </p:grpSpPr>
+      <p:sp>
+        <p:nvSpPr>
+          <p:cNvPr id="8" name="TextBox 7">
+            <a:extLst>
+              <a:ext uri="{FF2B5EF4-FFF2-40B4-BE49-F238E27FC236}">
+                <a16:creationId xmlns:a16="http://schemas.microsoft.com/office/drawing/2014/main" id="{6B8468B5-7310-4B26-889D-AF6B42A4512C}"/>
+              </a:ext>
+            </a:extLst>
+          </p:cNvPr>
+          <p:cNvSpPr txBox="1"/>
+          <p:nvPr/>
+        </p:nvSpPr>
+        <p:spPr>
+          <a:xfrm>
+            <a:off x="0" y="304800"/>
+            <a:ext cx="12192000" cy="707886"/>
+          </a:xfrm>
+          <a:prstGeom prst="rect">
+            <a:avLst/>
+          </a:prstGeom>
+          <a:noFill/>
+        </p:spPr>
+        <p:txBody>
+          <a:bodyPr wrap="square" rtlCol="0">
+            <a:spAutoFit/>
+          </a:bodyPr>
+          <a:lstStyle/>
+          <a:p>
+            <a:pPr algn="ctr"/>
+            <a:r>
+              <a:rPr lang="en-US" sz="4000" b="1" i="1" dirty="0"/>
+              <a:t>Reservation</a:t>
+            </a:r>
+            <a:endParaRPr lang="en-US" b="1" i="1" dirty="0"/>
+          </a:p>
+        </p:txBody>
+      </p:sp>
+      <p:grpSp>
+        <p:nvGrpSpPr>
+          <p:cNvPr id="91" name="Group 90">
+            <a:extLst>
+              <a:ext uri="{FF2B5EF4-FFF2-40B4-BE49-F238E27FC236}">
+                <a16:creationId xmlns:a16="http://schemas.microsoft.com/office/drawing/2014/main" id="{62E0B188-9162-40BE-A174-008421C1EF70}"/>
+              </a:ext>
+            </a:extLst>
+          </p:cNvPr>
+          <p:cNvGrpSpPr/>
+          <p:nvPr/>
+        </p:nvGrpSpPr>
+        <p:grpSpPr>
+          <a:xfrm>
+            <a:off x="1396999" y="1242248"/>
+            <a:ext cx="9429749" cy="11502202"/>
+            <a:chOff x="1396999" y="1242248"/>
+            <a:chExt cx="9429749" cy="11502202"/>
+          </a:xfrm>
+        </p:grpSpPr>
+        <p:sp>
+          <p:nvSpPr>
+            <p:cNvPr id="61" name="Rectangle 60">
+              <a:extLst>
+                <a:ext uri="{FF2B5EF4-FFF2-40B4-BE49-F238E27FC236}">
+                  <a16:creationId xmlns:a16="http://schemas.microsoft.com/office/drawing/2014/main" id="{9FE20422-542D-4D09-BA13-C9806EAF6F6E}"/>
+                </a:ext>
+              </a:extLst>
+            </p:cNvPr>
+            <p:cNvSpPr/>
+            <p:nvPr/>
+          </p:nvSpPr>
+          <p:spPr>
+            <a:xfrm>
+              <a:off x="1397000" y="1242249"/>
+              <a:ext cx="9398000" cy="11502201"/>
+            </a:xfrm>
+            <a:prstGeom prst="rect">
+              <a:avLst/>
+            </a:prstGeom>
+          </p:spPr>
+          <p:style>
+            <a:lnRef idx="2">
+              <a:schemeClr val="dk1"/>
+            </a:lnRef>
+            <a:fillRef idx="1">
+              <a:schemeClr val="lt1"/>
+            </a:fillRef>
+            <a:effectRef idx="0">
+              <a:schemeClr val="dk1"/>
+            </a:effectRef>
+            <a:fontRef idx="minor">
+              <a:schemeClr val="dk1"/>
+            </a:fontRef>
+          </p:style>
+          <p:txBody>
+            <a:bodyPr rtlCol="0" anchor="ctr"/>
+            <a:lstStyle/>
+            <a:p>
+              <a:pPr algn="ctr"/>
+              <a:endParaRPr lang="en-US" dirty="0"/>
+            </a:p>
+          </p:txBody>
+        </p:sp>
+        <p:sp>
+          <p:nvSpPr>
+            <p:cNvPr id="3" name="Rectangle 2">
+              <a:extLst>
+                <a:ext uri="{FF2B5EF4-FFF2-40B4-BE49-F238E27FC236}">
+                  <a16:creationId xmlns:a16="http://schemas.microsoft.com/office/drawing/2014/main" id="{F324A8B1-078C-46FB-B15D-74A333F5B44E}"/>
+                </a:ext>
+              </a:extLst>
+            </p:cNvPr>
+            <p:cNvSpPr/>
+            <p:nvPr/>
+          </p:nvSpPr>
+          <p:spPr>
+            <a:xfrm>
+              <a:off x="2501898" y="3103117"/>
+              <a:ext cx="2368550" cy="435926"/>
+            </a:xfrm>
+            <a:prstGeom prst="rect">
+              <a:avLst/>
+            </a:prstGeom>
+            <a:solidFill>
+              <a:schemeClr val="bg1"/>
+            </a:solidFill>
+            <a:ln>
+              <a:solidFill>
+                <a:schemeClr val="tx1"/>
+              </a:solidFill>
+            </a:ln>
+          </p:spPr>
+          <p:style>
+            <a:lnRef idx="2">
+              <a:schemeClr val="accent1">
+                <a:shade val="50000"/>
+              </a:schemeClr>
+            </a:lnRef>
+            <a:fillRef idx="1">
+              <a:schemeClr val="accent1"/>
+            </a:fillRef>
+            <a:effectRef idx="0">
+              <a:schemeClr val="accent1"/>
+            </a:effectRef>
+            <a:fontRef idx="minor">
+              <a:schemeClr val="lt1"/>
+            </a:fontRef>
+          </p:style>
+          <p:txBody>
+            <a:bodyPr rtlCol="0" anchor="ctr"/>
+            <a:lstStyle/>
+            <a:p>
+              <a:pPr algn="ctr"/>
+              <a:r>
+                <a:rPr lang="en-US" dirty="0">
+                  <a:solidFill>
+                    <a:schemeClr val="tx1"/>
+                  </a:solidFill>
+                </a:rPr>
+                <a:t>Check In</a:t>
+              </a:r>
+            </a:p>
+          </p:txBody>
+        </p:sp>
+        <p:sp>
+          <p:nvSpPr>
+            <p:cNvPr id="63" name="Rectangle 62">
+              <a:extLst>
+                <a:ext uri="{FF2B5EF4-FFF2-40B4-BE49-F238E27FC236}">
+                  <a16:creationId xmlns:a16="http://schemas.microsoft.com/office/drawing/2014/main" id="{EB97E290-DFF1-4D65-ACA7-773B03FF95C5}"/>
+                </a:ext>
+              </a:extLst>
+            </p:cNvPr>
+            <p:cNvSpPr/>
+            <p:nvPr/>
+          </p:nvSpPr>
+          <p:spPr>
+            <a:xfrm>
+              <a:off x="1396999" y="1304345"/>
+              <a:ext cx="7029449" cy="369332"/>
+            </a:xfrm>
+            <a:prstGeom prst="rect">
+              <a:avLst/>
+            </a:prstGeom>
+          </p:spPr>
+          <p:txBody>
+            <a:bodyPr wrap="square">
+              <a:spAutoFit/>
+            </a:bodyPr>
+            <a:lstStyle/>
+            <a:p>
+              <a:pPr algn="ctr"/>
+              <a:r>
+                <a:rPr lang="en-US" dirty="0"/>
+                <a:t>Place a reservation request: </a:t>
+              </a:r>
+            </a:p>
+          </p:txBody>
+        </p:sp>
+        <p:sp>
+          <p:nvSpPr>
+            <p:cNvPr id="64" name="Rectangle 63">
+              <a:extLst>
+                <a:ext uri="{FF2B5EF4-FFF2-40B4-BE49-F238E27FC236}">
+                  <a16:creationId xmlns:a16="http://schemas.microsoft.com/office/drawing/2014/main" id="{613474FA-71F9-4437-90E4-F04375936E4F}"/>
+                </a:ext>
+              </a:extLst>
+            </p:cNvPr>
+            <p:cNvSpPr/>
+            <p:nvPr/>
+          </p:nvSpPr>
+          <p:spPr>
+            <a:xfrm>
+              <a:off x="5111754" y="3103117"/>
+              <a:ext cx="2368550" cy="435926"/>
+            </a:xfrm>
+            <a:prstGeom prst="rect">
+              <a:avLst/>
+            </a:prstGeom>
+            <a:solidFill>
+              <a:schemeClr val="bg1"/>
+            </a:solidFill>
+            <a:ln>
+              <a:solidFill>
+                <a:schemeClr val="tx1"/>
+              </a:solidFill>
+            </a:ln>
+          </p:spPr>
+          <p:style>
+            <a:lnRef idx="2">
+              <a:schemeClr val="accent1">
+                <a:shade val="50000"/>
+              </a:schemeClr>
+            </a:lnRef>
+            <a:fillRef idx="1">
+              <a:schemeClr val="accent1"/>
+            </a:fillRef>
+            <a:effectRef idx="0">
+              <a:schemeClr val="accent1"/>
+            </a:effectRef>
+            <a:fontRef idx="minor">
+              <a:schemeClr val="lt1"/>
+            </a:fontRef>
+          </p:style>
+          <p:txBody>
+            <a:bodyPr rtlCol="0" anchor="ctr"/>
+            <a:lstStyle/>
+            <a:p>
+              <a:pPr algn="ctr"/>
+              <a:r>
+                <a:rPr lang="en-US" dirty="0">
+                  <a:solidFill>
+                    <a:schemeClr val="tx1"/>
+                  </a:solidFill>
+                </a:rPr>
+                <a:t>Check Out</a:t>
+              </a:r>
+            </a:p>
+          </p:txBody>
+        </p:sp>
+        <p:sp>
+          <p:nvSpPr>
+            <p:cNvPr id="65" name="Rectangle 64">
+              <a:extLst>
+                <a:ext uri="{FF2B5EF4-FFF2-40B4-BE49-F238E27FC236}">
+                  <a16:creationId xmlns:a16="http://schemas.microsoft.com/office/drawing/2014/main" id="{B846B21A-06D8-4420-95A4-14F4C13C9745}"/>
+                </a:ext>
+              </a:extLst>
+            </p:cNvPr>
+            <p:cNvSpPr/>
+            <p:nvPr/>
+          </p:nvSpPr>
+          <p:spPr>
+            <a:xfrm>
+              <a:off x="8426449" y="1242248"/>
+              <a:ext cx="2368550" cy="11502201"/>
+            </a:xfrm>
+            <a:prstGeom prst="rect">
+              <a:avLst/>
+            </a:prstGeom>
+          </p:spPr>
+          <p:style>
+            <a:lnRef idx="2">
+              <a:schemeClr val="dk1"/>
+            </a:lnRef>
+            <a:fillRef idx="1">
+              <a:schemeClr val="lt1"/>
+            </a:fillRef>
+            <a:effectRef idx="0">
+              <a:schemeClr val="dk1"/>
+            </a:effectRef>
+            <a:fontRef idx="minor">
+              <a:schemeClr val="dk1"/>
+            </a:fontRef>
+          </p:style>
+          <p:txBody>
+            <a:bodyPr rtlCol="0" anchor="ctr"/>
+            <a:lstStyle/>
+            <a:p>
+              <a:pPr algn="ctr"/>
+              <a:endParaRPr lang="en-US" dirty="0"/>
+            </a:p>
+          </p:txBody>
+        </p:sp>
+        <p:sp>
+          <p:nvSpPr>
+            <p:cNvPr id="66" name="Rectangle 65">
+              <a:extLst>
+                <a:ext uri="{FF2B5EF4-FFF2-40B4-BE49-F238E27FC236}">
+                  <a16:creationId xmlns:a16="http://schemas.microsoft.com/office/drawing/2014/main" id="{780ED79C-EB3B-418D-A8F7-8DCD14E9C37D}"/>
+                </a:ext>
+              </a:extLst>
+            </p:cNvPr>
+            <p:cNvSpPr/>
+            <p:nvPr/>
+          </p:nvSpPr>
+          <p:spPr>
+            <a:xfrm>
+              <a:off x="8458198" y="1334282"/>
+              <a:ext cx="2368550" cy="369332"/>
+            </a:xfrm>
+            <a:prstGeom prst="rect">
+              <a:avLst/>
+            </a:prstGeom>
+          </p:spPr>
+          <p:txBody>
+            <a:bodyPr wrap="square">
+              <a:spAutoFit/>
+            </a:bodyPr>
+            <a:lstStyle/>
+            <a:p>
+              <a:pPr algn="ctr"/>
+              <a:r>
+                <a:rPr lang="en-US" i="1" dirty="0"/>
+                <a:t>Request Summary </a:t>
+              </a:r>
+            </a:p>
+          </p:txBody>
+        </p:sp>
+        <p:sp>
+          <p:nvSpPr>
+            <p:cNvPr id="67" name="Rectangle 66">
+              <a:extLst>
+                <a:ext uri="{FF2B5EF4-FFF2-40B4-BE49-F238E27FC236}">
+                  <a16:creationId xmlns:a16="http://schemas.microsoft.com/office/drawing/2014/main" id="{ED840E37-E5E7-4C36-99A7-20BDBCA5A5BE}"/>
+                </a:ext>
+              </a:extLst>
+            </p:cNvPr>
+            <p:cNvSpPr/>
+            <p:nvPr/>
+          </p:nvSpPr>
+          <p:spPr>
+            <a:xfrm>
+              <a:off x="8458198" y="1747375"/>
+              <a:ext cx="2314569" cy="3139321"/>
+            </a:xfrm>
+            <a:prstGeom prst="rect">
+              <a:avLst/>
+            </a:prstGeom>
+          </p:spPr>
+          <p:txBody>
+            <a:bodyPr wrap="square">
+              <a:spAutoFit/>
+            </a:bodyPr>
+            <a:lstStyle/>
+            <a:p>
+              <a:pPr algn="ctr"/>
+              <a:r>
+                <a:rPr lang="en-US" dirty="0"/>
+                <a:t>Check in date: dd/mm/</a:t>
+              </a:r>
+              <a:r>
+                <a:rPr lang="en-US" dirty="0" err="1"/>
+                <a:t>yyyy</a:t>
+              </a:r>
+              <a:endParaRPr lang="en-US" dirty="0"/>
+            </a:p>
+            <a:p>
+              <a:pPr algn="ctr"/>
+              <a:r>
+                <a:rPr lang="en-US" dirty="0"/>
+                <a:t>Check out date:</a:t>
+              </a:r>
+              <a:br>
+                <a:rPr lang="en-US" dirty="0"/>
+              </a:br>
+              <a:r>
+                <a:rPr lang="en-US" dirty="0"/>
+                <a:t>dd/mm/</a:t>
+              </a:r>
+              <a:r>
+                <a:rPr lang="en-US" dirty="0" err="1"/>
+                <a:t>yyyy</a:t>
+              </a:r>
+              <a:br>
+                <a:rPr lang="en-US" dirty="0"/>
+              </a:br>
+              <a:r>
+                <a:rPr lang="en-US" dirty="0"/>
+                <a:t>Name: </a:t>
+              </a:r>
+              <a:br>
+                <a:rPr lang="en-US" dirty="0"/>
+              </a:br>
+              <a:r>
+                <a:rPr lang="en-US" dirty="0"/>
+                <a:t>Country</a:t>
+              </a:r>
+              <a:br>
+                <a:rPr lang="en-US" dirty="0"/>
+              </a:br>
+              <a:r>
+                <a:rPr lang="en-US" dirty="0"/>
+                <a:t>Post Code</a:t>
+              </a:r>
+              <a:br>
+                <a:rPr lang="en-US" dirty="0"/>
+              </a:br>
+              <a:r>
+                <a:rPr lang="en-US" dirty="0"/>
+                <a:t>Contact Number</a:t>
+              </a:r>
+              <a:br>
+                <a:rPr lang="en-US" dirty="0"/>
+              </a:br>
+              <a:r>
+                <a:rPr lang="en-US" dirty="0"/>
+                <a:t>Email</a:t>
+              </a:r>
+            </a:p>
+            <a:p>
+              <a:pPr algn="ctr"/>
+              <a:r>
+                <a:rPr lang="en-US" dirty="0"/>
+                <a:t>Number of Adults</a:t>
+              </a:r>
+            </a:p>
+            <a:p>
+              <a:pPr algn="ctr"/>
+              <a:r>
+                <a:rPr lang="en-US" dirty="0"/>
+                <a:t>ETA </a:t>
+              </a:r>
+            </a:p>
+          </p:txBody>
+        </p:sp>
+        <p:sp>
+          <p:nvSpPr>
+            <p:cNvPr id="68" name="Rectangle 67">
+              <a:extLst>
+                <a:ext uri="{FF2B5EF4-FFF2-40B4-BE49-F238E27FC236}">
+                  <a16:creationId xmlns:a16="http://schemas.microsoft.com/office/drawing/2014/main" id="{0230D761-84D8-492B-8497-83E036F1B12A}"/>
+                </a:ext>
+              </a:extLst>
+            </p:cNvPr>
+            <p:cNvSpPr/>
+            <p:nvPr/>
+          </p:nvSpPr>
+          <p:spPr>
+            <a:xfrm>
+              <a:off x="2501898" y="7056567"/>
+              <a:ext cx="4978406" cy="435926"/>
+            </a:xfrm>
+            <a:prstGeom prst="rect">
+              <a:avLst/>
+            </a:prstGeom>
+            <a:solidFill>
+              <a:schemeClr val="bg1"/>
+            </a:solidFill>
+            <a:ln>
+              <a:solidFill>
+                <a:schemeClr val="tx1"/>
+              </a:solidFill>
+            </a:ln>
+          </p:spPr>
+          <p:style>
+            <a:lnRef idx="2">
+              <a:schemeClr val="accent1">
+                <a:shade val="50000"/>
+              </a:schemeClr>
+            </a:lnRef>
+            <a:fillRef idx="1">
+              <a:schemeClr val="accent1"/>
+            </a:fillRef>
+            <a:effectRef idx="0">
+              <a:schemeClr val="accent1"/>
+            </a:effectRef>
+            <a:fontRef idx="minor">
+              <a:schemeClr val="lt1"/>
+            </a:fontRef>
+          </p:style>
+          <p:txBody>
+            <a:bodyPr rtlCol="0" anchor="ctr"/>
+            <a:lstStyle/>
+            <a:p>
+              <a:pPr algn="ctr"/>
+              <a:r>
+                <a:rPr lang="en-US" dirty="0">
+                  <a:solidFill>
+                    <a:schemeClr val="tx1"/>
+                  </a:solidFill>
+                </a:rPr>
+                <a:t>Country</a:t>
+              </a:r>
+            </a:p>
+          </p:txBody>
+        </p:sp>
+        <p:sp>
+          <p:nvSpPr>
+            <p:cNvPr id="78" name="Rectangle 77">
+              <a:extLst>
+                <a:ext uri="{FF2B5EF4-FFF2-40B4-BE49-F238E27FC236}">
+                  <a16:creationId xmlns:a16="http://schemas.microsoft.com/office/drawing/2014/main" id="{89330952-A70D-45C5-AEB5-9E6F05BF669C}"/>
+                </a:ext>
+              </a:extLst>
+            </p:cNvPr>
+            <p:cNvSpPr/>
+            <p:nvPr/>
+          </p:nvSpPr>
+          <p:spPr>
+            <a:xfrm>
+              <a:off x="2501898" y="8304646"/>
+              <a:ext cx="4978406" cy="435926"/>
+            </a:xfrm>
+            <a:prstGeom prst="rect">
+              <a:avLst/>
+            </a:prstGeom>
+            <a:solidFill>
+              <a:schemeClr val="bg1"/>
+            </a:solidFill>
+            <a:ln>
+              <a:solidFill>
+                <a:schemeClr val="tx1"/>
+              </a:solidFill>
+            </a:ln>
+          </p:spPr>
+          <p:style>
+            <a:lnRef idx="2">
+              <a:schemeClr val="accent1">
+                <a:shade val="50000"/>
+              </a:schemeClr>
+            </a:lnRef>
+            <a:fillRef idx="1">
+              <a:schemeClr val="accent1"/>
+            </a:fillRef>
+            <a:effectRef idx="0">
+              <a:schemeClr val="accent1"/>
+            </a:effectRef>
+            <a:fontRef idx="minor">
+              <a:schemeClr val="lt1"/>
+            </a:fontRef>
+          </p:style>
+          <p:txBody>
+            <a:bodyPr rtlCol="0" anchor="ctr"/>
+            <a:lstStyle/>
+            <a:p>
+              <a:pPr algn="ctr"/>
+              <a:r>
+                <a:rPr lang="en-US" dirty="0">
+                  <a:solidFill>
+                    <a:schemeClr val="tx1"/>
+                  </a:solidFill>
+                </a:rPr>
+                <a:t>Contact Number</a:t>
+              </a:r>
+            </a:p>
+          </p:txBody>
+        </p:sp>
+        <p:sp>
+          <p:nvSpPr>
+            <p:cNvPr id="79" name="Rectangle 78">
+              <a:extLst>
+                <a:ext uri="{FF2B5EF4-FFF2-40B4-BE49-F238E27FC236}">
+                  <a16:creationId xmlns:a16="http://schemas.microsoft.com/office/drawing/2014/main" id="{ECFEFBFE-2E01-4DB2-A1AC-832B7DFA22C0}"/>
+                </a:ext>
+              </a:extLst>
+            </p:cNvPr>
+            <p:cNvSpPr/>
+            <p:nvPr/>
+          </p:nvSpPr>
+          <p:spPr>
+            <a:xfrm>
+              <a:off x="2501898" y="8942519"/>
+              <a:ext cx="4978406" cy="435926"/>
+            </a:xfrm>
+            <a:prstGeom prst="rect">
+              <a:avLst/>
+            </a:prstGeom>
+            <a:solidFill>
+              <a:schemeClr val="bg1"/>
+            </a:solidFill>
+            <a:ln>
+              <a:solidFill>
+                <a:schemeClr val="tx1"/>
+              </a:solidFill>
+            </a:ln>
+          </p:spPr>
+          <p:style>
+            <a:lnRef idx="2">
+              <a:schemeClr val="accent1">
+                <a:shade val="50000"/>
+              </a:schemeClr>
+            </a:lnRef>
+            <a:fillRef idx="1">
+              <a:schemeClr val="accent1"/>
+            </a:fillRef>
+            <a:effectRef idx="0">
+              <a:schemeClr val="accent1"/>
+            </a:effectRef>
+            <a:fontRef idx="minor">
+              <a:schemeClr val="lt1"/>
+            </a:fontRef>
+          </p:style>
+          <p:txBody>
+            <a:bodyPr rtlCol="0" anchor="ctr"/>
+            <a:lstStyle/>
+            <a:p>
+              <a:pPr algn="ctr"/>
+              <a:r>
+                <a:rPr lang="en-US" dirty="0">
+                  <a:solidFill>
+                    <a:schemeClr val="tx1"/>
+                  </a:solidFill>
+                </a:rPr>
+                <a:t>Email</a:t>
+              </a:r>
+            </a:p>
+          </p:txBody>
+        </p:sp>
+        <p:sp>
+          <p:nvSpPr>
+            <p:cNvPr id="80" name="Rectangle 79">
+              <a:extLst>
+                <a:ext uri="{FF2B5EF4-FFF2-40B4-BE49-F238E27FC236}">
+                  <a16:creationId xmlns:a16="http://schemas.microsoft.com/office/drawing/2014/main" id="{AA6DEDF4-6E5F-41F9-9199-FB076EDA8757}"/>
+                </a:ext>
+              </a:extLst>
+            </p:cNvPr>
+            <p:cNvSpPr/>
+            <p:nvPr/>
+          </p:nvSpPr>
+          <p:spPr>
+            <a:xfrm>
+              <a:off x="2501898" y="9608009"/>
+              <a:ext cx="4978406" cy="435926"/>
+            </a:xfrm>
+            <a:prstGeom prst="rect">
+              <a:avLst/>
+            </a:prstGeom>
+            <a:solidFill>
+              <a:schemeClr val="bg1"/>
+            </a:solidFill>
+            <a:ln>
+              <a:solidFill>
+                <a:schemeClr val="tx1"/>
+              </a:solidFill>
+            </a:ln>
+          </p:spPr>
+          <p:style>
+            <a:lnRef idx="2">
+              <a:schemeClr val="accent1">
+                <a:shade val="50000"/>
+              </a:schemeClr>
+            </a:lnRef>
+            <a:fillRef idx="1">
+              <a:schemeClr val="accent1"/>
+            </a:fillRef>
+            <a:effectRef idx="0">
+              <a:schemeClr val="accent1"/>
+            </a:effectRef>
+            <a:fontRef idx="minor">
+              <a:schemeClr val="lt1"/>
+            </a:fontRef>
+          </p:style>
+          <p:txBody>
+            <a:bodyPr rtlCol="0" anchor="ctr"/>
+            <a:lstStyle/>
+            <a:p>
+              <a:pPr algn="ctr"/>
+              <a:r>
+                <a:rPr lang="en-US" dirty="0">
+                  <a:solidFill>
+                    <a:schemeClr val="tx1"/>
+                  </a:solidFill>
+                </a:rPr>
+                <a:t>Number of Adults</a:t>
+              </a:r>
+            </a:p>
+          </p:txBody>
+        </p:sp>
+        <p:sp>
+          <p:nvSpPr>
+            <p:cNvPr id="81" name="Rectangle 80">
+              <a:extLst>
+                <a:ext uri="{FF2B5EF4-FFF2-40B4-BE49-F238E27FC236}">
+                  <a16:creationId xmlns:a16="http://schemas.microsoft.com/office/drawing/2014/main" id="{E24E2C2A-300B-459B-AC92-9D6D41E3D263}"/>
+                </a:ext>
+              </a:extLst>
+            </p:cNvPr>
+            <p:cNvSpPr/>
+            <p:nvPr/>
+          </p:nvSpPr>
+          <p:spPr>
+            <a:xfrm>
+              <a:off x="2501898" y="10273498"/>
+              <a:ext cx="4978406" cy="435926"/>
+            </a:xfrm>
+            <a:prstGeom prst="rect">
+              <a:avLst/>
+            </a:prstGeom>
+            <a:solidFill>
+              <a:schemeClr val="bg1"/>
+            </a:solidFill>
+            <a:ln>
+              <a:solidFill>
+                <a:schemeClr val="tx1"/>
+              </a:solidFill>
+            </a:ln>
+          </p:spPr>
+          <p:style>
+            <a:lnRef idx="2">
+              <a:schemeClr val="accent1">
+                <a:shade val="50000"/>
+              </a:schemeClr>
+            </a:lnRef>
+            <a:fillRef idx="1">
+              <a:schemeClr val="accent1"/>
+            </a:fillRef>
+            <a:effectRef idx="0">
+              <a:schemeClr val="accent1"/>
+            </a:effectRef>
+            <a:fontRef idx="minor">
+              <a:schemeClr val="lt1"/>
+            </a:fontRef>
+          </p:style>
+          <p:txBody>
+            <a:bodyPr rtlCol="0" anchor="ctr"/>
+            <a:lstStyle/>
+            <a:p>
+              <a:pPr algn="ctr"/>
+              <a:r>
+                <a:rPr lang="en-US" dirty="0">
+                  <a:solidFill>
+                    <a:schemeClr val="tx1"/>
+                  </a:solidFill>
+                </a:rPr>
+                <a:t>Estimated Time of Arrival (optional)</a:t>
+              </a:r>
+            </a:p>
+          </p:txBody>
+        </p:sp>
+        <p:sp>
+          <p:nvSpPr>
+            <p:cNvPr id="82" name="Rectangle 81">
+              <a:extLst>
+                <a:ext uri="{FF2B5EF4-FFF2-40B4-BE49-F238E27FC236}">
+                  <a16:creationId xmlns:a16="http://schemas.microsoft.com/office/drawing/2014/main" id="{5AFA2242-9619-4887-B0A8-77A909F697A4}"/>
+                </a:ext>
+              </a:extLst>
+            </p:cNvPr>
+            <p:cNvSpPr/>
+            <p:nvPr/>
+          </p:nvSpPr>
+          <p:spPr>
+            <a:xfrm>
+              <a:off x="2501898" y="7676201"/>
+              <a:ext cx="4978406" cy="435926"/>
+            </a:xfrm>
+            <a:prstGeom prst="rect">
+              <a:avLst/>
+            </a:prstGeom>
+            <a:solidFill>
+              <a:schemeClr val="bg1"/>
+            </a:solidFill>
+            <a:ln>
+              <a:solidFill>
+                <a:schemeClr val="tx1"/>
+              </a:solidFill>
+            </a:ln>
+          </p:spPr>
+          <p:style>
+            <a:lnRef idx="2">
+              <a:schemeClr val="accent1">
+                <a:shade val="50000"/>
+              </a:schemeClr>
+            </a:lnRef>
+            <a:fillRef idx="1">
+              <a:schemeClr val="accent1"/>
+            </a:fillRef>
+            <a:effectRef idx="0">
+              <a:schemeClr val="accent1"/>
+            </a:effectRef>
+            <a:fontRef idx="minor">
+              <a:schemeClr val="lt1"/>
+            </a:fontRef>
+          </p:style>
+          <p:txBody>
+            <a:bodyPr rtlCol="0" anchor="ctr"/>
+            <a:lstStyle/>
+            <a:p>
+              <a:pPr algn="ctr"/>
+              <a:r>
+                <a:rPr lang="en-US" dirty="0">
+                  <a:solidFill>
+                    <a:schemeClr val="tx1"/>
+                  </a:solidFill>
+                </a:rPr>
+                <a:t>Post Code (if applicable)</a:t>
+              </a:r>
+            </a:p>
+          </p:txBody>
+        </p:sp>
+        <p:sp>
+          <p:nvSpPr>
+            <p:cNvPr id="83" name="Rectangle 82">
+              <a:extLst>
+                <a:ext uri="{FF2B5EF4-FFF2-40B4-BE49-F238E27FC236}">
+                  <a16:creationId xmlns:a16="http://schemas.microsoft.com/office/drawing/2014/main" id="{C0ADCC24-8C96-4134-8E36-F105D52E3356}"/>
+                </a:ext>
+              </a:extLst>
+            </p:cNvPr>
+            <p:cNvSpPr/>
+            <p:nvPr/>
+          </p:nvSpPr>
+          <p:spPr>
+            <a:xfrm>
+              <a:off x="2501898" y="6428568"/>
+              <a:ext cx="4978406" cy="435926"/>
+            </a:xfrm>
+            <a:prstGeom prst="rect">
+              <a:avLst/>
+            </a:prstGeom>
+            <a:solidFill>
+              <a:schemeClr val="bg1"/>
+            </a:solidFill>
+            <a:ln>
+              <a:solidFill>
+                <a:schemeClr val="tx1"/>
+              </a:solidFill>
+            </a:ln>
+          </p:spPr>
+          <p:style>
+            <a:lnRef idx="2">
+              <a:schemeClr val="accent1">
+                <a:shade val="50000"/>
+              </a:schemeClr>
+            </a:lnRef>
+            <a:fillRef idx="1">
+              <a:schemeClr val="accent1"/>
+            </a:fillRef>
+            <a:effectRef idx="0">
+              <a:schemeClr val="accent1"/>
+            </a:effectRef>
+            <a:fontRef idx="minor">
+              <a:schemeClr val="lt1"/>
+            </a:fontRef>
+          </p:style>
+          <p:txBody>
+            <a:bodyPr rtlCol="0" anchor="ctr"/>
+            <a:lstStyle/>
+            <a:p>
+              <a:pPr algn="ctr"/>
+              <a:r>
+                <a:rPr lang="en-US" dirty="0">
+                  <a:solidFill>
+                    <a:schemeClr val="tx1"/>
+                  </a:solidFill>
+                </a:rPr>
+                <a:t>Name</a:t>
+              </a:r>
+            </a:p>
+          </p:txBody>
+        </p:sp>
+        <p:sp>
+          <p:nvSpPr>
+            <p:cNvPr id="4" name="TextBox 3">
+              <a:extLst>
+                <a:ext uri="{FF2B5EF4-FFF2-40B4-BE49-F238E27FC236}">
+                  <a16:creationId xmlns:a16="http://schemas.microsoft.com/office/drawing/2014/main" id="{708F14CC-48F4-402E-8366-97C5D2F7B0B9}"/>
+                </a:ext>
+              </a:extLst>
+            </p:cNvPr>
+            <p:cNvSpPr txBox="1"/>
+            <p:nvPr/>
+          </p:nvSpPr>
+          <p:spPr>
+            <a:xfrm>
+              <a:off x="2501899" y="2399395"/>
+              <a:ext cx="2489202" cy="646331"/>
+            </a:xfrm>
+            <a:prstGeom prst="rect">
+              <a:avLst/>
+            </a:prstGeom>
+            <a:noFill/>
+          </p:spPr>
+          <p:txBody>
+            <a:bodyPr wrap="square" rtlCol="0">
+              <a:spAutoFit/>
+            </a:bodyPr>
+            <a:lstStyle/>
+            <a:p>
+              <a:r>
+                <a:rPr lang="en-US" dirty="0"/>
+                <a:t>Prefill data with Facebook!</a:t>
+              </a:r>
+            </a:p>
+          </p:txBody>
+        </p:sp>
+        <p:sp>
+          <p:nvSpPr>
+            <p:cNvPr id="85" name="Rectangle 84">
+              <a:extLst>
+                <a:ext uri="{FF2B5EF4-FFF2-40B4-BE49-F238E27FC236}">
+                  <a16:creationId xmlns:a16="http://schemas.microsoft.com/office/drawing/2014/main" id="{6CB14429-028C-48DB-92BF-49F974AD314A}"/>
+                </a:ext>
+              </a:extLst>
+            </p:cNvPr>
+            <p:cNvSpPr/>
+            <p:nvPr/>
+          </p:nvSpPr>
+          <p:spPr>
+            <a:xfrm>
+              <a:off x="2501898" y="11582805"/>
+              <a:ext cx="4978406" cy="435926"/>
+            </a:xfrm>
+            <a:prstGeom prst="rect">
+              <a:avLst/>
+            </a:prstGeom>
+            <a:solidFill>
+              <a:schemeClr val="bg1"/>
+            </a:solidFill>
+            <a:ln>
+              <a:solidFill>
+                <a:schemeClr val="tx1"/>
+              </a:solidFill>
+            </a:ln>
+          </p:spPr>
+          <p:style>
+            <a:lnRef idx="2">
+              <a:schemeClr val="accent1">
+                <a:shade val="50000"/>
+              </a:schemeClr>
+            </a:lnRef>
+            <a:fillRef idx="1">
+              <a:schemeClr val="accent1"/>
+            </a:fillRef>
+            <a:effectRef idx="0">
+              <a:schemeClr val="accent1"/>
+            </a:effectRef>
+            <a:fontRef idx="minor">
+              <a:schemeClr val="lt1"/>
+            </a:fontRef>
+          </p:style>
+          <p:txBody>
+            <a:bodyPr rtlCol="0" anchor="ctr"/>
+            <a:lstStyle/>
+            <a:p>
+              <a:pPr algn="ctr"/>
+              <a:r>
+                <a:rPr lang="en-US" dirty="0">
+                  <a:solidFill>
+                    <a:schemeClr val="tx1"/>
+                  </a:solidFill>
+                </a:rPr>
+                <a:t>Place Request</a:t>
+              </a:r>
+            </a:p>
+          </p:txBody>
+        </p:sp>
+        <p:sp>
+          <p:nvSpPr>
+            <p:cNvPr id="86" name="Rectangle 85">
+              <a:extLst>
+                <a:ext uri="{FF2B5EF4-FFF2-40B4-BE49-F238E27FC236}">
+                  <a16:creationId xmlns:a16="http://schemas.microsoft.com/office/drawing/2014/main" id="{5194C778-F69E-4A83-AEE4-B3F8E7B48EC0}"/>
+                </a:ext>
+              </a:extLst>
+            </p:cNvPr>
+            <p:cNvSpPr/>
+            <p:nvPr/>
+          </p:nvSpPr>
+          <p:spPr>
+            <a:xfrm>
+              <a:off x="2501898" y="10970764"/>
+              <a:ext cx="4978406" cy="435926"/>
+            </a:xfrm>
+            <a:prstGeom prst="rect">
+              <a:avLst/>
+            </a:prstGeom>
+            <a:solidFill>
+              <a:schemeClr val="bg1"/>
+            </a:solidFill>
+            <a:ln>
+              <a:noFill/>
+            </a:ln>
+          </p:spPr>
+          <p:style>
+            <a:lnRef idx="2">
+              <a:schemeClr val="accent1">
+                <a:shade val="50000"/>
+              </a:schemeClr>
+            </a:lnRef>
+            <a:fillRef idx="1">
+              <a:schemeClr val="accent1"/>
+            </a:fillRef>
+            <a:effectRef idx="0">
+              <a:schemeClr val="accent1"/>
+            </a:effectRef>
+            <a:fontRef idx="minor">
+              <a:schemeClr val="lt1"/>
+            </a:fontRef>
+          </p:style>
+          <p:txBody>
+            <a:bodyPr rtlCol="0" anchor="ctr"/>
+            <a:lstStyle/>
+            <a:p>
+              <a:pPr algn="ctr"/>
+              <a:r>
+                <a:rPr lang="en-US" dirty="0">
+                  <a:solidFill>
+                    <a:schemeClr val="tx1"/>
+                  </a:solidFill>
+                </a:rPr>
+                <a:t>I have read and agreed to the terms and conditions</a:t>
+              </a:r>
+            </a:p>
+          </p:txBody>
+        </p:sp>
+        <p:sp>
+          <p:nvSpPr>
+            <p:cNvPr id="5" name="Rectangle 4">
+              <a:extLst>
+                <a:ext uri="{FF2B5EF4-FFF2-40B4-BE49-F238E27FC236}">
+                  <a16:creationId xmlns:a16="http://schemas.microsoft.com/office/drawing/2014/main" id="{B9357719-C2A0-442D-AF91-002BFC7D3B72}"/>
+                </a:ext>
+              </a:extLst>
+            </p:cNvPr>
+            <p:cNvSpPr/>
+            <p:nvPr/>
+          </p:nvSpPr>
+          <p:spPr>
+            <a:xfrm>
+              <a:off x="2222500" y="11031112"/>
+              <a:ext cx="292097" cy="350178"/>
+            </a:xfrm>
+            <a:prstGeom prst="rect">
+              <a:avLst/>
+            </a:prstGeom>
+            <a:solidFill>
+              <a:schemeClr val="bg1"/>
+            </a:solidFill>
+            <a:ln>
+              <a:solidFill>
+                <a:schemeClr val="tx1"/>
+              </a:solidFill>
+            </a:ln>
+          </p:spPr>
+          <p:style>
+            <a:lnRef idx="2">
+              <a:schemeClr val="accent1">
+                <a:shade val="50000"/>
+              </a:schemeClr>
+            </a:lnRef>
+            <a:fillRef idx="1">
+              <a:schemeClr val="accent1"/>
+            </a:fillRef>
+            <a:effectRef idx="0">
+              <a:schemeClr val="accent1"/>
+            </a:effectRef>
+            <a:fontRef idx="minor">
+              <a:schemeClr val="lt1"/>
+            </a:fontRef>
+          </p:style>
+          <p:txBody>
+            <a:bodyPr rtlCol="0" anchor="ctr"/>
+            <a:lstStyle/>
+            <a:p>
+              <a:pPr algn="ctr"/>
+              <a:endParaRPr lang="en-US"/>
+            </a:p>
+          </p:txBody>
+        </p:sp>
+        <p:sp>
+          <p:nvSpPr>
+            <p:cNvPr id="87" name="TextBox 86">
+              <a:extLst>
+                <a:ext uri="{FF2B5EF4-FFF2-40B4-BE49-F238E27FC236}">
+                  <a16:creationId xmlns:a16="http://schemas.microsoft.com/office/drawing/2014/main" id="{BF23FFF6-72EA-4C13-B900-24F1DA57EBC0}"/>
+                </a:ext>
+              </a:extLst>
+            </p:cNvPr>
+            <p:cNvSpPr txBox="1"/>
+            <p:nvPr/>
+          </p:nvSpPr>
+          <p:spPr>
+            <a:xfrm>
+              <a:off x="5445123" y="12215567"/>
+              <a:ext cx="3013075" cy="369332"/>
+            </a:xfrm>
+            <a:prstGeom prst="rect">
+              <a:avLst/>
+            </a:prstGeom>
+            <a:noFill/>
+          </p:spPr>
+          <p:txBody>
+            <a:bodyPr wrap="square" rtlCol="0">
+              <a:spAutoFit/>
+            </a:bodyPr>
+            <a:lstStyle/>
+            <a:p>
+              <a:r>
+                <a:rPr lang="en-US" dirty="0"/>
+                <a:t>Optional – subject to change</a:t>
+              </a:r>
+            </a:p>
+          </p:txBody>
+        </p:sp>
+        <p:cxnSp>
+          <p:nvCxnSpPr>
+            <p:cNvPr id="13" name="Straight Arrow Connector 12">
+              <a:extLst>
+                <a:ext uri="{FF2B5EF4-FFF2-40B4-BE49-F238E27FC236}">
+                  <a16:creationId xmlns:a16="http://schemas.microsoft.com/office/drawing/2014/main" id="{834D3683-7052-45BE-BF68-792ED0C1D189}"/>
+                </a:ext>
+              </a:extLst>
+            </p:cNvPr>
+            <p:cNvCxnSpPr>
+              <a:cxnSpLocks/>
+            </p:cNvCxnSpPr>
+            <p:nvPr/>
+          </p:nvCxnSpPr>
+          <p:spPr>
+            <a:xfrm flipV="1">
+              <a:off x="7976764" y="4994006"/>
+              <a:ext cx="1567282" cy="7191624"/>
+            </a:xfrm>
+            <a:prstGeom prst="straightConnector1">
+              <a:avLst/>
+            </a:prstGeom>
+            <a:ln>
+              <a:solidFill>
+                <a:schemeClr val="tx1"/>
+              </a:solidFill>
+              <a:tailEnd type="triangle"/>
+            </a:ln>
+          </p:spPr>
+          <p:style>
+            <a:lnRef idx="1">
+              <a:schemeClr val="accent1"/>
+            </a:lnRef>
+            <a:fillRef idx="0">
+              <a:schemeClr val="accent1"/>
+            </a:fillRef>
+            <a:effectRef idx="0">
+              <a:schemeClr val="accent1"/>
+            </a:effectRef>
+            <a:fontRef idx="minor">
+              <a:schemeClr val="tx1"/>
+            </a:fontRef>
+          </p:style>
+        </p:cxnSp>
+        <p:sp>
+          <p:nvSpPr>
+            <p:cNvPr id="19" name="Rectangle 18">
+              <a:extLst>
+                <a:ext uri="{FF2B5EF4-FFF2-40B4-BE49-F238E27FC236}">
+                  <a16:creationId xmlns:a16="http://schemas.microsoft.com/office/drawing/2014/main" id="{0701DE7A-7B48-4754-A5B2-9F755D611727}"/>
+                </a:ext>
+              </a:extLst>
+            </p:cNvPr>
+            <p:cNvSpPr/>
+            <p:nvPr/>
+          </p:nvSpPr>
+          <p:spPr>
+            <a:xfrm>
+              <a:off x="2501898" y="3800383"/>
+              <a:ext cx="4978406" cy="2337282"/>
+            </a:xfrm>
+            <a:prstGeom prst="rect">
+              <a:avLst/>
+            </a:prstGeom>
+          </p:spPr>
+          <p:style>
+            <a:lnRef idx="2">
+              <a:schemeClr val="dk1"/>
+            </a:lnRef>
+            <a:fillRef idx="1">
+              <a:schemeClr val="lt1"/>
+            </a:fillRef>
+            <a:effectRef idx="0">
+              <a:schemeClr val="dk1"/>
+            </a:effectRef>
+            <a:fontRef idx="minor">
+              <a:schemeClr val="dk1"/>
+            </a:fontRef>
+          </p:style>
+          <p:txBody>
+            <a:bodyPr rtlCol="0" anchor="ctr"/>
+            <a:lstStyle/>
+            <a:p>
+              <a:pPr algn="ctr"/>
+              <a:r>
+                <a:rPr lang="en-US" dirty="0"/>
+                <a:t>Calendar</a:t>
+              </a:r>
+            </a:p>
+          </p:txBody>
+        </p:sp>
+        <p:sp>
+          <p:nvSpPr>
+            <p:cNvPr id="29" name="Isosceles Triangle 28">
+              <a:extLst>
+                <a:ext uri="{FF2B5EF4-FFF2-40B4-BE49-F238E27FC236}">
+                  <a16:creationId xmlns:a16="http://schemas.microsoft.com/office/drawing/2014/main" id="{2EA69775-4198-4059-B8F3-10A68BB69B6E}"/>
+                </a:ext>
+              </a:extLst>
+            </p:cNvPr>
+            <p:cNvSpPr/>
+            <p:nvPr/>
+          </p:nvSpPr>
+          <p:spPr>
+            <a:xfrm>
+              <a:off x="3406140" y="3539043"/>
+              <a:ext cx="655320" cy="261340"/>
+            </a:xfrm>
+            <a:prstGeom prst="triangle">
+              <a:avLst/>
+            </a:prstGeom>
+          </p:spPr>
+          <p:style>
+            <a:lnRef idx="2">
+              <a:schemeClr val="dk1"/>
+            </a:lnRef>
+            <a:fillRef idx="1">
+              <a:schemeClr val="lt1"/>
+            </a:fillRef>
+            <a:effectRef idx="0">
+              <a:schemeClr val="dk1"/>
+            </a:effectRef>
+            <a:fontRef idx="minor">
+              <a:schemeClr val="dk1"/>
+            </a:fontRef>
+          </p:style>
+          <p:txBody>
+            <a:bodyPr rtlCol="0" anchor="ctr"/>
+            <a:lstStyle/>
+            <a:p>
+              <a:pPr algn="ctr"/>
+              <a:endParaRPr lang="en-US"/>
+            </a:p>
+          </p:txBody>
+        </p:sp>
+        <p:sp>
+          <p:nvSpPr>
+            <p:cNvPr id="89" name="TextBox 88">
+              <a:extLst>
+                <a:ext uri="{FF2B5EF4-FFF2-40B4-BE49-F238E27FC236}">
+                  <a16:creationId xmlns:a16="http://schemas.microsoft.com/office/drawing/2014/main" id="{6DFC29B4-436B-40E3-AC77-5F8D93071875}"/>
+                </a:ext>
+              </a:extLst>
+            </p:cNvPr>
+            <p:cNvSpPr txBox="1"/>
+            <p:nvPr/>
+          </p:nvSpPr>
+          <p:spPr>
+            <a:xfrm>
+              <a:off x="2501898" y="1685148"/>
+              <a:ext cx="5168902" cy="369332"/>
+            </a:xfrm>
+            <a:prstGeom prst="rect">
+              <a:avLst/>
+            </a:prstGeom>
+            <a:noFill/>
+          </p:spPr>
+          <p:txBody>
+            <a:bodyPr wrap="square" rtlCol="0">
+              <a:spAutoFit/>
+            </a:bodyPr>
+            <a:lstStyle/>
+            <a:p>
+              <a:r>
+                <a:rPr lang="en-US" b="1" dirty="0"/>
+                <a:t>Booking and Property Details</a:t>
+              </a:r>
+            </a:p>
+          </p:txBody>
+        </p:sp>
+        <p:sp>
+          <p:nvSpPr>
+            <p:cNvPr id="90" name="Half Frame 89">
+              <a:extLst>
+                <a:ext uri="{FF2B5EF4-FFF2-40B4-BE49-F238E27FC236}">
+                  <a16:creationId xmlns:a16="http://schemas.microsoft.com/office/drawing/2014/main" id="{45BEF097-5E81-4E4C-83BC-548F8C5FF55C}"/>
+                </a:ext>
+              </a:extLst>
+            </p:cNvPr>
+            <p:cNvSpPr/>
+            <p:nvPr/>
+          </p:nvSpPr>
+          <p:spPr>
+            <a:xfrm rot="13500000">
+              <a:off x="5502655" y="1762341"/>
+              <a:ext cx="162141" cy="162141"/>
+            </a:xfrm>
+            <a:prstGeom prst="halfFrame">
+              <a:avLst/>
+            </a:prstGeom>
+          </p:spPr>
+          <p:style>
+            <a:lnRef idx="2">
+              <a:schemeClr val="dk1">
+                <a:shade val="50000"/>
+              </a:schemeClr>
+            </a:lnRef>
+            <a:fillRef idx="1">
+              <a:schemeClr val="dk1"/>
+            </a:fillRef>
+            <a:effectRef idx="0">
+              <a:schemeClr val="dk1"/>
+            </a:effectRef>
+            <a:fontRef idx="minor">
+              <a:schemeClr val="lt1"/>
+            </a:fontRef>
+          </p:style>
+          <p:txBody>
+            <a:bodyPr rtlCol="0" anchor="ctr"/>
+            <a:lstStyle/>
+            <a:p>
+              <a:pPr algn="ctr"/>
+              <a:endParaRPr lang="en-US">
+                <a:solidFill>
+                  <a:schemeClr val="tx1"/>
+                </a:solidFill>
+              </a:endParaRPr>
+            </a:p>
+          </p:txBody>
+        </p:sp>
+      </p:grpSp>
+    </p:spTree>
+    <p:extLst>
+      <p:ext uri="{BB962C8B-B14F-4D97-AF65-F5344CB8AC3E}">
+        <p14:creationId xmlns:p14="http://schemas.microsoft.com/office/powerpoint/2010/main" val="2702800105"/>
+      </p:ext>
+    </p:extLst>
+  </p:cSld>
+  <p:clrMapOvr>
+    <a:masterClrMapping/>
+  </p:clrMapOvr>
+</p:sld>
+</file>
+
 <file path=ppt/slides/slide2.xml><?xml version="1.0" encoding="utf-8"?>
 <p:sld xmlns:a="http://schemas.openxmlformats.org/drawingml/2006/main" xmlns:r="http://schemas.openxmlformats.org/officeDocument/2006/relationships" xmlns:p="http://schemas.openxmlformats.org/presentationml/2006/main">
   <p:cSld>

</xml_diff>

<commit_message>
Issue #1 - Finalising initial design documentation
The following design diagrams have been completed and added to the Diagrams.pttx and key_deisng_elements.docx file:
- Administrator Login
- Administrator Home Page
- Booking Manager
- Individual Booking Page
- Price Manager
- New Price Addition

This completes the design of the administrative component of the application.
</commit_message>
<xml_diff>
--- a/documentation/flow_diagrams/Diagrams.pptx
+++ b/documentation/flow_diagrams/Diagrams.pptx
@@ -15,6 +15,12 @@
     <p:sldId id="264" r:id="rId9"/>
     <p:sldId id="265" r:id="rId10"/>
     <p:sldId id="266" r:id="rId11"/>
+    <p:sldId id="267" r:id="rId12"/>
+    <p:sldId id="268" r:id="rId13"/>
+    <p:sldId id="269" r:id="rId14"/>
+    <p:sldId id="270" r:id="rId15"/>
+    <p:sldId id="271" r:id="rId16"/>
+    <p:sldId id="272" r:id="rId17"/>
   </p:sldIdLst>
   <p:sldSz cx="12192000" cy="6858000"/>
   <p:notesSz cx="6858000" cy="9144000"/>
@@ -268,7 +274,7 @@
           <a:p>
             <a:fld id="{D6E2EBEA-C0EE-4F95-BD56-68376C501018}" type="datetimeFigureOut">
               <a:rPr lang="en-US" smtClean="0"/>
-              <a:t>6/23/2018</a:t>
+              <a:t>6/24/2018</a:t>
             </a:fld>
             <a:endParaRPr lang="en-US"/>
           </a:p>
@@ -466,7 +472,7 @@
           <a:p>
             <a:fld id="{D6E2EBEA-C0EE-4F95-BD56-68376C501018}" type="datetimeFigureOut">
               <a:rPr lang="en-US" smtClean="0"/>
-              <a:t>6/23/2018</a:t>
+              <a:t>6/24/2018</a:t>
             </a:fld>
             <a:endParaRPr lang="en-US"/>
           </a:p>
@@ -674,7 +680,7 @@
           <a:p>
             <a:fld id="{D6E2EBEA-C0EE-4F95-BD56-68376C501018}" type="datetimeFigureOut">
               <a:rPr lang="en-US" smtClean="0"/>
-              <a:t>6/23/2018</a:t>
+              <a:t>6/24/2018</a:t>
             </a:fld>
             <a:endParaRPr lang="en-US"/>
           </a:p>
@@ -872,7 +878,7 @@
           <a:p>
             <a:fld id="{D6E2EBEA-C0EE-4F95-BD56-68376C501018}" type="datetimeFigureOut">
               <a:rPr lang="en-US" smtClean="0"/>
-              <a:t>6/23/2018</a:t>
+              <a:t>6/24/2018</a:t>
             </a:fld>
             <a:endParaRPr lang="en-US"/>
           </a:p>
@@ -1147,7 +1153,7 @@
           <a:p>
             <a:fld id="{D6E2EBEA-C0EE-4F95-BD56-68376C501018}" type="datetimeFigureOut">
               <a:rPr lang="en-US" smtClean="0"/>
-              <a:t>6/23/2018</a:t>
+              <a:t>6/24/2018</a:t>
             </a:fld>
             <a:endParaRPr lang="en-US"/>
           </a:p>
@@ -1412,7 +1418,7 @@
           <a:p>
             <a:fld id="{D6E2EBEA-C0EE-4F95-BD56-68376C501018}" type="datetimeFigureOut">
               <a:rPr lang="en-US" smtClean="0"/>
-              <a:t>6/23/2018</a:t>
+              <a:t>6/24/2018</a:t>
             </a:fld>
             <a:endParaRPr lang="en-US"/>
           </a:p>
@@ -1824,7 +1830,7 @@
           <a:p>
             <a:fld id="{D6E2EBEA-C0EE-4F95-BD56-68376C501018}" type="datetimeFigureOut">
               <a:rPr lang="en-US" smtClean="0"/>
-              <a:t>6/23/2018</a:t>
+              <a:t>6/24/2018</a:t>
             </a:fld>
             <a:endParaRPr lang="en-US"/>
           </a:p>
@@ -1965,7 +1971,7 @@
           <a:p>
             <a:fld id="{D6E2EBEA-C0EE-4F95-BD56-68376C501018}" type="datetimeFigureOut">
               <a:rPr lang="en-US" smtClean="0"/>
-              <a:t>6/23/2018</a:t>
+              <a:t>6/24/2018</a:t>
             </a:fld>
             <a:endParaRPr lang="en-US"/>
           </a:p>
@@ -2078,7 +2084,7 @@
           <a:p>
             <a:fld id="{D6E2EBEA-C0EE-4F95-BD56-68376C501018}" type="datetimeFigureOut">
               <a:rPr lang="en-US" smtClean="0"/>
-              <a:t>6/23/2018</a:t>
+              <a:t>6/24/2018</a:t>
             </a:fld>
             <a:endParaRPr lang="en-US"/>
           </a:p>
@@ -2389,7 +2395,7 @@
           <a:p>
             <a:fld id="{D6E2EBEA-C0EE-4F95-BD56-68376C501018}" type="datetimeFigureOut">
               <a:rPr lang="en-US" smtClean="0"/>
-              <a:t>6/23/2018</a:t>
+              <a:t>6/24/2018</a:t>
             </a:fld>
             <a:endParaRPr lang="en-US"/>
           </a:p>
@@ -2677,7 +2683,7 @@
           <a:p>
             <a:fld id="{D6E2EBEA-C0EE-4F95-BD56-68376C501018}" type="datetimeFigureOut">
               <a:rPr lang="en-US" smtClean="0"/>
-              <a:t>6/23/2018</a:t>
+              <a:t>6/24/2018</a:t>
             </a:fld>
             <a:endParaRPr lang="en-US"/>
           </a:p>
@@ -2918,7 +2924,7 @@
           <a:p>
             <a:fld id="{D6E2EBEA-C0EE-4F95-BD56-68376C501018}" type="datetimeFigureOut">
               <a:rPr lang="en-US" smtClean="0"/>
-              <a:t>6/23/2018</a:t>
+              <a:t>6/24/2018</a:t>
             </a:fld>
             <a:endParaRPr lang="en-US"/>
           </a:p>
@@ -5727,6 +5733,3158 @@
 </p:sld>
 </file>
 
+<file path=ppt/slides/slide11.xml><?xml version="1.0" encoding="utf-8"?>
+<p:sld xmlns:a="http://schemas.openxmlformats.org/drawingml/2006/main" xmlns:r="http://schemas.openxmlformats.org/officeDocument/2006/relationships" xmlns:p="http://schemas.openxmlformats.org/presentationml/2006/main">
+  <p:cSld>
+    <p:spTree>
+      <p:nvGrpSpPr>
+        <p:cNvPr id="1" name=""/>
+        <p:cNvGrpSpPr/>
+        <p:nvPr/>
+      </p:nvGrpSpPr>
+      <p:grpSpPr>
+        <a:xfrm>
+          <a:off x="0" y="0"/>
+          <a:ext cx="0" cy="0"/>
+          <a:chOff x="0" y="0"/>
+          <a:chExt cx="0" cy="0"/>
+        </a:xfrm>
+      </p:grpSpPr>
+      <p:sp>
+        <p:nvSpPr>
+          <p:cNvPr id="8" name="TextBox 7">
+            <a:extLst>
+              <a:ext uri="{FF2B5EF4-FFF2-40B4-BE49-F238E27FC236}">
+                <a16:creationId xmlns:a16="http://schemas.microsoft.com/office/drawing/2014/main" id="{6B8468B5-7310-4B26-889D-AF6B42A4512C}"/>
+              </a:ext>
+            </a:extLst>
+          </p:cNvPr>
+          <p:cNvSpPr txBox="1"/>
+          <p:nvPr/>
+        </p:nvSpPr>
+        <p:spPr>
+          <a:xfrm>
+            <a:off x="0" y="304800"/>
+            <a:ext cx="12192000" cy="707886"/>
+          </a:xfrm>
+          <a:prstGeom prst="rect">
+            <a:avLst/>
+          </a:prstGeom>
+          <a:noFill/>
+        </p:spPr>
+        <p:txBody>
+          <a:bodyPr wrap="square" rtlCol="0">
+            <a:spAutoFit/>
+          </a:bodyPr>
+          <a:lstStyle/>
+          <a:p>
+            <a:pPr algn="ctr"/>
+            <a:r>
+              <a:rPr lang="en-US" sz="4000" b="1" i="1" dirty="0"/>
+              <a:t>Administrator Login</a:t>
+            </a:r>
+            <a:endParaRPr lang="en-US" b="1" i="1" dirty="0"/>
+          </a:p>
+        </p:txBody>
+      </p:sp>
+      <p:sp>
+        <p:nvSpPr>
+          <p:cNvPr id="2" name="Rectangle 1">
+            <a:extLst>
+              <a:ext uri="{FF2B5EF4-FFF2-40B4-BE49-F238E27FC236}">
+                <a16:creationId xmlns:a16="http://schemas.microsoft.com/office/drawing/2014/main" id="{287A8ECD-4A3C-42EE-AA65-5BA7F91B72D4}"/>
+              </a:ext>
+            </a:extLst>
+          </p:cNvPr>
+          <p:cNvSpPr/>
+          <p:nvPr/>
+        </p:nvSpPr>
+        <p:spPr>
+          <a:xfrm>
+            <a:off x="1397000" y="1242250"/>
+            <a:ext cx="9398000" cy="3912136"/>
+          </a:xfrm>
+          <a:prstGeom prst="rect">
+            <a:avLst/>
+          </a:prstGeom>
+        </p:spPr>
+        <p:style>
+          <a:lnRef idx="2">
+            <a:schemeClr val="dk1"/>
+          </a:lnRef>
+          <a:fillRef idx="1">
+            <a:schemeClr val="lt1"/>
+          </a:fillRef>
+          <a:effectRef idx="0">
+            <a:schemeClr val="dk1"/>
+          </a:effectRef>
+          <a:fontRef idx="minor">
+            <a:schemeClr val="dk1"/>
+          </a:fontRef>
+        </p:style>
+        <p:txBody>
+          <a:bodyPr rtlCol="0" anchor="ctr"/>
+          <a:lstStyle/>
+          <a:p>
+            <a:pPr algn="ctr"/>
+            <a:endParaRPr lang="en-US" dirty="0"/>
+          </a:p>
+        </p:txBody>
+      </p:sp>
+      <p:cxnSp>
+        <p:nvCxnSpPr>
+          <p:cNvPr id="6" name="Straight Connector 5">
+            <a:extLst>
+              <a:ext uri="{FF2B5EF4-FFF2-40B4-BE49-F238E27FC236}">
+                <a16:creationId xmlns:a16="http://schemas.microsoft.com/office/drawing/2014/main" id="{EA19701A-CB54-45C4-85F1-63616CC5C7E5}"/>
+              </a:ext>
+            </a:extLst>
+          </p:cNvPr>
+          <p:cNvCxnSpPr>
+            <a:cxnSpLocks/>
+          </p:cNvCxnSpPr>
+          <p:nvPr/>
+        </p:nvCxnSpPr>
+        <p:spPr>
+          <a:xfrm>
+            <a:off x="8740815" y="1242250"/>
+            <a:ext cx="0" cy="3912136"/>
+          </a:xfrm>
+          <a:prstGeom prst="line">
+            <a:avLst/>
+          </a:prstGeom>
+        </p:spPr>
+        <p:style>
+          <a:lnRef idx="1">
+            <a:schemeClr val="accent1"/>
+          </a:lnRef>
+          <a:fillRef idx="0">
+            <a:schemeClr val="accent1"/>
+          </a:fillRef>
+          <a:effectRef idx="0">
+            <a:schemeClr val="accent1"/>
+          </a:effectRef>
+          <a:fontRef idx="minor">
+            <a:schemeClr val="tx1"/>
+          </a:fontRef>
+        </p:style>
+      </p:cxnSp>
+      <p:sp>
+        <p:nvSpPr>
+          <p:cNvPr id="7" name="TextBox 6">
+            <a:extLst>
+              <a:ext uri="{FF2B5EF4-FFF2-40B4-BE49-F238E27FC236}">
+                <a16:creationId xmlns:a16="http://schemas.microsoft.com/office/drawing/2014/main" id="{F9D474C6-1762-4CCE-999D-354C8DC691F0}"/>
+              </a:ext>
+            </a:extLst>
+          </p:cNvPr>
+          <p:cNvSpPr txBox="1"/>
+          <p:nvPr/>
+        </p:nvSpPr>
+        <p:spPr>
+          <a:xfrm>
+            <a:off x="4641448" y="2828986"/>
+            <a:ext cx="1574153" cy="369332"/>
+          </a:xfrm>
+          <a:prstGeom prst="rect">
+            <a:avLst/>
+          </a:prstGeom>
+          <a:noFill/>
+        </p:spPr>
+        <p:txBody>
+          <a:bodyPr wrap="square" rtlCol="0">
+            <a:spAutoFit/>
+          </a:bodyPr>
+          <a:lstStyle/>
+          <a:p>
+            <a:r>
+              <a:rPr lang="en-US" dirty="0"/>
+              <a:t>Photo</a:t>
+            </a:r>
+          </a:p>
+        </p:txBody>
+      </p:sp>
+      <p:sp>
+        <p:nvSpPr>
+          <p:cNvPr id="9" name="Rectangle 8">
+            <a:extLst>
+              <a:ext uri="{FF2B5EF4-FFF2-40B4-BE49-F238E27FC236}">
+                <a16:creationId xmlns:a16="http://schemas.microsoft.com/office/drawing/2014/main" id="{A5AAC192-5EC0-47A0-8A07-052BA232EC3B}"/>
+              </a:ext>
+            </a:extLst>
+          </p:cNvPr>
+          <p:cNvSpPr/>
+          <p:nvPr/>
+        </p:nvSpPr>
+        <p:spPr>
+          <a:xfrm>
+            <a:off x="8970380" y="1776714"/>
+            <a:ext cx="1591516" cy="254643"/>
+          </a:xfrm>
+          <a:prstGeom prst="rect">
+            <a:avLst/>
+          </a:prstGeom>
+        </p:spPr>
+        <p:style>
+          <a:lnRef idx="2">
+            <a:schemeClr val="dk1"/>
+          </a:lnRef>
+          <a:fillRef idx="1">
+            <a:schemeClr val="lt1"/>
+          </a:fillRef>
+          <a:effectRef idx="0">
+            <a:schemeClr val="dk1"/>
+          </a:effectRef>
+          <a:fontRef idx="minor">
+            <a:schemeClr val="dk1"/>
+          </a:fontRef>
+        </p:style>
+        <p:txBody>
+          <a:bodyPr rtlCol="0" anchor="ctr"/>
+          <a:lstStyle/>
+          <a:p>
+            <a:pPr algn="ctr"/>
+            <a:r>
+              <a:rPr lang="en-US" dirty="0"/>
+              <a:t>Email address</a:t>
+            </a:r>
+          </a:p>
+        </p:txBody>
+      </p:sp>
+      <p:sp>
+        <p:nvSpPr>
+          <p:cNvPr id="10" name="Rectangle 9">
+            <a:extLst>
+              <a:ext uri="{FF2B5EF4-FFF2-40B4-BE49-F238E27FC236}">
+                <a16:creationId xmlns:a16="http://schemas.microsoft.com/office/drawing/2014/main" id="{74A9630B-0FC3-4F04-B46B-618DFCC769DD}"/>
+              </a:ext>
+            </a:extLst>
+          </p:cNvPr>
+          <p:cNvSpPr/>
+          <p:nvPr/>
+        </p:nvSpPr>
+        <p:spPr>
+          <a:xfrm>
+            <a:off x="8970380" y="2192236"/>
+            <a:ext cx="1591516" cy="254643"/>
+          </a:xfrm>
+          <a:prstGeom prst="rect">
+            <a:avLst/>
+          </a:prstGeom>
+        </p:spPr>
+        <p:style>
+          <a:lnRef idx="2">
+            <a:schemeClr val="dk1"/>
+          </a:lnRef>
+          <a:fillRef idx="1">
+            <a:schemeClr val="lt1"/>
+          </a:fillRef>
+          <a:effectRef idx="0">
+            <a:schemeClr val="dk1"/>
+          </a:effectRef>
+          <a:fontRef idx="minor">
+            <a:schemeClr val="dk1"/>
+          </a:fontRef>
+        </p:style>
+        <p:txBody>
+          <a:bodyPr rtlCol="0" anchor="ctr"/>
+          <a:lstStyle/>
+          <a:p>
+            <a:pPr algn="ctr"/>
+            <a:r>
+              <a:rPr lang="en-US" dirty="0"/>
+              <a:t>Password</a:t>
+            </a:r>
+          </a:p>
+        </p:txBody>
+      </p:sp>
+      <p:sp>
+        <p:nvSpPr>
+          <p:cNvPr id="11" name="Rectangle: Rounded Corners 10">
+            <a:extLst>
+              <a:ext uri="{FF2B5EF4-FFF2-40B4-BE49-F238E27FC236}">
+                <a16:creationId xmlns:a16="http://schemas.microsoft.com/office/drawing/2014/main" id="{EC7DD8A8-0FB0-4C51-A274-26E27128DD6D}"/>
+              </a:ext>
+            </a:extLst>
+          </p:cNvPr>
+          <p:cNvSpPr/>
+          <p:nvPr/>
+        </p:nvSpPr>
+        <p:spPr>
+          <a:xfrm>
+            <a:off x="9160242" y="2606734"/>
+            <a:ext cx="1215332" cy="253619"/>
+          </a:xfrm>
+          <a:prstGeom prst="roundRect">
+            <a:avLst/>
+          </a:prstGeom>
+        </p:spPr>
+        <p:style>
+          <a:lnRef idx="2">
+            <a:schemeClr val="dk1"/>
+          </a:lnRef>
+          <a:fillRef idx="1">
+            <a:schemeClr val="lt1"/>
+          </a:fillRef>
+          <a:effectRef idx="0">
+            <a:schemeClr val="dk1"/>
+          </a:effectRef>
+          <a:fontRef idx="minor">
+            <a:schemeClr val="dk1"/>
+          </a:fontRef>
+        </p:style>
+        <p:txBody>
+          <a:bodyPr rtlCol="0" anchor="ctr"/>
+          <a:lstStyle/>
+          <a:p>
+            <a:pPr algn="ctr"/>
+            <a:r>
+              <a:rPr lang="en-US" dirty="0"/>
+              <a:t>Sign In</a:t>
+            </a:r>
+          </a:p>
+        </p:txBody>
+      </p:sp>
+      <p:sp>
+        <p:nvSpPr>
+          <p:cNvPr id="12" name="TextBox 11">
+            <a:extLst>
+              <a:ext uri="{FF2B5EF4-FFF2-40B4-BE49-F238E27FC236}">
+                <a16:creationId xmlns:a16="http://schemas.microsoft.com/office/drawing/2014/main" id="{9898F5A6-8288-4878-9EC6-BB63BBC79038}"/>
+              </a:ext>
+            </a:extLst>
+          </p:cNvPr>
+          <p:cNvSpPr txBox="1"/>
+          <p:nvPr/>
+        </p:nvSpPr>
+        <p:spPr>
+          <a:xfrm>
+            <a:off x="9457004" y="2901374"/>
+            <a:ext cx="1337996" cy="276999"/>
+          </a:xfrm>
+          <a:prstGeom prst="rect">
+            <a:avLst/>
+          </a:prstGeom>
+          <a:noFill/>
+        </p:spPr>
+        <p:txBody>
+          <a:bodyPr wrap="square" rtlCol="0">
+            <a:spAutoFit/>
+          </a:bodyPr>
+          <a:lstStyle/>
+          <a:p>
+            <a:r>
+              <a:rPr lang="en-US" sz="1200" dirty="0"/>
+              <a:t>Forgot Password? </a:t>
+            </a:r>
+          </a:p>
+        </p:txBody>
+      </p:sp>
+    </p:spTree>
+    <p:extLst>
+      <p:ext uri="{BB962C8B-B14F-4D97-AF65-F5344CB8AC3E}">
+        <p14:creationId xmlns:p14="http://schemas.microsoft.com/office/powerpoint/2010/main" val="1965577430"/>
+      </p:ext>
+    </p:extLst>
+  </p:cSld>
+  <p:clrMapOvr>
+    <a:masterClrMapping/>
+  </p:clrMapOvr>
+</p:sld>
+</file>
+
+<file path=ppt/slides/slide12.xml><?xml version="1.0" encoding="utf-8"?>
+<p:sld xmlns:a="http://schemas.openxmlformats.org/drawingml/2006/main" xmlns:r="http://schemas.openxmlformats.org/officeDocument/2006/relationships" xmlns:p="http://schemas.openxmlformats.org/presentationml/2006/main">
+  <p:cSld>
+    <p:spTree>
+      <p:nvGrpSpPr>
+        <p:cNvPr id="1" name=""/>
+        <p:cNvGrpSpPr/>
+        <p:nvPr/>
+      </p:nvGrpSpPr>
+      <p:grpSpPr>
+        <a:xfrm>
+          <a:off x="0" y="0"/>
+          <a:ext cx="0" cy="0"/>
+          <a:chOff x="0" y="0"/>
+          <a:chExt cx="0" cy="0"/>
+        </a:xfrm>
+      </p:grpSpPr>
+      <p:sp>
+        <p:nvSpPr>
+          <p:cNvPr id="8" name="TextBox 7">
+            <a:extLst>
+              <a:ext uri="{FF2B5EF4-FFF2-40B4-BE49-F238E27FC236}">
+                <a16:creationId xmlns:a16="http://schemas.microsoft.com/office/drawing/2014/main" id="{6B8468B5-7310-4B26-889D-AF6B42A4512C}"/>
+              </a:ext>
+            </a:extLst>
+          </p:cNvPr>
+          <p:cNvSpPr txBox="1"/>
+          <p:nvPr/>
+        </p:nvSpPr>
+        <p:spPr>
+          <a:xfrm>
+            <a:off x="0" y="304800"/>
+            <a:ext cx="12192000" cy="707886"/>
+          </a:xfrm>
+          <a:prstGeom prst="rect">
+            <a:avLst/>
+          </a:prstGeom>
+          <a:noFill/>
+        </p:spPr>
+        <p:txBody>
+          <a:bodyPr wrap="square" rtlCol="0">
+            <a:spAutoFit/>
+          </a:bodyPr>
+          <a:lstStyle/>
+          <a:p>
+            <a:pPr algn="ctr"/>
+            <a:r>
+              <a:rPr lang="en-US" sz="4000" b="1" i="1" dirty="0"/>
+              <a:t>Administrator Home</a:t>
+            </a:r>
+            <a:endParaRPr lang="en-US" b="1" i="1" dirty="0"/>
+          </a:p>
+        </p:txBody>
+      </p:sp>
+      <p:sp>
+        <p:nvSpPr>
+          <p:cNvPr id="2" name="Rectangle 1">
+            <a:extLst>
+              <a:ext uri="{FF2B5EF4-FFF2-40B4-BE49-F238E27FC236}">
+                <a16:creationId xmlns:a16="http://schemas.microsoft.com/office/drawing/2014/main" id="{287A8ECD-4A3C-42EE-AA65-5BA7F91B72D4}"/>
+              </a:ext>
+            </a:extLst>
+          </p:cNvPr>
+          <p:cNvSpPr/>
+          <p:nvPr/>
+        </p:nvSpPr>
+        <p:spPr>
+          <a:xfrm>
+            <a:off x="1397000" y="1242250"/>
+            <a:ext cx="9398000" cy="5310950"/>
+          </a:xfrm>
+          <a:prstGeom prst="rect">
+            <a:avLst/>
+          </a:prstGeom>
+        </p:spPr>
+        <p:style>
+          <a:lnRef idx="2">
+            <a:schemeClr val="dk1"/>
+          </a:lnRef>
+          <a:fillRef idx="1">
+            <a:schemeClr val="lt1"/>
+          </a:fillRef>
+          <a:effectRef idx="0">
+            <a:schemeClr val="dk1"/>
+          </a:effectRef>
+          <a:fontRef idx="minor">
+            <a:schemeClr val="dk1"/>
+          </a:fontRef>
+        </p:style>
+        <p:txBody>
+          <a:bodyPr rtlCol="0" anchor="ctr"/>
+          <a:lstStyle/>
+          <a:p>
+            <a:pPr algn="ctr"/>
+            <a:endParaRPr lang="en-US" dirty="0"/>
+          </a:p>
+        </p:txBody>
+      </p:sp>
+      <p:sp>
+        <p:nvSpPr>
+          <p:cNvPr id="3" name="Rectangle 2">
+            <a:extLst>
+              <a:ext uri="{FF2B5EF4-FFF2-40B4-BE49-F238E27FC236}">
+                <a16:creationId xmlns:a16="http://schemas.microsoft.com/office/drawing/2014/main" id="{1F8E4320-D31B-4A84-B871-103E0C5672EF}"/>
+              </a:ext>
+            </a:extLst>
+          </p:cNvPr>
+          <p:cNvSpPr/>
+          <p:nvPr/>
+        </p:nvSpPr>
+        <p:spPr>
+          <a:xfrm>
+            <a:off x="1397000" y="1242250"/>
+            <a:ext cx="9398000" cy="378206"/>
+          </a:xfrm>
+          <a:prstGeom prst="rect">
+            <a:avLst/>
+          </a:prstGeom>
+        </p:spPr>
+        <p:style>
+          <a:lnRef idx="2">
+            <a:schemeClr val="dk1">
+              <a:shade val="50000"/>
+            </a:schemeClr>
+          </a:lnRef>
+          <a:fillRef idx="1">
+            <a:schemeClr val="dk1"/>
+          </a:fillRef>
+          <a:effectRef idx="0">
+            <a:schemeClr val="dk1"/>
+          </a:effectRef>
+          <a:fontRef idx="minor">
+            <a:schemeClr val="lt1"/>
+          </a:fontRef>
+        </p:style>
+        <p:txBody>
+          <a:bodyPr rtlCol="0" anchor="ctr"/>
+          <a:lstStyle/>
+          <a:p>
+            <a:pPr algn="ctr"/>
+            <a:endParaRPr lang="en-US"/>
+          </a:p>
+        </p:txBody>
+      </p:sp>
+      <p:sp>
+        <p:nvSpPr>
+          <p:cNvPr id="4" name="TextBox 3">
+            <a:extLst>
+              <a:ext uri="{FF2B5EF4-FFF2-40B4-BE49-F238E27FC236}">
+                <a16:creationId xmlns:a16="http://schemas.microsoft.com/office/drawing/2014/main" id="{B64A4259-93A1-4271-B5DA-C5DE7C4A3AEB}"/>
+              </a:ext>
+            </a:extLst>
+          </p:cNvPr>
+          <p:cNvSpPr txBox="1"/>
+          <p:nvPr/>
+        </p:nvSpPr>
+        <p:spPr>
+          <a:xfrm>
+            <a:off x="1608881" y="1242250"/>
+            <a:ext cx="1840375" cy="378206"/>
+          </a:xfrm>
+          <a:prstGeom prst="rect">
+            <a:avLst/>
+          </a:prstGeom>
+          <a:noFill/>
+        </p:spPr>
+        <p:txBody>
+          <a:bodyPr wrap="square" rtlCol="0">
+            <a:spAutoFit/>
+          </a:bodyPr>
+          <a:lstStyle/>
+          <a:p>
+            <a:pPr algn="ctr"/>
+            <a:r>
+              <a:rPr lang="en-US" dirty="0">
+                <a:solidFill>
+                  <a:schemeClr val="bg1"/>
+                </a:solidFill>
+              </a:rPr>
+              <a:t>Booking Manager</a:t>
+            </a:r>
+          </a:p>
+        </p:txBody>
+      </p:sp>
+      <p:sp>
+        <p:nvSpPr>
+          <p:cNvPr id="13" name="TextBox 12">
+            <a:extLst>
+              <a:ext uri="{FF2B5EF4-FFF2-40B4-BE49-F238E27FC236}">
+                <a16:creationId xmlns:a16="http://schemas.microsoft.com/office/drawing/2014/main" id="{51DE2D29-D9A0-4DC6-9993-64A3484A2627}"/>
+              </a:ext>
+            </a:extLst>
+          </p:cNvPr>
+          <p:cNvSpPr txBox="1"/>
+          <p:nvPr/>
+        </p:nvSpPr>
+        <p:spPr>
+          <a:xfrm>
+            <a:off x="3449256" y="1242250"/>
+            <a:ext cx="1840375" cy="378206"/>
+          </a:xfrm>
+          <a:prstGeom prst="rect">
+            <a:avLst/>
+          </a:prstGeom>
+          <a:noFill/>
+        </p:spPr>
+        <p:txBody>
+          <a:bodyPr wrap="square" rtlCol="0">
+            <a:spAutoFit/>
+          </a:bodyPr>
+          <a:lstStyle/>
+          <a:p>
+            <a:pPr algn="ctr"/>
+            <a:r>
+              <a:rPr lang="en-US" dirty="0">
+                <a:solidFill>
+                  <a:schemeClr val="bg1"/>
+                </a:solidFill>
+              </a:rPr>
+              <a:t>Price Manager</a:t>
+            </a:r>
+          </a:p>
+        </p:txBody>
+      </p:sp>
+      <p:sp>
+        <p:nvSpPr>
+          <p:cNvPr id="14" name="TextBox 13">
+            <a:extLst>
+              <a:ext uri="{FF2B5EF4-FFF2-40B4-BE49-F238E27FC236}">
+                <a16:creationId xmlns:a16="http://schemas.microsoft.com/office/drawing/2014/main" id="{DD779965-0EA2-4985-8433-986261223AEA}"/>
+              </a:ext>
+            </a:extLst>
+          </p:cNvPr>
+          <p:cNvSpPr txBox="1"/>
+          <p:nvPr/>
+        </p:nvSpPr>
+        <p:spPr>
+          <a:xfrm>
+            <a:off x="8954625" y="1242250"/>
+            <a:ext cx="1840375" cy="378206"/>
+          </a:xfrm>
+          <a:prstGeom prst="rect">
+            <a:avLst/>
+          </a:prstGeom>
+          <a:noFill/>
+        </p:spPr>
+        <p:txBody>
+          <a:bodyPr wrap="square" rtlCol="0">
+            <a:spAutoFit/>
+          </a:bodyPr>
+          <a:lstStyle/>
+          <a:p>
+            <a:pPr algn="ctr"/>
+            <a:r>
+              <a:rPr lang="en-US" dirty="0">
+                <a:solidFill>
+                  <a:schemeClr val="bg1"/>
+                </a:solidFill>
+              </a:rPr>
+              <a:t>Logout</a:t>
+            </a:r>
+          </a:p>
+        </p:txBody>
+      </p:sp>
+      <p:sp>
+        <p:nvSpPr>
+          <p:cNvPr id="21" name="Rectangle 20">
+            <a:extLst>
+              <a:ext uri="{FF2B5EF4-FFF2-40B4-BE49-F238E27FC236}">
+                <a16:creationId xmlns:a16="http://schemas.microsoft.com/office/drawing/2014/main" id="{85BEDB46-53C5-4C2A-888E-52E7E50DAE3E}"/>
+              </a:ext>
+            </a:extLst>
+          </p:cNvPr>
+          <p:cNvSpPr/>
+          <p:nvPr/>
+        </p:nvSpPr>
+        <p:spPr>
+          <a:xfrm>
+            <a:off x="3183037" y="2017854"/>
+            <a:ext cx="2912963" cy="1371600"/>
+          </a:xfrm>
+          <a:prstGeom prst="rect">
+            <a:avLst/>
+          </a:prstGeom>
+        </p:spPr>
+        <p:style>
+          <a:lnRef idx="2">
+            <a:schemeClr val="dk1"/>
+          </a:lnRef>
+          <a:fillRef idx="1">
+            <a:schemeClr val="lt1"/>
+          </a:fillRef>
+          <a:effectRef idx="0">
+            <a:schemeClr val="dk1"/>
+          </a:effectRef>
+          <a:fontRef idx="minor">
+            <a:schemeClr val="dk1"/>
+          </a:fontRef>
+        </p:style>
+        <p:txBody>
+          <a:bodyPr rtlCol="0" anchor="ctr"/>
+          <a:lstStyle/>
+          <a:p>
+            <a:pPr algn="ctr"/>
+            <a:r>
+              <a:rPr lang="en-US" dirty="0"/>
+              <a:t>Booking Summary</a:t>
+            </a:r>
+          </a:p>
+        </p:txBody>
+      </p:sp>
+      <p:sp>
+        <p:nvSpPr>
+          <p:cNvPr id="22" name="Rectangle 21">
+            <a:extLst>
+              <a:ext uri="{FF2B5EF4-FFF2-40B4-BE49-F238E27FC236}">
+                <a16:creationId xmlns:a16="http://schemas.microsoft.com/office/drawing/2014/main" id="{428FD17C-F3C8-4730-94D8-18E0222EB010}"/>
+              </a:ext>
+            </a:extLst>
+          </p:cNvPr>
+          <p:cNvSpPr/>
+          <p:nvPr/>
+        </p:nvSpPr>
+        <p:spPr>
+          <a:xfrm>
+            <a:off x="6096000" y="2017854"/>
+            <a:ext cx="2912963" cy="1371600"/>
+          </a:xfrm>
+          <a:prstGeom prst="rect">
+            <a:avLst/>
+          </a:prstGeom>
+        </p:spPr>
+        <p:style>
+          <a:lnRef idx="2">
+            <a:schemeClr val="dk1"/>
+          </a:lnRef>
+          <a:fillRef idx="1">
+            <a:schemeClr val="lt1"/>
+          </a:fillRef>
+          <a:effectRef idx="0">
+            <a:schemeClr val="dk1"/>
+          </a:effectRef>
+          <a:fontRef idx="minor">
+            <a:schemeClr val="dk1"/>
+          </a:fontRef>
+        </p:style>
+        <p:txBody>
+          <a:bodyPr rtlCol="0" anchor="ctr"/>
+          <a:lstStyle/>
+          <a:p>
+            <a:pPr algn="ctr"/>
+            <a:r>
+              <a:rPr lang="en-US" dirty="0"/>
+              <a:t>Current Price Summary</a:t>
+            </a:r>
+          </a:p>
+        </p:txBody>
+      </p:sp>
+      <p:sp>
+        <p:nvSpPr>
+          <p:cNvPr id="24" name="Rectangle 23">
+            <a:extLst>
+              <a:ext uri="{FF2B5EF4-FFF2-40B4-BE49-F238E27FC236}">
+                <a16:creationId xmlns:a16="http://schemas.microsoft.com/office/drawing/2014/main" id="{ABBCEED0-DD97-40C7-8C4D-C1E13892186D}"/>
+              </a:ext>
+            </a:extLst>
+          </p:cNvPr>
+          <p:cNvSpPr/>
+          <p:nvPr/>
+        </p:nvSpPr>
+        <p:spPr>
+          <a:xfrm>
+            <a:off x="3183037" y="3389454"/>
+            <a:ext cx="5825926" cy="2513636"/>
+          </a:xfrm>
+          <a:prstGeom prst="rect">
+            <a:avLst/>
+          </a:prstGeom>
+        </p:spPr>
+        <p:style>
+          <a:lnRef idx="2">
+            <a:schemeClr val="dk1"/>
+          </a:lnRef>
+          <a:fillRef idx="1">
+            <a:schemeClr val="lt1"/>
+          </a:fillRef>
+          <a:effectRef idx="0">
+            <a:schemeClr val="dk1"/>
+          </a:effectRef>
+          <a:fontRef idx="minor">
+            <a:schemeClr val="dk1"/>
+          </a:fontRef>
+        </p:style>
+        <p:txBody>
+          <a:bodyPr rtlCol="0" anchor="ctr"/>
+          <a:lstStyle/>
+          <a:p>
+            <a:pPr algn="ctr"/>
+            <a:r>
+              <a:rPr lang="en-US" dirty="0"/>
+              <a:t>Full Year Calendar showing summary</a:t>
+            </a:r>
+          </a:p>
+        </p:txBody>
+      </p:sp>
+    </p:spTree>
+    <p:extLst>
+      <p:ext uri="{BB962C8B-B14F-4D97-AF65-F5344CB8AC3E}">
+        <p14:creationId xmlns:p14="http://schemas.microsoft.com/office/powerpoint/2010/main" val="918983366"/>
+      </p:ext>
+    </p:extLst>
+  </p:cSld>
+  <p:clrMapOvr>
+    <a:masterClrMapping/>
+  </p:clrMapOvr>
+</p:sld>
+</file>
+
+<file path=ppt/slides/slide13.xml><?xml version="1.0" encoding="utf-8"?>
+<p:sld xmlns:a="http://schemas.openxmlformats.org/drawingml/2006/main" xmlns:r="http://schemas.openxmlformats.org/officeDocument/2006/relationships" xmlns:p="http://schemas.openxmlformats.org/presentationml/2006/main">
+  <p:cSld>
+    <p:spTree>
+      <p:nvGrpSpPr>
+        <p:cNvPr id="1" name=""/>
+        <p:cNvGrpSpPr/>
+        <p:nvPr/>
+      </p:nvGrpSpPr>
+      <p:grpSpPr>
+        <a:xfrm>
+          <a:off x="0" y="0"/>
+          <a:ext cx="0" cy="0"/>
+          <a:chOff x="0" y="0"/>
+          <a:chExt cx="0" cy="0"/>
+        </a:xfrm>
+      </p:grpSpPr>
+      <p:sp>
+        <p:nvSpPr>
+          <p:cNvPr id="8" name="TextBox 7">
+            <a:extLst>
+              <a:ext uri="{FF2B5EF4-FFF2-40B4-BE49-F238E27FC236}">
+                <a16:creationId xmlns:a16="http://schemas.microsoft.com/office/drawing/2014/main" id="{6B8468B5-7310-4B26-889D-AF6B42A4512C}"/>
+              </a:ext>
+            </a:extLst>
+          </p:cNvPr>
+          <p:cNvSpPr txBox="1"/>
+          <p:nvPr/>
+        </p:nvSpPr>
+        <p:spPr>
+          <a:xfrm>
+            <a:off x="0" y="304800"/>
+            <a:ext cx="12192000" cy="707886"/>
+          </a:xfrm>
+          <a:prstGeom prst="rect">
+            <a:avLst/>
+          </a:prstGeom>
+          <a:noFill/>
+        </p:spPr>
+        <p:txBody>
+          <a:bodyPr wrap="square" rtlCol="0">
+            <a:spAutoFit/>
+          </a:bodyPr>
+          <a:lstStyle/>
+          <a:p>
+            <a:pPr algn="ctr"/>
+            <a:r>
+              <a:rPr lang="en-US" sz="4000" b="1" i="1" dirty="0"/>
+              <a:t>Administrator Home</a:t>
+            </a:r>
+            <a:endParaRPr lang="en-US" b="1" i="1" dirty="0"/>
+          </a:p>
+        </p:txBody>
+      </p:sp>
+      <p:sp>
+        <p:nvSpPr>
+          <p:cNvPr id="2" name="Rectangle 1">
+            <a:extLst>
+              <a:ext uri="{FF2B5EF4-FFF2-40B4-BE49-F238E27FC236}">
+                <a16:creationId xmlns:a16="http://schemas.microsoft.com/office/drawing/2014/main" id="{287A8ECD-4A3C-42EE-AA65-5BA7F91B72D4}"/>
+              </a:ext>
+            </a:extLst>
+          </p:cNvPr>
+          <p:cNvSpPr/>
+          <p:nvPr/>
+        </p:nvSpPr>
+        <p:spPr>
+          <a:xfrm>
+            <a:off x="1397000" y="1242250"/>
+            <a:ext cx="9398000" cy="5310950"/>
+          </a:xfrm>
+          <a:prstGeom prst="rect">
+            <a:avLst/>
+          </a:prstGeom>
+        </p:spPr>
+        <p:style>
+          <a:lnRef idx="2">
+            <a:schemeClr val="dk1"/>
+          </a:lnRef>
+          <a:fillRef idx="1">
+            <a:schemeClr val="lt1"/>
+          </a:fillRef>
+          <a:effectRef idx="0">
+            <a:schemeClr val="dk1"/>
+          </a:effectRef>
+          <a:fontRef idx="minor">
+            <a:schemeClr val="dk1"/>
+          </a:fontRef>
+        </p:style>
+        <p:txBody>
+          <a:bodyPr rtlCol="0" anchor="ctr"/>
+          <a:lstStyle/>
+          <a:p>
+            <a:pPr algn="ctr"/>
+            <a:endParaRPr lang="en-US" dirty="0"/>
+          </a:p>
+        </p:txBody>
+      </p:sp>
+      <p:sp>
+        <p:nvSpPr>
+          <p:cNvPr id="3" name="Rectangle 2">
+            <a:extLst>
+              <a:ext uri="{FF2B5EF4-FFF2-40B4-BE49-F238E27FC236}">
+                <a16:creationId xmlns:a16="http://schemas.microsoft.com/office/drawing/2014/main" id="{1F8E4320-D31B-4A84-B871-103E0C5672EF}"/>
+              </a:ext>
+            </a:extLst>
+          </p:cNvPr>
+          <p:cNvSpPr/>
+          <p:nvPr/>
+        </p:nvSpPr>
+        <p:spPr>
+          <a:xfrm>
+            <a:off x="1397000" y="1242250"/>
+            <a:ext cx="9398000" cy="378206"/>
+          </a:xfrm>
+          <a:prstGeom prst="rect">
+            <a:avLst/>
+          </a:prstGeom>
+        </p:spPr>
+        <p:style>
+          <a:lnRef idx="2">
+            <a:schemeClr val="dk1">
+              <a:shade val="50000"/>
+            </a:schemeClr>
+          </a:lnRef>
+          <a:fillRef idx="1">
+            <a:schemeClr val="dk1"/>
+          </a:fillRef>
+          <a:effectRef idx="0">
+            <a:schemeClr val="dk1"/>
+          </a:effectRef>
+          <a:fontRef idx="minor">
+            <a:schemeClr val="lt1"/>
+          </a:fontRef>
+        </p:style>
+        <p:txBody>
+          <a:bodyPr rtlCol="0" anchor="ctr"/>
+          <a:lstStyle/>
+          <a:p>
+            <a:pPr algn="ctr"/>
+            <a:endParaRPr lang="en-US"/>
+          </a:p>
+        </p:txBody>
+      </p:sp>
+      <p:sp>
+        <p:nvSpPr>
+          <p:cNvPr id="4" name="TextBox 3">
+            <a:extLst>
+              <a:ext uri="{FF2B5EF4-FFF2-40B4-BE49-F238E27FC236}">
+                <a16:creationId xmlns:a16="http://schemas.microsoft.com/office/drawing/2014/main" id="{B64A4259-93A1-4271-B5DA-C5DE7C4A3AEB}"/>
+              </a:ext>
+            </a:extLst>
+          </p:cNvPr>
+          <p:cNvSpPr txBox="1"/>
+          <p:nvPr/>
+        </p:nvSpPr>
+        <p:spPr>
+          <a:xfrm>
+            <a:off x="1608881" y="1242250"/>
+            <a:ext cx="1840375" cy="378206"/>
+          </a:xfrm>
+          <a:prstGeom prst="rect">
+            <a:avLst/>
+          </a:prstGeom>
+          <a:noFill/>
+        </p:spPr>
+        <p:txBody>
+          <a:bodyPr wrap="square" rtlCol="0">
+            <a:spAutoFit/>
+          </a:bodyPr>
+          <a:lstStyle/>
+          <a:p>
+            <a:pPr algn="ctr"/>
+            <a:r>
+              <a:rPr lang="en-US" dirty="0">
+                <a:solidFill>
+                  <a:schemeClr val="bg1"/>
+                </a:solidFill>
+              </a:rPr>
+              <a:t>Booking Manager</a:t>
+            </a:r>
+          </a:p>
+        </p:txBody>
+      </p:sp>
+      <p:sp>
+        <p:nvSpPr>
+          <p:cNvPr id="13" name="TextBox 12">
+            <a:extLst>
+              <a:ext uri="{FF2B5EF4-FFF2-40B4-BE49-F238E27FC236}">
+                <a16:creationId xmlns:a16="http://schemas.microsoft.com/office/drawing/2014/main" id="{51DE2D29-D9A0-4DC6-9993-64A3484A2627}"/>
+              </a:ext>
+            </a:extLst>
+          </p:cNvPr>
+          <p:cNvSpPr txBox="1"/>
+          <p:nvPr/>
+        </p:nvSpPr>
+        <p:spPr>
+          <a:xfrm>
+            <a:off x="3449256" y="1242250"/>
+            <a:ext cx="1840375" cy="378206"/>
+          </a:xfrm>
+          <a:prstGeom prst="rect">
+            <a:avLst/>
+          </a:prstGeom>
+          <a:noFill/>
+        </p:spPr>
+        <p:txBody>
+          <a:bodyPr wrap="square" rtlCol="0">
+            <a:spAutoFit/>
+          </a:bodyPr>
+          <a:lstStyle/>
+          <a:p>
+            <a:pPr algn="ctr"/>
+            <a:r>
+              <a:rPr lang="en-US" dirty="0">
+                <a:solidFill>
+                  <a:schemeClr val="bg1"/>
+                </a:solidFill>
+              </a:rPr>
+              <a:t>Price Manager</a:t>
+            </a:r>
+          </a:p>
+        </p:txBody>
+      </p:sp>
+      <p:sp>
+        <p:nvSpPr>
+          <p:cNvPr id="14" name="TextBox 13">
+            <a:extLst>
+              <a:ext uri="{FF2B5EF4-FFF2-40B4-BE49-F238E27FC236}">
+                <a16:creationId xmlns:a16="http://schemas.microsoft.com/office/drawing/2014/main" id="{DD779965-0EA2-4985-8433-986261223AEA}"/>
+              </a:ext>
+            </a:extLst>
+          </p:cNvPr>
+          <p:cNvSpPr txBox="1"/>
+          <p:nvPr/>
+        </p:nvSpPr>
+        <p:spPr>
+          <a:xfrm>
+            <a:off x="8954625" y="1242250"/>
+            <a:ext cx="1840375" cy="378206"/>
+          </a:xfrm>
+          <a:prstGeom prst="rect">
+            <a:avLst/>
+          </a:prstGeom>
+          <a:noFill/>
+        </p:spPr>
+        <p:txBody>
+          <a:bodyPr wrap="square" rtlCol="0">
+            <a:spAutoFit/>
+          </a:bodyPr>
+          <a:lstStyle/>
+          <a:p>
+            <a:pPr algn="ctr"/>
+            <a:r>
+              <a:rPr lang="en-US" dirty="0">
+                <a:solidFill>
+                  <a:schemeClr val="bg1"/>
+                </a:solidFill>
+              </a:rPr>
+              <a:t>Logout</a:t>
+            </a:r>
+          </a:p>
+        </p:txBody>
+      </p:sp>
+      <p:sp>
+        <p:nvSpPr>
+          <p:cNvPr id="7" name="Plus Sign 6">
+            <a:extLst>
+              <a:ext uri="{FF2B5EF4-FFF2-40B4-BE49-F238E27FC236}">
+                <a16:creationId xmlns:a16="http://schemas.microsoft.com/office/drawing/2014/main" id="{92F7B37A-2638-4795-B235-E81BC1829E3E}"/>
+              </a:ext>
+            </a:extLst>
+          </p:cNvPr>
+          <p:cNvSpPr/>
+          <p:nvPr/>
+        </p:nvSpPr>
+        <p:spPr>
+          <a:xfrm>
+            <a:off x="2048719" y="5867988"/>
+            <a:ext cx="480349" cy="480349"/>
+          </a:xfrm>
+          <a:prstGeom prst="mathPlus">
+            <a:avLst/>
+          </a:prstGeom>
+        </p:spPr>
+        <p:style>
+          <a:lnRef idx="2">
+            <a:schemeClr val="dk1"/>
+          </a:lnRef>
+          <a:fillRef idx="1">
+            <a:schemeClr val="lt1"/>
+          </a:fillRef>
+          <a:effectRef idx="0">
+            <a:schemeClr val="dk1"/>
+          </a:effectRef>
+          <a:fontRef idx="minor">
+            <a:schemeClr val="dk1"/>
+          </a:fontRef>
+        </p:style>
+        <p:txBody>
+          <a:bodyPr rtlCol="0" anchor="ctr"/>
+          <a:lstStyle/>
+          <a:p>
+            <a:pPr algn="ctr"/>
+            <a:endParaRPr lang="en-US"/>
+          </a:p>
+        </p:txBody>
+      </p:sp>
+      <p:sp>
+        <p:nvSpPr>
+          <p:cNvPr id="10" name="Rectangle 9">
+            <a:extLst>
+              <a:ext uri="{FF2B5EF4-FFF2-40B4-BE49-F238E27FC236}">
+                <a16:creationId xmlns:a16="http://schemas.microsoft.com/office/drawing/2014/main" id="{710C4725-9935-4D9F-AB85-912789AE1B71}"/>
+              </a:ext>
+            </a:extLst>
+          </p:cNvPr>
+          <p:cNvSpPr/>
+          <p:nvPr/>
+        </p:nvSpPr>
+        <p:spPr>
+          <a:xfrm>
+            <a:off x="2037144" y="2054506"/>
+            <a:ext cx="8009682" cy="3784058"/>
+          </a:xfrm>
+          <a:prstGeom prst="rect">
+            <a:avLst/>
+          </a:prstGeom>
+        </p:spPr>
+        <p:style>
+          <a:lnRef idx="2">
+            <a:schemeClr val="dk1"/>
+          </a:lnRef>
+          <a:fillRef idx="1">
+            <a:schemeClr val="lt1"/>
+          </a:fillRef>
+          <a:effectRef idx="0">
+            <a:schemeClr val="dk1"/>
+          </a:effectRef>
+          <a:fontRef idx="minor">
+            <a:schemeClr val="dk1"/>
+          </a:fontRef>
+        </p:style>
+        <p:txBody>
+          <a:bodyPr rtlCol="0" anchor="ctr"/>
+          <a:lstStyle/>
+          <a:p>
+            <a:pPr algn="ctr"/>
+            <a:r>
+              <a:rPr lang="en-US" dirty="0"/>
+              <a:t>Calendar</a:t>
+            </a:r>
+          </a:p>
+        </p:txBody>
+      </p:sp>
+    </p:spTree>
+    <p:extLst>
+      <p:ext uri="{BB962C8B-B14F-4D97-AF65-F5344CB8AC3E}">
+        <p14:creationId xmlns:p14="http://schemas.microsoft.com/office/powerpoint/2010/main" val="2931391008"/>
+      </p:ext>
+    </p:extLst>
+  </p:cSld>
+  <p:clrMapOvr>
+    <a:masterClrMapping/>
+  </p:clrMapOvr>
+</p:sld>
+</file>
+
+<file path=ppt/slides/slide14.xml><?xml version="1.0" encoding="utf-8"?>
+<p:sld xmlns:a="http://schemas.openxmlformats.org/drawingml/2006/main" xmlns:r="http://schemas.openxmlformats.org/officeDocument/2006/relationships" xmlns:p="http://schemas.openxmlformats.org/presentationml/2006/main">
+  <p:cSld>
+    <p:spTree>
+      <p:nvGrpSpPr>
+        <p:cNvPr id="1" name=""/>
+        <p:cNvGrpSpPr/>
+        <p:nvPr/>
+      </p:nvGrpSpPr>
+      <p:grpSpPr>
+        <a:xfrm>
+          <a:off x="0" y="0"/>
+          <a:ext cx="0" cy="0"/>
+          <a:chOff x="0" y="0"/>
+          <a:chExt cx="0" cy="0"/>
+        </a:xfrm>
+      </p:grpSpPr>
+      <p:sp>
+        <p:nvSpPr>
+          <p:cNvPr id="8" name="TextBox 7">
+            <a:extLst>
+              <a:ext uri="{FF2B5EF4-FFF2-40B4-BE49-F238E27FC236}">
+                <a16:creationId xmlns:a16="http://schemas.microsoft.com/office/drawing/2014/main" id="{6B8468B5-7310-4B26-889D-AF6B42A4512C}"/>
+              </a:ext>
+            </a:extLst>
+          </p:cNvPr>
+          <p:cNvSpPr txBox="1"/>
+          <p:nvPr/>
+        </p:nvSpPr>
+        <p:spPr>
+          <a:xfrm>
+            <a:off x="0" y="304800"/>
+            <a:ext cx="12192000" cy="707886"/>
+          </a:xfrm>
+          <a:prstGeom prst="rect">
+            <a:avLst/>
+          </a:prstGeom>
+          <a:noFill/>
+        </p:spPr>
+        <p:txBody>
+          <a:bodyPr wrap="square" rtlCol="0">
+            <a:spAutoFit/>
+          </a:bodyPr>
+          <a:lstStyle/>
+          <a:p>
+            <a:pPr algn="ctr"/>
+            <a:r>
+              <a:rPr lang="en-US" sz="4000" b="1" i="1" dirty="0"/>
+              <a:t>Individual Booking</a:t>
+            </a:r>
+            <a:endParaRPr lang="en-US" b="1" i="1" dirty="0"/>
+          </a:p>
+        </p:txBody>
+      </p:sp>
+      <p:sp>
+        <p:nvSpPr>
+          <p:cNvPr id="2" name="Rectangle 1">
+            <a:extLst>
+              <a:ext uri="{FF2B5EF4-FFF2-40B4-BE49-F238E27FC236}">
+                <a16:creationId xmlns:a16="http://schemas.microsoft.com/office/drawing/2014/main" id="{287A8ECD-4A3C-42EE-AA65-5BA7F91B72D4}"/>
+              </a:ext>
+            </a:extLst>
+          </p:cNvPr>
+          <p:cNvSpPr/>
+          <p:nvPr/>
+        </p:nvSpPr>
+        <p:spPr>
+          <a:xfrm>
+            <a:off x="1397000" y="1242250"/>
+            <a:ext cx="9398000" cy="5310950"/>
+          </a:xfrm>
+          <a:prstGeom prst="rect">
+            <a:avLst/>
+          </a:prstGeom>
+        </p:spPr>
+        <p:style>
+          <a:lnRef idx="2">
+            <a:schemeClr val="dk1"/>
+          </a:lnRef>
+          <a:fillRef idx="1">
+            <a:schemeClr val="lt1"/>
+          </a:fillRef>
+          <a:effectRef idx="0">
+            <a:schemeClr val="dk1"/>
+          </a:effectRef>
+          <a:fontRef idx="minor">
+            <a:schemeClr val="dk1"/>
+          </a:fontRef>
+        </p:style>
+        <p:txBody>
+          <a:bodyPr rtlCol="0" anchor="ctr"/>
+          <a:lstStyle/>
+          <a:p>
+            <a:pPr algn="ctr"/>
+            <a:endParaRPr lang="en-US" dirty="0"/>
+          </a:p>
+        </p:txBody>
+      </p:sp>
+      <p:sp>
+        <p:nvSpPr>
+          <p:cNvPr id="3" name="Rectangle 2">
+            <a:extLst>
+              <a:ext uri="{FF2B5EF4-FFF2-40B4-BE49-F238E27FC236}">
+                <a16:creationId xmlns:a16="http://schemas.microsoft.com/office/drawing/2014/main" id="{1F8E4320-D31B-4A84-B871-103E0C5672EF}"/>
+              </a:ext>
+            </a:extLst>
+          </p:cNvPr>
+          <p:cNvSpPr/>
+          <p:nvPr/>
+        </p:nvSpPr>
+        <p:spPr>
+          <a:xfrm>
+            <a:off x="1397000" y="1242250"/>
+            <a:ext cx="9398000" cy="378206"/>
+          </a:xfrm>
+          <a:prstGeom prst="rect">
+            <a:avLst/>
+          </a:prstGeom>
+        </p:spPr>
+        <p:style>
+          <a:lnRef idx="2">
+            <a:schemeClr val="dk1">
+              <a:shade val="50000"/>
+            </a:schemeClr>
+          </a:lnRef>
+          <a:fillRef idx="1">
+            <a:schemeClr val="dk1"/>
+          </a:fillRef>
+          <a:effectRef idx="0">
+            <a:schemeClr val="dk1"/>
+          </a:effectRef>
+          <a:fontRef idx="minor">
+            <a:schemeClr val="lt1"/>
+          </a:fontRef>
+        </p:style>
+        <p:txBody>
+          <a:bodyPr rtlCol="0" anchor="ctr"/>
+          <a:lstStyle/>
+          <a:p>
+            <a:pPr algn="ctr"/>
+            <a:endParaRPr lang="en-US"/>
+          </a:p>
+        </p:txBody>
+      </p:sp>
+      <p:sp>
+        <p:nvSpPr>
+          <p:cNvPr id="4" name="TextBox 3">
+            <a:extLst>
+              <a:ext uri="{FF2B5EF4-FFF2-40B4-BE49-F238E27FC236}">
+                <a16:creationId xmlns:a16="http://schemas.microsoft.com/office/drawing/2014/main" id="{B64A4259-93A1-4271-B5DA-C5DE7C4A3AEB}"/>
+              </a:ext>
+            </a:extLst>
+          </p:cNvPr>
+          <p:cNvSpPr txBox="1"/>
+          <p:nvPr/>
+        </p:nvSpPr>
+        <p:spPr>
+          <a:xfrm>
+            <a:off x="1608881" y="1242250"/>
+            <a:ext cx="1840375" cy="378206"/>
+          </a:xfrm>
+          <a:prstGeom prst="rect">
+            <a:avLst/>
+          </a:prstGeom>
+          <a:noFill/>
+        </p:spPr>
+        <p:txBody>
+          <a:bodyPr wrap="square" rtlCol="0">
+            <a:spAutoFit/>
+          </a:bodyPr>
+          <a:lstStyle/>
+          <a:p>
+            <a:pPr algn="ctr"/>
+            <a:r>
+              <a:rPr lang="en-US" dirty="0">
+                <a:solidFill>
+                  <a:schemeClr val="bg1"/>
+                </a:solidFill>
+              </a:rPr>
+              <a:t>Booking Manager</a:t>
+            </a:r>
+          </a:p>
+        </p:txBody>
+      </p:sp>
+      <p:sp>
+        <p:nvSpPr>
+          <p:cNvPr id="13" name="TextBox 12">
+            <a:extLst>
+              <a:ext uri="{FF2B5EF4-FFF2-40B4-BE49-F238E27FC236}">
+                <a16:creationId xmlns:a16="http://schemas.microsoft.com/office/drawing/2014/main" id="{51DE2D29-D9A0-4DC6-9993-64A3484A2627}"/>
+              </a:ext>
+            </a:extLst>
+          </p:cNvPr>
+          <p:cNvSpPr txBox="1"/>
+          <p:nvPr/>
+        </p:nvSpPr>
+        <p:spPr>
+          <a:xfrm>
+            <a:off x="3449256" y="1242250"/>
+            <a:ext cx="1840375" cy="378206"/>
+          </a:xfrm>
+          <a:prstGeom prst="rect">
+            <a:avLst/>
+          </a:prstGeom>
+          <a:noFill/>
+        </p:spPr>
+        <p:txBody>
+          <a:bodyPr wrap="square" rtlCol="0">
+            <a:spAutoFit/>
+          </a:bodyPr>
+          <a:lstStyle/>
+          <a:p>
+            <a:pPr algn="ctr"/>
+            <a:r>
+              <a:rPr lang="en-US" dirty="0">
+                <a:solidFill>
+                  <a:schemeClr val="bg1"/>
+                </a:solidFill>
+              </a:rPr>
+              <a:t>Price Manager</a:t>
+            </a:r>
+          </a:p>
+        </p:txBody>
+      </p:sp>
+      <p:sp>
+        <p:nvSpPr>
+          <p:cNvPr id="14" name="TextBox 13">
+            <a:extLst>
+              <a:ext uri="{FF2B5EF4-FFF2-40B4-BE49-F238E27FC236}">
+                <a16:creationId xmlns:a16="http://schemas.microsoft.com/office/drawing/2014/main" id="{DD779965-0EA2-4985-8433-986261223AEA}"/>
+              </a:ext>
+            </a:extLst>
+          </p:cNvPr>
+          <p:cNvSpPr txBox="1"/>
+          <p:nvPr/>
+        </p:nvSpPr>
+        <p:spPr>
+          <a:xfrm>
+            <a:off x="8954625" y="1242250"/>
+            <a:ext cx="1840375" cy="378206"/>
+          </a:xfrm>
+          <a:prstGeom prst="rect">
+            <a:avLst/>
+          </a:prstGeom>
+          <a:noFill/>
+        </p:spPr>
+        <p:txBody>
+          <a:bodyPr wrap="square" rtlCol="0">
+            <a:spAutoFit/>
+          </a:bodyPr>
+          <a:lstStyle/>
+          <a:p>
+            <a:pPr algn="ctr"/>
+            <a:r>
+              <a:rPr lang="en-US" dirty="0">
+                <a:solidFill>
+                  <a:schemeClr val="bg1"/>
+                </a:solidFill>
+              </a:rPr>
+              <a:t>Logout</a:t>
+            </a:r>
+          </a:p>
+        </p:txBody>
+      </p:sp>
+      <p:sp>
+        <p:nvSpPr>
+          <p:cNvPr id="10" name="Rectangle 9">
+            <a:extLst>
+              <a:ext uri="{FF2B5EF4-FFF2-40B4-BE49-F238E27FC236}">
+                <a16:creationId xmlns:a16="http://schemas.microsoft.com/office/drawing/2014/main" id="{710C4725-9935-4D9F-AB85-912789AE1B71}"/>
+              </a:ext>
+            </a:extLst>
+          </p:cNvPr>
+          <p:cNvSpPr/>
+          <p:nvPr/>
+        </p:nvSpPr>
+        <p:spPr>
+          <a:xfrm>
+            <a:off x="2037144" y="2465408"/>
+            <a:ext cx="8009682" cy="3373156"/>
+          </a:xfrm>
+          <a:prstGeom prst="rect">
+            <a:avLst/>
+          </a:prstGeom>
+        </p:spPr>
+        <p:style>
+          <a:lnRef idx="2">
+            <a:schemeClr val="dk1"/>
+          </a:lnRef>
+          <a:fillRef idx="1">
+            <a:schemeClr val="lt1"/>
+          </a:fillRef>
+          <a:effectRef idx="0">
+            <a:schemeClr val="dk1"/>
+          </a:effectRef>
+          <a:fontRef idx="minor">
+            <a:schemeClr val="dk1"/>
+          </a:fontRef>
+        </p:style>
+        <p:txBody>
+          <a:bodyPr rtlCol="0" anchor="ctr"/>
+          <a:lstStyle/>
+          <a:p>
+            <a:r>
+              <a:rPr lang="en-US" dirty="0"/>
+              <a:t>   Booking Details</a:t>
+            </a:r>
+          </a:p>
+          <a:p>
+            <a:endParaRPr lang="en-US" dirty="0"/>
+          </a:p>
+          <a:p>
+            <a:endParaRPr lang="en-US" dirty="0"/>
+          </a:p>
+          <a:p>
+            <a:endParaRPr lang="en-US" dirty="0"/>
+          </a:p>
+          <a:p>
+            <a:endParaRPr lang="en-US" dirty="0"/>
+          </a:p>
+          <a:p>
+            <a:endParaRPr lang="en-US" dirty="0"/>
+          </a:p>
+          <a:p>
+            <a:endParaRPr lang="en-US" dirty="0"/>
+          </a:p>
+        </p:txBody>
+      </p:sp>
+      <p:sp>
+        <p:nvSpPr>
+          <p:cNvPr id="11" name="TextBox 10">
+            <a:extLst>
+              <a:ext uri="{FF2B5EF4-FFF2-40B4-BE49-F238E27FC236}">
+                <a16:creationId xmlns:a16="http://schemas.microsoft.com/office/drawing/2014/main" id="{0E3EE51B-7F72-459A-936D-7647C6C65F69}"/>
+              </a:ext>
+            </a:extLst>
+          </p:cNvPr>
+          <p:cNvSpPr txBox="1"/>
+          <p:nvPr/>
+        </p:nvSpPr>
+        <p:spPr>
+          <a:xfrm>
+            <a:off x="2037144" y="1855906"/>
+            <a:ext cx="8009682" cy="369332"/>
+          </a:xfrm>
+          <a:prstGeom prst="rect">
+            <a:avLst/>
+          </a:prstGeom>
+          <a:noFill/>
+        </p:spPr>
+        <p:txBody>
+          <a:bodyPr wrap="square" rtlCol="0">
+            <a:spAutoFit/>
+          </a:bodyPr>
+          <a:lstStyle/>
+          <a:p>
+            <a:r>
+              <a:rPr lang="en-US" i="1" dirty="0"/>
+              <a:t>Individual Booking</a:t>
+            </a:r>
+          </a:p>
+        </p:txBody>
+      </p:sp>
+      <p:sp>
+        <p:nvSpPr>
+          <p:cNvPr id="5" name="Rectangle 4">
+            <a:extLst>
+              <a:ext uri="{FF2B5EF4-FFF2-40B4-BE49-F238E27FC236}">
+                <a16:creationId xmlns:a16="http://schemas.microsoft.com/office/drawing/2014/main" id="{CA587C35-A275-4D36-9711-0192CC0A10A2}"/>
+              </a:ext>
+            </a:extLst>
+          </p:cNvPr>
+          <p:cNvSpPr/>
+          <p:nvPr/>
+        </p:nvSpPr>
+        <p:spPr>
+          <a:xfrm>
+            <a:off x="2288893" y="4749423"/>
+            <a:ext cx="1241385" cy="529753"/>
+          </a:xfrm>
+          <a:prstGeom prst="rect">
+            <a:avLst/>
+          </a:prstGeom>
+        </p:spPr>
+        <p:style>
+          <a:lnRef idx="2">
+            <a:schemeClr val="dk1"/>
+          </a:lnRef>
+          <a:fillRef idx="1">
+            <a:schemeClr val="lt1"/>
+          </a:fillRef>
+          <a:effectRef idx="0">
+            <a:schemeClr val="dk1"/>
+          </a:effectRef>
+          <a:fontRef idx="minor">
+            <a:schemeClr val="dk1"/>
+          </a:fontRef>
+        </p:style>
+        <p:txBody>
+          <a:bodyPr rtlCol="0" anchor="ctr"/>
+          <a:lstStyle/>
+          <a:p>
+            <a:pPr algn="ctr"/>
+            <a:r>
+              <a:rPr lang="en-US" dirty="0"/>
+              <a:t>Set to</a:t>
+            </a:r>
+          </a:p>
+        </p:txBody>
+      </p:sp>
+      <p:sp>
+        <p:nvSpPr>
+          <p:cNvPr id="6" name="Rectangle 5">
+            <a:extLst>
+              <a:ext uri="{FF2B5EF4-FFF2-40B4-BE49-F238E27FC236}">
+                <a16:creationId xmlns:a16="http://schemas.microsoft.com/office/drawing/2014/main" id="{1366A79F-AB04-44FB-982D-759AC89FD502}"/>
+              </a:ext>
+            </a:extLst>
+          </p:cNvPr>
+          <p:cNvSpPr/>
+          <p:nvPr/>
+        </p:nvSpPr>
+        <p:spPr>
+          <a:xfrm>
+            <a:off x="3530278" y="4412848"/>
+            <a:ext cx="1652287" cy="1202902"/>
+          </a:xfrm>
+          <a:prstGeom prst="rect">
+            <a:avLst/>
+          </a:prstGeom>
+        </p:spPr>
+        <p:style>
+          <a:lnRef idx="2">
+            <a:schemeClr val="dk1"/>
+          </a:lnRef>
+          <a:fillRef idx="1">
+            <a:schemeClr val="lt1"/>
+          </a:fillRef>
+          <a:effectRef idx="0">
+            <a:schemeClr val="dk1"/>
+          </a:effectRef>
+          <a:fontRef idx="minor">
+            <a:schemeClr val="dk1"/>
+          </a:fontRef>
+        </p:style>
+        <p:txBody>
+          <a:bodyPr rtlCol="0" anchor="ctr"/>
+          <a:lstStyle/>
+          <a:p>
+            <a:pPr marL="285750" indent="-285750" algn="ctr">
+              <a:buFontTx/>
+              <a:buChar char="-"/>
+            </a:pPr>
+            <a:r>
+              <a:rPr lang="en-US" dirty="0"/>
+              <a:t>Reserved</a:t>
+            </a:r>
+          </a:p>
+          <a:p>
+            <a:pPr marL="285750" indent="-285750" algn="ctr">
+              <a:buFontTx/>
+              <a:buChar char="-"/>
+            </a:pPr>
+            <a:r>
+              <a:rPr lang="en-US" dirty="0"/>
+              <a:t>Booked</a:t>
+            </a:r>
+          </a:p>
+          <a:p>
+            <a:pPr marL="285750" indent="-285750" algn="ctr">
+              <a:buFontTx/>
+              <a:buChar char="-"/>
+            </a:pPr>
+            <a:r>
+              <a:rPr lang="en-US" dirty="0"/>
+              <a:t>Deleted</a:t>
+            </a:r>
+          </a:p>
+        </p:txBody>
+      </p:sp>
+      <p:sp>
+        <p:nvSpPr>
+          <p:cNvPr id="9" name="TextBox 8">
+            <a:extLst>
+              <a:ext uri="{FF2B5EF4-FFF2-40B4-BE49-F238E27FC236}">
+                <a16:creationId xmlns:a16="http://schemas.microsoft.com/office/drawing/2014/main" id="{BEDB68C9-8E34-4285-A542-83A01DD40F4D}"/>
+              </a:ext>
+            </a:extLst>
+          </p:cNvPr>
+          <p:cNvSpPr txBox="1"/>
+          <p:nvPr/>
+        </p:nvSpPr>
+        <p:spPr>
+          <a:xfrm>
+            <a:off x="2106592" y="5838564"/>
+            <a:ext cx="1652287" cy="369332"/>
+          </a:xfrm>
+          <a:prstGeom prst="rect">
+            <a:avLst/>
+          </a:prstGeom>
+        </p:spPr>
+        <p:style>
+          <a:lnRef idx="2">
+            <a:schemeClr val="dk1"/>
+          </a:lnRef>
+          <a:fillRef idx="1">
+            <a:schemeClr val="lt1"/>
+          </a:fillRef>
+          <a:effectRef idx="0">
+            <a:schemeClr val="dk1"/>
+          </a:effectRef>
+          <a:fontRef idx="minor">
+            <a:schemeClr val="dk1"/>
+          </a:fontRef>
+        </p:style>
+        <p:txBody>
+          <a:bodyPr wrap="square" rtlCol="0">
+            <a:spAutoFit/>
+          </a:bodyPr>
+          <a:lstStyle/>
+          <a:p>
+            <a:r>
+              <a:rPr lang="en-US" dirty="0"/>
+              <a:t>Home</a:t>
+            </a:r>
+          </a:p>
+        </p:txBody>
+      </p:sp>
+    </p:spTree>
+    <p:extLst>
+      <p:ext uri="{BB962C8B-B14F-4D97-AF65-F5344CB8AC3E}">
+        <p14:creationId xmlns:p14="http://schemas.microsoft.com/office/powerpoint/2010/main" val="2121241969"/>
+      </p:ext>
+    </p:extLst>
+  </p:cSld>
+  <p:clrMapOvr>
+    <a:masterClrMapping/>
+  </p:clrMapOvr>
+</p:sld>
+</file>
+
+<file path=ppt/slides/slide15.xml><?xml version="1.0" encoding="utf-8"?>
+<p:sld xmlns:a="http://schemas.openxmlformats.org/drawingml/2006/main" xmlns:r="http://schemas.openxmlformats.org/officeDocument/2006/relationships" xmlns:p="http://schemas.openxmlformats.org/presentationml/2006/main">
+  <p:cSld>
+    <p:spTree>
+      <p:nvGrpSpPr>
+        <p:cNvPr id="1" name=""/>
+        <p:cNvGrpSpPr/>
+        <p:nvPr/>
+      </p:nvGrpSpPr>
+      <p:grpSpPr>
+        <a:xfrm>
+          <a:off x="0" y="0"/>
+          <a:ext cx="0" cy="0"/>
+          <a:chOff x="0" y="0"/>
+          <a:chExt cx="0" cy="0"/>
+        </a:xfrm>
+      </p:grpSpPr>
+      <p:sp>
+        <p:nvSpPr>
+          <p:cNvPr id="8" name="TextBox 7">
+            <a:extLst>
+              <a:ext uri="{FF2B5EF4-FFF2-40B4-BE49-F238E27FC236}">
+                <a16:creationId xmlns:a16="http://schemas.microsoft.com/office/drawing/2014/main" id="{6B8468B5-7310-4B26-889D-AF6B42A4512C}"/>
+              </a:ext>
+            </a:extLst>
+          </p:cNvPr>
+          <p:cNvSpPr txBox="1"/>
+          <p:nvPr/>
+        </p:nvSpPr>
+        <p:spPr>
+          <a:xfrm>
+            <a:off x="0" y="304800"/>
+            <a:ext cx="12192000" cy="707886"/>
+          </a:xfrm>
+          <a:prstGeom prst="rect">
+            <a:avLst/>
+          </a:prstGeom>
+          <a:noFill/>
+        </p:spPr>
+        <p:txBody>
+          <a:bodyPr wrap="square" rtlCol="0">
+            <a:spAutoFit/>
+          </a:bodyPr>
+          <a:lstStyle/>
+          <a:p>
+            <a:pPr algn="ctr"/>
+            <a:r>
+              <a:rPr lang="en-US" sz="4000" b="1" i="1" dirty="0"/>
+              <a:t>Price Manager</a:t>
+            </a:r>
+            <a:endParaRPr lang="en-US" b="1" i="1" dirty="0"/>
+          </a:p>
+        </p:txBody>
+      </p:sp>
+      <p:sp>
+        <p:nvSpPr>
+          <p:cNvPr id="2" name="Rectangle 1">
+            <a:extLst>
+              <a:ext uri="{FF2B5EF4-FFF2-40B4-BE49-F238E27FC236}">
+                <a16:creationId xmlns:a16="http://schemas.microsoft.com/office/drawing/2014/main" id="{287A8ECD-4A3C-42EE-AA65-5BA7F91B72D4}"/>
+              </a:ext>
+            </a:extLst>
+          </p:cNvPr>
+          <p:cNvSpPr/>
+          <p:nvPr/>
+        </p:nvSpPr>
+        <p:spPr>
+          <a:xfrm>
+            <a:off x="1397000" y="1242250"/>
+            <a:ext cx="9398000" cy="5310950"/>
+          </a:xfrm>
+          <a:prstGeom prst="rect">
+            <a:avLst/>
+          </a:prstGeom>
+        </p:spPr>
+        <p:style>
+          <a:lnRef idx="2">
+            <a:schemeClr val="dk1"/>
+          </a:lnRef>
+          <a:fillRef idx="1">
+            <a:schemeClr val="lt1"/>
+          </a:fillRef>
+          <a:effectRef idx="0">
+            <a:schemeClr val="dk1"/>
+          </a:effectRef>
+          <a:fontRef idx="minor">
+            <a:schemeClr val="dk1"/>
+          </a:fontRef>
+        </p:style>
+        <p:txBody>
+          <a:bodyPr rtlCol="0" anchor="ctr"/>
+          <a:lstStyle/>
+          <a:p>
+            <a:pPr algn="ctr"/>
+            <a:endParaRPr lang="en-US" dirty="0"/>
+          </a:p>
+        </p:txBody>
+      </p:sp>
+      <p:sp>
+        <p:nvSpPr>
+          <p:cNvPr id="3" name="Rectangle 2">
+            <a:extLst>
+              <a:ext uri="{FF2B5EF4-FFF2-40B4-BE49-F238E27FC236}">
+                <a16:creationId xmlns:a16="http://schemas.microsoft.com/office/drawing/2014/main" id="{1F8E4320-D31B-4A84-B871-103E0C5672EF}"/>
+              </a:ext>
+            </a:extLst>
+          </p:cNvPr>
+          <p:cNvSpPr/>
+          <p:nvPr/>
+        </p:nvSpPr>
+        <p:spPr>
+          <a:xfrm>
+            <a:off x="1397000" y="1242250"/>
+            <a:ext cx="9398000" cy="378206"/>
+          </a:xfrm>
+          <a:prstGeom prst="rect">
+            <a:avLst/>
+          </a:prstGeom>
+        </p:spPr>
+        <p:style>
+          <a:lnRef idx="2">
+            <a:schemeClr val="dk1">
+              <a:shade val="50000"/>
+            </a:schemeClr>
+          </a:lnRef>
+          <a:fillRef idx="1">
+            <a:schemeClr val="dk1"/>
+          </a:fillRef>
+          <a:effectRef idx="0">
+            <a:schemeClr val="dk1"/>
+          </a:effectRef>
+          <a:fontRef idx="minor">
+            <a:schemeClr val="lt1"/>
+          </a:fontRef>
+        </p:style>
+        <p:txBody>
+          <a:bodyPr rtlCol="0" anchor="ctr"/>
+          <a:lstStyle/>
+          <a:p>
+            <a:pPr algn="ctr"/>
+            <a:endParaRPr lang="en-US"/>
+          </a:p>
+        </p:txBody>
+      </p:sp>
+      <p:sp>
+        <p:nvSpPr>
+          <p:cNvPr id="4" name="TextBox 3">
+            <a:extLst>
+              <a:ext uri="{FF2B5EF4-FFF2-40B4-BE49-F238E27FC236}">
+                <a16:creationId xmlns:a16="http://schemas.microsoft.com/office/drawing/2014/main" id="{B64A4259-93A1-4271-B5DA-C5DE7C4A3AEB}"/>
+              </a:ext>
+            </a:extLst>
+          </p:cNvPr>
+          <p:cNvSpPr txBox="1"/>
+          <p:nvPr/>
+        </p:nvSpPr>
+        <p:spPr>
+          <a:xfrm>
+            <a:off x="1608881" y="1242250"/>
+            <a:ext cx="1840375" cy="378206"/>
+          </a:xfrm>
+          <a:prstGeom prst="rect">
+            <a:avLst/>
+          </a:prstGeom>
+          <a:noFill/>
+        </p:spPr>
+        <p:txBody>
+          <a:bodyPr wrap="square" rtlCol="0">
+            <a:spAutoFit/>
+          </a:bodyPr>
+          <a:lstStyle/>
+          <a:p>
+            <a:pPr algn="ctr"/>
+            <a:r>
+              <a:rPr lang="en-US" dirty="0">
+                <a:solidFill>
+                  <a:schemeClr val="bg1"/>
+                </a:solidFill>
+              </a:rPr>
+              <a:t>Booking Manager</a:t>
+            </a:r>
+          </a:p>
+        </p:txBody>
+      </p:sp>
+      <p:sp>
+        <p:nvSpPr>
+          <p:cNvPr id="13" name="TextBox 12">
+            <a:extLst>
+              <a:ext uri="{FF2B5EF4-FFF2-40B4-BE49-F238E27FC236}">
+                <a16:creationId xmlns:a16="http://schemas.microsoft.com/office/drawing/2014/main" id="{51DE2D29-D9A0-4DC6-9993-64A3484A2627}"/>
+              </a:ext>
+            </a:extLst>
+          </p:cNvPr>
+          <p:cNvSpPr txBox="1"/>
+          <p:nvPr/>
+        </p:nvSpPr>
+        <p:spPr>
+          <a:xfrm>
+            <a:off x="3449256" y="1242250"/>
+            <a:ext cx="1840375" cy="378206"/>
+          </a:xfrm>
+          <a:prstGeom prst="rect">
+            <a:avLst/>
+          </a:prstGeom>
+          <a:noFill/>
+        </p:spPr>
+        <p:txBody>
+          <a:bodyPr wrap="square" rtlCol="0">
+            <a:spAutoFit/>
+          </a:bodyPr>
+          <a:lstStyle/>
+          <a:p>
+            <a:pPr algn="ctr"/>
+            <a:r>
+              <a:rPr lang="en-US" dirty="0">
+                <a:solidFill>
+                  <a:schemeClr val="bg1"/>
+                </a:solidFill>
+              </a:rPr>
+              <a:t>Price Manager</a:t>
+            </a:r>
+          </a:p>
+        </p:txBody>
+      </p:sp>
+      <p:sp>
+        <p:nvSpPr>
+          <p:cNvPr id="14" name="TextBox 13">
+            <a:extLst>
+              <a:ext uri="{FF2B5EF4-FFF2-40B4-BE49-F238E27FC236}">
+                <a16:creationId xmlns:a16="http://schemas.microsoft.com/office/drawing/2014/main" id="{DD779965-0EA2-4985-8433-986261223AEA}"/>
+              </a:ext>
+            </a:extLst>
+          </p:cNvPr>
+          <p:cNvSpPr txBox="1"/>
+          <p:nvPr/>
+        </p:nvSpPr>
+        <p:spPr>
+          <a:xfrm>
+            <a:off x="8954625" y="1242250"/>
+            <a:ext cx="1840375" cy="378206"/>
+          </a:xfrm>
+          <a:prstGeom prst="rect">
+            <a:avLst/>
+          </a:prstGeom>
+          <a:noFill/>
+        </p:spPr>
+        <p:txBody>
+          <a:bodyPr wrap="square" rtlCol="0">
+            <a:spAutoFit/>
+          </a:bodyPr>
+          <a:lstStyle/>
+          <a:p>
+            <a:pPr algn="ctr"/>
+            <a:r>
+              <a:rPr lang="en-US" dirty="0">
+                <a:solidFill>
+                  <a:schemeClr val="bg1"/>
+                </a:solidFill>
+              </a:rPr>
+              <a:t>Logout</a:t>
+            </a:r>
+          </a:p>
+        </p:txBody>
+      </p:sp>
+      <p:sp>
+        <p:nvSpPr>
+          <p:cNvPr id="11" name="TextBox 10">
+            <a:extLst>
+              <a:ext uri="{FF2B5EF4-FFF2-40B4-BE49-F238E27FC236}">
+                <a16:creationId xmlns:a16="http://schemas.microsoft.com/office/drawing/2014/main" id="{0E3EE51B-7F72-459A-936D-7647C6C65F69}"/>
+              </a:ext>
+            </a:extLst>
+          </p:cNvPr>
+          <p:cNvSpPr txBox="1"/>
+          <p:nvPr/>
+        </p:nvSpPr>
+        <p:spPr>
+          <a:xfrm>
+            <a:off x="2037144" y="1855906"/>
+            <a:ext cx="8009682" cy="369332"/>
+          </a:xfrm>
+          <a:prstGeom prst="rect">
+            <a:avLst/>
+          </a:prstGeom>
+          <a:noFill/>
+        </p:spPr>
+        <p:txBody>
+          <a:bodyPr wrap="square" rtlCol="0">
+            <a:spAutoFit/>
+          </a:bodyPr>
+          <a:lstStyle/>
+          <a:p>
+            <a:r>
+              <a:rPr lang="en-US" i="1" dirty="0"/>
+              <a:t>Price Ranges</a:t>
+            </a:r>
+          </a:p>
+        </p:txBody>
+      </p:sp>
+      <p:sp>
+        <p:nvSpPr>
+          <p:cNvPr id="27" name="Rectangle 26">
+            <a:extLst>
+              <a:ext uri="{FF2B5EF4-FFF2-40B4-BE49-F238E27FC236}">
+                <a16:creationId xmlns:a16="http://schemas.microsoft.com/office/drawing/2014/main" id="{4C8D0116-95EB-4DF1-878B-0A65C269F7D7}"/>
+              </a:ext>
+            </a:extLst>
+          </p:cNvPr>
+          <p:cNvSpPr/>
+          <p:nvPr/>
+        </p:nvSpPr>
+        <p:spPr>
+          <a:xfrm>
+            <a:off x="2127811" y="2412836"/>
+            <a:ext cx="7531261" cy="1395231"/>
+          </a:xfrm>
+          <a:prstGeom prst="rect">
+            <a:avLst/>
+          </a:prstGeom>
+        </p:spPr>
+        <p:style>
+          <a:lnRef idx="2">
+            <a:schemeClr val="dk1"/>
+          </a:lnRef>
+          <a:fillRef idx="1">
+            <a:schemeClr val="lt1"/>
+          </a:fillRef>
+          <a:effectRef idx="0">
+            <a:schemeClr val="dk1"/>
+          </a:effectRef>
+          <a:fontRef idx="minor">
+            <a:schemeClr val="dk1"/>
+          </a:fontRef>
+        </p:style>
+        <p:txBody>
+          <a:bodyPr rtlCol="0" anchor="ctr"/>
+          <a:lstStyle/>
+          <a:p>
+            <a:pPr algn="ctr"/>
+            <a:r>
+              <a:rPr lang="en-US" dirty="0"/>
+              <a:t>Written description of price data</a:t>
+            </a:r>
+            <a:br>
+              <a:rPr lang="en-US" dirty="0"/>
+            </a:br>
+            <a:r>
+              <a:rPr lang="en-US" dirty="0"/>
+              <a:t>Written description of price data</a:t>
+            </a:r>
+          </a:p>
+        </p:txBody>
+      </p:sp>
+      <p:cxnSp>
+        <p:nvCxnSpPr>
+          <p:cNvPr id="29" name="Straight Connector 28">
+            <a:extLst>
+              <a:ext uri="{FF2B5EF4-FFF2-40B4-BE49-F238E27FC236}">
+                <a16:creationId xmlns:a16="http://schemas.microsoft.com/office/drawing/2014/main" id="{730B05E7-DA24-4054-A214-AC98427FC105}"/>
+              </a:ext>
+            </a:extLst>
+          </p:cNvPr>
+          <p:cNvCxnSpPr>
+            <a:cxnSpLocks/>
+          </p:cNvCxnSpPr>
+          <p:nvPr/>
+        </p:nvCxnSpPr>
+        <p:spPr>
+          <a:xfrm>
+            <a:off x="2141316" y="2259961"/>
+            <a:ext cx="7517756" cy="0"/>
+          </a:xfrm>
+          <a:prstGeom prst="line">
+            <a:avLst/>
+          </a:prstGeom>
+        </p:spPr>
+        <p:style>
+          <a:lnRef idx="1">
+            <a:schemeClr val="dk1"/>
+          </a:lnRef>
+          <a:fillRef idx="0">
+            <a:schemeClr val="dk1"/>
+          </a:fillRef>
+          <a:effectRef idx="0">
+            <a:schemeClr val="dk1"/>
+          </a:effectRef>
+          <a:fontRef idx="minor">
+            <a:schemeClr val="tx1"/>
+          </a:fontRef>
+        </p:style>
+      </p:cxnSp>
+      <p:cxnSp>
+        <p:nvCxnSpPr>
+          <p:cNvPr id="31" name="Straight Connector 30">
+            <a:extLst>
+              <a:ext uri="{FF2B5EF4-FFF2-40B4-BE49-F238E27FC236}">
+                <a16:creationId xmlns:a16="http://schemas.microsoft.com/office/drawing/2014/main" id="{DD31279C-0192-4F01-8866-087562215560}"/>
+              </a:ext>
+            </a:extLst>
+          </p:cNvPr>
+          <p:cNvCxnSpPr>
+            <a:cxnSpLocks/>
+          </p:cNvCxnSpPr>
+          <p:nvPr/>
+        </p:nvCxnSpPr>
+        <p:spPr>
+          <a:xfrm>
+            <a:off x="2160608" y="4021234"/>
+            <a:ext cx="7517756" cy="0"/>
+          </a:xfrm>
+          <a:prstGeom prst="line">
+            <a:avLst/>
+          </a:prstGeom>
+        </p:spPr>
+        <p:style>
+          <a:lnRef idx="1">
+            <a:schemeClr val="dk1"/>
+          </a:lnRef>
+          <a:fillRef idx="0">
+            <a:schemeClr val="dk1"/>
+          </a:fillRef>
+          <a:effectRef idx="0">
+            <a:schemeClr val="dk1"/>
+          </a:effectRef>
+          <a:fontRef idx="minor">
+            <a:schemeClr val="tx1"/>
+          </a:fontRef>
+        </p:style>
+      </p:cxnSp>
+      <p:sp>
+        <p:nvSpPr>
+          <p:cNvPr id="33" name="Multiplication Sign 32">
+            <a:extLst>
+              <a:ext uri="{FF2B5EF4-FFF2-40B4-BE49-F238E27FC236}">
+                <a16:creationId xmlns:a16="http://schemas.microsoft.com/office/drawing/2014/main" id="{84729C00-F858-4155-886C-27BF2B171A17}"/>
+              </a:ext>
+            </a:extLst>
+          </p:cNvPr>
+          <p:cNvSpPr/>
+          <p:nvPr/>
+        </p:nvSpPr>
+        <p:spPr>
+          <a:xfrm>
+            <a:off x="7500395" y="2836766"/>
+            <a:ext cx="347241" cy="347241"/>
+          </a:xfrm>
+          <a:prstGeom prst="mathMultiply">
+            <a:avLst/>
+          </a:prstGeom>
+          <a:solidFill>
+            <a:srgbClr val="FF0000"/>
+          </a:solidFill>
+        </p:spPr>
+        <p:style>
+          <a:lnRef idx="2">
+            <a:schemeClr val="accent1">
+              <a:shade val="50000"/>
+            </a:schemeClr>
+          </a:lnRef>
+          <a:fillRef idx="1">
+            <a:schemeClr val="accent1"/>
+          </a:fillRef>
+          <a:effectRef idx="0">
+            <a:schemeClr val="accent1"/>
+          </a:effectRef>
+          <a:fontRef idx="minor">
+            <a:schemeClr val="lt1"/>
+          </a:fontRef>
+        </p:style>
+        <p:txBody>
+          <a:bodyPr rtlCol="0" anchor="ctr"/>
+          <a:lstStyle/>
+          <a:p>
+            <a:pPr algn="ctr"/>
+            <a:endParaRPr lang="en-US"/>
+          </a:p>
+        </p:txBody>
+      </p:sp>
+      <p:sp>
+        <p:nvSpPr>
+          <p:cNvPr id="34" name="Multiplication Sign 33">
+            <a:extLst>
+              <a:ext uri="{FF2B5EF4-FFF2-40B4-BE49-F238E27FC236}">
+                <a16:creationId xmlns:a16="http://schemas.microsoft.com/office/drawing/2014/main" id="{532BB2A6-3D82-4A11-B6A2-82C03AE9C353}"/>
+              </a:ext>
+            </a:extLst>
+          </p:cNvPr>
+          <p:cNvSpPr/>
+          <p:nvPr/>
+        </p:nvSpPr>
+        <p:spPr>
+          <a:xfrm>
+            <a:off x="7500394" y="3125406"/>
+            <a:ext cx="347241" cy="347241"/>
+          </a:xfrm>
+          <a:prstGeom prst="mathMultiply">
+            <a:avLst/>
+          </a:prstGeom>
+          <a:solidFill>
+            <a:srgbClr val="FF0000"/>
+          </a:solidFill>
+        </p:spPr>
+        <p:style>
+          <a:lnRef idx="2">
+            <a:schemeClr val="accent1">
+              <a:shade val="50000"/>
+            </a:schemeClr>
+          </a:lnRef>
+          <a:fillRef idx="1">
+            <a:schemeClr val="accent1"/>
+          </a:fillRef>
+          <a:effectRef idx="0">
+            <a:schemeClr val="accent1"/>
+          </a:effectRef>
+          <a:fontRef idx="minor">
+            <a:schemeClr val="lt1"/>
+          </a:fontRef>
+        </p:style>
+        <p:txBody>
+          <a:bodyPr rtlCol="0" anchor="ctr"/>
+          <a:lstStyle/>
+          <a:p>
+            <a:pPr algn="ctr"/>
+            <a:endParaRPr lang="en-US"/>
+          </a:p>
+        </p:txBody>
+      </p:sp>
+      <p:sp>
+        <p:nvSpPr>
+          <p:cNvPr id="35" name="TextBox 34">
+            <a:extLst>
+              <a:ext uri="{FF2B5EF4-FFF2-40B4-BE49-F238E27FC236}">
+                <a16:creationId xmlns:a16="http://schemas.microsoft.com/office/drawing/2014/main" id="{BF67F2A5-8CBB-4F57-AFCD-B3BF1E217215}"/>
+              </a:ext>
+            </a:extLst>
+          </p:cNvPr>
+          <p:cNvSpPr txBox="1"/>
+          <p:nvPr/>
+        </p:nvSpPr>
+        <p:spPr>
+          <a:xfrm>
+            <a:off x="4427316" y="4126375"/>
+            <a:ext cx="3188826" cy="369332"/>
+          </a:xfrm>
+          <a:prstGeom prst="rect">
+            <a:avLst/>
+          </a:prstGeom>
+          <a:ln/>
+        </p:spPr>
+        <p:style>
+          <a:lnRef idx="2">
+            <a:schemeClr val="dk1"/>
+          </a:lnRef>
+          <a:fillRef idx="1">
+            <a:schemeClr val="lt1"/>
+          </a:fillRef>
+          <a:effectRef idx="0">
+            <a:schemeClr val="dk1"/>
+          </a:effectRef>
+          <a:fontRef idx="minor">
+            <a:schemeClr val="dk1"/>
+          </a:fontRef>
+        </p:style>
+        <p:txBody>
+          <a:bodyPr wrap="square" rtlCol="0">
+            <a:spAutoFit/>
+          </a:bodyPr>
+          <a:lstStyle/>
+          <a:p>
+            <a:pPr algn="ctr"/>
+            <a:r>
+              <a:rPr lang="en-US" dirty="0"/>
+              <a:t>Add new price rule</a:t>
+            </a:r>
+          </a:p>
+        </p:txBody>
+      </p:sp>
+      <p:sp>
+        <p:nvSpPr>
+          <p:cNvPr id="36" name="TextBox 35">
+            <a:extLst>
+              <a:ext uri="{FF2B5EF4-FFF2-40B4-BE49-F238E27FC236}">
+                <a16:creationId xmlns:a16="http://schemas.microsoft.com/office/drawing/2014/main" id="{8561C1CA-D08E-4610-B447-7F17128F715F}"/>
+              </a:ext>
+            </a:extLst>
+          </p:cNvPr>
+          <p:cNvSpPr txBox="1"/>
+          <p:nvPr/>
+        </p:nvSpPr>
+        <p:spPr>
+          <a:xfrm>
+            <a:off x="7928658" y="2819405"/>
+            <a:ext cx="769717" cy="369332"/>
+          </a:xfrm>
+          <a:prstGeom prst="rect">
+            <a:avLst/>
+          </a:prstGeom>
+        </p:spPr>
+        <p:style>
+          <a:lnRef idx="2">
+            <a:schemeClr val="dk1"/>
+          </a:lnRef>
+          <a:fillRef idx="1">
+            <a:schemeClr val="lt1"/>
+          </a:fillRef>
+          <a:effectRef idx="0">
+            <a:schemeClr val="dk1"/>
+          </a:effectRef>
+          <a:fontRef idx="minor">
+            <a:schemeClr val="dk1"/>
+          </a:fontRef>
+        </p:style>
+        <p:txBody>
+          <a:bodyPr wrap="square" rtlCol="0">
+            <a:spAutoFit/>
+          </a:bodyPr>
+          <a:lstStyle/>
+          <a:p>
+            <a:pPr algn="ctr"/>
+            <a:r>
+              <a:rPr lang="en-US" dirty="0"/>
+              <a:t>Edit</a:t>
+            </a:r>
+          </a:p>
+        </p:txBody>
+      </p:sp>
+      <p:sp>
+        <p:nvSpPr>
+          <p:cNvPr id="37" name="TextBox 36">
+            <a:extLst>
+              <a:ext uri="{FF2B5EF4-FFF2-40B4-BE49-F238E27FC236}">
+                <a16:creationId xmlns:a16="http://schemas.microsoft.com/office/drawing/2014/main" id="{EBF6B2A7-45EF-451A-88E7-50BF82A8E42B}"/>
+              </a:ext>
+            </a:extLst>
+          </p:cNvPr>
+          <p:cNvSpPr txBox="1"/>
+          <p:nvPr/>
+        </p:nvSpPr>
+        <p:spPr>
+          <a:xfrm>
+            <a:off x="7928658" y="3198481"/>
+            <a:ext cx="769717" cy="369332"/>
+          </a:xfrm>
+          <a:prstGeom prst="rect">
+            <a:avLst/>
+          </a:prstGeom>
+        </p:spPr>
+        <p:style>
+          <a:lnRef idx="2">
+            <a:schemeClr val="dk1"/>
+          </a:lnRef>
+          <a:fillRef idx="1">
+            <a:schemeClr val="lt1"/>
+          </a:fillRef>
+          <a:effectRef idx="0">
+            <a:schemeClr val="dk1"/>
+          </a:effectRef>
+          <a:fontRef idx="minor">
+            <a:schemeClr val="dk1"/>
+          </a:fontRef>
+        </p:style>
+        <p:txBody>
+          <a:bodyPr wrap="square" rtlCol="0">
+            <a:spAutoFit/>
+          </a:bodyPr>
+          <a:lstStyle/>
+          <a:p>
+            <a:pPr algn="ctr"/>
+            <a:r>
+              <a:rPr lang="en-US" dirty="0"/>
+              <a:t>Edit</a:t>
+            </a:r>
+          </a:p>
+        </p:txBody>
+      </p:sp>
+    </p:spTree>
+    <p:extLst>
+      <p:ext uri="{BB962C8B-B14F-4D97-AF65-F5344CB8AC3E}">
+        <p14:creationId xmlns:p14="http://schemas.microsoft.com/office/powerpoint/2010/main" val="1724000442"/>
+      </p:ext>
+    </p:extLst>
+  </p:cSld>
+  <p:clrMapOvr>
+    <a:masterClrMapping/>
+  </p:clrMapOvr>
+</p:sld>
+</file>
+
+<file path=ppt/slides/slide16.xml><?xml version="1.0" encoding="utf-8"?>
+<p:sld xmlns:a="http://schemas.openxmlformats.org/drawingml/2006/main" xmlns:r="http://schemas.openxmlformats.org/officeDocument/2006/relationships" xmlns:p="http://schemas.openxmlformats.org/presentationml/2006/main">
+  <p:cSld>
+    <p:spTree>
+      <p:nvGrpSpPr>
+        <p:cNvPr id="1" name=""/>
+        <p:cNvGrpSpPr/>
+        <p:nvPr/>
+      </p:nvGrpSpPr>
+      <p:grpSpPr>
+        <a:xfrm>
+          <a:off x="0" y="0"/>
+          <a:ext cx="0" cy="0"/>
+          <a:chOff x="0" y="0"/>
+          <a:chExt cx="0" cy="0"/>
+        </a:xfrm>
+      </p:grpSpPr>
+      <p:sp>
+        <p:nvSpPr>
+          <p:cNvPr id="8" name="TextBox 7">
+            <a:extLst>
+              <a:ext uri="{FF2B5EF4-FFF2-40B4-BE49-F238E27FC236}">
+                <a16:creationId xmlns:a16="http://schemas.microsoft.com/office/drawing/2014/main" id="{6B8468B5-7310-4B26-889D-AF6B42A4512C}"/>
+              </a:ext>
+            </a:extLst>
+          </p:cNvPr>
+          <p:cNvSpPr txBox="1"/>
+          <p:nvPr/>
+        </p:nvSpPr>
+        <p:spPr>
+          <a:xfrm>
+            <a:off x="0" y="304800"/>
+            <a:ext cx="12192000" cy="707886"/>
+          </a:xfrm>
+          <a:prstGeom prst="rect">
+            <a:avLst/>
+          </a:prstGeom>
+          <a:noFill/>
+        </p:spPr>
+        <p:txBody>
+          <a:bodyPr wrap="square" rtlCol="0">
+            <a:spAutoFit/>
+          </a:bodyPr>
+          <a:lstStyle/>
+          <a:p>
+            <a:pPr algn="ctr"/>
+            <a:r>
+              <a:rPr lang="en-US" sz="4000" b="1" i="1" dirty="0"/>
+              <a:t>New Price Rule</a:t>
+            </a:r>
+            <a:endParaRPr lang="en-US" b="1" i="1" dirty="0"/>
+          </a:p>
+        </p:txBody>
+      </p:sp>
+      <p:sp>
+        <p:nvSpPr>
+          <p:cNvPr id="2" name="Rectangle 1">
+            <a:extLst>
+              <a:ext uri="{FF2B5EF4-FFF2-40B4-BE49-F238E27FC236}">
+                <a16:creationId xmlns:a16="http://schemas.microsoft.com/office/drawing/2014/main" id="{287A8ECD-4A3C-42EE-AA65-5BA7F91B72D4}"/>
+              </a:ext>
+            </a:extLst>
+          </p:cNvPr>
+          <p:cNvSpPr/>
+          <p:nvPr/>
+        </p:nvSpPr>
+        <p:spPr>
+          <a:xfrm>
+            <a:off x="1397000" y="1242250"/>
+            <a:ext cx="9398000" cy="5860008"/>
+          </a:xfrm>
+          <a:prstGeom prst="rect">
+            <a:avLst/>
+          </a:prstGeom>
+        </p:spPr>
+        <p:style>
+          <a:lnRef idx="2">
+            <a:schemeClr val="dk1"/>
+          </a:lnRef>
+          <a:fillRef idx="1">
+            <a:schemeClr val="lt1"/>
+          </a:fillRef>
+          <a:effectRef idx="0">
+            <a:schemeClr val="dk1"/>
+          </a:effectRef>
+          <a:fontRef idx="minor">
+            <a:schemeClr val="dk1"/>
+          </a:fontRef>
+        </p:style>
+        <p:txBody>
+          <a:bodyPr rtlCol="0" anchor="ctr"/>
+          <a:lstStyle/>
+          <a:p>
+            <a:pPr algn="ctr"/>
+            <a:endParaRPr lang="en-US" dirty="0"/>
+          </a:p>
+        </p:txBody>
+      </p:sp>
+      <p:sp>
+        <p:nvSpPr>
+          <p:cNvPr id="3" name="Rectangle 2">
+            <a:extLst>
+              <a:ext uri="{FF2B5EF4-FFF2-40B4-BE49-F238E27FC236}">
+                <a16:creationId xmlns:a16="http://schemas.microsoft.com/office/drawing/2014/main" id="{1F8E4320-D31B-4A84-B871-103E0C5672EF}"/>
+              </a:ext>
+            </a:extLst>
+          </p:cNvPr>
+          <p:cNvSpPr/>
+          <p:nvPr/>
+        </p:nvSpPr>
+        <p:spPr>
+          <a:xfrm>
+            <a:off x="1397000" y="1242250"/>
+            <a:ext cx="9398000" cy="378206"/>
+          </a:xfrm>
+          <a:prstGeom prst="rect">
+            <a:avLst/>
+          </a:prstGeom>
+        </p:spPr>
+        <p:style>
+          <a:lnRef idx="2">
+            <a:schemeClr val="dk1">
+              <a:shade val="50000"/>
+            </a:schemeClr>
+          </a:lnRef>
+          <a:fillRef idx="1">
+            <a:schemeClr val="dk1"/>
+          </a:fillRef>
+          <a:effectRef idx="0">
+            <a:schemeClr val="dk1"/>
+          </a:effectRef>
+          <a:fontRef idx="minor">
+            <a:schemeClr val="lt1"/>
+          </a:fontRef>
+        </p:style>
+        <p:txBody>
+          <a:bodyPr rtlCol="0" anchor="ctr"/>
+          <a:lstStyle/>
+          <a:p>
+            <a:pPr algn="ctr"/>
+            <a:endParaRPr lang="en-US"/>
+          </a:p>
+        </p:txBody>
+      </p:sp>
+      <p:sp>
+        <p:nvSpPr>
+          <p:cNvPr id="4" name="TextBox 3">
+            <a:extLst>
+              <a:ext uri="{FF2B5EF4-FFF2-40B4-BE49-F238E27FC236}">
+                <a16:creationId xmlns:a16="http://schemas.microsoft.com/office/drawing/2014/main" id="{B64A4259-93A1-4271-B5DA-C5DE7C4A3AEB}"/>
+              </a:ext>
+            </a:extLst>
+          </p:cNvPr>
+          <p:cNvSpPr txBox="1"/>
+          <p:nvPr/>
+        </p:nvSpPr>
+        <p:spPr>
+          <a:xfrm>
+            <a:off x="1608881" y="1242250"/>
+            <a:ext cx="1840375" cy="378206"/>
+          </a:xfrm>
+          <a:prstGeom prst="rect">
+            <a:avLst/>
+          </a:prstGeom>
+          <a:noFill/>
+        </p:spPr>
+        <p:txBody>
+          <a:bodyPr wrap="square" rtlCol="0">
+            <a:spAutoFit/>
+          </a:bodyPr>
+          <a:lstStyle/>
+          <a:p>
+            <a:pPr algn="ctr"/>
+            <a:r>
+              <a:rPr lang="en-US" dirty="0">
+                <a:solidFill>
+                  <a:schemeClr val="bg1"/>
+                </a:solidFill>
+              </a:rPr>
+              <a:t>Booking Manager</a:t>
+            </a:r>
+          </a:p>
+        </p:txBody>
+      </p:sp>
+      <p:sp>
+        <p:nvSpPr>
+          <p:cNvPr id="13" name="TextBox 12">
+            <a:extLst>
+              <a:ext uri="{FF2B5EF4-FFF2-40B4-BE49-F238E27FC236}">
+                <a16:creationId xmlns:a16="http://schemas.microsoft.com/office/drawing/2014/main" id="{51DE2D29-D9A0-4DC6-9993-64A3484A2627}"/>
+              </a:ext>
+            </a:extLst>
+          </p:cNvPr>
+          <p:cNvSpPr txBox="1"/>
+          <p:nvPr/>
+        </p:nvSpPr>
+        <p:spPr>
+          <a:xfrm>
+            <a:off x="3449256" y="1242250"/>
+            <a:ext cx="1840375" cy="378206"/>
+          </a:xfrm>
+          <a:prstGeom prst="rect">
+            <a:avLst/>
+          </a:prstGeom>
+          <a:noFill/>
+        </p:spPr>
+        <p:txBody>
+          <a:bodyPr wrap="square" rtlCol="0">
+            <a:spAutoFit/>
+          </a:bodyPr>
+          <a:lstStyle/>
+          <a:p>
+            <a:pPr algn="ctr"/>
+            <a:r>
+              <a:rPr lang="en-US" dirty="0">
+                <a:solidFill>
+                  <a:schemeClr val="bg1"/>
+                </a:solidFill>
+              </a:rPr>
+              <a:t>Price Manager</a:t>
+            </a:r>
+          </a:p>
+        </p:txBody>
+      </p:sp>
+      <p:sp>
+        <p:nvSpPr>
+          <p:cNvPr id="14" name="TextBox 13">
+            <a:extLst>
+              <a:ext uri="{FF2B5EF4-FFF2-40B4-BE49-F238E27FC236}">
+                <a16:creationId xmlns:a16="http://schemas.microsoft.com/office/drawing/2014/main" id="{DD779965-0EA2-4985-8433-986261223AEA}"/>
+              </a:ext>
+            </a:extLst>
+          </p:cNvPr>
+          <p:cNvSpPr txBox="1"/>
+          <p:nvPr/>
+        </p:nvSpPr>
+        <p:spPr>
+          <a:xfrm>
+            <a:off x="8954625" y="1242250"/>
+            <a:ext cx="1840375" cy="378206"/>
+          </a:xfrm>
+          <a:prstGeom prst="rect">
+            <a:avLst/>
+          </a:prstGeom>
+          <a:noFill/>
+        </p:spPr>
+        <p:txBody>
+          <a:bodyPr wrap="square" rtlCol="0">
+            <a:spAutoFit/>
+          </a:bodyPr>
+          <a:lstStyle/>
+          <a:p>
+            <a:pPr algn="ctr"/>
+            <a:r>
+              <a:rPr lang="en-US" dirty="0">
+                <a:solidFill>
+                  <a:schemeClr val="bg1"/>
+                </a:solidFill>
+              </a:rPr>
+              <a:t>Logout</a:t>
+            </a:r>
+          </a:p>
+        </p:txBody>
+      </p:sp>
+      <p:sp>
+        <p:nvSpPr>
+          <p:cNvPr id="11" name="TextBox 10">
+            <a:extLst>
+              <a:ext uri="{FF2B5EF4-FFF2-40B4-BE49-F238E27FC236}">
+                <a16:creationId xmlns:a16="http://schemas.microsoft.com/office/drawing/2014/main" id="{0E3EE51B-7F72-459A-936D-7647C6C65F69}"/>
+              </a:ext>
+            </a:extLst>
+          </p:cNvPr>
+          <p:cNvSpPr txBox="1"/>
+          <p:nvPr/>
+        </p:nvSpPr>
+        <p:spPr>
+          <a:xfrm>
+            <a:off x="2037144" y="1855906"/>
+            <a:ext cx="8009682" cy="369332"/>
+          </a:xfrm>
+          <a:prstGeom prst="rect">
+            <a:avLst/>
+          </a:prstGeom>
+          <a:noFill/>
+        </p:spPr>
+        <p:txBody>
+          <a:bodyPr wrap="square" rtlCol="0">
+            <a:spAutoFit/>
+          </a:bodyPr>
+          <a:lstStyle/>
+          <a:p>
+            <a:pPr algn="ctr"/>
+            <a:r>
+              <a:rPr lang="en-US" i="1" dirty="0"/>
+              <a:t>Price Ranges</a:t>
+            </a:r>
+          </a:p>
+        </p:txBody>
+      </p:sp>
+      <p:cxnSp>
+        <p:nvCxnSpPr>
+          <p:cNvPr id="29" name="Straight Connector 28">
+            <a:extLst>
+              <a:ext uri="{FF2B5EF4-FFF2-40B4-BE49-F238E27FC236}">
+                <a16:creationId xmlns:a16="http://schemas.microsoft.com/office/drawing/2014/main" id="{730B05E7-DA24-4054-A214-AC98427FC105}"/>
+              </a:ext>
+            </a:extLst>
+          </p:cNvPr>
+          <p:cNvCxnSpPr>
+            <a:cxnSpLocks/>
+          </p:cNvCxnSpPr>
+          <p:nvPr/>
+        </p:nvCxnSpPr>
+        <p:spPr>
+          <a:xfrm>
+            <a:off x="2141316" y="2259961"/>
+            <a:ext cx="7517756" cy="0"/>
+          </a:xfrm>
+          <a:prstGeom prst="line">
+            <a:avLst/>
+          </a:prstGeom>
+        </p:spPr>
+        <p:style>
+          <a:lnRef idx="1">
+            <a:schemeClr val="dk1"/>
+          </a:lnRef>
+          <a:fillRef idx="0">
+            <a:schemeClr val="dk1"/>
+          </a:fillRef>
+          <a:effectRef idx="0">
+            <a:schemeClr val="dk1"/>
+          </a:effectRef>
+          <a:fontRef idx="minor">
+            <a:schemeClr val="tx1"/>
+          </a:fontRef>
+        </p:style>
+      </p:cxnSp>
+      <p:cxnSp>
+        <p:nvCxnSpPr>
+          <p:cNvPr id="31" name="Straight Connector 30">
+            <a:extLst>
+              <a:ext uri="{FF2B5EF4-FFF2-40B4-BE49-F238E27FC236}">
+                <a16:creationId xmlns:a16="http://schemas.microsoft.com/office/drawing/2014/main" id="{DD31279C-0192-4F01-8866-087562215560}"/>
+              </a:ext>
+            </a:extLst>
+          </p:cNvPr>
+          <p:cNvCxnSpPr>
+            <a:cxnSpLocks/>
+          </p:cNvCxnSpPr>
+          <p:nvPr/>
+        </p:nvCxnSpPr>
+        <p:spPr>
+          <a:xfrm>
+            <a:off x="2160608" y="6964848"/>
+            <a:ext cx="7517756" cy="0"/>
+          </a:xfrm>
+          <a:prstGeom prst="line">
+            <a:avLst/>
+          </a:prstGeom>
+        </p:spPr>
+        <p:style>
+          <a:lnRef idx="1">
+            <a:schemeClr val="dk1"/>
+          </a:lnRef>
+          <a:fillRef idx="0">
+            <a:schemeClr val="dk1"/>
+          </a:fillRef>
+          <a:effectRef idx="0">
+            <a:schemeClr val="dk1"/>
+          </a:effectRef>
+          <a:fontRef idx="minor">
+            <a:schemeClr val="tx1"/>
+          </a:fontRef>
+        </p:style>
+      </p:cxnSp>
+      <p:sp>
+        <p:nvSpPr>
+          <p:cNvPr id="35" name="TextBox 34">
+            <a:extLst>
+              <a:ext uri="{FF2B5EF4-FFF2-40B4-BE49-F238E27FC236}">
+                <a16:creationId xmlns:a16="http://schemas.microsoft.com/office/drawing/2014/main" id="{BF67F2A5-8CBB-4F57-AFCD-B3BF1E217215}"/>
+              </a:ext>
+            </a:extLst>
+          </p:cNvPr>
+          <p:cNvSpPr txBox="1"/>
+          <p:nvPr/>
+        </p:nvSpPr>
+        <p:spPr>
+          <a:xfrm>
+            <a:off x="4427316" y="2454802"/>
+            <a:ext cx="3188826" cy="369332"/>
+          </a:xfrm>
+          <a:prstGeom prst="rect">
+            <a:avLst/>
+          </a:prstGeom>
+          <a:ln/>
+        </p:spPr>
+        <p:style>
+          <a:lnRef idx="2">
+            <a:schemeClr val="dk1"/>
+          </a:lnRef>
+          <a:fillRef idx="1">
+            <a:schemeClr val="lt1"/>
+          </a:fillRef>
+          <a:effectRef idx="0">
+            <a:schemeClr val="dk1"/>
+          </a:effectRef>
+          <a:fontRef idx="minor">
+            <a:schemeClr val="dk1"/>
+          </a:fontRef>
+        </p:style>
+        <p:txBody>
+          <a:bodyPr wrap="square" rtlCol="0">
+            <a:spAutoFit/>
+          </a:bodyPr>
+          <a:lstStyle/>
+          <a:p>
+            <a:pPr algn="ctr"/>
+            <a:r>
+              <a:rPr lang="en-US" dirty="0"/>
+              <a:t>Price</a:t>
+            </a:r>
+          </a:p>
+        </p:txBody>
+      </p:sp>
+      <p:sp>
+        <p:nvSpPr>
+          <p:cNvPr id="15" name="TextBox 14">
+            <a:extLst>
+              <a:ext uri="{FF2B5EF4-FFF2-40B4-BE49-F238E27FC236}">
+                <a16:creationId xmlns:a16="http://schemas.microsoft.com/office/drawing/2014/main" id="{BE25E94C-8FE1-4FF8-A64E-056B0ECC5BC7}"/>
+              </a:ext>
+            </a:extLst>
+          </p:cNvPr>
+          <p:cNvSpPr txBox="1"/>
+          <p:nvPr/>
+        </p:nvSpPr>
+        <p:spPr>
+          <a:xfrm>
+            <a:off x="4427316" y="2925060"/>
+            <a:ext cx="3188826" cy="369332"/>
+          </a:xfrm>
+          <a:prstGeom prst="rect">
+            <a:avLst/>
+          </a:prstGeom>
+          <a:ln/>
+        </p:spPr>
+        <p:style>
+          <a:lnRef idx="2">
+            <a:schemeClr val="dk1"/>
+          </a:lnRef>
+          <a:fillRef idx="1">
+            <a:schemeClr val="lt1"/>
+          </a:fillRef>
+          <a:effectRef idx="0">
+            <a:schemeClr val="dk1"/>
+          </a:effectRef>
+          <a:fontRef idx="minor">
+            <a:schemeClr val="dk1"/>
+          </a:fontRef>
+        </p:style>
+        <p:txBody>
+          <a:bodyPr wrap="square" rtlCol="0">
+            <a:spAutoFit/>
+          </a:bodyPr>
+          <a:lstStyle/>
+          <a:p>
+            <a:pPr algn="ctr"/>
+            <a:r>
+              <a:rPr lang="en-US" dirty="0"/>
+              <a:t>per Night/Fixed toggle</a:t>
+            </a:r>
+          </a:p>
+        </p:txBody>
+      </p:sp>
+      <p:sp>
+        <p:nvSpPr>
+          <p:cNvPr id="16" name="TextBox 15">
+            <a:extLst>
+              <a:ext uri="{FF2B5EF4-FFF2-40B4-BE49-F238E27FC236}">
+                <a16:creationId xmlns:a16="http://schemas.microsoft.com/office/drawing/2014/main" id="{BDACD9E1-C8F0-4821-B4B2-68BB8541EEAB}"/>
+              </a:ext>
+            </a:extLst>
+          </p:cNvPr>
+          <p:cNvSpPr txBox="1"/>
+          <p:nvPr/>
+        </p:nvSpPr>
+        <p:spPr>
+          <a:xfrm>
+            <a:off x="4427316" y="3397743"/>
+            <a:ext cx="3188826" cy="369332"/>
+          </a:xfrm>
+          <a:prstGeom prst="rect">
+            <a:avLst/>
+          </a:prstGeom>
+          <a:ln/>
+        </p:spPr>
+        <p:style>
+          <a:lnRef idx="2">
+            <a:schemeClr val="dk1"/>
+          </a:lnRef>
+          <a:fillRef idx="1">
+            <a:schemeClr val="lt1"/>
+          </a:fillRef>
+          <a:effectRef idx="0">
+            <a:schemeClr val="dk1"/>
+          </a:effectRef>
+          <a:fontRef idx="minor">
+            <a:schemeClr val="dk1"/>
+          </a:fontRef>
+        </p:style>
+        <p:txBody>
+          <a:bodyPr wrap="square" rtlCol="0">
+            <a:spAutoFit/>
+          </a:bodyPr>
+          <a:lstStyle/>
+          <a:p>
+            <a:pPr algn="ctr"/>
+            <a:r>
+              <a:rPr lang="en-US" dirty="0"/>
+              <a:t>Flat rate / Additional Persons</a:t>
+            </a:r>
+          </a:p>
+        </p:txBody>
+      </p:sp>
+      <p:sp>
+        <p:nvSpPr>
+          <p:cNvPr id="17" name="TextBox 16">
+            <a:extLst>
+              <a:ext uri="{FF2B5EF4-FFF2-40B4-BE49-F238E27FC236}">
+                <a16:creationId xmlns:a16="http://schemas.microsoft.com/office/drawing/2014/main" id="{7D471D8C-9FB7-4310-B906-4EA9D133BCCE}"/>
+              </a:ext>
+            </a:extLst>
+          </p:cNvPr>
+          <p:cNvSpPr txBox="1"/>
+          <p:nvPr/>
+        </p:nvSpPr>
+        <p:spPr>
+          <a:xfrm>
+            <a:off x="4427316" y="4407630"/>
+            <a:ext cx="3188826" cy="369332"/>
+          </a:xfrm>
+          <a:prstGeom prst="rect">
+            <a:avLst/>
+          </a:prstGeom>
+          <a:ln/>
+        </p:spPr>
+        <p:style>
+          <a:lnRef idx="2">
+            <a:schemeClr val="dk1"/>
+          </a:lnRef>
+          <a:fillRef idx="1">
+            <a:schemeClr val="lt1"/>
+          </a:fillRef>
+          <a:effectRef idx="0">
+            <a:schemeClr val="dk1"/>
+          </a:effectRef>
+          <a:fontRef idx="minor">
+            <a:schemeClr val="dk1"/>
+          </a:fontRef>
+        </p:style>
+        <p:txBody>
+          <a:bodyPr wrap="square" rtlCol="0">
+            <a:spAutoFit/>
+          </a:bodyPr>
+          <a:lstStyle/>
+          <a:p>
+            <a:pPr algn="ctr"/>
+            <a:r>
+              <a:rPr lang="en-US" dirty="0"/>
+              <a:t>All year / date range</a:t>
+            </a:r>
+          </a:p>
+        </p:txBody>
+      </p:sp>
+      <p:sp>
+        <p:nvSpPr>
+          <p:cNvPr id="6" name="Rectangle 5">
+            <a:extLst>
+              <a:ext uri="{FF2B5EF4-FFF2-40B4-BE49-F238E27FC236}">
+                <a16:creationId xmlns:a16="http://schemas.microsoft.com/office/drawing/2014/main" id="{B9FAD6DB-55D2-473E-AABE-085295CE74D7}"/>
+              </a:ext>
+            </a:extLst>
+          </p:cNvPr>
+          <p:cNvSpPr/>
+          <p:nvPr/>
+        </p:nvSpPr>
+        <p:spPr>
+          <a:xfrm>
+            <a:off x="4416878" y="4882443"/>
+            <a:ext cx="3199264" cy="1496023"/>
+          </a:xfrm>
+          <a:prstGeom prst="rect">
+            <a:avLst/>
+          </a:prstGeom>
+        </p:spPr>
+        <p:style>
+          <a:lnRef idx="2">
+            <a:schemeClr val="dk1"/>
+          </a:lnRef>
+          <a:fillRef idx="1">
+            <a:schemeClr val="lt1"/>
+          </a:fillRef>
+          <a:effectRef idx="0">
+            <a:schemeClr val="dk1"/>
+          </a:effectRef>
+          <a:fontRef idx="minor">
+            <a:schemeClr val="dk1"/>
+          </a:fontRef>
+        </p:style>
+        <p:txBody>
+          <a:bodyPr rtlCol="0" anchor="ctr"/>
+          <a:lstStyle/>
+          <a:p>
+            <a:pPr algn="ctr"/>
+            <a:r>
+              <a:rPr lang="en-US" dirty="0"/>
+              <a:t>Calendar for date range</a:t>
+            </a:r>
+          </a:p>
+        </p:txBody>
+      </p:sp>
+      <p:sp>
+        <p:nvSpPr>
+          <p:cNvPr id="7" name="Rectangle 6">
+            <a:extLst>
+              <a:ext uri="{FF2B5EF4-FFF2-40B4-BE49-F238E27FC236}">
+                <a16:creationId xmlns:a16="http://schemas.microsoft.com/office/drawing/2014/main" id="{20F31300-92C8-4300-8180-D8B612EB0D0A}"/>
+              </a:ext>
+            </a:extLst>
+          </p:cNvPr>
+          <p:cNvSpPr/>
+          <p:nvPr/>
+        </p:nvSpPr>
+        <p:spPr>
+          <a:xfrm>
+            <a:off x="4575859" y="6483947"/>
+            <a:ext cx="1363884" cy="294361"/>
+          </a:xfrm>
+          <a:prstGeom prst="rect">
+            <a:avLst/>
+          </a:prstGeom>
+        </p:spPr>
+        <p:style>
+          <a:lnRef idx="2">
+            <a:schemeClr val="dk1"/>
+          </a:lnRef>
+          <a:fillRef idx="1">
+            <a:schemeClr val="lt1"/>
+          </a:fillRef>
+          <a:effectRef idx="0">
+            <a:schemeClr val="dk1"/>
+          </a:effectRef>
+          <a:fontRef idx="minor">
+            <a:schemeClr val="dk1"/>
+          </a:fontRef>
+        </p:style>
+        <p:txBody>
+          <a:bodyPr rtlCol="0" anchor="ctr"/>
+          <a:lstStyle/>
+          <a:p>
+            <a:pPr algn="ctr"/>
+            <a:r>
+              <a:rPr lang="en-US" dirty="0"/>
+              <a:t>Discard</a:t>
+            </a:r>
+          </a:p>
+        </p:txBody>
+      </p:sp>
+      <p:sp>
+        <p:nvSpPr>
+          <p:cNvPr id="22" name="Rectangle 21">
+            <a:extLst>
+              <a:ext uri="{FF2B5EF4-FFF2-40B4-BE49-F238E27FC236}">
+                <a16:creationId xmlns:a16="http://schemas.microsoft.com/office/drawing/2014/main" id="{3FA62FAF-10DA-4EDF-8E80-C12D59204A86}"/>
+              </a:ext>
+            </a:extLst>
+          </p:cNvPr>
+          <p:cNvSpPr/>
+          <p:nvPr/>
+        </p:nvSpPr>
+        <p:spPr>
+          <a:xfrm>
+            <a:off x="6096000" y="6492568"/>
+            <a:ext cx="1363884" cy="294361"/>
+          </a:xfrm>
+          <a:prstGeom prst="rect">
+            <a:avLst/>
+          </a:prstGeom>
+        </p:spPr>
+        <p:style>
+          <a:lnRef idx="2">
+            <a:schemeClr val="dk1"/>
+          </a:lnRef>
+          <a:fillRef idx="1">
+            <a:schemeClr val="lt1"/>
+          </a:fillRef>
+          <a:effectRef idx="0">
+            <a:schemeClr val="dk1"/>
+          </a:effectRef>
+          <a:fontRef idx="minor">
+            <a:schemeClr val="dk1"/>
+          </a:fontRef>
+        </p:style>
+        <p:txBody>
+          <a:bodyPr rtlCol="0" anchor="ctr"/>
+          <a:lstStyle/>
+          <a:p>
+            <a:pPr algn="ctr"/>
+            <a:r>
+              <a:rPr lang="en-US" dirty="0"/>
+              <a:t>Apply</a:t>
+            </a:r>
+          </a:p>
+        </p:txBody>
+      </p:sp>
+      <p:sp>
+        <p:nvSpPr>
+          <p:cNvPr id="9" name="Rectangle 8">
+            <a:extLst>
+              <a:ext uri="{FF2B5EF4-FFF2-40B4-BE49-F238E27FC236}">
+                <a16:creationId xmlns:a16="http://schemas.microsoft.com/office/drawing/2014/main" id="{13BB0C64-5A1C-4A31-A9A9-A725623328E3}"/>
+              </a:ext>
+            </a:extLst>
+          </p:cNvPr>
+          <p:cNvSpPr/>
+          <p:nvPr/>
+        </p:nvSpPr>
+        <p:spPr>
+          <a:xfrm>
+            <a:off x="4416878" y="3901774"/>
+            <a:ext cx="3199264" cy="357505"/>
+          </a:xfrm>
+          <a:prstGeom prst="rect">
+            <a:avLst/>
+          </a:prstGeom>
+        </p:spPr>
+        <p:style>
+          <a:lnRef idx="2">
+            <a:schemeClr val="dk1"/>
+          </a:lnRef>
+          <a:fillRef idx="1">
+            <a:schemeClr val="lt1"/>
+          </a:fillRef>
+          <a:effectRef idx="0">
+            <a:schemeClr val="dk1"/>
+          </a:effectRef>
+          <a:fontRef idx="minor">
+            <a:schemeClr val="dk1"/>
+          </a:fontRef>
+        </p:style>
+        <p:txBody>
+          <a:bodyPr rtlCol="0" anchor="ctr"/>
+          <a:lstStyle/>
+          <a:p>
+            <a:pPr algn="ctr"/>
+            <a:r>
+              <a:rPr lang="en-US" dirty="0"/>
+              <a:t>Min people – Max People</a:t>
+            </a:r>
+          </a:p>
+        </p:txBody>
+      </p:sp>
+    </p:spTree>
+    <p:extLst>
+      <p:ext uri="{BB962C8B-B14F-4D97-AF65-F5344CB8AC3E}">
+        <p14:creationId xmlns:p14="http://schemas.microsoft.com/office/powerpoint/2010/main" val="1324878942"/>
+      </p:ext>
+    </p:extLst>
+  </p:cSld>
+  <p:clrMapOvr>
+    <a:masterClrMapping/>
+  </p:clrMapOvr>
+</p:sld>
+</file>
+
 <file path=ppt/slides/slide2.xml><?xml version="1.0" encoding="utf-8"?>
 <p:sld xmlns:a="http://schemas.openxmlformats.org/drawingml/2006/main" xmlns:r="http://schemas.openxmlformats.org/officeDocument/2006/relationships" xmlns:p="http://schemas.openxmlformats.org/presentationml/2006/main">
   <p:cSld>
@@ -8036,8 +11194,13 @@
               <a:pPr algn="ctr"/>
               <a:r>
                 <a:rPr lang="en-US" dirty="0"/>
-                <a:t>Landscape</a:t>
-              </a:r>
+                <a:t>Landscape from the creek (</a:t>
+              </a:r>
+              <a:r>
+                <a:rPr lang="en-US"/>
+                <a:t>east facing west)</a:t>
+              </a:r>
+              <a:endParaRPr lang="en-US" dirty="0"/>
             </a:p>
           </p:txBody>
         </p:sp>
@@ -8360,7 +11523,7 @@
                 <a:pPr algn="ctr"/>
                 <a:r>
                   <a:rPr lang="en-US" dirty="0"/>
-                  <a:t>Fire Place</a:t>
+                  <a:t>Carob Tree</a:t>
                 </a:r>
               </a:p>
             </p:txBody>

</xml_diff>

<commit_message>
Issue #1 - Changing new price title in powerpoint
</commit_message>
<xml_diff>
--- a/documentation/flow_diagrams/Diagrams.pptx
+++ b/documentation/flow_diagrams/Diagrams.pptx
@@ -6559,7 +6559,7 @@
             <a:pPr algn="ctr"/>
             <a:r>
               <a:rPr lang="en-US" sz="4000" b="1" i="1" dirty="0"/>
-              <a:t>Administrator Home</a:t>
+              <a:t>Booking Manager</a:t>
             </a:r>
             <a:endParaRPr lang="en-US" b="1" i="1" dirty="0"/>
           </a:p>
@@ -6861,7 +6861,7 @@
             <a:pPr algn="ctr"/>
             <a:r>
               <a:rPr lang="en-US" dirty="0"/>
-              <a:t>Calendar</a:t>
+              <a:t>Calendar – Click on booking for more information</a:t>
             </a:r>
           </a:p>
         </p:txBody>
@@ -7474,627 +7474,648 @@
           </a:p>
         </p:txBody>
       </p:sp>
-      <p:sp>
-        <p:nvSpPr>
-          <p:cNvPr id="2" name="Rectangle 1">
+      <p:grpSp>
+        <p:nvGrpSpPr>
+          <p:cNvPr id="38" name="Group 37">
             <a:extLst>
               <a:ext uri="{FF2B5EF4-FFF2-40B4-BE49-F238E27FC236}">
-                <a16:creationId xmlns:a16="http://schemas.microsoft.com/office/drawing/2014/main" id="{287A8ECD-4A3C-42EE-AA65-5BA7F91B72D4}"/>
+                <a16:creationId xmlns:a16="http://schemas.microsoft.com/office/drawing/2014/main" id="{69F26AA6-6259-4975-9124-006629D5F2D5}"/>
               </a:ext>
             </a:extLst>
           </p:cNvPr>
-          <p:cNvSpPr/>
+          <p:cNvGrpSpPr/>
           <p:nvPr/>
-        </p:nvSpPr>
-        <p:spPr>
+        </p:nvGrpSpPr>
+        <p:grpSpPr>
           <a:xfrm>
             <a:off x="1397000" y="1242250"/>
             <a:ext cx="9398000" cy="5310950"/>
+            <a:chOff x="1397000" y="1242250"/>
+            <a:chExt cx="9398000" cy="5310950"/>
           </a:xfrm>
-          <a:prstGeom prst="rect">
-            <a:avLst/>
-          </a:prstGeom>
-        </p:spPr>
-        <p:style>
-          <a:lnRef idx="2">
-            <a:schemeClr val="dk1"/>
-          </a:lnRef>
-          <a:fillRef idx="1">
-            <a:schemeClr val="lt1"/>
-          </a:fillRef>
-          <a:effectRef idx="0">
-            <a:schemeClr val="dk1"/>
-          </a:effectRef>
-          <a:fontRef idx="minor">
-            <a:schemeClr val="dk1"/>
-          </a:fontRef>
-        </p:style>
-        <p:txBody>
-          <a:bodyPr rtlCol="0" anchor="ctr"/>
-          <a:lstStyle/>
-          <a:p>
-            <a:pPr algn="ctr"/>
-            <a:endParaRPr lang="en-US" dirty="0"/>
-          </a:p>
-        </p:txBody>
-      </p:sp>
-      <p:sp>
-        <p:nvSpPr>
-          <p:cNvPr id="3" name="Rectangle 2">
-            <a:extLst>
-              <a:ext uri="{FF2B5EF4-FFF2-40B4-BE49-F238E27FC236}">
-                <a16:creationId xmlns:a16="http://schemas.microsoft.com/office/drawing/2014/main" id="{1F8E4320-D31B-4A84-B871-103E0C5672EF}"/>
-              </a:ext>
-            </a:extLst>
-          </p:cNvPr>
-          <p:cNvSpPr/>
-          <p:nvPr/>
-        </p:nvSpPr>
-        <p:spPr>
-          <a:xfrm>
-            <a:off x="1397000" y="1242250"/>
-            <a:ext cx="9398000" cy="378206"/>
-          </a:xfrm>
-          <a:prstGeom prst="rect">
-            <a:avLst/>
-          </a:prstGeom>
-        </p:spPr>
-        <p:style>
-          <a:lnRef idx="2">
-            <a:schemeClr val="dk1">
-              <a:shade val="50000"/>
-            </a:schemeClr>
-          </a:lnRef>
-          <a:fillRef idx="1">
-            <a:schemeClr val="dk1"/>
-          </a:fillRef>
-          <a:effectRef idx="0">
-            <a:schemeClr val="dk1"/>
-          </a:effectRef>
-          <a:fontRef idx="minor">
-            <a:schemeClr val="lt1"/>
-          </a:fontRef>
-        </p:style>
-        <p:txBody>
-          <a:bodyPr rtlCol="0" anchor="ctr"/>
-          <a:lstStyle/>
-          <a:p>
-            <a:pPr algn="ctr"/>
-            <a:endParaRPr lang="en-US"/>
-          </a:p>
-        </p:txBody>
-      </p:sp>
-      <p:sp>
-        <p:nvSpPr>
-          <p:cNvPr id="4" name="TextBox 3">
-            <a:extLst>
-              <a:ext uri="{FF2B5EF4-FFF2-40B4-BE49-F238E27FC236}">
-                <a16:creationId xmlns:a16="http://schemas.microsoft.com/office/drawing/2014/main" id="{B64A4259-93A1-4271-B5DA-C5DE7C4A3AEB}"/>
-              </a:ext>
-            </a:extLst>
-          </p:cNvPr>
-          <p:cNvSpPr txBox="1"/>
-          <p:nvPr/>
-        </p:nvSpPr>
-        <p:spPr>
-          <a:xfrm>
-            <a:off x="1608881" y="1242250"/>
-            <a:ext cx="1840375" cy="378206"/>
-          </a:xfrm>
-          <a:prstGeom prst="rect">
-            <a:avLst/>
-          </a:prstGeom>
-          <a:noFill/>
-        </p:spPr>
-        <p:txBody>
-          <a:bodyPr wrap="square" rtlCol="0">
-            <a:spAutoFit/>
-          </a:bodyPr>
-          <a:lstStyle/>
-          <a:p>
-            <a:pPr algn="ctr"/>
-            <a:r>
-              <a:rPr lang="en-US" dirty="0">
-                <a:solidFill>
-                  <a:schemeClr val="bg1"/>
-                </a:solidFill>
-              </a:rPr>
-              <a:t>Booking Manager</a:t>
-            </a:r>
-          </a:p>
-        </p:txBody>
-      </p:sp>
-      <p:sp>
-        <p:nvSpPr>
-          <p:cNvPr id="13" name="TextBox 12">
-            <a:extLst>
-              <a:ext uri="{FF2B5EF4-FFF2-40B4-BE49-F238E27FC236}">
-                <a16:creationId xmlns:a16="http://schemas.microsoft.com/office/drawing/2014/main" id="{51DE2D29-D9A0-4DC6-9993-64A3484A2627}"/>
-              </a:ext>
-            </a:extLst>
-          </p:cNvPr>
-          <p:cNvSpPr txBox="1"/>
-          <p:nvPr/>
-        </p:nvSpPr>
-        <p:spPr>
-          <a:xfrm>
-            <a:off x="3449256" y="1242250"/>
-            <a:ext cx="1840375" cy="378206"/>
-          </a:xfrm>
-          <a:prstGeom prst="rect">
-            <a:avLst/>
-          </a:prstGeom>
-          <a:noFill/>
-        </p:spPr>
-        <p:txBody>
-          <a:bodyPr wrap="square" rtlCol="0">
-            <a:spAutoFit/>
-          </a:bodyPr>
-          <a:lstStyle/>
-          <a:p>
-            <a:pPr algn="ctr"/>
-            <a:r>
-              <a:rPr lang="en-US" dirty="0">
-                <a:solidFill>
-                  <a:schemeClr val="bg1"/>
-                </a:solidFill>
-              </a:rPr>
-              <a:t>Price Manager</a:t>
-            </a:r>
-          </a:p>
-        </p:txBody>
-      </p:sp>
-      <p:sp>
-        <p:nvSpPr>
-          <p:cNvPr id="14" name="TextBox 13">
-            <a:extLst>
-              <a:ext uri="{FF2B5EF4-FFF2-40B4-BE49-F238E27FC236}">
-                <a16:creationId xmlns:a16="http://schemas.microsoft.com/office/drawing/2014/main" id="{DD779965-0EA2-4985-8433-986261223AEA}"/>
-              </a:ext>
-            </a:extLst>
-          </p:cNvPr>
-          <p:cNvSpPr txBox="1"/>
-          <p:nvPr/>
-        </p:nvSpPr>
-        <p:spPr>
-          <a:xfrm>
-            <a:off x="8954625" y="1242250"/>
-            <a:ext cx="1840375" cy="378206"/>
-          </a:xfrm>
-          <a:prstGeom prst="rect">
-            <a:avLst/>
-          </a:prstGeom>
-          <a:noFill/>
-        </p:spPr>
-        <p:txBody>
-          <a:bodyPr wrap="square" rtlCol="0">
-            <a:spAutoFit/>
-          </a:bodyPr>
-          <a:lstStyle/>
-          <a:p>
-            <a:pPr algn="ctr"/>
-            <a:r>
-              <a:rPr lang="en-US" dirty="0">
-                <a:solidFill>
-                  <a:schemeClr val="bg1"/>
-                </a:solidFill>
-              </a:rPr>
-              <a:t>Logout</a:t>
-            </a:r>
-          </a:p>
-        </p:txBody>
-      </p:sp>
-      <p:sp>
-        <p:nvSpPr>
-          <p:cNvPr id="11" name="TextBox 10">
-            <a:extLst>
-              <a:ext uri="{FF2B5EF4-FFF2-40B4-BE49-F238E27FC236}">
-                <a16:creationId xmlns:a16="http://schemas.microsoft.com/office/drawing/2014/main" id="{0E3EE51B-7F72-459A-936D-7647C6C65F69}"/>
-              </a:ext>
-            </a:extLst>
-          </p:cNvPr>
-          <p:cNvSpPr txBox="1"/>
-          <p:nvPr/>
-        </p:nvSpPr>
-        <p:spPr>
-          <a:xfrm>
-            <a:off x="2037144" y="1855906"/>
-            <a:ext cx="8009682" cy="369332"/>
-          </a:xfrm>
-          <a:prstGeom prst="rect">
-            <a:avLst/>
-          </a:prstGeom>
-          <a:noFill/>
-        </p:spPr>
-        <p:txBody>
-          <a:bodyPr wrap="square" rtlCol="0">
-            <a:spAutoFit/>
-          </a:bodyPr>
-          <a:lstStyle/>
-          <a:p>
-            <a:r>
-              <a:rPr lang="en-US" i="1" dirty="0"/>
-              <a:t>Price Ranges</a:t>
-            </a:r>
-          </a:p>
-        </p:txBody>
-      </p:sp>
-      <p:sp>
-        <p:nvSpPr>
-          <p:cNvPr id="27" name="Rectangle 26">
-            <a:extLst>
-              <a:ext uri="{FF2B5EF4-FFF2-40B4-BE49-F238E27FC236}">
-                <a16:creationId xmlns:a16="http://schemas.microsoft.com/office/drawing/2014/main" id="{4C8D0116-95EB-4DF1-878B-0A65C269F7D7}"/>
-              </a:ext>
-            </a:extLst>
-          </p:cNvPr>
-          <p:cNvSpPr/>
-          <p:nvPr/>
-        </p:nvSpPr>
-        <p:spPr>
-          <a:xfrm>
-            <a:off x="2127811" y="2412836"/>
-            <a:ext cx="7531261" cy="1395231"/>
-          </a:xfrm>
-          <a:prstGeom prst="rect">
-            <a:avLst/>
-          </a:prstGeom>
-        </p:spPr>
-        <p:style>
-          <a:lnRef idx="2">
-            <a:schemeClr val="dk1"/>
-          </a:lnRef>
-          <a:fillRef idx="1">
-            <a:schemeClr val="lt1"/>
-          </a:fillRef>
-          <a:effectRef idx="0">
-            <a:schemeClr val="dk1"/>
-          </a:effectRef>
-          <a:fontRef idx="minor">
-            <a:schemeClr val="dk1"/>
-          </a:fontRef>
-        </p:style>
-        <p:txBody>
-          <a:bodyPr rtlCol="0" anchor="ctr"/>
-          <a:lstStyle/>
-          <a:p>
-            <a:pPr algn="ctr"/>
-            <a:r>
-              <a:rPr lang="en-US" dirty="0"/>
-              <a:t>Written description of price data</a:t>
-            </a:r>
-            <a:br>
-              <a:rPr lang="en-US" dirty="0"/>
-            </a:br>
-            <a:r>
-              <a:rPr lang="en-US" dirty="0"/>
-              <a:t>Written description of price data</a:t>
-            </a:r>
-          </a:p>
-        </p:txBody>
-      </p:sp>
-      <p:cxnSp>
-        <p:nvCxnSpPr>
-          <p:cNvPr id="29" name="Straight Connector 28">
-            <a:extLst>
-              <a:ext uri="{FF2B5EF4-FFF2-40B4-BE49-F238E27FC236}">
-                <a16:creationId xmlns:a16="http://schemas.microsoft.com/office/drawing/2014/main" id="{730B05E7-DA24-4054-A214-AC98427FC105}"/>
-              </a:ext>
-            </a:extLst>
-          </p:cNvPr>
-          <p:cNvCxnSpPr>
-            <a:cxnSpLocks/>
-          </p:cNvCxnSpPr>
-          <p:nvPr/>
-        </p:nvCxnSpPr>
-        <p:spPr>
-          <a:xfrm>
-            <a:off x="2141316" y="2259961"/>
-            <a:ext cx="7517756" cy="0"/>
-          </a:xfrm>
-          <a:prstGeom prst="line">
-            <a:avLst/>
-          </a:prstGeom>
-        </p:spPr>
-        <p:style>
-          <a:lnRef idx="1">
-            <a:schemeClr val="dk1"/>
-          </a:lnRef>
-          <a:fillRef idx="0">
-            <a:schemeClr val="dk1"/>
-          </a:fillRef>
-          <a:effectRef idx="0">
-            <a:schemeClr val="dk1"/>
-          </a:effectRef>
-          <a:fontRef idx="minor">
-            <a:schemeClr val="tx1"/>
-          </a:fontRef>
-        </p:style>
-      </p:cxnSp>
-      <p:cxnSp>
-        <p:nvCxnSpPr>
-          <p:cNvPr id="31" name="Straight Connector 30">
-            <a:extLst>
-              <a:ext uri="{FF2B5EF4-FFF2-40B4-BE49-F238E27FC236}">
-                <a16:creationId xmlns:a16="http://schemas.microsoft.com/office/drawing/2014/main" id="{DD31279C-0192-4F01-8866-087562215560}"/>
-              </a:ext>
-            </a:extLst>
-          </p:cNvPr>
-          <p:cNvCxnSpPr>
-            <a:cxnSpLocks/>
-          </p:cNvCxnSpPr>
-          <p:nvPr/>
-        </p:nvCxnSpPr>
-        <p:spPr>
-          <a:xfrm>
-            <a:off x="2160608" y="4021234"/>
-            <a:ext cx="7517756" cy="0"/>
-          </a:xfrm>
-          <a:prstGeom prst="line">
-            <a:avLst/>
-          </a:prstGeom>
-        </p:spPr>
-        <p:style>
-          <a:lnRef idx="1">
-            <a:schemeClr val="dk1"/>
-          </a:lnRef>
-          <a:fillRef idx="0">
-            <a:schemeClr val="dk1"/>
-          </a:fillRef>
-          <a:effectRef idx="0">
-            <a:schemeClr val="dk1"/>
-          </a:effectRef>
-          <a:fontRef idx="minor">
-            <a:schemeClr val="tx1"/>
-          </a:fontRef>
-        </p:style>
-      </p:cxnSp>
-      <p:sp>
-        <p:nvSpPr>
-          <p:cNvPr id="33" name="Multiplication Sign 32">
-            <a:extLst>
-              <a:ext uri="{FF2B5EF4-FFF2-40B4-BE49-F238E27FC236}">
-                <a16:creationId xmlns:a16="http://schemas.microsoft.com/office/drawing/2014/main" id="{84729C00-F858-4155-886C-27BF2B171A17}"/>
-              </a:ext>
-            </a:extLst>
-          </p:cNvPr>
-          <p:cNvSpPr/>
-          <p:nvPr/>
-        </p:nvSpPr>
-        <p:spPr>
-          <a:xfrm>
-            <a:off x="7500395" y="2836766"/>
-            <a:ext cx="347241" cy="347241"/>
-          </a:xfrm>
-          <a:prstGeom prst="mathMultiply">
-            <a:avLst/>
-          </a:prstGeom>
-          <a:solidFill>
-            <a:srgbClr val="FF0000"/>
-          </a:solidFill>
-        </p:spPr>
-        <p:style>
-          <a:lnRef idx="2">
-            <a:schemeClr val="accent1">
-              <a:shade val="50000"/>
-            </a:schemeClr>
-          </a:lnRef>
-          <a:fillRef idx="1">
-            <a:schemeClr val="accent1"/>
-          </a:fillRef>
-          <a:effectRef idx="0">
-            <a:schemeClr val="accent1"/>
-          </a:effectRef>
-          <a:fontRef idx="minor">
-            <a:schemeClr val="lt1"/>
-          </a:fontRef>
-        </p:style>
-        <p:txBody>
-          <a:bodyPr rtlCol="0" anchor="ctr"/>
-          <a:lstStyle/>
-          <a:p>
-            <a:pPr algn="ctr"/>
-            <a:endParaRPr lang="en-US"/>
-          </a:p>
-        </p:txBody>
-      </p:sp>
-      <p:sp>
-        <p:nvSpPr>
-          <p:cNvPr id="34" name="Multiplication Sign 33">
-            <a:extLst>
-              <a:ext uri="{FF2B5EF4-FFF2-40B4-BE49-F238E27FC236}">
-                <a16:creationId xmlns:a16="http://schemas.microsoft.com/office/drawing/2014/main" id="{532BB2A6-3D82-4A11-B6A2-82C03AE9C353}"/>
-              </a:ext>
-            </a:extLst>
-          </p:cNvPr>
-          <p:cNvSpPr/>
-          <p:nvPr/>
-        </p:nvSpPr>
-        <p:spPr>
-          <a:xfrm>
-            <a:off x="7500394" y="3125406"/>
-            <a:ext cx="347241" cy="347241"/>
-          </a:xfrm>
-          <a:prstGeom prst="mathMultiply">
-            <a:avLst/>
-          </a:prstGeom>
-          <a:solidFill>
-            <a:srgbClr val="FF0000"/>
-          </a:solidFill>
-        </p:spPr>
-        <p:style>
-          <a:lnRef idx="2">
-            <a:schemeClr val="accent1">
-              <a:shade val="50000"/>
-            </a:schemeClr>
-          </a:lnRef>
-          <a:fillRef idx="1">
-            <a:schemeClr val="accent1"/>
-          </a:fillRef>
-          <a:effectRef idx="0">
-            <a:schemeClr val="accent1"/>
-          </a:effectRef>
-          <a:fontRef idx="minor">
-            <a:schemeClr val="lt1"/>
-          </a:fontRef>
-        </p:style>
-        <p:txBody>
-          <a:bodyPr rtlCol="0" anchor="ctr"/>
-          <a:lstStyle/>
-          <a:p>
-            <a:pPr algn="ctr"/>
-            <a:endParaRPr lang="en-US"/>
-          </a:p>
-        </p:txBody>
-      </p:sp>
-      <p:sp>
-        <p:nvSpPr>
-          <p:cNvPr id="35" name="TextBox 34">
-            <a:extLst>
-              <a:ext uri="{FF2B5EF4-FFF2-40B4-BE49-F238E27FC236}">
-                <a16:creationId xmlns:a16="http://schemas.microsoft.com/office/drawing/2014/main" id="{BF67F2A5-8CBB-4F57-AFCD-B3BF1E217215}"/>
-              </a:ext>
-            </a:extLst>
-          </p:cNvPr>
-          <p:cNvSpPr txBox="1"/>
-          <p:nvPr/>
-        </p:nvSpPr>
-        <p:spPr>
-          <a:xfrm>
-            <a:off x="4427316" y="4126375"/>
-            <a:ext cx="3188826" cy="369332"/>
-          </a:xfrm>
-          <a:prstGeom prst="rect">
-            <a:avLst/>
-          </a:prstGeom>
-          <a:ln/>
-        </p:spPr>
-        <p:style>
-          <a:lnRef idx="2">
-            <a:schemeClr val="dk1"/>
-          </a:lnRef>
-          <a:fillRef idx="1">
-            <a:schemeClr val="lt1"/>
-          </a:fillRef>
-          <a:effectRef idx="0">
-            <a:schemeClr val="dk1"/>
-          </a:effectRef>
-          <a:fontRef idx="minor">
-            <a:schemeClr val="dk1"/>
-          </a:fontRef>
-        </p:style>
-        <p:txBody>
-          <a:bodyPr wrap="square" rtlCol="0">
-            <a:spAutoFit/>
-          </a:bodyPr>
-          <a:lstStyle/>
-          <a:p>
-            <a:pPr algn="ctr"/>
-            <a:r>
-              <a:rPr lang="en-US" dirty="0"/>
-              <a:t>Add new price rule</a:t>
-            </a:r>
-          </a:p>
-        </p:txBody>
-      </p:sp>
-      <p:sp>
-        <p:nvSpPr>
-          <p:cNvPr id="36" name="TextBox 35">
-            <a:extLst>
-              <a:ext uri="{FF2B5EF4-FFF2-40B4-BE49-F238E27FC236}">
-                <a16:creationId xmlns:a16="http://schemas.microsoft.com/office/drawing/2014/main" id="{8561C1CA-D08E-4610-B447-7F17128F715F}"/>
-              </a:ext>
-            </a:extLst>
-          </p:cNvPr>
-          <p:cNvSpPr txBox="1"/>
-          <p:nvPr/>
-        </p:nvSpPr>
-        <p:spPr>
-          <a:xfrm>
-            <a:off x="7928658" y="2819405"/>
-            <a:ext cx="769717" cy="369332"/>
-          </a:xfrm>
-          <a:prstGeom prst="rect">
-            <a:avLst/>
-          </a:prstGeom>
-        </p:spPr>
-        <p:style>
-          <a:lnRef idx="2">
-            <a:schemeClr val="dk1"/>
-          </a:lnRef>
-          <a:fillRef idx="1">
-            <a:schemeClr val="lt1"/>
-          </a:fillRef>
-          <a:effectRef idx="0">
-            <a:schemeClr val="dk1"/>
-          </a:effectRef>
-          <a:fontRef idx="minor">
-            <a:schemeClr val="dk1"/>
-          </a:fontRef>
-        </p:style>
-        <p:txBody>
-          <a:bodyPr wrap="square" rtlCol="0">
-            <a:spAutoFit/>
-          </a:bodyPr>
-          <a:lstStyle/>
-          <a:p>
-            <a:pPr algn="ctr"/>
-            <a:r>
-              <a:rPr lang="en-US" dirty="0"/>
-              <a:t>Edit</a:t>
-            </a:r>
-          </a:p>
-        </p:txBody>
-      </p:sp>
-      <p:sp>
-        <p:nvSpPr>
-          <p:cNvPr id="37" name="TextBox 36">
-            <a:extLst>
-              <a:ext uri="{FF2B5EF4-FFF2-40B4-BE49-F238E27FC236}">
-                <a16:creationId xmlns:a16="http://schemas.microsoft.com/office/drawing/2014/main" id="{EBF6B2A7-45EF-451A-88E7-50BF82A8E42B}"/>
-              </a:ext>
-            </a:extLst>
-          </p:cNvPr>
-          <p:cNvSpPr txBox="1"/>
-          <p:nvPr/>
-        </p:nvSpPr>
-        <p:spPr>
-          <a:xfrm>
-            <a:off x="7928658" y="3198481"/>
-            <a:ext cx="769717" cy="369332"/>
-          </a:xfrm>
-          <a:prstGeom prst="rect">
-            <a:avLst/>
-          </a:prstGeom>
-        </p:spPr>
-        <p:style>
-          <a:lnRef idx="2">
-            <a:schemeClr val="dk1"/>
-          </a:lnRef>
-          <a:fillRef idx="1">
-            <a:schemeClr val="lt1"/>
-          </a:fillRef>
-          <a:effectRef idx="0">
-            <a:schemeClr val="dk1"/>
-          </a:effectRef>
-          <a:fontRef idx="minor">
-            <a:schemeClr val="dk1"/>
-          </a:fontRef>
-        </p:style>
-        <p:txBody>
-          <a:bodyPr wrap="square" rtlCol="0">
-            <a:spAutoFit/>
-          </a:bodyPr>
-          <a:lstStyle/>
-          <a:p>
-            <a:pPr algn="ctr"/>
-            <a:r>
-              <a:rPr lang="en-US" dirty="0"/>
-              <a:t>Edit</a:t>
-            </a:r>
-          </a:p>
-        </p:txBody>
-      </p:sp>
+        </p:grpSpPr>
+        <p:sp>
+          <p:nvSpPr>
+            <p:cNvPr id="2" name="Rectangle 1">
+              <a:extLst>
+                <a:ext uri="{FF2B5EF4-FFF2-40B4-BE49-F238E27FC236}">
+                  <a16:creationId xmlns:a16="http://schemas.microsoft.com/office/drawing/2014/main" id="{287A8ECD-4A3C-42EE-AA65-5BA7F91B72D4}"/>
+                </a:ext>
+              </a:extLst>
+            </p:cNvPr>
+            <p:cNvSpPr/>
+            <p:nvPr/>
+          </p:nvSpPr>
+          <p:spPr>
+            <a:xfrm>
+              <a:off x="1397000" y="1242250"/>
+              <a:ext cx="9398000" cy="5310950"/>
+            </a:xfrm>
+            <a:prstGeom prst="rect">
+              <a:avLst/>
+            </a:prstGeom>
+          </p:spPr>
+          <p:style>
+            <a:lnRef idx="2">
+              <a:schemeClr val="dk1"/>
+            </a:lnRef>
+            <a:fillRef idx="1">
+              <a:schemeClr val="lt1"/>
+            </a:fillRef>
+            <a:effectRef idx="0">
+              <a:schemeClr val="dk1"/>
+            </a:effectRef>
+            <a:fontRef idx="minor">
+              <a:schemeClr val="dk1"/>
+            </a:fontRef>
+          </p:style>
+          <p:txBody>
+            <a:bodyPr rtlCol="0" anchor="ctr"/>
+            <a:lstStyle/>
+            <a:p>
+              <a:pPr algn="ctr"/>
+              <a:endParaRPr lang="en-US" dirty="0"/>
+            </a:p>
+          </p:txBody>
+        </p:sp>
+        <p:sp>
+          <p:nvSpPr>
+            <p:cNvPr id="3" name="Rectangle 2">
+              <a:extLst>
+                <a:ext uri="{FF2B5EF4-FFF2-40B4-BE49-F238E27FC236}">
+                  <a16:creationId xmlns:a16="http://schemas.microsoft.com/office/drawing/2014/main" id="{1F8E4320-D31B-4A84-B871-103E0C5672EF}"/>
+                </a:ext>
+              </a:extLst>
+            </p:cNvPr>
+            <p:cNvSpPr/>
+            <p:nvPr/>
+          </p:nvSpPr>
+          <p:spPr>
+            <a:xfrm>
+              <a:off x="1397000" y="1242250"/>
+              <a:ext cx="9398000" cy="378206"/>
+            </a:xfrm>
+            <a:prstGeom prst="rect">
+              <a:avLst/>
+            </a:prstGeom>
+          </p:spPr>
+          <p:style>
+            <a:lnRef idx="2">
+              <a:schemeClr val="dk1">
+                <a:shade val="50000"/>
+              </a:schemeClr>
+            </a:lnRef>
+            <a:fillRef idx="1">
+              <a:schemeClr val="dk1"/>
+            </a:fillRef>
+            <a:effectRef idx="0">
+              <a:schemeClr val="dk1"/>
+            </a:effectRef>
+            <a:fontRef idx="minor">
+              <a:schemeClr val="lt1"/>
+            </a:fontRef>
+          </p:style>
+          <p:txBody>
+            <a:bodyPr rtlCol="0" anchor="ctr"/>
+            <a:lstStyle/>
+            <a:p>
+              <a:pPr algn="ctr"/>
+              <a:endParaRPr lang="en-US"/>
+            </a:p>
+          </p:txBody>
+        </p:sp>
+        <p:sp>
+          <p:nvSpPr>
+            <p:cNvPr id="4" name="TextBox 3">
+              <a:extLst>
+                <a:ext uri="{FF2B5EF4-FFF2-40B4-BE49-F238E27FC236}">
+                  <a16:creationId xmlns:a16="http://schemas.microsoft.com/office/drawing/2014/main" id="{B64A4259-93A1-4271-B5DA-C5DE7C4A3AEB}"/>
+                </a:ext>
+              </a:extLst>
+            </p:cNvPr>
+            <p:cNvSpPr txBox="1"/>
+            <p:nvPr/>
+          </p:nvSpPr>
+          <p:spPr>
+            <a:xfrm>
+              <a:off x="1608881" y="1242250"/>
+              <a:ext cx="1840375" cy="378206"/>
+            </a:xfrm>
+            <a:prstGeom prst="rect">
+              <a:avLst/>
+            </a:prstGeom>
+            <a:noFill/>
+          </p:spPr>
+          <p:txBody>
+            <a:bodyPr wrap="square" rtlCol="0">
+              <a:spAutoFit/>
+            </a:bodyPr>
+            <a:lstStyle/>
+            <a:p>
+              <a:pPr algn="ctr"/>
+              <a:r>
+                <a:rPr lang="en-US" dirty="0">
+                  <a:solidFill>
+                    <a:schemeClr val="bg1"/>
+                  </a:solidFill>
+                </a:rPr>
+                <a:t>Booking Manager</a:t>
+              </a:r>
+            </a:p>
+          </p:txBody>
+        </p:sp>
+        <p:sp>
+          <p:nvSpPr>
+            <p:cNvPr id="13" name="TextBox 12">
+              <a:extLst>
+                <a:ext uri="{FF2B5EF4-FFF2-40B4-BE49-F238E27FC236}">
+                  <a16:creationId xmlns:a16="http://schemas.microsoft.com/office/drawing/2014/main" id="{51DE2D29-D9A0-4DC6-9993-64A3484A2627}"/>
+                </a:ext>
+              </a:extLst>
+            </p:cNvPr>
+            <p:cNvSpPr txBox="1"/>
+            <p:nvPr/>
+          </p:nvSpPr>
+          <p:spPr>
+            <a:xfrm>
+              <a:off x="3449256" y="1242250"/>
+              <a:ext cx="1840375" cy="378206"/>
+            </a:xfrm>
+            <a:prstGeom prst="rect">
+              <a:avLst/>
+            </a:prstGeom>
+            <a:noFill/>
+          </p:spPr>
+          <p:txBody>
+            <a:bodyPr wrap="square" rtlCol="0">
+              <a:spAutoFit/>
+            </a:bodyPr>
+            <a:lstStyle/>
+            <a:p>
+              <a:pPr algn="ctr"/>
+              <a:r>
+                <a:rPr lang="en-US" dirty="0">
+                  <a:solidFill>
+                    <a:schemeClr val="bg1"/>
+                  </a:solidFill>
+                </a:rPr>
+                <a:t>Price Manager</a:t>
+              </a:r>
+            </a:p>
+          </p:txBody>
+        </p:sp>
+        <p:sp>
+          <p:nvSpPr>
+            <p:cNvPr id="14" name="TextBox 13">
+              <a:extLst>
+                <a:ext uri="{FF2B5EF4-FFF2-40B4-BE49-F238E27FC236}">
+                  <a16:creationId xmlns:a16="http://schemas.microsoft.com/office/drawing/2014/main" id="{DD779965-0EA2-4985-8433-986261223AEA}"/>
+                </a:ext>
+              </a:extLst>
+            </p:cNvPr>
+            <p:cNvSpPr txBox="1"/>
+            <p:nvPr/>
+          </p:nvSpPr>
+          <p:spPr>
+            <a:xfrm>
+              <a:off x="8954625" y="1242250"/>
+              <a:ext cx="1840375" cy="378206"/>
+            </a:xfrm>
+            <a:prstGeom prst="rect">
+              <a:avLst/>
+            </a:prstGeom>
+            <a:noFill/>
+          </p:spPr>
+          <p:txBody>
+            <a:bodyPr wrap="square" rtlCol="0">
+              <a:spAutoFit/>
+            </a:bodyPr>
+            <a:lstStyle/>
+            <a:p>
+              <a:pPr algn="ctr"/>
+              <a:r>
+                <a:rPr lang="en-US" dirty="0">
+                  <a:solidFill>
+                    <a:schemeClr val="bg1"/>
+                  </a:solidFill>
+                </a:rPr>
+                <a:t>Logout</a:t>
+              </a:r>
+            </a:p>
+          </p:txBody>
+        </p:sp>
+        <p:sp>
+          <p:nvSpPr>
+            <p:cNvPr id="11" name="TextBox 10">
+              <a:extLst>
+                <a:ext uri="{FF2B5EF4-FFF2-40B4-BE49-F238E27FC236}">
+                  <a16:creationId xmlns:a16="http://schemas.microsoft.com/office/drawing/2014/main" id="{0E3EE51B-7F72-459A-936D-7647C6C65F69}"/>
+                </a:ext>
+              </a:extLst>
+            </p:cNvPr>
+            <p:cNvSpPr txBox="1"/>
+            <p:nvPr/>
+          </p:nvSpPr>
+          <p:spPr>
+            <a:xfrm>
+              <a:off x="2037144" y="1855906"/>
+              <a:ext cx="8009682" cy="369332"/>
+            </a:xfrm>
+            <a:prstGeom prst="rect">
+              <a:avLst/>
+            </a:prstGeom>
+            <a:noFill/>
+          </p:spPr>
+          <p:txBody>
+            <a:bodyPr wrap="square" rtlCol="0">
+              <a:spAutoFit/>
+            </a:bodyPr>
+            <a:lstStyle/>
+            <a:p>
+              <a:r>
+                <a:rPr lang="en-US" i="1" dirty="0"/>
+                <a:t>Price Ranges</a:t>
+              </a:r>
+            </a:p>
+          </p:txBody>
+        </p:sp>
+        <p:sp>
+          <p:nvSpPr>
+            <p:cNvPr id="27" name="Rectangle 26">
+              <a:extLst>
+                <a:ext uri="{FF2B5EF4-FFF2-40B4-BE49-F238E27FC236}">
+                  <a16:creationId xmlns:a16="http://schemas.microsoft.com/office/drawing/2014/main" id="{4C8D0116-95EB-4DF1-878B-0A65C269F7D7}"/>
+                </a:ext>
+              </a:extLst>
+            </p:cNvPr>
+            <p:cNvSpPr/>
+            <p:nvPr/>
+          </p:nvSpPr>
+          <p:spPr>
+            <a:xfrm>
+              <a:off x="2127811" y="2412836"/>
+              <a:ext cx="7531261" cy="1395231"/>
+            </a:xfrm>
+            <a:prstGeom prst="rect">
+              <a:avLst/>
+            </a:prstGeom>
+          </p:spPr>
+          <p:style>
+            <a:lnRef idx="2">
+              <a:schemeClr val="dk1"/>
+            </a:lnRef>
+            <a:fillRef idx="1">
+              <a:schemeClr val="lt1"/>
+            </a:fillRef>
+            <a:effectRef idx="0">
+              <a:schemeClr val="dk1"/>
+            </a:effectRef>
+            <a:fontRef idx="minor">
+              <a:schemeClr val="dk1"/>
+            </a:fontRef>
+          </p:style>
+          <p:txBody>
+            <a:bodyPr rtlCol="0" anchor="ctr"/>
+            <a:lstStyle/>
+            <a:p>
+              <a:pPr algn="ctr"/>
+              <a:r>
+                <a:rPr lang="en-US" dirty="0"/>
+                <a:t>Written description of price data</a:t>
+              </a:r>
+              <a:br>
+                <a:rPr lang="en-US" dirty="0"/>
+              </a:br>
+              <a:r>
+                <a:rPr lang="en-US" dirty="0"/>
+                <a:t>Written description of price data</a:t>
+              </a:r>
+            </a:p>
+          </p:txBody>
+        </p:sp>
+        <p:cxnSp>
+          <p:nvCxnSpPr>
+            <p:cNvPr id="29" name="Straight Connector 28">
+              <a:extLst>
+                <a:ext uri="{FF2B5EF4-FFF2-40B4-BE49-F238E27FC236}">
+                  <a16:creationId xmlns:a16="http://schemas.microsoft.com/office/drawing/2014/main" id="{730B05E7-DA24-4054-A214-AC98427FC105}"/>
+                </a:ext>
+              </a:extLst>
+            </p:cNvPr>
+            <p:cNvCxnSpPr>
+              <a:cxnSpLocks/>
+            </p:cNvCxnSpPr>
+            <p:nvPr/>
+          </p:nvCxnSpPr>
+          <p:spPr>
+            <a:xfrm>
+              <a:off x="2141316" y="2259961"/>
+              <a:ext cx="7517756" cy="0"/>
+            </a:xfrm>
+            <a:prstGeom prst="line">
+              <a:avLst/>
+            </a:prstGeom>
+          </p:spPr>
+          <p:style>
+            <a:lnRef idx="1">
+              <a:schemeClr val="dk1"/>
+            </a:lnRef>
+            <a:fillRef idx="0">
+              <a:schemeClr val="dk1"/>
+            </a:fillRef>
+            <a:effectRef idx="0">
+              <a:schemeClr val="dk1"/>
+            </a:effectRef>
+            <a:fontRef idx="minor">
+              <a:schemeClr val="tx1"/>
+            </a:fontRef>
+          </p:style>
+        </p:cxnSp>
+        <p:cxnSp>
+          <p:nvCxnSpPr>
+            <p:cNvPr id="31" name="Straight Connector 30">
+              <a:extLst>
+                <a:ext uri="{FF2B5EF4-FFF2-40B4-BE49-F238E27FC236}">
+                  <a16:creationId xmlns:a16="http://schemas.microsoft.com/office/drawing/2014/main" id="{DD31279C-0192-4F01-8866-087562215560}"/>
+                </a:ext>
+              </a:extLst>
+            </p:cNvPr>
+            <p:cNvCxnSpPr>
+              <a:cxnSpLocks/>
+            </p:cNvCxnSpPr>
+            <p:nvPr/>
+          </p:nvCxnSpPr>
+          <p:spPr>
+            <a:xfrm>
+              <a:off x="2160608" y="4021234"/>
+              <a:ext cx="7517756" cy="0"/>
+            </a:xfrm>
+            <a:prstGeom prst="line">
+              <a:avLst/>
+            </a:prstGeom>
+          </p:spPr>
+          <p:style>
+            <a:lnRef idx="1">
+              <a:schemeClr val="dk1"/>
+            </a:lnRef>
+            <a:fillRef idx="0">
+              <a:schemeClr val="dk1"/>
+            </a:fillRef>
+            <a:effectRef idx="0">
+              <a:schemeClr val="dk1"/>
+            </a:effectRef>
+            <a:fontRef idx="minor">
+              <a:schemeClr val="tx1"/>
+            </a:fontRef>
+          </p:style>
+        </p:cxnSp>
+        <p:sp>
+          <p:nvSpPr>
+            <p:cNvPr id="33" name="Multiplication Sign 32">
+              <a:extLst>
+                <a:ext uri="{FF2B5EF4-FFF2-40B4-BE49-F238E27FC236}">
+                  <a16:creationId xmlns:a16="http://schemas.microsoft.com/office/drawing/2014/main" id="{84729C00-F858-4155-886C-27BF2B171A17}"/>
+                </a:ext>
+              </a:extLst>
+            </p:cNvPr>
+            <p:cNvSpPr/>
+            <p:nvPr/>
+          </p:nvSpPr>
+          <p:spPr>
+            <a:xfrm>
+              <a:off x="7500395" y="2836766"/>
+              <a:ext cx="347241" cy="347241"/>
+            </a:xfrm>
+            <a:prstGeom prst="mathMultiply">
+              <a:avLst/>
+            </a:prstGeom>
+            <a:solidFill>
+              <a:srgbClr val="FF0000"/>
+            </a:solidFill>
+          </p:spPr>
+          <p:style>
+            <a:lnRef idx="2">
+              <a:schemeClr val="accent1">
+                <a:shade val="50000"/>
+              </a:schemeClr>
+            </a:lnRef>
+            <a:fillRef idx="1">
+              <a:schemeClr val="accent1"/>
+            </a:fillRef>
+            <a:effectRef idx="0">
+              <a:schemeClr val="accent1"/>
+            </a:effectRef>
+            <a:fontRef idx="minor">
+              <a:schemeClr val="lt1"/>
+            </a:fontRef>
+          </p:style>
+          <p:txBody>
+            <a:bodyPr rtlCol="0" anchor="ctr"/>
+            <a:lstStyle/>
+            <a:p>
+              <a:pPr algn="ctr"/>
+              <a:endParaRPr lang="en-US"/>
+            </a:p>
+          </p:txBody>
+        </p:sp>
+        <p:sp>
+          <p:nvSpPr>
+            <p:cNvPr id="34" name="Multiplication Sign 33">
+              <a:extLst>
+                <a:ext uri="{FF2B5EF4-FFF2-40B4-BE49-F238E27FC236}">
+                  <a16:creationId xmlns:a16="http://schemas.microsoft.com/office/drawing/2014/main" id="{532BB2A6-3D82-4A11-B6A2-82C03AE9C353}"/>
+                </a:ext>
+              </a:extLst>
+            </p:cNvPr>
+            <p:cNvSpPr/>
+            <p:nvPr/>
+          </p:nvSpPr>
+          <p:spPr>
+            <a:xfrm>
+              <a:off x="7500394" y="3125406"/>
+              <a:ext cx="347241" cy="347241"/>
+            </a:xfrm>
+            <a:prstGeom prst="mathMultiply">
+              <a:avLst/>
+            </a:prstGeom>
+            <a:solidFill>
+              <a:srgbClr val="FF0000"/>
+            </a:solidFill>
+          </p:spPr>
+          <p:style>
+            <a:lnRef idx="2">
+              <a:schemeClr val="accent1">
+                <a:shade val="50000"/>
+              </a:schemeClr>
+            </a:lnRef>
+            <a:fillRef idx="1">
+              <a:schemeClr val="accent1"/>
+            </a:fillRef>
+            <a:effectRef idx="0">
+              <a:schemeClr val="accent1"/>
+            </a:effectRef>
+            <a:fontRef idx="minor">
+              <a:schemeClr val="lt1"/>
+            </a:fontRef>
+          </p:style>
+          <p:txBody>
+            <a:bodyPr rtlCol="0" anchor="ctr"/>
+            <a:lstStyle/>
+            <a:p>
+              <a:pPr algn="ctr"/>
+              <a:endParaRPr lang="en-US"/>
+            </a:p>
+          </p:txBody>
+        </p:sp>
+        <p:sp>
+          <p:nvSpPr>
+            <p:cNvPr id="35" name="TextBox 34">
+              <a:extLst>
+                <a:ext uri="{FF2B5EF4-FFF2-40B4-BE49-F238E27FC236}">
+                  <a16:creationId xmlns:a16="http://schemas.microsoft.com/office/drawing/2014/main" id="{BF67F2A5-8CBB-4F57-AFCD-B3BF1E217215}"/>
+                </a:ext>
+              </a:extLst>
+            </p:cNvPr>
+            <p:cNvSpPr txBox="1"/>
+            <p:nvPr/>
+          </p:nvSpPr>
+          <p:spPr>
+            <a:xfrm>
+              <a:off x="4427316" y="4126375"/>
+              <a:ext cx="3188826" cy="369332"/>
+            </a:xfrm>
+            <a:prstGeom prst="rect">
+              <a:avLst/>
+            </a:prstGeom>
+            <a:ln/>
+          </p:spPr>
+          <p:style>
+            <a:lnRef idx="2">
+              <a:schemeClr val="dk1"/>
+            </a:lnRef>
+            <a:fillRef idx="1">
+              <a:schemeClr val="lt1"/>
+            </a:fillRef>
+            <a:effectRef idx="0">
+              <a:schemeClr val="dk1"/>
+            </a:effectRef>
+            <a:fontRef idx="minor">
+              <a:schemeClr val="dk1"/>
+            </a:fontRef>
+          </p:style>
+          <p:txBody>
+            <a:bodyPr wrap="square" rtlCol="0">
+              <a:spAutoFit/>
+            </a:bodyPr>
+            <a:lstStyle/>
+            <a:p>
+              <a:pPr algn="ctr"/>
+              <a:r>
+                <a:rPr lang="en-US" dirty="0"/>
+                <a:t>Add new price rule</a:t>
+              </a:r>
+            </a:p>
+          </p:txBody>
+        </p:sp>
+        <p:sp>
+          <p:nvSpPr>
+            <p:cNvPr id="36" name="TextBox 35">
+              <a:extLst>
+                <a:ext uri="{FF2B5EF4-FFF2-40B4-BE49-F238E27FC236}">
+                  <a16:creationId xmlns:a16="http://schemas.microsoft.com/office/drawing/2014/main" id="{8561C1CA-D08E-4610-B447-7F17128F715F}"/>
+                </a:ext>
+              </a:extLst>
+            </p:cNvPr>
+            <p:cNvSpPr txBox="1"/>
+            <p:nvPr/>
+          </p:nvSpPr>
+          <p:spPr>
+            <a:xfrm>
+              <a:off x="7928658" y="2819405"/>
+              <a:ext cx="769717" cy="369332"/>
+            </a:xfrm>
+            <a:prstGeom prst="rect">
+              <a:avLst/>
+            </a:prstGeom>
+          </p:spPr>
+          <p:style>
+            <a:lnRef idx="2">
+              <a:schemeClr val="dk1"/>
+            </a:lnRef>
+            <a:fillRef idx="1">
+              <a:schemeClr val="lt1"/>
+            </a:fillRef>
+            <a:effectRef idx="0">
+              <a:schemeClr val="dk1"/>
+            </a:effectRef>
+            <a:fontRef idx="minor">
+              <a:schemeClr val="dk1"/>
+            </a:fontRef>
+          </p:style>
+          <p:txBody>
+            <a:bodyPr wrap="square" rtlCol="0">
+              <a:spAutoFit/>
+            </a:bodyPr>
+            <a:lstStyle/>
+            <a:p>
+              <a:pPr algn="ctr"/>
+              <a:r>
+                <a:rPr lang="en-US" dirty="0"/>
+                <a:t>Edit</a:t>
+              </a:r>
+            </a:p>
+          </p:txBody>
+        </p:sp>
+        <p:sp>
+          <p:nvSpPr>
+            <p:cNvPr id="37" name="TextBox 36">
+              <a:extLst>
+                <a:ext uri="{FF2B5EF4-FFF2-40B4-BE49-F238E27FC236}">
+                  <a16:creationId xmlns:a16="http://schemas.microsoft.com/office/drawing/2014/main" id="{EBF6B2A7-45EF-451A-88E7-50BF82A8E42B}"/>
+                </a:ext>
+              </a:extLst>
+            </p:cNvPr>
+            <p:cNvSpPr txBox="1"/>
+            <p:nvPr/>
+          </p:nvSpPr>
+          <p:spPr>
+            <a:xfrm>
+              <a:off x="7928658" y="3198481"/>
+              <a:ext cx="769717" cy="369332"/>
+            </a:xfrm>
+            <a:prstGeom prst="rect">
+              <a:avLst/>
+            </a:prstGeom>
+          </p:spPr>
+          <p:style>
+            <a:lnRef idx="2">
+              <a:schemeClr val="dk1"/>
+            </a:lnRef>
+            <a:fillRef idx="1">
+              <a:schemeClr val="lt1"/>
+            </a:fillRef>
+            <a:effectRef idx="0">
+              <a:schemeClr val="dk1"/>
+            </a:effectRef>
+            <a:fontRef idx="minor">
+              <a:schemeClr val="dk1"/>
+            </a:fontRef>
+          </p:style>
+          <p:txBody>
+            <a:bodyPr wrap="square" rtlCol="0">
+              <a:spAutoFit/>
+            </a:bodyPr>
+            <a:lstStyle/>
+            <a:p>
+              <a:pPr algn="ctr"/>
+              <a:r>
+                <a:rPr lang="en-US" dirty="0"/>
+                <a:t>Edit</a:t>
+              </a:r>
+            </a:p>
+          </p:txBody>
+        </p:sp>
+      </p:grpSp>
     </p:spTree>
     <p:extLst>
       <p:ext uri="{BB962C8B-B14F-4D97-AF65-F5344CB8AC3E}">
@@ -8162,716 +8183,737 @@
           </a:p>
         </p:txBody>
       </p:sp>
-      <p:sp>
-        <p:nvSpPr>
-          <p:cNvPr id="2" name="Rectangle 1">
+      <p:grpSp>
+        <p:nvGrpSpPr>
+          <p:cNvPr id="12" name="Group 11">
             <a:extLst>
               <a:ext uri="{FF2B5EF4-FFF2-40B4-BE49-F238E27FC236}">
-                <a16:creationId xmlns:a16="http://schemas.microsoft.com/office/drawing/2014/main" id="{287A8ECD-4A3C-42EE-AA65-5BA7F91B72D4}"/>
+                <a16:creationId xmlns:a16="http://schemas.microsoft.com/office/drawing/2014/main" id="{486EE81C-D115-4798-A5D0-F2812DCCA56B}"/>
               </a:ext>
             </a:extLst>
           </p:cNvPr>
-          <p:cNvSpPr/>
+          <p:cNvGrpSpPr/>
           <p:nvPr/>
-        </p:nvSpPr>
-        <p:spPr>
+        </p:nvGrpSpPr>
+        <p:grpSpPr>
           <a:xfrm>
             <a:off x="1397000" y="1242250"/>
             <a:ext cx="9398000" cy="5860008"/>
+            <a:chOff x="1397000" y="1242250"/>
+            <a:chExt cx="9398000" cy="5860008"/>
           </a:xfrm>
-          <a:prstGeom prst="rect">
-            <a:avLst/>
-          </a:prstGeom>
-        </p:spPr>
-        <p:style>
-          <a:lnRef idx="2">
-            <a:schemeClr val="dk1"/>
-          </a:lnRef>
-          <a:fillRef idx="1">
-            <a:schemeClr val="lt1"/>
-          </a:fillRef>
-          <a:effectRef idx="0">
-            <a:schemeClr val="dk1"/>
-          </a:effectRef>
-          <a:fontRef idx="minor">
-            <a:schemeClr val="dk1"/>
-          </a:fontRef>
-        </p:style>
-        <p:txBody>
-          <a:bodyPr rtlCol="0" anchor="ctr"/>
-          <a:lstStyle/>
-          <a:p>
-            <a:pPr algn="ctr"/>
-            <a:endParaRPr lang="en-US" dirty="0"/>
-          </a:p>
-        </p:txBody>
-      </p:sp>
-      <p:sp>
-        <p:nvSpPr>
-          <p:cNvPr id="3" name="Rectangle 2">
-            <a:extLst>
-              <a:ext uri="{FF2B5EF4-FFF2-40B4-BE49-F238E27FC236}">
-                <a16:creationId xmlns:a16="http://schemas.microsoft.com/office/drawing/2014/main" id="{1F8E4320-D31B-4A84-B871-103E0C5672EF}"/>
-              </a:ext>
-            </a:extLst>
-          </p:cNvPr>
-          <p:cNvSpPr/>
-          <p:nvPr/>
-        </p:nvSpPr>
-        <p:spPr>
-          <a:xfrm>
-            <a:off x="1397000" y="1242250"/>
-            <a:ext cx="9398000" cy="378206"/>
-          </a:xfrm>
-          <a:prstGeom prst="rect">
-            <a:avLst/>
-          </a:prstGeom>
-        </p:spPr>
-        <p:style>
-          <a:lnRef idx="2">
-            <a:schemeClr val="dk1">
-              <a:shade val="50000"/>
-            </a:schemeClr>
-          </a:lnRef>
-          <a:fillRef idx="1">
-            <a:schemeClr val="dk1"/>
-          </a:fillRef>
-          <a:effectRef idx="0">
-            <a:schemeClr val="dk1"/>
-          </a:effectRef>
-          <a:fontRef idx="minor">
-            <a:schemeClr val="lt1"/>
-          </a:fontRef>
-        </p:style>
-        <p:txBody>
-          <a:bodyPr rtlCol="0" anchor="ctr"/>
-          <a:lstStyle/>
-          <a:p>
-            <a:pPr algn="ctr"/>
-            <a:endParaRPr lang="en-US"/>
-          </a:p>
-        </p:txBody>
-      </p:sp>
-      <p:sp>
-        <p:nvSpPr>
-          <p:cNvPr id="4" name="TextBox 3">
-            <a:extLst>
-              <a:ext uri="{FF2B5EF4-FFF2-40B4-BE49-F238E27FC236}">
-                <a16:creationId xmlns:a16="http://schemas.microsoft.com/office/drawing/2014/main" id="{B64A4259-93A1-4271-B5DA-C5DE7C4A3AEB}"/>
-              </a:ext>
-            </a:extLst>
-          </p:cNvPr>
-          <p:cNvSpPr txBox="1"/>
-          <p:nvPr/>
-        </p:nvSpPr>
-        <p:spPr>
-          <a:xfrm>
-            <a:off x="1608881" y="1242250"/>
-            <a:ext cx="1840375" cy="378206"/>
-          </a:xfrm>
-          <a:prstGeom prst="rect">
-            <a:avLst/>
-          </a:prstGeom>
-          <a:noFill/>
-        </p:spPr>
-        <p:txBody>
-          <a:bodyPr wrap="square" rtlCol="0">
-            <a:spAutoFit/>
-          </a:bodyPr>
-          <a:lstStyle/>
-          <a:p>
-            <a:pPr algn="ctr"/>
-            <a:r>
-              <a:rPr lang="en-US" dirty="0">
-                <a:solidFill>
-                  <a:schemeClr val="bg1"/>
-                </a:solidFill>
-              </a:rPr>
-              <a:t>Booking Manager</a:t>
-            </a:r>
-          </a:p>
-        </p:txBody>
-      </p:sp>
-      <p:sp>
-        <p:nvSpPr>
-          <p:cNvPr id="13" name="TextBox 12">
-            <a:extLst>
-              <a:ext uri="{FF2B5EF4-FFF2-40B4-BE49-F238E27FC236}">
-                <a16:creationId xmlns:a16="http://schemas.microsoft.com/office/drawing/2014/main" id="{51DE2D29-D9A0-4DC6-9993-64A3484A2627}"/>
-              </a:ext>
-            </a:extLst>
-          </p:cNvPr>
-          <p:cNvSpPr txBox="1"/>
-          <p:nvPr/>
-        </p:nvSpPr>
-        <p:spPr>
-          <a:xfrm>
-            <a:off x="3449256" y="1242250"/>
-            <a:ext cx="1840375" cy="378206"/>
-          </a:xfrm>
-          <a:prstGeom prst="rect">
-            <a:avLst/>
-          </a:prstGeom>
-          <a:noFill/>
-        </p:spPr>
-        <p:txBody>
-          <a:bodyPr wrap="square" rtlCol="0">
-            <a:spAutoFit/>
-          </a:bodyPr>
-          <a:lstStyle/>
-          <a:p>
-            <a:pPr algn="ctr"/>
-            <a:r>
-              <a:rPr lang="en-US" dirty="0">
-                <a:solidFill>
-                  <a:schemeClr val="bg1"/>
-                </a:solidFill>
-              </a:rPr>
-              <a:t>Price Manager</a:t>
-            </a:r>
-          </a:p>
-        </p:txBody>
-      </p:sp>
-      <p:sp>
-        <p:nvSpPr>
-          <p:cNvPr id="14" name="TextBox 13">
-            <a:extLst>
-              <a:ext uri="{FF2B5EF4-FFF2-40B4-BE49-F238E27FC236}">
-                <a16:creationId xmlns:a16="http://schemas.microsoft.com/office/drawing/2014/main" id="{DD779965-0EA2-4985-8433-986261223AEA}"/>
-              </a:ext>
-            </a:extLst>
-          </p:cNvPr>
-          <p:cNvSpPr txBox="1"/>
-          <p:nvPr/>
-        </p:nvSpPr>
-        <p:spPr>
-          <a:xfrm>
-            <a:off x="8954625" y="1242250"/>
-            <a:ext cx="1840375" cy="378206"/>
-          </a:xfrm>
-          <a:prstGeom prst="rect">
-            <a:avLst/>
-          </a:prstGeom>
-          <a:noFill/>
-        </p:spPr>
-        <p:txBody>
-          <a:bodyPr wrap="square" rtlCol="0">
-            <a:spAutoFit/>
-          </a:bodyPr>
-          <a:lstStyle/>
-          <a:p>
-            <a:pPr algn="ctr"/>
-            <a:r>
-              <a:rPr lang="en-US" dirty="0">
-                <a:solidFill>
-                  <a:schemeClr val="bg1"/>
-                </a:solidFill>
-              </a:rPr>
-              <a:t>Logout</a:t>
-            </a:r>
-          </a:p>
-        </p:txBody>
-      </p:sp>
-      <p:sp>
-        <p:nvSpPr>
-          <p:cNvPr id="11" name="TextBox 10">
-            <a:extLst>
-              <a:ext uri="{FF2B5EF4-FFF2-40B4-BE49-F238E27FC236}">
-                <a16:creationId xmlns:a16="http://schemas.microsoft.com/office/drawing/2014/main" id="{0E3EE51B-7F72-459A-936D-7647C6C65F69}"/>
-              </a:ext>
-            </a:extLst>
-          </p:cNvPr>
-          <p:cNvSpPr txBox="1"/>
-          <p:nvPr/>
-        </p:nvSpPr>
-        <p:spPr>
-          <a:xfrm>
-            <a:off x="2037144" y="1855906"/>
-            <a:ext cx="8009682" cy="369332"/>
-          </a:xfrm>
-          <a:prstGeom prst="rect">
-            <a:avLst/>
-          </a:prstGeom>
-          <a:noFill/>
-        </p:spPr>
-        <p:txBody>
-          <a:bodyPr wrap="square" rtlCol="0">
-            <a:spAutoFit/>
-          </a:bodyPr>
-          <a:lstStyle/>
-          <a:p>
-            <a:pPr algn="ctr"/>
-            <a:r>
-              <a:rPr lang="en-US" i="1" dirty="0"/>
-              <a:t>Price Ranges</a:t>
-            </a:r>
-          </a:p>
-        </p:txBody>
-      </p:sp>
-      <p:cxnSp>
-        <p:nvCxnSpPr>
-          <p:cNvPr id="29" name="Straight Connector 28">
-            <a:extLst>
-              <a:ext uri="{FF2B5EF4-FFF2-40B4-BE49-F238E27FC236}">
-                <a16:creationId xmlns:a16="http://schemas.microsoft.com/office/drawing/2014/main" id="{730B05E7-DA24-4054-A214-AC98427FC105}"/>
-              </a:ext>
-            </a:extLst>
-          </p:cNvPr>
-          <p:cNvCxnSpPr>
-            <a:cxnSpLocks/>
-          </p:cNvCxnSpPr>
-          <p:nvPr/>
-        </p:nvCxnSpPr>
-        <p:spPr>
-          <a:xfrm>
-            <a:off x="2141316" y="2259961"/>
-            <a:ext cx="7517756" cy="0"/>
-          </a:xfrm>
-          <a:prstGeom prst="line">
-            <a:avLst/>
-          </a:prstGeom>
-        </p:spPr>
-        <p:style>
-          <a:lnRef idx="1">
-            <a:schemeClr val="dk1"/>
-          </a:lnRef>
-          <a:fillRef idx="0">
-            <a:schemeClr val="dk1"/>
-          </a:fillRef>
-          <a:effectRef idx="0">
-            <a:schemeClr val="dk1"/>
-          </a:effectRef>
-          <a:fontRef idx="minor">
-            <a:schemeClr val="tx1"/>
-          </a:fontRef>
-        </p:style>
-      </p:cxnSp>
-      <p:cxnSp>
-        <p:nvCxnSpPr>
-          <p:cNvPr id="31" name="Straight Connector 30">
-            <a:extLst>
-              <a:ext uri="{FF2B5EF4-FFF2-40B4-BE49-F238E27FC236}">
-                <a16:creationId xmlns:a16="http://schemas.microsoft.com/office/drawing/2014/main" id="{DD31279C-0192-4F01-8866-087562215560}"/>
-              </a:ext>
-            </a:extLst>
-          </p:cNvPr>
-          <p:cNvCxnSpPr>
-            <a:cxnSpLocks/>
-          </p:cNvCxnSpPr>
-          <p:nvPr/>
-        </p:nvCxnSpPr>
-        <p:spPr>
-          <a:xfrm>
-            <a:off x="2160608" y="6964848"/>
-            <a:ext cx="7517756" cy="0"/>
-          </a:xfrm>
-          <a:prstGeom prst="line">
-            <a:avLst/>
-          </a:prstGeom>
-        </p:spPr>
-        <p:style>
-          <a:lnRef idx="1">
-            <a:schemeClr val="dk1"/>
-          </a:lnRef>
-          <a:fillRef idx="0">
-            <a:schemeClr val="dk1"/>
-          </a:fillRef>
-          <a:effectRef idx="0">
-            <a:schemeClr val="dk1"/>
-          </a:effectRef>
-          <a:fontRef idx="minor">
-            <a:schemeClr val="tx1"/>
-          </a:fontRef>
-        </p:style>
-      </p:cxnSp>
-      <p:sp>
-        <p:nvSpPr>
-          <p:cNvPr id="35" name="TextBox 34">
-            <a:extLst>
-              <a:ext uri="{FF2B5EF4-FFF2-40B4-BE49-F238E27FC236}">
-                <a16:creationId xmlns:a16="http://schemas.microsoft.com/office/drawing/2014/main" id="{BF67F2A5-8CBB-4F57-AFCD-B3BF1E217215}"/>
-              </a:ext>
-            </a:extLst>
-          </p:cNvPr>
-          <p:cNvSpPr txBox="1"/>
-          <p:nvPr/>
-        </p:nvSpPr>
-        <p:spPr>
-          <a:xfrm>
-            <a:off x="4427316" y="2454802"/>
-            <a:ext cx="3188826" cy="369332"/>
-          </a:xfrm>
-          <a:prstGeom prst="rect">
-            <a:avLst/>
-          </a:prstGeom>
-          <a:ln/>
-        </p:spPr>
-        <p:style>
-          <a:lnRef idx="2">
-            <a:schemeClr val="dk1"/>
-          </a:lnRef>
-          <a:fillRef idx="1">
-            <a:schemeClr val="lt1"/>
-          </a:fillRef>
-          <a:effectRef idx="0">
-            <a:schemeClr val="dk1"/>
-          </a:effectRef>
-          <a:fontRef idx="minor">
-            <a:schemeClr val="dk1"/>
-          </a:fontRef>
-        </p:style>
-        <p:txBody>
-          <a:bodyPr wrap="square" rtlCol="0">
-            <a:spAutoFit/>
-          </a:bodyPr>
-          <a:lstStyle/>
-          <a:p>
-            <a:pPr algn="ctr"/>
-            <a:r>
-              <a:rPr lang="en-US" dirty="0"/>
-              <a:t>Price</a:t>
-            </a:r>
-          </a:p>
-        </p:txBody>
-      </p:sp>
-      <p:sp>
-        <p:nvSpPr>
-          <p:cNvPr id="15" name="TextBox 14">
-            <a:extLst>
-              <a:ext uri="{FF2B5EF4-FFF2-40B4-BE49-F238E27FC236}">
-                <a16:creationId xmlns:a16="http://schemas.microsoft.com/office/drawing/2014/main" id="{BE25E94C-8FE1-4FF8-A64E-056B0ECC5BC7}"/>
-              </a:ext>
-            </a:extLst>
-          </p:cNvPr>
-          <p:cNvSpPr txBox="1"/>
-          <p:nvPr/>
-        </p:nvSpPr>
-        <p:spPr>
-          <a:xfrm>
-            <a:off x="4427316" y="2925060"/>
-            <a:ext cx="3188826" cy="369332"/>
-          </a:xfrm>
-          <a:prstGeom prst="rect">
-            <a:avLst/>
-          </a:prstGeom>
-          <a:ln/>
-        </p:spPr>
-        <p:style>
-          <a:lnRef idx="2">
-            <a:schemeClr val="dk1"/>
-          </a:lnRef>
-          <a:fillRef idx="1">
-            <a:schemeClr val="lt1"/>
-          </a:fillRef>
-          <a:effectRef idx="0">
-            <a:schemeClr val="dk1"/>
-          </a:effectRef>
-          <a:fontRef idx="minor">
-            <a:schemeClr val="dk1"/>
-          </a:fontRef>
-        </p:style>
-        <p:txBody>
-          <a:bodyPr wrap="square" rtlCol="0">
-            <a:spAutoFit/>
-          </a:bodyPr>
-          <a:lstStyle/>
-          <a:p>
-            <a:pPr algn="ctr"/>
-            <a:r>
-              <a:rPr lang="en-US" dirty="0"/>
-              <a:t>per Night/Fixed toggle</a:t>
-            </a:r>
-          </a:p>
-        </p:txBody>
-      </p:sp>
-      <p:sp>
-        <p:nvSpPr>
-          <p:cNvPr id="16" name="TextBox 15">
-            <a:extLst>
-              <a:ext uri="{FF2B5EF4-FFF2-40B4-BE49-F238E27FC236}">
-                <a16:creationId xmlns:a16="http://schemas.microsoft.com/office/drawing/2014/main" id="{BDACD9E1-C8F0-4821-B4B2-68BB8541EEAB}"/>
-              </a:ext>
-            </a:extLst>
-          </p:cNvPr>
-          <p:cNvSpPr txBox="1"/>
-          <p:nvPr/>
-        </p:nvSpPr>
-        <p:spPr>
-          <a:xfrm>
-            <a:off x="4427316" y="3397743"/>
-            <a:ext cx="3188826" cy="369332"/>
-          </a:xfrm>
-          <a:prstGeom prst="rect">
-            <a:avLst/>
-          </a:prstGeom>
-          <a:ln/>
-        </p:spPr>
-        <p:style>
-          <a:lnRef idx="2">
-            <a:schemeClr val="dk1"/>
-          </a:lnRef>
-          <a:fillRef idx="1">
-            <a:schemeClr val="lt1"/>
-          </a:fillRef>
-          <a:effectRef idx="0">
-            <a:schemeClr val="dk1"/>
-          </a:effectRef>
-          <a:fontRef idx="minor">
-            <a:schemeClr val="dk1"/>
-          </a:fontRef>
-        </p:style>
-        <p:txBody>
-          <a:bodyPr wrap="square" rtlCol="0">
-            <a:spAutoFit/>
-          </a:bodyPr>
-          <a:lstStyle/>
-          <a:p>
-            <a:pPr algn="ctr"/>
-            <a:r>
-              <a:rPr lang="en-US" dirty="0"/>
-              <a:t>Flat rate / Additional Persons</a:t>
-            </a:r>
-          </a:p>
-        </p:txBody>
-      </p:sp>
-      <p:sp>
-        <p:nvSpPr>
-          <p:cNvPr id="17" name="TextBox 16">
-            <a:extLst>
-              <a:ext uri="{FF2B5EF4-FFF2-40B4-BE49-F238E27FC236}">
-                <a16:creationId xmlns:a16="http://schemas.microsoft.com/office/drawing/2014/main" id="{7D471D8C-9FB7-4310-B906-4EA9D133BCCE}"/>
-              </a:ext>
-            </a:extLst>
-          </p:cNvPr>
-          <p:cNvSpPr txBox="1"/>
-          <p:nvPr/>
-        </p:nvSpPr>
-        <p:spPr>
-          <a:xfrm>
-            <a:off x="4427316" y="4407630"/>
-            <a:ext cx="3188826" cy="369332"/>
-          </a:xfrm>
-          <a:prstGeom prst="rect">
-            <a:avLst/>
-          </a:prstGeom>
-          <a:ln/>
-        </p:spPr>
-        <p:style>
-          <a:lnRef idx="2">
-            <a:schemeClr val="dk1"/>
-          </a:lnRef>
-          <a:fillRef idx="1">
-            <a:schemeClr val="lt1"/>
-          </a:fillRef>
-          <a:effectRef idx="0">
-            <a:schemeClr val="dk1"/>
-          </a:effectRef>
-          <a:fontRef idx="minor">
-            <a:schemeClr val="dk1"/>
-          </a:fontRef>
-        </p:style>
-        <p:txBody>
-          <a:bodyPr wrap="square" rtlCol="0">
-            <a:spAutoFit/>
-          </a:bodyPr>
-          <a:lstStyle/>
-          <a:p>
-            <a:pPr algn="ctr"/>
-            <a:r>
-              <a:rPr lang="en-US" dirty="0"/>
-              <a:t>All year / date range</a:t>
-            </a:r>
-          </a:p>
-        </p:txBody>
-      </p:sp>
-      <p:sp>
-        <p:nvSpPr>
-          <p:cNvPr id="6" name="Rectangle 5">
-            <a:extLst>
-              <a:ext uri="{FF2B5EF4-FFF2-40B4-BE49-F238E27FC236}">
-                <a16:creationId xmlns:a16="http://schemas.microsoft.com/office/drawing/2014/main" id="{B9FAD6DB-55D2-473E-AABE-085295CE74D7}"/>
-              </a:ext>
-            </a:extLst>
-          </p:cNvPr>
-          <p:cNvSpPr/>
-          <p:nvPr/>
-        </p:nvSpPr>
-        <p:spPr>
-          <a:xfrm>
-            <a:off x="4416878" y="4882443"/>
-            <a:ext cx="3199264" cy="1496023"/>
-          </a:xfrm>
-          <a:prstGeom prst="rect">
-            <a:avLst/>
-          </a:prstGeom>
-        </p:spPr>
-        <p:style>
-          <a:lnRef idx="2">
-            <a:schemeClr val="dk1"/>
-          </a:lnRef>
-          <a:fillRef idx="1">
-            <a:schemeClr val="lt1"/>
-          </a:fillRef>
-          <a:effectRef idx="0">
-            <a:schemeClr val="dk1"/>
-          </a:effectRef>
-          <a:fontRef idx="minor">
-            <a:schemeClr val="dk1"/>
-          </a:fontRef>
-        </p:style>
-        <p:txBody>
-          <a:bodyPr rtlCol="0" anchor="ctr"/>
-          <a:lstStyle/>
-          <a:p>
-            <a:pPr algn="ctr"/>
-            <a:r>
-              <a:rPr lang="en-US" dirty="0"/>
-              <a:t>Calendar for date range</a:t>
-            </a:r>
-          </a:p>
-        </p:txBody>
-      </p:sp>
-      <p:sp>
-        <p:nvSpPr>
-          <p:cNvPr id="7" name="Rectangle 6">
-            <a:extLst>
-              <a:ext uri="{FF2B5EF4-FFF2-40B4-BE49-F238E27FC236}">
-                <a16:creationId xmlns:a16="http://schemas.microsoft.com/office/drawing/2014/main" id="{20F31300-92C8-4300-8180-D8B612EB0D0A}"/>
-              </a:ext>
-            </a:extLst>
-          </p:cNvPr>
-          <p:cNvSpPr/>
-          <p:nvPr/>
-        </p:nvSpPr>
-        <p:spPr>
-          <a:xfrm>
-            <a:off x="4575859" y="6483947"/>
-            <a:ext cx="1363884" cy="294361"/>
-          </a:xfrm>
-          <a:prstGeom prst="rect">
-            <a:avLst/>
-          </a:prstGeom>
-        </p:spPr>
-        <p:style>
-          <a:lnRef idx="2">
-            <a:schemeClr val="dk1"/>
-          </a:lnRef>
-          <a:fillRef idx="1">
-            <a:schemeClr val="lt1"/>
-          </a:fillRef>
-          <a:effectRef idx="0">
-            <a:schemeClr val="dk1"/>
-          </a:effectRef>
-          <a:fontRef idx="minor">
-            <a:schemeClr val="dk1"/>
-          </a:fontRef>
-        </p:style>
-        <p:txBody>
-          <a:bodyPr rtlCol="0" anchor="ctr"/>
-          <a:lstStyle/>
-          <a:p>
-            <a:pPr algn="ctr"/>
-            <a:r>
-              <a:rPr lang="en-US" dirty="0"/>
-              <a:t>Discard</a:t>
-            </a:r>
-          </a:p>
-        </p:txBody>
-      </p:sp>
-      <p:sp>
-        <p:nvSpPr>
-          <p:cNvPr id="22" name="Rectangle 21">
-            <a:extLst>
-              <a:ext uri="{FF2B5EF4-FFF2-40B4-BE49-F238E27FC236}">
-                <a16:creationId xmlns:a16="http://schemas.microsoft.com/office/drawing/2014/main" id="{3FA62FAF-10DA-4EDF-8E80-C12D59204A86}"/>
-              </a:ext>
-            </a:extLst>
-          </p:cNvPr>
-          <p:cNvSpPr/>
-          <p:nvPr/>
-        </p:nvSpPr>
-        <p:spPr>
-          <a:xfrm>
-            <a:off x="6096000" y="6492568"/>
-            <a:ext cx="1363884" cy="294361"/>
-          </a:xfrm>
-          <a:prstGeom prst="rect">
-            <a:avLst/>
-          </a:prstGeom>
-        </p:spPr>
-        <p:style>
-          <a:lnRef idx="2">
-            <a:schemeClr val="dk1"/>
-          </a:lnRef>
-          <a:fillRef idx="1">
-            <a:schemeClr val="lt1"/>
-          </a:fillRef>
-          <a:effectRef idx="0">
-            <a:schemeClr val="dk1"/>
-          </a:effectRef>
-          <a:fontRef idx="minor">
-            <a:schemeClr val="dk1"/>
-          </a:fontRef>
-        </p:style>
-        <p:txBody>
-          <a:bodyPr rtlCol="0" anchor="ctr"/>
-          <a:lstStyle/>
-          <a:p>
-            <a:pPr algn="ctr"/>
-            <a:r>
-              <a:rPr lang="en-US" dirty="0"/>
-              <a:t>Apply</a:t>
-            </a:r>
-          </a:p>
-        </p:txBody>
-      </p:sp>
-      <p:sp>
-        <p:nvSpPr>
-          <p:cNvPr id="9" name="Rectangle 8">
-            <a:extLst>
-              <a:ext uri="{FF2B5EF4-FFF2-40B4-BE49-F238E27FC236}">
-                <a16:creationId xmlns:a16="http://schemas.microsoft.com/office/drawing/2014/main" id="{13BB0C64-5A1C-4A31-A9A9-A725623328E3}"/>
-              </a:ext>
-            </a:extLst>
-          </p:cNvPr>
-          <p:cNvSpPr/>
-          <p:nvPr/>
-        </p:nvSpPr>
-        <p:spPr>
-          <a:xfrm>
-            <a:off x="4416878" y="3901774"/>
-            <a:ext cx="3199264" cy="357505"/>
-          </a:xfrm>
-          <a:prstGeom prst="rect">
-            <a:avLst/>
-          </a:prstGeom>
-        </p:spPr>
-        <p:style>
-          <a:lnRef idx="2">
-            <a:schemeClr val="dk1"/>
-          </a:lnRef>
-          <a:fillRef idx="1">
-            <a:schemeClr val="lt1"/>
-          </a:fillRef>
-          <a:effectRef idx="0">
-            <a:schemeClr val="dk1"/>
-          </a:effectRef>
-          <a:fontRef idx="minor">
-            <a:schemeClr val="dk1"/>
-          </a:fontRef>
-        </p:style>
-        <p:txBody>
-          <a:bodyPr rtlCol="0" anchor="ctr"/>
-          <a:lstStyle/>
-          <a:p>
-            <a:pPr algn="ctr"/>
-            <a:r>
-              <a:rPr lang="en-US" dirty="0"/>
-              <a:t>Min people – Max People</a:t>
-            </a:r>
-          </a:p>
-        </p:txBody>
-      </p:sp>
+        </p:grpSpPr>
+        <p:sp>
+          <p:nvSpPr>
+            <p:cNvPr id="2" name="Rectangle 1">
+              <a:extLst>
+                <a:ext uri="{FF2B5EF4-FFF2-40B4-BE49-F238E27FC236}">
+                  <a16:creationId xmlns:a16="http://schemas.microsoft.com/office/drawing/2014/main" id="{287A8ECD-4A3C-42EE-AA65-5BA7F91B72D4}"/>
+                </a:ext>
+              </a:extLst>
+            </p:cNvPr>
+            <p:cNvSpPr/>
+            <p:nvPr/>
+          </p:nvSpPr>
+          <p:spPr>
+            <a:xfrm>
+              <a:off x="1397000" y="1242250"/>
+              <a:ext cx="9398000" cy="5860008"/>
+            </a:xfrm>
+            <a:prstGeom prst="rect">
+              <a:avLst/>
+            </a:prstGeom>
+          </p:spPr>
+          <p:style>
+            <a:lnRef idx="2">
+              <a:schemeClr val="dk1"/>
+            </a:lnRef>
+            <a:fillRef idx="1">
+              <a:schemeClr val="lt1"/>
+            </a:fillRef>
+            <a:effectRef idx="0">
+              <a:schemeClr val="dk1"/>
+            </a:effectRef>
+            <a:fontRef idx="minor">
+              <a:schemeClr val="dk1"/>
+            </a:fontRef>
+          </p:style>
+          <p:txBody>
+            <a:bodyPr rtlCol="0" anchor="ctr"/>
+            <a:lstStyle/>
+            <a:p>
+              <a:pPr algn="ctr"/>
+              <a:endParaRPr lang="en-US" dirty="0"/>
+            </a:p>
+          </p:txBody>
+        </p:sp>
+        <p:sp>
+          <p:nvSpPr>
+            <p:cNvPr id="3" name="Rectangle 2">
+              <a:extLst>
+                <a:ext uri="{FF2B5EF4-FFF2-40B4-BE49-F238E27FC236}">
+                  <a16:creationId xmlns:a16="http://schemas.microsoft.com/office/drawing/2014/main" id="{1F8E4320-D31B-4A84-B871-103E0C5672EF}"/>
+                </a:ext>
+              </a:extLst>
+            </p:cNvPr>
+            <p:cNvSpPr/>
+            <p:nvPr/>
+          </p:nvSpPr>
+          <p:spPr>
+            <a:xfrm>
+              <a:off x="1397000" y="1242250"/>
+              <a:ext cx="9398000" cy="378206"/>
+            </a:xfrm>
+            <a:prstGeom prst="rect">
+              <a:avLst/>
+            </a:prstGeom>
+          </p:spPr>
+          <p:style>
+            <a:lnRef idx="2">
+              <a:schemeClr val="dk1">
+                <a:shade val="50000"/>
+              </a:schemeClr>
+            </a:lnRef>
+            <a:fillRef idx="1">
+              <a:schemeClr val="dk1"/>
+            </a:fillRef>
+            <a:effectRef idx="0">
+              <a:schemeClr val="dk1"/>
+            </a:effectRef>
+            <a:fontRef idx="minor">
+              <a:schemeClr val="lt1"/>
+            </a:fontRef>
+          </p:style>
+          <p:txBody>
+            <a:bodyPr rtlCol="0" anchor="ctr"/>
+            <a:lstStyle/>
+            <a:p>
+              <a:pPr algn="ctr"/>
+              <a:endParaRPr lang="en-US"/>
+            </a:p>
+          </p:txBody>
+        </p:sp>
+        <p:sp>
+          <p:nvSpPr>
+            <p:cNvPr id="4" name="TextBox 3">
+              <a:extLst>
+                <a:ext uri="{FF2B5EF4-FFF2-40B4-BE49-F238E27FC236}">
+                  <a16:creationId xmlns:a16="http://schemas.microsoft.com/office/drawing/2014/main" id="{B64A4259-93A1-4271-B5DA-C5DE7C4A3AEB}"/>
+                </a:ext>
+              </a:extLst>
+            </p:cNvPr>
+            <p:cNvSpPr txBox="1"/>
+            <p:nvPr/>
+          </p:nvSpPr>
+          <p:spPr>
+            <a:xfrm>
+              <a:off x="1608881" y="1242250"/>
+              <a:ext cx="1840375" cy="378206"/>
+            </a:xfrm>
+            <a:prstGeom prst="rect">
+              <a:avLst/>
+            </a:prstGeom>
+            <a:noFill/>
+          </p:spPr>
+          <p:txBody>
+            <a:bodyPr wrap="square" rtlCol="0">
+              <a:spAutoFit/>
+            </a:bodyPr>
+            <a:lstStyle/>
+            <a:p>
+              <a:pPr algn="ctr"/>
+              <a:r>
+                <a:rPr lang="en-US" dirty="0">
+                  <a:solidFill>
+                    <a:schemeClr val="bg1"/>
+                  </a:solidFill>
+                </a:rPr>
+                <a:t>Booking Manager</a:t>
+              </a:r>
+            </a:p>
+          </p:txBody>
+        </p:sp>
+        <p:sp>
+          <p:nvSpPr>
+            <p:cNvPr id="13" name="TextBox 12">
+              <a:extLst>
+                <a:ext uri="{FF2B5EF4-FFF2-40B4-BE49-F238E27FC236}">
+                  <a16:creationId xmlns:a16="http://schemas.microsoft.com/office/drawing/2014/main" id="{51DE2D29-D9A0-4DC6-9993-64A3484A2627}"/>
+                </a:ext>
+              </a:extLst>
+            </p:cNvPr>
+            <p:cNvSpPr txBox="1"/>
+            <p:nvPr/>
+          </p:nvSpPr>
+          <p:spPr>
+            <a:xfrm>
+              <a:off x="3449256" y="1242250"/>
+              <a:ext cx="1840375" cy="378206"/>
+            </a:xfrm>
+            <a:prstGeom prst="rect">
+              <a:avLst/>
+            </a:prstGeom>
+            <a:noFill/>
+          </p:spPr>
+          <p:txBody>
+            <a:bodyPr wrap="square" rtlCol="0">
+              <a:spAutoFit/>
+            </a:bodyPr>
+            <a:lstStyle/>
+            <a:p>
+              <a:pPr algn="ctr"/>
+              <a:r>
+                <a:rPr lang="en-US" dirty="0">
+                  <a:solidFill>
+                    <a:schemeClr val="bg1"/>
+                  </a:solidFill>
+                </a:rPr>
+                <a:t>Price Manager</a:t>
+              </a:r>
+            </a:p>
+          </p:txBody>
+        </p:sp>
+        <p:sp>
+          <p:nvSpPr>
+            <p:cNvPr id="14" name="TextBox 13">
+              <a:extLst>
+                <a:ext uri="{FF2B5EF4-FFF2-40B4-BE49-F238E27FC236}">
+                  <a16:creationId xmlns:a16="http://schemas.microsoft.com/office/drawing/2014/main" id="{DD779965-0EA2-4985-8433-986261223AEA}"/>
+                </a:ext>
+              </a:extLst>
+            </p:cNvPr>
+            <p:cNvSpPr txBox="1"/>
+            <p:nvPr/>
+          </p:nvSpPr>
+          <p:spPr>
+            <a:xfrm>
+              <a:off x="8954625" y="1242250"/>
+              <a:ext cx="1840375" cy="378206"/>
+            </a:xfrm>
+            <a:prstGeom prst="rect">
+              <a:avLst/>
+            </a:prstGeom>
+            <a:noFill/>
+          </p:spPr>
+          <p:txBody>
+            <a:bodyPr wrap="square" rtlCol="0">
+              <a:spAutoFit/>
+            </a:bodyPr>
+            <a:lstStyle/>
+            <a:p>
+              <a:pPr algn="ctr"/>
+              <a:r>
+                <a:rPr lang="en-US" dirty="0">
+                  <a:solidFill>
+                    <a:schemeClr val="bg1"/>
+                  </a:solidFill>
+                </a:rPr>
+                <a:t>Logout</a:t>
+              </a:r>
+            </a:p>
+          </p:txBody>
+        </p:sp>
+        <p:sp>
+          <p:nvSpPr>
+            <p:cNvPr id="11" name="TextBox 10">
+              <a:extLst>
+                <a:ext uri="{FF2B5EF4-FFF2-40B4-BE49-F238E27FC236}">
+                  <a16:creationId xmlns:a16="http://schemas.microsoft.com/office/drawing/2014/main" id="{0E3EE51B-7F72-459A-936D-7647C6C65F69}"/>
+                </a:ext>
+              </a:extLst>
+            </p:cNvPr>
+            <p:cNvSpPr txBox="1"/>
+            <p:nvPr/>
+          </p:nvSpPr>
+          <p:spPr>
+            <a:xfrm>
+              <a:off x="2037144" y="1855906"/>
+              <a:ext cx="8009682" cy="369332"/>
+            </a:xfrm>
+            <a:prstGeom prst="rect">
+              <a:avLst/>
+            </a:prstGeom>
+            <a:noFill/>
+          </p:spPr>
+          <p:txBody>
+            <a:bodyPr wrap="square" rtlCol="0">
+              <a:spAutoFit/>
+            </a:bodyPr>
+            <a:lstStyle/>
+            <a:p>
+              <a:pPr algn="ctr"/>
+              <a:r>
+                <a:rPr lang="en-US" i="1" dirty="0"/>
+                <a:t>New Price</a:t>
+              </a:r>
+            </a:p>
+          </p:txBody>
+        </p:sp>
+        <p:cxnSp>
+          <p:nvCxnSpPr>
+            <p:cNvPr id="29" name="Straight Connector 28">
+              <a:extLst>
+                <a:ext uri="{FF2B5EF4-FFF2-40B4-BE49-F238E27FC236}">
+                  <a16:creationId xmlns:a16="http://schemas.microsoft.com/office/drawing/2014/main" id="{730B05E7-DA24-4054-A214-AC98427FC105}"/>
+                </a:ext>
+              </a:extLst>
+            </p:cNvPr>
+            <p:cNvCxnSpPr>
+              <a:cxnSpLocks/>
+            </p:cNvCxnSpPr>
+            <p:nvPr/>
+          </p:nvCxnSpPr>
+          <p:spPr>
+            <a:xfrm>
+              <a:off x="2141316" y="2259961"/>
+              <a:ext cx="7517756" cy="0"/>
+            </a:xfrm>
+            <a:prstGeom prst="line">
+              <a:avLst/>
+            </a:prstGeom>
+          </p:spPr>
+          <p:style>
+            <a:lnRef idx="1">
+              <a:schemeClr val="dk1"/>
+            </a:lnRef>
+            <a:fillRef idx="0">
+              <a:schemeClr val="dk1"/>
+            </a:fillRef>
+            <a:effectRef idx="0">
+              <a:schemeClr val="dk1"/>
+            </a:effectRef>
+            <a:fontRef idx="minor">
+              <a:schemeClr val="tx1"/>
+            </a:fontRef>
+          </p:style>
+        </p:cxnSp>
+        <p:cxnSp>
+          <p:nvCxnSpPr>
+            <p:cNvPr id="31" name="Straight Connector 30">
+              <a:extLst>
+                <a:ext uri="{FF2B5EF4-FFF2-40B4-BE49-F238E27FC236}">
+                  <a16:creationId xmlns:a16="http://schemas.microsoft.com/office/drawing/2014/main" id="{DD31279C-0192-4F01-8866-087562215560}"/>
+                </a:ext>
+              </a:extLst>
+            </p:cNvPr>
+            <p:cNvCxnSpPr>
+              <a:cxnSpLocks/>
+            </p:cNvCxnSpPr>
+            <p:nvPr/>
+          </p:nvCxnSpPr>
+          <p:spPr>
+            <a:xfrm>
+              <a:off x="2160608" y="6964848"/>
+              <a:ext cx="7517756" cy="0"/>
+            </a:xfrm>
+            <a:prstGeom prst="line">
+              <a:avLst/>
+            </a:prstGeom>
+          </p:spPr>
+          <p:style>
+            <a:lnRef idx="1">
+              <a:schemeClr val="dk1"/>
+            </a:lnRef>
+            <a:fillRef idx="0">
+              <a:schemeClr val="dk1"/>
+            </a:fillRef>
+            <a:effectRef idx="0">
+              <a:schemeClr val="dk1"/>
+            </a:effectRef>
+            <a:fontRef idx="minor">
+              <a:schemeClr val="tx1"/>
+            </a:fontRef>
+          </p:style>
+        </p:cxnSp>
+        <p:sp>
+          <p:nvSpPr>
+            <p:cNvPr id="35" name="TextBox 34">
+              <a:extLst>
+                <a:ext uri="{FF2B5EF4-FFF2-40B4-BE49-F238E27FC236}">
+                  <a16:creationId xmlns:a16="http://schemas.microsoft.com/office/drawing/2014/main" id="{BF67F2A5-8CBB-4F57-AFCD-B3BF1E217215}"/>
+                </a:ext>
+              </a:extLst>
+            </p:cNvPr>
+            <p:cNvSpPr txBox="1"/>
+            <p:nvPr/>
+          </p:nvSpPr>
+          <p:spPr>
+            <a:xfrm>
+              <a:off x="4427316" y="2454802"/>
+              <a:ext cx="3188826" cy="369332"/>
+            </a:xfrm>
+            <a:prstGeom prst="rect">
+              <a:avLst/>
+            </a:prstGeom>
+            <a:ln/>
+          </p:spPr>
+          <p:style>
+            <a:lnRef idx="2">
+              <a:schemeClr val="dk1"/>
+            </a:lnRef>
+            <a:fillRef idx="1">
+              <a:schemeClr val="lt1"/>
+            </a:fillRef>
+            <a:effectRef idx="0">
+              <a:schemeClr val="dk1"/>
+            </a:effectRef>
+            <a:fontRef idx="minor">
+              <a:schemeClr val="dk1"/>
+            </a:fontRef>
+          </p:style>
+          <p:txBody>
+            <a:bodyPr wrap="square" rtlCol="0">
+              <a:spAutoFit/>
+            </a:bodyPr>
+            <a:lstStyle/>
+            <a:p>
+              <a:pPr algn="ctr"/>
+              <a:r>
+                <a:rPr lang="en-US" dirty="0"/>
+                <a:t>Price</a:t>
+              </a:r>
+            </a:p>
+          </p:txBody>
+        </p:sp>
+        <p:sp>
+          <p:nvSpPr>
+            <p:cNvPr id="15" name="TextBox 14">
+              <a:extLst>
+                <a:ext uri="{FF2B5EF4-FFF2-40B4-BE49-F238E27FC236}">
+                  <a16:creationId xmlns:a16="http://schemas.microsoft.com/office/drawing/2014/main" id="{BE25E94C-8FE1-4FF8-A64E-056B0ECC5BC7}"/>
+                </a:ext>
+              </a:extLst>
+            </p:cNvPr>
+            <p:cNvSpPr txBox="1"/>
+            <p:nvPr/>
+          </p:nvSpPr>
+          <p:spPr>
+            <a:xfrm>
+              <a:off x="4427316" y="2925060"/>
+              <a:ext cx="3188826" cy="369332"/>
+            </a:xfrm>
+            <a:prstGeom prst="rect">
+              <a:avLst/>
+            </a:prstGeom>
+            <a:ln/>
+          </p:spPr>
+          <p:style>
+            <a:lnRef idx="2">
+              <a:schemeClr val="dk1"/>
+            </a:lnRef>
+            <a:fillRef idx="1">
+              <a:schemeClr val="lt1"/>
+            </a:fillRef>
+            <a:effectRef idx="0">
+              <a:schemeClr val="dk1"/>
+            </a:effectRef>
+            <a:fontRef idx="minor">
+              <a:schemeClr val="dk1"/>
+            </a:fontRef>
+          </p:style>
+          <p:txBody>
+            <a:bodyPr wrap="square" rtlCol="0">
+              <a:spAutoFit/>
+            </a:bodyPr>
+            <a:lstStyle/>
+            <a:p>
+              <a:pPr algn="ctr"/>
+              <a:r>
+                <a:rPr lang="en-US" dirty="0"/>
+                <a:t>per Night/Fixed toggle</a:t>
+              </a:r>
+            </a:p>
+          </p:txBody>
+        </p:sp>
+        <p:sp>
+          <p:nvSpPr>
+            <p:cNvPr id="16" name="TextBox 15">
+              <a:extLst>
+                <a:ext uri="{FF2B5EF4-FFF2-40B4-BE49-F238E27FC236}">
+                  <a16:creationId xmlns:a16="http://schemas.microsoft.com/office/drawing/2014/main" id="{BDACD9E1-C8F0-4821-B4B2-68BB8541EEAB}"/>
+                </a:ext>
+              </a:extLst>
+            </p:cNvPr>
+            <p:cNvSpPr txBox="1"/>
+            <p:nvPr/>
+          </p:nvSpPr>
+          <p:spPr>
+            <a:xfrm>
+              <a:off x="4427316" y="3397743"/>
+              <a:ext cx="3188826" cy="369332"/>
+            </a:xfrm>
+            <a:prstGeom prst="rect">
+              <a:avLst/>
+            </a:prstGeom>
+            <a:ln/>
+          </p:spPr>
+          <p:style>
+            <a:lnRef idx="2">
+              <a:schemeClr val="dk1"/>
+            </a:lnRef>
+            <a:fillRef idx="1">
+              <a:schemeClr val="lt1"/>
+            </a:fillRef>
+            <a:effectRef idx="0">
+              <a:schemeClr val="dk1"/>
+            </a:effectRef>
+            <a:fontRef idx="minor">
+              <a:schemeClr val="dk1"/>
+            </a:fontRef>
+          </p:style>
+          <p:txBody>
+            <a:bodyPr wrap="square" rtlCol="0">
+              <a:spAutoFit/>
+            </a:bodyPr>
+            <a:lstStyle/>
+            <a:p>
+              <a:pPr algn="ctr"/>
+              <a:r>
+                <a:rPr lang="en-US" dirty="0"/>
+                <a:t>Flat rate / Additional Persons</a:t>
+              </a:r>
+            </a:p>
+          </p:txBody>
+        </p:sp>
+        <p:sp>
+          <p:nvSpPr>
+            <p:cNvPr id="17" name="TextBox 16">
+              <a:extLst>
+                <a:ext uri="{FF2B5EF4-FFF2-40B4-BE49-F238E27FC236}">
+                  <a16:creationId xmlns:a16="http://schemas.microsoft.com/office/drawing/2014/main" id="{7D471D8C-9FB7-4310-B906-4EA9D133BCCE}"/>
+                </a:ext>
+              </a:extLst>
+            </p:cNvPr>
+            <p:cNvSpPr txBox="1"/>
+            <p:nvPr/>
+          </p:nvSpPr>
+          <p:spPr>
+            <a:xfrm>
+              <a:off x="4427316" y="4407630"/>
+              <a:ext cx="3188826" cy="369332"/>
+            </a:xfrm>
+            <a:prstGeom prst="rect">
+              <a:avLst/>
+            </a:prstGeom>
+            <a:ln/>
+          </p:spPr>
+          <p:style>
+            <a:lnRef idx="2">
+              <a:schemeClr val="dk1"/>
+            </a:lnRef>
+            <a:fillRef idx="1">
+              <a:schemeClr val="lt1"/>
+            </a:fillRef>
+            <a:effectRef idx="0">
+              <a:schemeClr val="dk1"/>
+            </a:effectRef>
+            <a:fontRef idx="minor">
+              <a:schemeClr val="dk1"/>
+            </a:fontRef>
+          </p:style>
+          <p:txBody>
+            <a:bodyPr wrap="square" rtlCol="0">
+              <a:spAutoFit/>
+            </a:bodyPr>
+            <a:lstStyle/>
+            <a:p>
+              <a:pPr algn="ctr"/>
+              <a:r>
+                <a:rPr lang="en-US" dirty="0"/>
+                <a:t>All year / date range</a:t>
+              </a:r>
+            </a:p>
+          </p:txBody>
+        </p:sp>
+        <p:sp>
+          <p:nvSpPr>
+            <p:cNvPr id="6" name="Rectangle 5">
+              <a:extLst>
+                <a:ext uri="{FF2B5EF4-FFF2-40B4-BE49-F238E27FC236}">
+                  <a16:creationId xmlns:a16="http://schemas.microsoft.com/office/drawing/2014/main" id="{B9FAD6DB-55D2-473E-AABE-085295CE74D7}"/>
+                </a:ext>
+              </a:extLst>
+            </p:cNvPr>
+            <p:cNvSpPr/>
+            <p:nvPr/>
+          </p:nvSpPr>
+          <p:spPr>
+            <a:xfrm>
+              <a:off x="4416878" y="4882443"/>
+              <a:ext cx="3199264" cy="1496023"/>
+            </a:xfrm>
+            <a:prstGeom prst="rect">
+              <a:avLst/>
+            </a:prstGeom>
+          </p:spPr>
+          <p:style>
+            <a:lnRef idx="2">
+              <a:schemeClr val="dk1"/>
+            </a:lnRef>
+            <a:fillRef idx="1">
+              <a:schemeClr val="lt1"/>
+            </a:fillRef>
+            <a:effectRef idx="0">
+              <a:schemeClr val="dk1"/>
+            </a:effectRef>
+            <a:fontRef idx="minor">
+              <a:schemeClr val="dk1"/>
+            </a:fontRef>
+          </p:style>
+          <p:txBody>
+            <a:bodyPr rtlCol="0" anchor="ctr"/>
+            <a:lstStyle/>
+            <a:p>
+              <a:pPr algn="ctr"/>
+              <a:r>
+                <a:rPr lang="en-US" dirty="0"/>
+                <a:t>Calendar for date range</a:t>
+              </a:r>
+            </a:p>
+          </p:txBody>
+        </p:sp>
+        <p:sp>
+          <p:nvSpPr>
+            <p:cNvPr id="7" name="Rectangle 6">
+              <a:extLst>
+                <a:ext uri="{FF2B5EF4-FFF2-40B4-BE49-F238E27FC236}">
+                  <a16:creationId xmlns:a16="http://schemas.microsoft.com/office/drawing/2014/main" id="{20F31300-92C8-4300-8180-D8B612EB0D0A}"/>
+                </a:ext>
+              </a:extLst>
+            </p:cNvPr>
+            <p:cNvSpPr/>
+            <p:nvPr/>
+          </p:nvSpPr>
+          <p:spPr>
+            <a:xfrm>
+              <a:off x="4575859" y="6483947"/>
+              <a:ext cx="1363884" cy="294361"/>
+            </a:xfrm>
+            <a:prstGeom prst="rect">
+              <a:avLst/>
+            </a:prstGeom>
+          </p:spPr>
+          <p:style>
+            <a:lnRef idx="2">
+              <a:schemeClr val="dk1"/>
+            </a:lnRef>
+            <a:fillRef idx="1">
+              <a:schemeClr val="lt1"/>
+            </a:fillRef>
+            <a:effectRef idx="0">
+              <a:schemeClr val="dk1"/>
+            </a:effectRef>
+            <a:fontRef idx="minor">
+              <a:schemeClr val="dk1"/>
+            </a:fontRef>
+          </p:style>
+          <p:txBody>
+            <a:bodyPr rtlCol="0" anchor="ctr"/>
+            <a:lstStyle/>
+            <a:p>
+              <a:pPr algn="ctr"/>
+              <a:r>
+                <a:rPr lang="en-US" dirty="0"/>
+                <a:t>Discard</a:t>
+              </a:r>
+            </a:p>
+          </p:txBody>
+        </p:sp>
+        <p:sp>
+          <p:nvSpPr>
+            <p:cNvPr id="22" name="Rectangle 21">
+              <a:extLst>
+                <a:ext uri="{FF2B5EF4-FFF2-40B4-BE49-F238E27FC236}">
+                  <a16:creationId xmlns:a16="http://schemas.microsoft.com/office/drawing/2014/main" id="{3FA62FAF-10DA-4EDF-8E80-C12D59204A86}"/>
+                </a:ext>
+              </a:extLst>
+            </p:cNvPr>
+            <p:cNvSpPr/>
+            <p:nvPr/>
+          </p:nvSpPr>
+          <p:spPr>
+            <a:xfrm>
+              <a:off x="6096000" y="6492568"/>
+              <a:ext cx="1363884" cy="294361"/>
+            </a:xfrm>
+            <a:prstGeom prst="rect">
+              <a:avLst/>
+            </a:prstGeom>
+          </p:spPr>
+          <p:style>
+            <a:lnRef idx="2">
+              <a:schemeClr val="dk1"/>
+            </a:lnRef>
+            <a:fillRef idx="1">
+              <a:schemeClr val="lt1"/>
+            </a:fillRef>
+            <a:effectRef idx="0">
+              <a:schemeClr val="dk1"/>
+            </a:effectRef>
+            <a:fontRef idx="minor">
+              <a:schemeClr val="dk1"/>
+            </a:fontRef>
+          </p:style>
+          <p:txBody>
+            <a:bodyPr rtlCol="0" anchor="ctr"/>
+            <a:lstStyle/>
+            <a:p>
+              <a:pPr algn="ctr"/>
+              <a:r>
+                <a:rPr lang="en-US" dirty="0"/>
+                <a:t>Apply</a:t>
+              </a:r>
+            </a:p>
+          </p:txBody>
+        </p:sp>
+        <p:sp>
+          <p:nvSpPr>
+            <p:cNvPr id="9" name="Rectangle 8">
+              <a:extLst>
+                <a:ext uri="{FF2B5EF4-FFF2-40B4-BE49-F238E27FC236}">
+                  <a16:creationId xmlns:a16="http://schemas.microsoft.com/office/drawing/2014/main" id="{13BB0C64-5A1C-4A31-A9A9-A725623328E3}"/>
+                </a:ext>
+              </a:extLst>
+            </p:cNvPr>
+            <p:cNvSpPr/>
+            <p:nvPr/>
+          </p:nvSpPr>
+          <p:spPr>
+            <a:xfrm>
+              <a:off x="4416878" y="3901774"/>
+              <a:ext cx="3199264" cy="357505"/>
+            </a:xfrm>
+            <a:prstGeom prst="rect">
+              <a:avLst/>
+            </a:prstGeom>
+          </p:spPr>
+          <p:style>
+            <a:lnRef idx="2">
+              <a:schemeClr val="dk1"/>
+            </a:lnRef>
+            <a:fillRef idx="1">
+              <a:schemeClr val="lt1"/>
+            </a:fillRef>
+            <a:effectRef idx="0">
+              <a:schemeClr val="dk1"/>
+            </a:effectRef>
+            <a:fontRef idx="minor">
+              <a:schemeClr val="dk1"/>
+            </a:fontRef>
+          </p:style>
+          <p:txBody>
+            <a:bodyPr rtlCol="0" anchor="ctr"/>
+            <a:lstStyle/>
+            <a:p>
+              <a:pPr algn="ctr"/>
+              <a:r>
+                <a:rPr lang="en-US" dirty="0"/>
+                <a:t>Min people – Max People</a:t>
+              </a:r>
+            </a:p>
+          </p:txBody>
+        </p:sp>
+      </p:grpSp>
     </p:spTree>
     <p:extLst>
       <p:ext uri="{BB962C8B-B14F-4D97-AF65-F5344CB8AC3E}">

</xml_diff>

<commit_message>
Issue #2 - Initial CSS design The 'css_design' file included in this commit outlines the various css classes and ids that will be used in the software. The "Contact Us" page design now includes a form to allow customers to contact us directly from the site. The 'Diagrams.pptx' and 'key_design_elements.docx' pages have been updated to reflect this.
</commit_message>
<xml_diff>
--- a/documentation/flow_diagrams/Diagrams.pptx
+++ b/documentation/flow_diagrams/Diagrams.pptx
@@ -13732,323 +13732,407 @@
           </a:p>
         </p:txBody>
       </p:sp>
-      <p:sp>
-        <p:nvSpPr>
-          <p:cNvPr id="2" name="Rectangle 1">
+      <p:grpSp>
+        <p:nvGrpSpPr>
+          <p:cNvPr id="12" name="Group 11">
             <a:extLst>
               <a:ext uri="{FF2B5EF4-FFF2-40B4-BE49-F238E27FC236}">
-                <a16:creationId xmlns:a16="http://schemas.microsoft.com/office/drawing/2014/main" id="{287A8ECD-4A3C-42EE-AA65-5BA7F91B72D4}"/>
+                <a16:creationId xmlns:a16="http://schemas.microsoft.com/office/drawing/2014/main" id="{1E80A485-A913-4ECC-BFE2-08AE27EF2073}"/>
               </a:ext>
             </a:extLst>
           </p:cNvPr>
-          <p:cNvSpPr/>
+          <p:cNvGrpSpPr/>
           <p:nvPr/>
-        </p:nvSpPr>
-        <p:spPr>
+        </p:nvGrpSpPr>
+        <p:grpSpPr>
           <a:xfrm>
-            <a:off x="1397000" y="1242250"/>
-            <a:ext cx="9398000" cy="3912136"/>
+            <a:off x="1397000" y="1242249"/>
+            <a:ext cx="9398000" cy="4701351"/>
+            <a:chOff x="1397000" y="1242249"/>
+            <a:chExt cx="9398000" cy="4701351"/>
           </a:xfrm>
-          <a:prstGeom prst="rect">
-            <a:avLst/>
-          </a:prstGeom>
-        </p:spPr>
-        <p:style>
-          <a:lnRef idx="2">
-            <a:schemeClr val="dk1"/>
-          </a:lnRef>
-          <a:fillRef idx="1">
-            <a:schemeClr val="lt1"/>
-          </a:fillRef>
-          <a:effectRef idx="0">
-            <a:schemeClr val="dk1"/>
-          </a:effectRef>
-          <a:fontRef idx="minor">
-            <a:schemeClr val="dk1"/>
-          </a:fontRef>
-        </p:style>
-        <p:txBody>
-          <a:bodyPr rtlCol="0" anchor="ctr"/>
-          <a:lstStyle/>
-          <a:p>
-            <a:pPr algn="ctr"/>
-            <a:endParaRPr lang="en-US" dirty="0"/>
-          </a:p>
-        </p:txBody>
-      </p:sp>
-      <p:sp>
-        <p:nvSpPr>
-          <p:cNvPr id="5" name="Rectangle 4">
-            <a:extLst>
-              <a:ext uri="{FF2B5EF4-FFF2-40B4-BE49-F238E27FC236}">
-                <a16:creationId xmlns:a16="http://schemas.microsoft.com/office/drawing/2014/main" id="{DBE0E741-4CE7-4E79-AD17-CC63F3B462A2}"/>
-              </a:ext>
-            </a:extLst>
-          </p:cNvPr>
-          <p:cNvSpPr/>
-          <p:nvPr/>
-        </p:nvSpPr>
-        <p:spPr>
-          <a:xfrm>
-            <a:off x="2278744" y="1554008"/>
-            <a:ext cx="3132666" cy="1798792"/>
-          </a:xfrm>
-          <a:prstGeom prst="rect">
-            <a:avLst/>
-          </a:prstGeom>
-        </p:spPr>
-        <p:style>
-          <a:lnRef idx="2">
-            <a:schemeClr val="dk1"/>
-          </a:lnRef>
-          <a:fillRef idx="1">
-            <a:schemeClr val="lt1"/>
-          </a:fillRef>
-          <a:effectRef idx="0">
-            <a:schemeClr val="dk1"/>
-          </a:effectRef>
-          <a:fontRef idx="minor">
-            <a:schemeClr val="dk1"/>
-          </a:fontRef>
-        </p:style>
-        <p:txBody>
-          <a:bodyPr rtlCol="0" anchor="ctr"/>
-          <a:lstStyle/>
-          <a:p>
-            <a:pPr algn="ctr"/>
-            <a:r>
-              <a:rPr lang="en-US" dirty="0"/>
-              <a:t>Photo of Mother (and Father)</a:t>
-            </a:r>
-          </a:p>
-        </p:txBody>
-      </p:sp>
-      <p:sp>
-        <p:nvSpPr>
-          <p:cNvPr id="3" name="Rectangle 2">
-            <a:extLst>
-              <a:ext uri="{FF2B5EF4-FFF2-40B4-BE49-F238E27FC236}">
-                <a16:creationId xmlns:a16="http://schemas.microsoft.com/office/drawing/2014/main" id="{DE69E330-DA4F-426F-B293-F0811C74AD4E}"/>
-              </a:ext>
-            </a:extLst>
-          </p:cNvPr>
-          <p:cNvSpPr/>
-          <p:nvPr/>
-        </p:nvSpPr>
-        <p:spPr>
-          <a:xfrm>
-            <a:off x="5453743" y="1554008"/>
-            <a:ext cx="4229100" cy="2585323"/>
-          </a:xfrm>
-          <a:prstGeom prst="rect">
-            <a:avLst/>
-          </a:prstGeom>
-        </p:spPr>
-        <p:txBody>
-          <a:bodyPr wrap="square">
-            <a:spAutoFit/>
-          </a:bodyPr>
-          <a:lstStyle/>
-          <a:p>
-            <a:r>
-              <a:rPr lang="en-US" dirty="0"/>
-              <a:t>Contact Details: </a:t>
-            </a:r>
-          </a:p>
-          <a:p>
-            <a:r>
-              <a:rPr lang="en-US" dirty="0"/>
-              <a:t>Lorem ipsum dolor sit </a:t>
-            </a:r>
-            <a:r>
-              <a:rPr lang="en-US" dirty="0" err="1"/>
-              <a:t>amet</a:t>
-            </a:r>
-            <a:r>
-              <a:rPr lang="en-US" dirty="0"/>
-              <a:t>, </a:t>
-            </a:r>
-            <a:r>
-              <a:rPr lang="en-US" dirty="0" err="1"/>
-              <a:t>consectetur</a:t>
-            </a:r>
-            <a:r>
-              <a:rPr lang="en-US" dirty="0"/>
-              <a:t> </a:t>
-            </a:r>
-            <a:r>
-              <a:rPr lang="en-US" dirty="0" err="1"/>
-              <a:t>adipiscing</a:t>
-            </a:r>
-            <a:r>
-              <a:rPr lang="en-US" dirty="0"/>
-              <a:t> </a:t>
-            </a:r>
-            <a:r>
-              <a:rPr lang="en-US" dirty="0" err="1"/>
-              <a:t>elit</a:t>
-            </a:r>
-            <a:r>
-              <a:rPr lang="en-US" dirty="0"/>
-              <a:t>.</a:t>
-            </a:r>
-          </a:p>
-          <a:p>
-            <a:r>
-              <a:rPr lang="en-US" dirty="0" err="1"/>
-              <a:t>Nulla</a:t>
-            </a:r>
-            <a:r>
-              <a:rPr lang="en-US" dirty="0"/>
-              <a:t> </a:t>
-            </a:r>
-            <a:r>
-              <a:rPr lang="en-US" dirty="0" err="1"/>
-              <a:t>sodales</a:t>
-            </a:r>
-            <a:r>
-              <a:rPr lang="en-US" dirty="0"/>
-              <a:t> </a:t>
-            </a:r>
-            <a:r>
-              <a:rPr lang="en-US" dirty="0" err="1"/>
-              <a:t>nunc</a:t>
-            </a:r>
-            <a:r>
-              <a:rPr lang="en-US" dirty="0"/>
-              <a:t> </a:t>
-            </a:r>
-            <a:r>
-              <a:rPr lang="en-US" dirty="0" err="1"/>
-              <a:t>eget</a:t>
-            </a:r>
-            <a:r>
-              <a:rPr lang="en-US" dirty="0"/>
-              <a:t> </a:t>
-            </a:r>
-            <a:r>
-              <a:rPr lang="en-US" dirty="0" err="1"/>
-              <a:t>metus</a:t>
-            </a:r>
-            <a:r>
-              <a:rPr lang="en-US" dirty="0"/>
-              <a:t> </a:t>
-            </a:r>
-            <a:r>
-              <a:rPr lang="en-US" dirty="0" err="1"/>
-              <a:t>porttitor</a:t>
-            </a:r>
-            <a:r>
-              <a:rPr lang="en-US" dirty="0"/>
-              <a:t> </a:t>
-            </a:r>
-            <a:r>
-              <a:rPr lang="en-US" dirty="0" err="1"/>
-              <a:t>egestas</a:t>
-            </a:r>
-            <a:r>
-              <a:rPr lang="en-US" dirty="0"/>
-              <a:t> id </a:t>
-            </a:r>
-            <a:r>
-              <a:rPr lang="en-US" dirty="0" err="1"/>
-              <a:t>nec</a:t>
-            </a:r>
-            <a:r>
-              <a:rPr lang="en-US" dirty="0"/>
-              <a:t> </a:t>
-            </a:r>
-            <a:r>
-              <a:rPr lang="en-US" dirty="0" err="1"/>
-              <a:t>mauris</a:t>
-            </a:r>
-            <a:r>
-              <a:rPr lang="en-US" dirty="0"/>
-              <a:t>.</a:t>
-            </a:r>
-          </a:p>
-          <a:p>
-            <a:r>
-              <a:rPr lang="en-US" dirty="0"/>
-              <a:t>Vestibulum et diam </a:t>
-            </a:r>
-            <a:r>
-              <a:rPr lang="en-US" dirty="0" err="1"/>
-              <a:t>ut</a:t>
-            </a:r>
-            <a:r>
-              <a:rPr lang="en-US" dirty="0"/>
-              <a:t> </a:t>
-            </a:r>
-            <a:r>
-              <a:rPr lang="en-US" dirty="0" err="1"/>
-              <a:t>arcu</a:t>
-            </a:r>
-            <a:r>
-              <a:rPr lang="en-US" dirty="0"/>
-              <a:t> </a:t>
-            </a:r>
-            <a:r>
-              <a:rPr lang="en-US" dirty="0" err="1"/>
-              <a:t>tincidunt</a:t>
-            </a:r>
-            <a:r>
-              <a:rPr lang="en-US" dirty="0"/>
-              <a:t> </a:t>
-            </a:r>
-            <a:r>
-              <a:rPr lang="en-US" dirty="0" err="1"/>
-              <a:t>euismod</a:t>
-            </a:r>
-            <a:r>
-              <a:rPr lang="en-US" dirty="0"/>
-              <a:t>.</a:t>
-            </a:r>
-          </a:p>
-          <a:p>
-            <a:r>
-              <a:rPr lang="en-US" dirty="0" err="1"/>
-              <a:t>Praesent</a:t>
-            </a:r>
-            <a:r>
-              <a:rPr lang="en-US" dirty="0"/>
-              <a:t> </a:t>
-            </a:r>
-            <a:r>
-              <a:rPr lang="en-US" dirty="0" err="1"/>
-              <a:t>suscipit</a:t>
-            </a:r>
-            <a:r>
-              <a:rPr lang="en-US" dirty="0"/>
-              <a:t> magna </a:t>
-            </a:r>
-            <a:r>
-              <a:rPr lang="en-US" dirty="0" err="1"/>
-              <a:t>eget</a:t>
-            </a:r>
-            <a:r>
-              <a:rPr lang="en-US" dirty="0"/>
-              <a:t> </a:t>
-            </a:r>
-            <a:r>
-              <a:rPr lang="en-US" dirty="0" err="1"/>
-              <a:t>congue</a:t>
-            </a:r>
-            <a:r>
-              <a:rPr lang="en-US" dirty="0"/>
-              <a:t> </a:t>
-            </a:r>
-            <a:r>
-              <a:rPr lang="en-US" dirty="0" err="1"/>
-              <a:t>dignissim</a:t>
-            </a:r>
-            <a:r>
-              <a:rPr lang="en-US" dirty="0"/>
-              <a:t>.</a:t>
-            </a:r>
-          </a:p>
-        </p:txBody>
-      </p:sp>
+        </p:grpSpPr>
+        <p:sp>
+          <p:nvSpPr>
+            <p:cNvPr id="2" name="Rectangle 1">
+              <a:extLst>
+                <a:ext uri="{FF2B5EF4-FFF2-40B4-BE49-F238E27FC236}">
+                  <a16:creationId xmlns:a16="http://schemas.microsoft.com/office/drawing/2014/main" id="{287A8ECD-4A3C-42EE-AA65-5BA7F91B72D4}"/>
+                </a:ext>
+              </a:extLst>
+            </p:cNvPr>
+            <p:cNvSpPr/>
+            <p:nvPr/>
+          </p:nvSpPr>
+          <p:spPr>
+            <a:xfrm>
+              <a:off x="1397000" y="1242249"/>
+              <a:ext cx="9398000" cy="4701351"/>
+            </a:xfrm>
+            <a:prstGeom prst="rect">
+              <a:avLst/>
+            </a:prstGeom>
+          </p:spPr>
+          <p:style>
+            <a:lnRef idx="2">
+              <a:schemeClr val="dk1"/>
+            </a:lnRef>
+            <a:fillRef idx="1">
+              <a:schemeClr val="lt1"/>
+            </a:fillRef>
+            <a:effectRef idx="0">
+              <a:schemeClr val="dk1"/>
+            </a:effectRef>
+            <a:fontRef idx="minor">
+              <a:schemeClr val="dk1"/>
+            </a:fontRef>
+          </p:style>
+          <p:txBody>
+            <a:bodyPr rtlCol="0" anchor="ctr"/>
+            <a:lstStyle/>
+            <a:p>
+              <a:pPr algn="ctr"/>
+              <a:endParaRPr lang="en-US" dirty="0"/>
+            </a:p>
+          </p:txBody>
+        </p:sp>
+        <p:sp>
+          <p:nvSpPr>
+            <p:cNvPr id="5" name="Rectangle 4">
+              <a:extLst>
+                <a:ext uri="{FF2B5EF4-FFF2-40B4-BE49-F238E27FC236}">
+                  <a16:creationId xmlns:a16="http://schemas.microsoft.com/office/drawing/2014/main" id="{DBE0E741-4CE7-4E79-AD17-CC63F3B462A2}"/>
+                </a:ext>
+              </a:extLst>
+            </p:cNvPr>
+            <p:cNvSpPr/>
+            <p:nvPr/>
+          </p:nvSpPr>
+          <p:spPr>
+            <a:xfrm>
+              <a:off x="2278744" y="1554008"/>
+              <a:ext cx="3132666" cy="1798792"/>
+            </a:xfrm>
+            <a:prstGeom prst="rect">
+              <a:avLst/>
+            </a:prstGeom>
+          </p:spPr>
+          <p:style>
+            <a:lnRef idx="2">
+              <a:schemeClr val="dk1"/>
+            </a:lnRef>
+            <a:fillRef idx="1">
+              <a:schemeClr val="lt1"/>
+            </a:fillRef>
+            <a:effectRef idx="0">
+              <a:schemeClr val="dk1"/>
+            </a:effectRef>
+            <a:fontRef idx="minor">
+              <a:schemeClr val="dk1"/>
+            </a:fontRef>
+          </p:style>
+          <p:txBody>
+            <a:bodyPr rtlCol="0" anchor="ctr"/>
+            <a:lstStyle/>
+            <a:p>
+              <a:pPr algn="ctr"/>
+              <a:r>
+                <a:rPr lang="en-US" dirty="0"/>
+                <a:t>Photo of Mother (and Father)</a:t>
+              </a:r>
+            </a:p>
+          </p:txBody>
+        </p:sp>
+        <p:sp>
+          <p:nvSpPr>
+            <p:cNvPr id="3" name="Rectangle 2">
+              <a:extLst>
+                <a:ext uri="{FF2B5EF4-FFF2-40B4-BE49-F238E27FC236}">
+                  <a16:creationId xmlns:a16="http://schemas.microsoft.com/office/drawing/2014/main" id="{DE69E330-DA4F-426F-B293-F0811C74AD4E}"/>
+                </a:ext>
+              </a:extLst>
+            </p:cNvPr>
+            <p:cNvSpPr/>
+            <p:nvPr/>
+          </p:nvSpPr>
+          <p:spPr>
+            <a:xfrm>
+              <a:off x="2341025" y="3505201"/>
+              <a:ext cx="3070385" cy="923330"/>
+            </a:xfrm>
+            <a:prstGeom prst="rect">
+              <a:avLst/>
+            </a:prstGeom>
+          </p:spPr>
+          <p:txBody>
+            <a:bodyPr wrap="square">
+              <a:spAutoFit/>
+            </a:bodyPr>
+            <a:lstStyle/>
+            <a:p>
+              <a:r>
+                <a:rPr lang="en-US" dirty="0"/>
+                <a:t>Contact Details: </a:t>
+              </a:r>
+            </a:p>
+            <a:p>
+              <a:pPr marL="285750" indent="-285750">
+                <a:buFontTx/>
+                <a:buChar char="-"/>
+              </a:pPr>
+              <a:r>
+                <a:rPr lang="en-US" dirty="0"/>
+                <a:t>Phone number</a:t>
+              </a:r>
+            </a:p>
+            <a:p>
+              <a:pPr marL="285750" indent="-285750">
+                <a:buFontTx/>
+                <a:buChar char="-"/>
+              </a:pPr>
+              <a:r>
+                <a:rPr lang="en-US" dirty="0"/>
+                <a:t>Email address</a:t>
+              </a:r>
+            </a:p>
+          </p:txBody>
+        </p:sp>
+        <p:sp>
+          <p:nvSpPr>
+            <p:cNvPr id="4" name="Rectangle 3">
+              <a:extLst>
+                <a:ext uri="{FF2B5EF4-FFF2-40B4-BE49-F238E27FC236}">
+                  <a16:creationId xmlns:a16="http://schemas.microsoft.com/office/drawing/2014/main" id="{D37B57BB-8EBA-4EF4-9BB1-92078027AC8B}"/>
+                </a:ext>
+              </a:extLst>
+            </p:cNvPr>
+            <p:cNvSpPr/>
+            <p:nvPr/>
+          </p:nvSpPr>
+          <p:spPr>
+            <a:xfrm>
+              <a:off x="5981178" y="1759907"/>
+              <a:ext cx="4139852" cy="382044"/>
+            </a:xfrm>
+            <a:prstGeom prst="rect">
+              <a:avLst/>
+            </a:prstGeom>
+          </p:spPr>
+          <p:style>
+            <a:lnRef idx="2">
+              <a:schemeClr val="dk1"/>
+            </a:lnRef>
+            <a:fillRef idx="1">
+              <a:schemeClr val="lt1"/>
+            </a:fillRef>
+            <a:effectRef idx="0">
+              <a:schemeClr val="dk1"/>
+            </a:effectRef>
+            <a:fontRef idx="minor">
+              <a:schemeClr val="dk1"/>
+            </a:fontRef>
+          </p:style>
+          <p:txBody>
+            <a:bodyPr rtlCol="0" anchor="ctr"/>
+            <a:lstStyle/>
+            <a:p>
+              <a:pPr algn="ctr"/>
+              <a:r>
+                <a:rPr lang="en-US" dirty="0"/>
+                <a:t>Name</a:t>
+              </a:r>
+            </a:p>
+          </p:txBody>
+        </p:sp>
+        <p:sp>
+          <p:nvSpPr>
+            <p:cNvPr id="7" name="Rectangle 6">
+              <a:extLst>
+                <a:ext uri="{FF2B5EF4-FFF2-40B4-BE49-F238E27FC236}">
+                  <a16:creationId xmlns:a16="http://schemas.microsoft.com/office/drawing/2014/main" id="{FB92ACEE-043C-4BB5-A3F3-10DACD03EF40}"/>
+                </a:ext>
+              </a:extLst>
+            </p:cNvPr>
+            <p:cNvSpPr/>
+            <p:nvPr/>
+          </p:nvSpPr>
+          <p:spPr>
+            <a:xfrm>
+              <a:off x="5981178" y="2429965"/>
+              <a:ext cx="4139852" cy="382044"/>
+            </a:xfrm>
+            <a:prstGeom prst="rect">
+              <a:avLst/>
+            </a:prstGeom>
+          </p:spPr>
+          <p:style>
+            <a:lnRef idx="2">
+              <a:schemeClr val="dk1"/>
+            </a:lnRef>
+            <a:fillRef idx="1">
+              <a:schemeClr val="lt1"/>
+            </a:fillRef>
+            <a:effectRef idx="0">
+              <a:schemeClr val="dk1"/>
+            </a:effectRef>
+            <a:fontRef idx="minor">
+              <a:schemeClr val="dk1"/>
+            </a:fontRef>
+          </p:style>
+          <p:txBody>
+            <a:bodyPr rtlCol="0" anchor="ctr"/>
+            <a:lstStyle/>
+            <a:p>
+              <a:pPr algn="ctr"/>
+              <a:r>
+                <a:rPr lang="en-US" dirty="0"/>
+                <a:t>Email Address</a:t>
+              </a:r>
+            </a:p>
+          </p:txBody>
+        </p:sp>
+        <p:sp>
+          <p:nvSpPr>
+            <p:cNvPr id="9" name="Rectangle 8">
+              <a:extLst>
+                <a:ext uri="{FF2B5EF4-FFF2-40B4-BE49-F238E27FC236}">
+                  <a16:creationId xmlns:a16="http://schemas.microsoft.com/office/drawing/2014/main" id="{5ADC7550-5CF0-445B-AD55-45B1621498D7}"/>
+                </a:ext>
+              </a:extLst>
+            </p:cNvPr>
+            <p:cNvSpPr/>
+            <p:nvPr/>
+          </p:nvSpPr>
+          <p:spPr>
+            <a:xfrm>
+              <a:off x="5981178" y="3100023"/>
+              <a:ext cx="4139852" cy="382044"/>
+            </a:xfrm>
+            <a:prstGeom prst="rect">
+              <a:avLst/>
+            </a:prstGeom>
+          </p:spPr>
+          <p:style>
+            <a:lnRef idx="2">
+              <a:schemeClr val="dk1"/>
+            </a:lnRef>
+            <a:fillRef idx="1">
+              <a:schemeClr val="lt1"/>
+            </a:fillRef>
+            <a:effectRef idx="0">
+              <a:schemeClr val="dk1"/>
+            </a:effectRef>
+            <a:fontRef idx="minor">
+              <a:schemeClr val="dk1"/>
+            </a:fontRef>
+          </p:style>
+          <p:txBody>
+            <a:bodyPr rtlCol="0" anchor="ctr"/>
+            <a:lstStyle/>
+            <a:p>
+              <a:pPr algn="ctr"/>
+              <a:r>
+                <a:rPr lang="en-US" dirty="0"/>
+                <a:t>Subject</a:t>
+              </a:r>
+            </a:p>
+          </p:txBody>
+        </p:sp>
+        <p:sp>
+          <p:nvSpPr>
+            <p:cNvPr id="10" name="Rectangle 9">
+              <a:extLst>
+                <a:ext uri="{FF2B5EF4-FFF2-40B4-BE49-F238E27FC236}">
+                  <a16:creationId xmlns:a16="http://schemas.microsoft.com/office/drawing/2014/main" id="{8515FAD9-89F1-4EE8-AF48-0B8739E738FD}"/>
+                </a:ext>
+              </a:extLst>
+            </p:cNvPr>
+            <p:cNvSpPr/>
+            <p:nvPr/>
+          </p:nvSpPr>
+          <p:spPr>
+            <a:xfrm>
+              <a:off x="5981178" y="3769911"/>
+              <a:ext cx="4139852" cy="1340707"/>
+            </a:xfrm>
+            <a:prstGeom prst="rect">
+              <a:avLst/>
+            </a:prstGeom>
+          </p:spPr>
+          <p:style>
+            <a:lnRef idx="2">
+              <a:schemeClr val="dk1"/>
+            </a:lnRef>
+            <a:fillRef idx="1">
+              <a:schemeClr val="lt1"/>
+            </a:fillRef>
+            <a:effectRef idx="0">
+              <a:schemeClr val="dk1"/>
+            </a:effectRef>
+            <a:fontRef idx="minor">
+              <a:schemeClr val="dk1"/>
+            </a:fontRef>
+          </p:style>
+          <p:txBody>
+            <a:bodyPr rtlCol="0" anchor="ctr"/>
+            <a:lstStyle/>
+            <a:p>
+              <a:pPr algn="ctr"/>
+              <a:r>
+                <a:rPr lang="en-US" dirty="0"/>
+                <a:t>Message</a:t>
+              </a:r>
+            </a:p>
+          </p:txBody>
+        </p:sp>
+        <p:sp>
+          <p:nvSpPr>
+            <p:cNvPr id="11" name="Rectangle 10">
+              <a:extLst>
+                <a:ext uri="{FF2B5EF4-FFF2-40B4-BE49-F238E27FC236}">
+                  <a16:creationId xmlns:a16="http://schemas.microsoft.com/office/drawing/2014/main" id="{6CB0E8B9-675F-4595-80D0-62077AEBD5D5}"/>
+                </a:ext>
+              </a:extLst>
+            </p:cNvPr>
+            <p:cNvSpPr/>
+            <p:nvPr/>
+          </p:nvSpPr>
+          <p:spPr>
+            <a:xfrm>
+              <a:off x="7340252" y="5311036"/>
+              <a:ext cx="1546964" cy="304715"/>
+            </a:xfrm>
+            <a:prstGeom prst="rect">
+              <a:avLst/>
+            </a:prstGeom>
+          </p:spPr>
+          <p:style>
+            <a:lnRef idx="2">
+              <a:schemeClr val="dk1"/>
+            </a:lnRef>
+            <a:fillRef idx="1">
+              <a:schemeClr val="lt1"/>
+            </a:fillRef>
+            <a:effectRef idx="0">
+              <a:schemeClr val="dk1"/>
+            </a:effectRef>
+            <a:fontRef idx="minor">
+              <a:schemeClr val="dk1"/>
+            </a:fontRef>
+          </p:style>
+          <p:txBody>
+            <a:bodyPr rtlCol="0" anchor="ctr"/>
+            <a:lstStyle/>
+            <a:p>
+              <a:pPr algn="ctr"/>
+              <a:r>
+                <a:rPr lang="en-US" dirty="0"/>
+                <a:t>Send</a:t>
+              </a:r>
+            </a:p>
+          </p:txBody>
+        </p:sp>
+      </p:grpSp>
     </p:spTree>
     <p:extLst>
       <p:ext uri="{BB962C8B-B14F-4D97-AF65-F5344CB8AC3E}">

</xml_diff>